<commit_message>
Update images and README to match new proposed spec
</commit_message>
<xml_diff>
--- a/EPrintsArchivematicaExportStructure-v2.pptx
+++ b/EPrintsArchivematicaExportStructure-v2.pptx
@@ -1632,23 +1632,23 @@
         <a:lstStyle/>
         <a:p>
           <a:r>
-            <a:rPr lang="en-CA" sz="1200" b="1" dirty="0" err="1" smtClean="0"/>
+            <a:rPr lang="en-CA" sz="1200" b="1" dirty="0" err="1"/>
             <a:t>repositoryid-eprintid-lastmoddate</a:t>
           </a:r>
           <a:r>
-            <a:rPr lang="en-CA" sz="1200" b="1" dirty="0" smtClean="0"/>
+            <a:rPr lang="en-CA" sz="1200" b="1" dirty="0"/>
             <a:t> folder </a:t>
           </a:r>
           <a:r>
-            <a:rPr lang="en-CA" sz="1200" dirty="0" smtClean="0"/>
+            <a:rPr lang="en-CA" sz="1200" dirty="0"/>
             <a:t>(for example </a:t>
           </a:r>
           <a:r>
-            <a:rPr lang="en-CA" sz="1200" baseline="0" dirty="0" smtClean="0"/>
+            <a:rPr lang="en-CA" sz="1200" baseline="0" dirty="0"/>
             <a:t>library-981471-2016-11-05_05-20-53</a:t>
           </a:r>
           <a:r>
-            <a:rPr lang="en-CA" sz="1200" dirty="0" smtClean="0"/>
+            <a:rPr lang="en-CA" sz="1200" dirty="0"/>
             <a:t>)</a:t>
           </a:r>
           <a:endParaRPr lang="en-US" sz="1200" dirty="0"/>
@@ -1685,10 +1685,9 @@
         <a:lstStyle/>
         <a:p>
           <a:r>
-            <a:rPr lang="en-US" sz="1400" baseline="0" dirty="0" smtClean="0"/>
+            <a:rPr lang="en-US" sz="1400" baseline="0" dirty="0"/>
             <a:t>objects</a:t>
           </a:r>
-          <a:endParaRPr lang="en-US" sz="1400" baseline="0" dirty="0"/>
         </a:p>
       </dgm:t>
     </dgm:pt>
@@ -1722,10 +1721,9 @@
         <a:lstStyle/>
         <a:p>
           <a:r>
-            <a:rPr lang="en-US" sz="1400" baseline="0" dirty="0" smtClean="0"/>
+            <a:rPr lang="en-US" sz="1400" baseline="0" dirty="0"/>
             <a:t>EP3.xml</a:t>
           </a:r>
-          <a:endParaRPr lang="en-US" sz="1400" baseline="0" dirty="0"/>
         </a:p>
       </dgm:t>
     </dgm:pt>
@@ -1759,10 +1757,16 @@
         <a:lstStyle/>
         <a:p>
           <a:r>
-            <a:rPr lang="en-US" sz="1400" baseline="0" dirty="0" smtClean="0"/>
-            <a:t>DublinCore.txt</a:t>
+            <a:rPr lang="en-US" sz="1400" baseline="0" dirty="0" err="1"/>
+            <a:t>metadata.json</a:t>
           </a:r>
-          <a:endParaRPr lang="en-US" sz="1400" baseline="0" dirty="0"/>
+          <a:br>
+            <a:rPr lang="en-US" sz="1400" baseline="0" dirty="0"/>
+          </a:br>
+          <a:r>
+            <a:rPr lang="en-US" sz="1400" baseline="0" dirty="0"/>
+            <a:t>(Dublin Core)</a:t>
+          </a:r>
         </a:p>
       </dgm:t>
     </dgm:pt>
@@ -1796,10 +1800,9 @@
         <a:lstStyle/>
         <a:p>
           <a:r>
-            <a:rPr lang="en-US" sz="1400" baseline="0" dirty="0" smtClean="0"/>
+            <a:rPr lang="en-US" sz="1400" baseline="0" dirty="0"/>
             <a:t>metadata</a:t>
           </a:r>
-          <a:endParaRPr lang="en-US" sz="1400" baseline="0" dirty="0"/>
         </a:p>
       </dgm:t>
     </dgm:pt>
@@ -1833,10 +1836,9 @@
         <a:lstStyle/>
         <a:p>
           <a:r>
-            <a:rPr lang="en-US" sz="1400" baseline="0" dirty="0" smtClean="0"/>
+            <a:rPr lang="en-US" sz="1400" baseline="0" dirty="0"/>
             <a:t>revisions</a:t>
           </a:r>
-          <a:endParaRPr lang="en-US" sz="1400" baseline="0" dirty="0"/>
         </a:p>
       </dgm:t>
     </dgm:pt>
@@ -1870,10 +1872,9 @@
         <a:lstStyle/>
         <a:p>
           <a:r>
-            <a:rPr lang="en-US" baseline="0" dirty="0" smtClean="0"/>
+            <a:rPr lang="en-US" baseline="0" dirty="0"/>
             <a:t>1.xml</a:t>
           </a:r>
-          <a:endParaRPr lang="en-US" baseline="0" dirty="0"/>
         </a:p>
       </dgm:t>
     </dgm:pt>
@@ -1907,10 +1908,9 @@
         <a:lstStyle/>
         <a:p>
           <a:r>
-            <a:rPr lang="en-US" baseline="0" dirty="0" smtClean="0"/>
+            <a:rPr lang="en-US" baseline="0" dirty="0"/>
             <a:t>2.xml</a:t>
           </a:r>
-          <a:endParaRPr lang="en-US" baseline="0" dirty="0"/>
         </a:p>
       </dgm:t>
     </dgm:pt>
@@ -1944,7 +1944,7 @@
         <a:lstStyle/>
         <a:p>
           <a:r>
-            <a:rPr lang="en-US" smtClean="0"/>
+            <a:rPr lang="en-US"/>
             <a:t>derivatives</a:t>
           </a:r>
           <a:endParaRPr lang="en-US" baseline="0" dirty="0"/>
@@ -1981,18 +1981,17 @@
         <a:lstStyle/>
         <a:p>
           <a:r>
-            <a:rPr lang="en-US" baseline="0" dirty="0" smtClean="0"/>
+            <a:rPr lang="en-US" baseline="0" dirty="0"/>
             <a:t>Folder # on disk (&lt;</a:t>
           </a:r>
           <a:r>
-            <a:rPr lang="en-US" baseline="0" dirty="0" err="1" smtClean="0"/>
+            <a:rPr lang="en-US" baseline="0" dirty="0" err="1"/>
             <a:t>pos</a:t>
           </a:r>
           <a:r>
-            <a:rPr lang="en-US" baseline="0" dirty="0" smtClean="0"/>
+            <a:rPr lang="en-US" baseline="0" dirty="0"/>
             <a:t>&gt;)</a:t>
           </a:r>
-          <a:endParaRPr lang="en-US" baseline="0" dirty="0"/>
         </a:p>
       </dgm:t>
     </dgm:pt>
@@ -2026,10 +2025,9 @@
         <a:lstStyle/>
         <a:p>
           <a:r>
-            <a:rPr lang="en-US" baseline="0" dirty="0" smtClean="0"/>
+            <a:rPr lang="en-US" baseline="0" dirty="0"/>
             <a:t>filename</a:t>
           </a:r>
-          <a:endParaRPr lang="en-US" baseline="0" dirty="0"/>
         </a:p>
       </dgm:t>
     </dgm:pt>
@@ -2063,18 +2061,17 @@
         <a:lstStyle/>
         <a:p>
           <a:r>
-            <a:rPr lang="en-US" baseline="0" dirty="0" smtClean="0"/>
+            <a:rPr lang="en-US" baseline="0" dirty="0"/>
             <a:t>Folder # on disk (&lt;</a:t>
           </a:r>
           <a:r>
-            <a:rPr lang="en-US" baseline="0" dirty="0" err="1" smtClean="0"/>
+            <a:rPr lang="en-US" baseline="0" dirty="0" err="1"/>
             <a:t>pos</a:t>
           </a:r>
           <a:r>
-            <a:rPr lang="en-US" baseline="0" dirty="0" smtClean="0"/>
+            <a:rPr lang="en-US" baseline="0" dirty="0"/>
             <a:t>&gt;)</a:t>
           </a:r>
-          <a:endParaRPr lang="en-US" baseline="0" dirty="0"/>
         </a:p>
       </dgm:t>
     </dgm:pt>
@@ -2108,10 +2105,9 @@
         <a:lstStyle/>
         <a:p>
           <a:r>
-            <a:rPr lang="en-US" baseline="0" dirty="0" smtClean="0"/>
+            <a:rPr lang="en-US" baseline="0" dirty="0"/>
             <a:t>filename</a:t>
           </a:r>
-          <a:endParaRPr lang="en-US" baseline="0" dirty="0"/>
         </a:p>
       </dgm:t>
     </dgm:pt>
@@ -2145,10 +2141,9 @@
         <a:lstStyle/>
         <a:p>
           <a:r>
-            <a:rPr lang="en-US" sz="1400" baseline="0" dirty="0" smtClean="0"/>
+            <a:rPr lang="en-US" sz="1400" baseline="0" dirty="0"/>
             <a:t>checksum.md5</a:t>
           </a:r>
-          <a:endParaRPr lang="en-US" sz="1400" baseline="0" dirty="0"/>
         </a:p>
       </dgm:t>
     </dgm:pt>
@@ -2182,10 +2177,9 @@
         <a:lstStyle/>
         <a:p>
           <a:r>
-            <a:rPr lang="en-US" sz="1400" baseline="0" dirty="0" smtClean="0"/>
-            <a:t>Documents</a:t>
+            <a:rPr lang="en-US" sz="1400" baseline="0" dirty="0"/>
+            <a:t>documents</a:t>
           </a:r>
-          <a:endParaRPr lang="en-US" sz="1400" baseline="0" dirty="0"/>
         </a:p>
       </dgm:t>
     </dgm:pt>
@@ -2222,13 +2216,6 @@
         </dgm:presLayoutVars>
       </dgm:prSet>
       <dgm:spPr/>
-      <dgm:t>
-        <a:bodyPr/>
-        <a:lstStyle/>
-        <a:p>
-          <a:endParaRPr lang="en-US"/>
-        </a:p>
-      </dgm:t>
     </dgm:pt>
     <dgm:pt modelId="{B5B783EA-3F60-456D-B956-C15D100CFAFA}" type="pres">
       <dgm:prSet presAssocID="{4B45486A-C81F-4BA8-AEEE-9DE931EFB1FA}" presName="hierRoot1" presStyleCnt="0"/>
@@ -2249,13 +2236,6 @@
         </dgm:presLayoutVars>
       </dgm:prSet>
       <dgm:spPr/>
-      <dgm:t>
-        <a:bodyPr/>
-        <a:lstStyle/>
-        <a:p>
-          <a:endParaRPr lang="en-US"/>
-        </a:p>
-      </dgm:t>
     </dgm:pt>
     <dgm:pt modelId="{CDC816B4-8B63-477C-8B7A-197E11BBC8B8}" type="pres">
       <dgm:prSet presAssocID="{4B45486A-C81F-4BA8-AEEE-9DE931EFB1FA}" presName="hierChild2" presStyleCnt="0"/>
@@ -2264,13 +2244,6 @@
     <dgm:pt modelId="{FE690589-86B8-43FE-A41B-9D62D6430AB9}" type="pres">
       <dgm:prSet presAssocID="{5B17717F-5F4F-4947-AB7B-DAE68E73538F}" presName="Name10" presStyleLbl="parChTrans1D2" presStyleIdx="0" presStyleCnt="2"/>
       <dgm:spPr/>
-      <dgm:t>
-        <a:bodyPr/>
-        <a:lstStyle/>
-        <a:p>
-          <a:endParaRPr lang="en-US"/>
-        </a:p>
-      </dgm:t>
     </dgm:pt>
     <dgm:pt modelId="{2E813B83-67FC-4842-8F47-5BD60EFFD4EF}" type="pres">
       <dgm:prSet presAssocID="{1245DEF0-43F9-4230-A81A-980D178A756B}" presName="hierRoot2" presStyleCnt="0"/>
@@ -2291,13 +2264,6 @@
         </dgm:presLayoutVars>
       </dgm:prSet>
       <dgm:spPr/>
-      <dgm:t>
-        <a:bodyPr/>
-        <a:lstStyle/>
-        <a:p>
-          <a:endParaRPr lang="en-US"/>
-        </a:p>
-      </dgm:t>
     </dgm:pt>
     <dgm:pt modelId="{A545A776-4A9C-49F1-B844-5D1CB6AB55A3}" type="pres">
       <dgm:prSet presAssocID="{1245DEF0-43F9-4230-A81A-980D178A756B}" presName="hierChild3" presStyleCnt="0"/>
@@ -2326,13 +2292,6 @@
         </dgm:presLayoutVars>
       </dgm:prSet>
       <dgm:spPr/>
-      <dgm:t>
-        <a:bodyPr/>
-        <a:lstStyle/>
-        <a:p>
-          <a:endParaRPr lang="en-US"/>
-        </a:p>
-      </dgm:t>
     </dgm:pt>
     <dgm:pt modelId="{5561ED40-59AD-4660-8B04-5C85B27DCD5A}" type="pres">
       <dgm:prSet presAssocID="{B425ABC7-A3E0-4EA9-B0B0-C88BCA4327A4}" presName="hierChild4" presStyleCnt="0"/>
@@ -2361,13 +2320,6 @@
         </dgm:presLayoutVars>
       </dgm:prSet>
       <dgm:spPr/>
-      <dgm:t>
-        <a:bodyPr/>
-        <a:lstStyle/>
-        <a:p>
-          <a:endParaRPr lang="en-US"/>
-        </a:p>
-      </dgm:t>
     </dgm:pt>
     <dgm:pt modelId="{B1624760-0347-41AC-B52B-07007A5782D2}" type="pres">
       <dgm:prSet presAssocID="{E9335B92-0993-47B6-89C4-6972D0CA941C}" presName="hierChild4" presStyleCnt="0"/>
@@ -2396,13 +2348,6 @@
         </dgm:presLayoutVars>
       </dgm:prSet>
       <dgm:spPr/>
-      <dgm:t>
-        <a:bodyPr/>
-        <a:lstStyle/>
-        <a:p>
-          <a:endParaRPr lang="en-US"/>
-        </a:p>
-      </dgm:t>
     </dgm:pt>
     <dgm:pt modelId="{8F6BDE23-129C-4537-9475-9D0A98BAFE26}" type="pres">
       <dgm:prSet presAssocID="{64F125AA-06E5-408C-92F0-29B683643E21}" presName="hierChild5" presStyleCnt="0"/>
@@ -2431,13 +2376,6 @@
         </dgm:presLayoutVars>
       </dgm:prSet>
       <dgm:spPr/>
-      <dgm:t>
-        <a:bodyPr/>
-        <a:lstStyle/>
-        <a:p>
-          <a:endParaRPr lang="en-US"/>
-        </a:p>
-      </dgm:t>
     </dgm:pt>
     <dgm:pt modelId="{F70054BB-1C25-44F7-B3F3-A19F66A4F5F7}" type="pres">
       <dgm:prSet presAssocID="{7A07C836-60D9-43DE-AF7A-2D0935F9CA94}" presName="hierChild5" presStyleCnt="0"/>
@@ -2466,13 +2404,6 @@
         </dgm:presLayoutVars>
       </dgm:prSet>
       <dgm:spPr/>
-      <dgm:t>
-        <a:bodyPr/>
-        <a:lstStyle/>
-        <a:p>
-          <a:endParaRPr lang="en-US"/>
-        </a:p>
-      </dgm:t>
     </dgm:pt>
     <dgm:pt modelId="{4542F0FE-00E5-453A-B97B-DAE3107FD65A}" type="pres">
       <dgm:prSet presAssocID="{661C1B7C-9DE2-4F22-9F48-D9E13FD0A79C}" presName="hierChild4" presStyleCnt="0"/>
@@ -2501,13 +2432,6 @@
         </dgm:presLayoutVars>
       </dgm:prSet>
       <dgm:spPr/>
-      <dgm:t>
-        <a:bodyPr/>
-        <a:lstStyle/>
-        <a:p>
-          <a:endParaRPr lang="en-US"/>
-        </a:p>
-      </dgm:t>
     </dgm:pt>
     <dgm:pt modelId="{C85F226C-FD04-4104-B4B0-99C42A0CE069}" type="pres">
       <dgm:prSet presAssocID="{C46F31FD-7EF3-4F4B-8006-EB508A8405C9}" presName="hierChild5" presStyleCnt="0"/>
@@ -2536,13 +2460,6 @@
         </dgm:presLayoutVars>
       </dgm:prSet>
       <dgm:spPr/>
-      <dgm:t>
-        <a:bodyPr/>
-        <a:lstStyle/>
-        <a:p>
-          <a:endParaRPr lang="en-US"/>
-        </a:p>
-      </dgm:t>
     </dgm:pt>
     <dgm:pt modelId="{EC06A080-4EA3-4270-B6C0-492C4204E145}" type="pres">
       <dgm:prSet presAssocID="{1B3B97B0-B938-409A-9DAC-AC4DD6ADD01A}" presName="hierChild5" presStyleCnt="0"/>
@@ -2571,13 +2488,6 @@
         </dgm:presLayoutVars>
       </dgm:prSet>
       <dgm:spPr/>
-      <dgm:t>
-        <a:bodyPr/>
-        <a:lstStyle/>
-        <a:p>
-          <a:endParaRPr lang="en-US"/>
-        </a:p>
-      </dgm:t>
     </dgm:pt>
     <dgm:pt modelId="{02328E74-9A9C-4760-B858-D3F30E2EA876}" type="pres">
       <dgm:prSet presAssocID="{8A45DCF4-0B7F-46CA-9AEF-991A8D1BAF57}" presName="hierChild5" presStyleCnt="0"/>
@@ -2606,13 +2516,6 @@
         </dgm:presLayoutVars>
       </dgm:prSet>
       <dgm:spPr/>
-      <dgm:t>
-        <a:bodyPr/>
-        <a:lstStyle/>
-        <a:p>
-          <a:endParaRPr lang="en-US"/>
-        </a:p>
-      </dgm:t>
     </dgm:pt>
     <dgm:pt modelId="{5B558020-9358-4DF4-9D37-7F7E70282668}" type="pres">
       <dgm:prSet presAssocID="{7162E3DE-4C59-4744-BCED-861246BAEF57}" presName="hierChild5" presStyleCnt="0"/>
@@ -2641,13 +2544,6 @@
         </dgm:presLayoutVars>
       </dgm:prSet>
       <dgm:spPr/>
-      <dgm:t>
-        <a:bodyPr/>
-        <a:lstStyle/>
-        <a:p>
-          <a:endParaRPr lang="en-US"/>
-        </a:p>
-      </dgm:t>
     </dgm:pt>
     <dgm:pt modelId="{74DD70C0-1A9D-4786-BF4C-4C79CB3BB47E}" type="pres">
       <dgm:prSet presAssocID="{A1F77813-DA0D-40D1-849D-ADC41B82CA0A}" presName="hierChild3" presStyleCnt="0"/>
@@ -2676,13 +2572,6 @@
         </dgm:presLayoutVars>
       </dgm:prSet>
       <dgm:spPr/>
-      <dgm:t>
-        <a:bodyPr/>
-        <a:lstStyle/>
-        <a:p>
-          <a:endParaRPr lang="en-US"/>
-        </a:p>
-      </dgm:t>
     </dgm:pt>
     <dgm:pt modelId="{23A957FA-95B7-4FA1-9693-52C098751AE4}" type="pres">
       <dgm:prSet presAssocID="{4E3C1994-F7FD-4AA9-A246-70726C143854}" presName="hierChild4" presStyleCnt="0"/>
@@ -2691,13 +2580,6 @@
     <dgm:pt modelId="{5F05445E-1615-45FE-91D2-CAEDE209D812}" type="pres">
       <dgm:prSet presAssocID="{AB724194-8C5F-4EC8-85D3-603E2D37F61D}" presName="Name17" presStyleLbl="parChTrans1D3" presStyleIdx="4" presStyleCnt="6"/>
       <dgm:spPr/>
-      <dgm:t>
-        <a:bodyPr/>
-        <a:lstStyle/>
-        <a:p>
-          <a:endParaRPr lang="en-US"/>
-        </a:p>
-      </dgm:t>
     </dgm:pt>
     <dgm:pt modelId="{DFCE1A6F-019D-4538-B805-6D6247E2BD3A}" type="pres">
       <dgm:prSet presAssocID="{05CF61FD-F37E-4903-AD79-70AA9CB12F3F}" presName="hierRoot3" presStyleCnt="0"/>
@@ -2718,13 +2600,6 @@
         </dgm:presLayoutVars>
       </dgm:prSet>
       <dgm:spPr/>
-      <dgm:t>
-        <a:bodyPr/>
-        <a:lstStyle/>
-        <a:p>
-          <a:endParaRPr lang="en-US"/>
-        </a:p>
-      </dgm:t>
     </dgm:pt>
     <dgm:pt modelId="{CE844B5D-CFD6-46F3-8F96-FA66B458E731}" type="pres">
       <dgm:prSet presAssocID="{05CF61FD-F37E-4903-AD79-70AA9CB12F3F}" presName="hierChild4" presStyleCnt="0"/>
@@ -2733,13 +2608,6 @@
     <dgm:pt modelId="{1DA52C46-0957-45D5-84AB-55922474A93E}" type="pres">
       <dgm:prSet presAssocID="{D9BCAE30-25CA-412D-BFB1-7A093D7B456C}" presName="Name17" presStyleLbl="parChTrans1D3" presStyleIdx="5" presStyleCnt="6"/>
       <dgm:spPr/>
-      <dgm:t>
-        <a:bodyPr/>
-        <a:lstStyle/>
-        <a:p>
-          <a:endParaRPr lang="en-US"/>
-        </a:p>
-      </dgm:t>
     </dgm:pt>
     <dgm:pt modelId="{B361F2AB-21D9-4FF8-AA78-C63CDCC29FE2}" type="pres">
       <dgm:prSet presAssocID="{97CC8D6F-7204-402E-87DC-7604A04F6E35}" presName="hierRoot3" presStyleCnt="0"/>
@@ -2754,19 +2622,12 @@
       <dgm:spPr/>
     </dgm:pt>
     <dgm:pt modelId="{B6D96C63-9EA5-4EBC-BCFA-CF10C3B1CC41}" type="pres">
-      <dgm:prSet presAssocID="{97CC8D6F-7204-402E-87DC-7604A04F6E35}" presName="text3" presStyleLbl="fgAcc3" presStyleIdx="5" presStyleCnt="6">
+      <dgm:prSet presAssocID="{97CC8D6F-7204-402E-87DC-7604A04F6E35}" presName="text3" presStyleLbl="fgAcc3" presStyleIdx="5" presStyleCnt="6" custScaleX="134485">
         <dgm:presLayoutVars>
           <dgm:chPref val="3"/>
         </dgm:presLayoutVars>
       </dgm:prSet>
       <dgm:spPr/>
-      <dgm:t>
-        <a:bodyPr/>
-        <a:lstStyle/>
-        <a:p>
-          <a:endParaRPr lang="en-US"/>
-        </a:p>
-      </dgm:t>
     </dgm:pt>
     <dgm:pt modelId="{98607042-D20F-4DCA-91D3-97310D23C553}" type="pres">
       <dgm:prSet presAssocID="{97CC8D6F-7204-402E-87DC-7604A04F6E35}" presName="hierChild4" presStyleCnt="0"/>
@@ -2774,51 +2635,51 @@
     </dgm:pt>
   </dgm:ptLst>
   <dgm:cxnLst>
+    <dgm:cxn modelId="{99B26500-0EFF-4874-AC8F-B2819FF57375}" type="presOf" srcId="{D9BCAE30-25CA-412D-BFB1-7A093D7B456C}" destId="{1DA52C46-0957-45D5-84AB-55922474A93E}" srcOrd="0" destOrd="0" presId="urn:microsoft.com/office/officeart/2005/8/layout/hierarchy1"/>
+    <dgm:cxn modelId="{94B35808-9676-4E4D-AA5B-87FA8A0CC2FF}" type="presOf" srcId="{5B17717F-5F4F-4947-AB7B-DAE68E73538F}" destId="{FE690589-86B8-43FE-A41B-9D62D6430AB9}" srcOrd="0" destOrd="0" presId="urn:microsoft.com/office/officeart/2005/8/layout/hierarchy1"/>
+    <dgm:cxn modelId="{BD52400B-5A4C-4B5A-830B-F25660B8E292}" type="presOf" srcId="{7A07C836-60D9-43DE-AF7A-2D0935F9CA94}" destId="{F5D33BEE-6B78-4387-ABEC-A540DAF8CDC3}" srcOrd="0" destOrd="0" presId="urn:microsoft.com/office/officeart/2005/8/layout/hierarchy1"/>
+    <dgm:cxn modelId="{37AAFB12-7D55-4975-B579-53FF4FA0DC8F}" srcId="{4B45486A-C81F-4BA8-AEEE-9DE931EFB1FA}" destId="{A1F77813-DA0D-40D1-849D-ADC41B82CA0A}" srcOrd="1" destOrd="0" parTransId="{895A8415-186E-42CB-BDCC-8AB59FE0924A}" sibTransId="{5A466318-7B41-4E02-9BA3-5CC1F40C55A0}"/>
     <dgm:cxn modelId="{ED586B17-354D-430F-9CCF-4E7EBDBAFDD3}" srcId="{E9335B92-0993-47B6-89C4-6972D0CA941C}" destId="{64F125AA-06E5-408C-92F0-29B683643E21}" srcOrd="0" destOrd="0" parTransId="{C55E3E45-29B2-4823-A3C7-C27C8F7667A0}" sibTransId="{E7AE558F-65BD-445E-96CE-3F7051CC59DF}"/>
+    <dgm:cxn modelId="{D14F051A-2F5F-40FE-9E52-B650DB516405}" srcId="{A1F77813-DA0D-40D1-849D-ADC41B82CA0A}" destId="{05CF61FD-F37E-4903-AD79-70AA9CB12F3F}" srcOrd="1" destOrd="0" parTransId="{AB724194-8C5F-4EC8-85D3-603E2D37F61D}" sibTransId="{068CFE31-F983-4A97-99AB-0E7DB4DBE228}"/>
+    <dgm:cxn modelId="{CE02321B-69A8-4980-978F-83AD14921001}" type="presOf" srcId="{05CF61FD-F37E-4903-AD79-70AA9CB12F3F}" destId="{32C02F5D-2AFD-4AEB-B702-B9D5EDFC6578}" srcOrd="0" destOrd="0" presId="urn:microsoft.com/office/officeart/2005/8/layout/hierarchy1"/>
+    <dgm:cxn modelId="{E1AFB322-2683-4AE1-A86E-F7F38C2EAF8C}" type="presOf" srcId="{C55E3E45-29B2-4823-A3C7-C27C8F7667A0}" destId="{AB4DEF6B-F751-4C7A-BF3F-FD72A33585F1}" srcOrd="0" destOrd="0" presId="urn:microsoft.com/office/officeart/2005/8/layout/hierarchy1"/>
+    <dgm:cxn modelId="{0C7BA123-2460-4071-98B6-4EF20F62745C}" srcId="{B43C9653-F421-437D-A8FF-7EE550C290C6}" destId="{4B45486A-C81F-4BA8-AEEE-9DE931EFB1FA}" srcOrd="0" destOrd="0" parTransId="{41C4AF9B-8E76-47CD-8504-20380E0795DD}" sibTransId="{6349A96A-7EA5-43ED-BA44-4B7D120CF195}"/>
+    <dgm:cxn modelId="{68E0C329-C319-41DA-AC5A-0CFCC6DD48D8}" type="presOf" srcId="{1584C53A-2447-4E17-BF0C-3B02003F65C9}" destId="{D7FFCED2-D1F7-4DA4-BB3E-2D58E8B264B2}" srcOrd="0" destOrd="0" presId="urn:microsoft.com/office/officeart/2005/8/layout/hierarchy1"/>
+    <dgm:cxn modelId="{6FEE0535-6156-4D1B-AC42-DE47746F3864}" srcId="{661C1B7C-9DE2-4F22-9F48-D9E13FD0A79C}" destId="{8A45DCF4-0B7F-46CA-9AEF-991A8D1BAF57}" srcOrd="1" destOrd="0" parTransId="{739CE320-AEBA-41DF-A329-8EC1ABB51056}" sibTransId="{CE30BABE-A9C7-47E1-BF15-E3CDB0BD6DDF}"/>
+    <dgm:cxn modelId="{438F213C-CCF9-4742-9C2A-6A42CFE0313B}" type="presOf" srcId="{EA9BA22A-E1F0-45A9-A49C-BFCDA2B55294}" destId="{D63F6A73-1AA5-4E17-A1AA-CDEF17CF0698}" srcOrd="0" destOrd="0" presId="urn:microsoft.com/office/officeart/2005/8/layout/hierarchy1"/>
+    <dgm:cxn modelId="{A756884D-E609-4F13-8867-48B057F62E35}" type="presOf" srcId="{4B45486A-C81F-4BA8-AEEE-9DE931EFB1FA}" destId="{E427CD53-C7F2-47C3-8E2D-9550FFDB0AF1}" srcOrd="0" destOrd="0" presId="urn:microsoft.com/office/officeart/2005/8/layout/hierarchy1"/>
+    <dgm:cxn modelId="{643D424E-311C-473F-9492-AC0D835DEDB9}" srcId="{661C1B7C-9DE2-4F22-9F48-D9E13FD0A79C}" destId="{C46F31FD-7EF3-4F4B-8006-EB508A8405C9}" srcOrd="0" destOrd="0" parTransId="{1584C53A-2447-4E17-BF0C-3B02003F65C9}" sibTransId="{8E13F906-C0D5-4414-91F5-3F34A73ECAE7}"/>
+    <dgm:cxn modelId="{98DFA557-F20C-4801-8F68-223FF86CC266}" srcId="{E9335B92-0993-47B6-89C4-6972D0CA941C}" destId="{7A07C836-60D9-43DE-AF7A-2D0935F9CA94}" srcOrd="1" destOrd="0" parTransId="{C9DAD4B7-FD70-4DA8-8A22-1CEC23CCEB6F}" sibTransId="{44D52721-CF83-4C4F-8CB7-60B199CAA2F0}"/>
+    <dgm:cxn modelId="{43552E58-0FA8-4F74-8018-8DB6077B94AB}" type="presOf" srcId="{BC132D8D-8A59-44F1-B428-7713B5EC9CE0}" destId="{324CF935-1935-47CA-83E5-96840FBFE437}" srcOrd="0" destOrd="0" presId="urn:microsoft.com/office/officeart/2005/8/layout/hierarchy1"/>
+    <dgm:cxn modelId="{0D984E5E-D7B0-48AF-989E-EBC8F84C1F84}" type="presOf" srcId="{86E7B6D8-3187-4F63-AB19-DA0A507E63CF}" destId="{214BC148-D85A-42E7-A41D-4CA859ED54EA}" srcOrd="0" destOrd="0" presId="urn:microsoft.com/office/officeart/2005/8/layout/hierarchy1"/>
     <dgm:cxn modelId="{FD5DD260-5E00-4DFD-89DB-72E22E240CB2}" type="presOf" srcId="{B425ABC7-A3E0-4EA9-B0B0-C88BCA4327A4}" destId="{6CEFDF5F-67FB-45AE-8A7B-7CF5868E41CA}" srcOrd="0" destOrd="0" presId="urn:microsoft.com/office/officeart/2005/8/layout/hierarchy1"/>
+    <dgm:cxn modelId="{969DDE65-34D2-464E-ADA3-3C6E86198F74}" type="presOf" srcId="{D569D02A-F937-4D6C-94F5-E1A26484808F}" destId="{473607A1-27FB-4066-9BF8-178C56FE0884}" srcOrd="0" destOrd="0" presId="urn:microsoft.com/office/officeart/2005/8/layout/hierarchy1"/>
+    <dgm:cxn modelId="{FED7E166-BD0F-4F6A-AD63-C4156D9C3877}" srcId="{1245DEF0-43F9-4230-A81A-980D178A756B}" destId="{B425ABC7-A3E0-4EA9-B0B0-C88BCA4327A4}" srcOrd="0" destOrd="0" parTransId="{86E7B6D8-3187-4F63-AB19-DA0A507E63CF}" sibTransId="{31DC6FC8-7155-44AB-A0C2-7E3659723262}"/>
+    <dgm:cxn modelId="{0C81EE67-A3E4-4EAD-80AA-6E643B11BB2D}" srcId="{C46F31FD-7EF3-4F4B-8006-EB508A8405C9}" destId="{1B3B97B0-B938-409A-9DAC-AC4DD6ADD01A}" srcOrd="0" destOrd="0" parTransId="{BC132D8D-8A59-44F1-B428-7713B5EC9CE0}" sibTransId="{A30620E4-2007-4890-A419-3D76282B53F5}"/>
+    <dgm:cxn modelId="{5AC25F68-4D27-4CA9-8EAA-D1FD0420558E}" type="presOf" srcId="{8A45DCF4-0B7F-46CA-9AEF-991A8D1BAF57}" destId="{A29A621D-FDB0-41DF-A1D4-75FD9D5980A5}" srcOrd="0" destOrd="0" presId="urn:microsoft.com/office/officeart/2005/8/layout/hierarchy1"/>
+    <dgm:cxn modelId="{CA281C70-4AE4-43D2-8F20-CC466E1A20BE}" type="presOf" srcId="{7162E3DE-4C59-4744-BCED-861246BAEF57}" destId="{20B05BA1-6646-492F-999C-1460239F9202}" srcOrd="0" destOrd="0" presId="urn:microsoft.com/office/officeart/2005/8/layout/hierarchy1"/>
+    <dgm:cxn modelId="{CC27D775-36D9-4FD9-AA89-224B0B06D58E}" type="presOf" srcId="{1B3B97B0-B938-409A-9DAC-AC4DD6ADD01A}" destId="{20F962D1-CEF5-4AC2-8C8B-9B1FB6606F81}" srcOrd="0" destOrd="0" presId="urn:microsoft.com/office/officeart/2005/8/layout/hierarchy1"/>
+    <dgm:cxn modelId="{F75C077A-E342-4D2D-811B-775F96758E7B}" type="presOf" srcId="{1245DEF0-43F9-4230-A81A-980D178A756B}" destId="{FB5950E2-7620-4BF1-A0C5-66658ABCFA8F}" srcOrd="0" destOrd="0" presId="urn:microsoft.com/office/officeart/2005/8/layout/hierarchy1"/>
+    <dgm:cxn modelId="{E541FA80-401F-437A-8E87-47D9C74EA60E}" type="presOf" srcId="{B43C9653-F421-437D-A8FF-7EE550C290C6}" destId="{5C3B16B1-445C-4658-9392-3CFE011BBD0E}" srcOrd="0" destOrd="0" presId="urn:microsoft.com/office/officeart/2005/8/layout/hierarchy1"/>
+    <dgm:cxn modelId="{C14C6686-931F-419F-8C59-1B1DA642E4F1}" type="presOf" srcId="{895A8415-186E-42CB-BDCC-8AB59FE0924A}" destId="{A787A79F-FE1A-477E-83CD-31B61485D15B}" srcOrd="0" destOrd="0" presId="urn:microsoft.com/office/officeart/2005/8/layout/hierarchy1"/>
     <dgm:cxn modelId="{AC7B448B-EF95-48DA-B089-EAD90EFFED55}" type="presOf" srcId="{4E3C1994-F7FD-4AA9-A246-70726C143854}" destId="{9450FCFE-5D5E-48BB-B65E-15E8D1D3F1C8}" srcOrd="0" destOrd="0" presId="urn:microsoft.com/office/officeart/2005/8/layout/hierarchy1"/>
-    <dgm:cxn modelId="{CC27D775-36D9-4FD9-AA89-224B0B06D58E}" type="presOf" srcId="{1B3B97B0-B938-409A-9DAC-AC4DD6ADD01A}" destId="{20F962D1-CEF5-4AC2-8C8B-9B1FB6606F81}" srcOrd="0" destOrd="0" presId="urn:microsoft.com/office/officeart/2005/8/layout/hierarchy1"/>
-    <dgm:cxn modelId="{212F78F3-41A0-468C-B6CC-5F3377BDB846}" type="presOf" srcId="{64F125AA-06E5-408C-92F0-29B683643E21}" destId="{9EDCDDC1-BD6E-485B-A244-E75823256875}" srcOrd="0" destOrd="0" presId="urn:microsoft.com/office/officeart/2005/8/layout/hierarchy1"/>
-    <dgm:cxn modelId="{FED7E166-BD0F-4F6A-AD63-C4156D9C3877}" srcId="{1245DEF0-43F9-4230-A81A-980D178A756B}" destId="{B425ABC7-A3E0-4EA9-B0B0-C88BCA4327A4}" srcOrd="0" destOrd="0" parTransId="{86E7B6D8-3187-4F63-AB19-DA0A507E63CF}" sibTransId="{31DC6FC8-7155-44AB-A0C2-7E3659723262}"/>
-    <dgm:cxn modelId="{D14F051A-2F5F-40FE-9E52-B650DB516405}" srcId="{A1F77813-DA0D-40D1-849D-ADC41B82CA0A}" destId="{05CF61FD-F37E-4903-AD79-70AA9CB12F3F}" srcOrd="1" destOrd="0" parTransId="{AB724194-8C5F-4EC8-85D3-603E2D37F61D}" sibTransId="{068CFE31-F983-4A97-99AB-0E7DB4DBE228}"/>
-    <dgm:cxn modelId="{E1AFB322-2683-4AE1-A86E-F7F38C2EAF8C}" type="presOf" srcId="{C55E3E45-29B2-4823-A3C7-C27C8F7667A0}" destId="{AB4DEF6B-F751-4C7A-BF3F-FD72A33585F1}" srcOrd="0" destOrd="0" presId="urn:microsoft.com/office/officeart/2005/8/layout/hierarchy1"/>
-    <dgm:cxn modelId="{5AC25F68-4D27-4CA9-8EAA-D1FD0420558E}" type="presOf" srcId="{8A45DCF4-0B7F-46CA-9AEF-991A8D1BAF57}" destId="{A29A621D-FDB0-41DF-A1D4-75FD9D5980A5}" srcOrd="0" destOrd="0" presId="urn:microsoft.com/office/officeart/2005/8/layout/hierarchy1"/>
-    <dgm:cxn modelId="{643D424E-311C-473F-9492-AC0D835DEDB9}" srcId="{661C1B7C-9DE2-4F22-9F48-D9E13FD0A79C}" destId="{C46F31FD-7EF3-4F4B-8006-EB508A8405C9}" srcOrd="0" destOrd="0" parTransId="{1584C53A-2447-4E17-BF0C-3B02003F65C9}" sibTransId="{8E13F906-C0D5-4414-91F5-3F34A73ECAE7}"/>
-    <dgm:cxn modelId="{438F213C-CCF9-4742-9C2A-6A42CFE0313B}" type="presOf" srcId="{EA9BA22A-E1F0-45A9-A49C-BFCDA2B55294}" destId="{D63F6A73-1AA5-4E17-A1AA-CDEF17CF0698}" srcOrd="0" destOrd="0" presId="urn:microsoft.com/office/officeart/2005/8/layout/hierarchy1"/>
-    <dgm:cxn modelId="{CC1FCDE1-B2BD-43AA-8A84-6E8C4224F9F6}" type="presOf" srcId="{AB724194-8C5F-4EC8-85D3-603E2D37F61D}" destId="{5F05445E-1615-45FE-91D2-CAEDE209D812}" srcOrd="0" destOrd="0" presId="urn:microsoft.com/office/officeart/2005/8/layout/hierarchy1"/>
-    <dgm:cxn modelId="{68E0C329-C319-41DA-AC5A-0CFCC6DD48D8}" type="presOf" srcId="{1584C53A-2447-4E17-BF0C-3B02003F65C9}" destId="{D7FFCED2-D1F7-4DA4-BB3E-2D58E8B264B2}" srcOrd="0" destOrd="0" presId="urn:microsoft.com/office/officeart/2005/8/layout/hierarchy1"/>
-    <dgm:cxn modelId="{0C7BA123-2460-4071-98B6-4EF20F62745C}" srcId="{B43C9653-F421-437D-A8FF-7EE550C290C6}" destId="{4B45486A-C81F-4BA8-AEEE-9DE931EFB1FA}" srcOrd="0" destOrd="0" parTransId="{41C4AF9B-8E76-47CD-8504-20380E0795DD}" sibTransId="{6349A96A-7EA5-43ED-BA44-4B7D120CF195}"/>
-    <dgm:cxn modelId="{969DDE65-34D2-464E-ADA3-3C6E86198F74}" type="presOf" srcId="{D569D02A-F937-4D6C-94F5-E1A26484808F}" destId="{473607A1-27FB-4066-9BF8-178C56FE0884}" srcOrd="0" destOrd="0" presId="urn:microsoft.com/office/officeart/2005/8/layout/hierarchy1"/>
-    <dgm:cxn modelId="{C14C6686-931F-419F-8C59-1B1DA642E4F1}" type="presOf" srcId="{895A8415-186E-42CB-BDCC-8AB59FE0924A}" destId="{A787A79F-FE1A-477E-83CD-31B61485D15B}" srcOrd="0" destOrd="0" presId="urn:microsoft.com/office/officeart/2005/8/layout/hierarchy1"/>
-    <dgm:cxn modelId="{80EF00F9-397F-4E70-990F-EA02BC9876A0}" type="presOf" srcId="{76F1315D-B542-43FB-9D86-6BE542DF0E15}" destId="{25CB3E1E-92FB-4EC3-9A10-DAD0D4E284CF}" srcOrd="0" destOrd="0" presId="urn:microsoft.com/office/officeart/2005/8/layout/hierarchy1"/>
-    <dgm:cxn modelId="{E541FA80-401F-437A-8E87-47D9C74EA60E}" type="presOf" srcId="{B43C9653-F421-437D-A8FF-7EE550C290C6}" destId="{5C3B16B1-445C-4658-9392-3CFE011BBD0E}" srcOrd="0" destOrd="0" presId="urn:microsoft.com/office/officeart/2005/8/layout/hierarchy1"/>
+    <dgm:cxn modelId="{F9ED598F-B741-46B2-9855-6BC1EF4960A2}" srcId="{8A45DCF4-0B7F-46CA-9AEF-991A8D1BAF57}" destId="{7162E3DE-4C59-4744-BCED-861246BAEF57}" srcOrd="0" destOrd="0" parTransId="{76F1315D-B542-43FB-9D86-6BE542DF0E15}" sibTransId="{60140E2A-23DB-433A-BA37-E9C855D374C5}"/>
     <dgm:cxn modelId="{152FE795-72D4-483B-9C53-478C1FEFC4BF}" type="presOf" srcId="{97CC8D6F-7204-402E-87DC-7604A04F6E35}" destId="{B6D96C63-9EA5-4EBC-BCFA-CF10C3B1CC41}" srcOrd="0" destOrd="0" presId="urn:microsoft.com/office/officeart/2005/8/layout/hierarchy1"/>
+    <dgm:cxn modelId="{24167296-3544-47F0-B5A5-A6C96250833A}" type="presOf" srcId="{661C1B7C-9DE2-4F22-9F48-D9E13FD0A79C}" destId="{32523095-824A-4E5E-BB13-108F6A7832E0}" srcOrd="0" destOrd="0" presId="urn:microsoft.com/office/officeart/2005/8/layout/hierarchy1"/>
     <dgm:cxn modelId="{5B3AE197-A292-4E97-8248-02703C8F52C8}" type="presOf" srcId="{E9335B92-0993-47B6-89C4-6972D0CA941C}" destId="{7627023D-68E6-41F5-A314-0DE0565DC153}" srcOrd="0" destOrd="0" presId="urn:microsoft.com/office/officeart/2005/8/layout/hierarchy1"/>
-    <dgm:cxn modelId="{BD52400B-5A4C-4B5A-830B-F25660B8E292}" type="presOf" srcId="{7A07C836-60D9-43DE-AF7A-2D0935F9CA94}" destId="{F5D33BEE-6B78-4387-ABEC-A540DAF8CDC3}" srcOrd="0" destOrd="0" presId="urn:microsoft.com/office/officeart/2005/8/layout/hierarchy1"/>
+    <dgm:cxn modelId="{BF00A399-77B2-4125-B995-7616FC863775}" srcId="{4B45486A-C81F-4BA8-AEEE-9DE931EFB1FA}" destId="{1245DEF0-43F9-4230-A81A-980D178A756B}" srcOrd="0" destOrd="0" parTransId="{5B17717F-5F4F-4947-AB7B-DAE68E73538F}" sibTransId="{25111504-0341-4C43-A925-DF7D742E0DDA}"/>
+    <dgm:cxn modelId="{144E2FA1-2A12-4DFA-9F92-4CA965AB49DF}" srcId="{A1F77813-DA0D-40D1-849D-ADC41B82CA0A}" destId="{97CC8D6F-7204-402E-87DC-7604A04F6E35}" srcOrd="2" destOrd="0" parTransId="{D9BCAE30-25CA-412D-BFB1-7A093D7B456C}" sibTransId="{9D019E7E-FD7F-43FC-9D6F-7B4B0E8D5D5E}"/>
+    <dgm:cxn modelId="{8E3F73B6-7570-48A2-8D3E-5F55C8F26E10}" type="presOf" srcId="{A1F77813-DA0D-40D1-849D-ADC41B82CA0A}" destId="{A87540D3-F830-41BD-9A10-CD1CDC824B11}" srcOrd="0" destOrd="0" presId="urn:microsoft.com/office/officeart/2005/8/layout/hierarchy1"/>
+    <dgm:cxn modelId="{407AD1C1-6AAC-46E4-9968-F8EBC6AEA97C}" srcId="{A1F77813-DA0D-40D1-849D-ADC41B82CA0A}" destId="{4E3C1994-F7FD-4AA9-A246-70726C143854}" srcOrd="0" destOrd="0" parTransId="{EA9BA22A-E1F0-45A9-A49C-BFCDA2B55294}" sibTransId="{F60BD05B-7EEE-4AC9-A656-2EF63AFC4F50}"/>
     <dgm:cxn modelId="{EEBAF1C6-AE25-44CB-B124-98985B2A0DA0}" type="presOf" srcId="{739CE320-AEBA-41DF-A329-8EC1ABB51056}" destId="{F97D9EDF-E13F-4D0F-8781-B5A71300B23F}" srcOrd="0" destOrd="0" presId="urn:microsoft.com/office/officeart/2005/8/layout/hierarchy1"/>
+    <dgm:cxn modelId="{9C57A9D3-69FC-4592-87D8-2410B37AF685}" srcId="{1245DEF0-43F9-4230-A81A-980D178A756B}" destId="{661C1B7C-9DE2-4F22-9F48-D9E13FD0A79C}" srcOrd="2" destOrd="0" parTransId="{D569D02A-F937-4D6C-94F5-E1A26484808F}" sibTransId="{3DF7AEEB-672D-4A22-822B-E33F06B96715}"/>
     <dgm:cxn modelId="{1B417BD4-D391-4610-A918-DAB180A2AC6B}" type="presOf" srcId="{C9DAD4B7-FD70-4DA8-8A22-1CEC23CCEB6F}" destId="{4E7DC508-651C-4AC7-A964-6592E1FBDF76}" srcOrd="0" destOrd="0" presId="urn:microsoft.com/office/officeart/2005/8/layout/hierarchy1"/>
-    <dgm:cxn modelId="{A756884D-E609-4F13-8867-48B057F62E35}" type="presOf" srcId="{4B45486A-C81F-4BA8-AEEE-9DE931EFB1FA}" destId="{E427CD53-C7F2-47C3-8E2D-9550FFDB0AF1}" srcOrd="0" destOrd="0" presId="urn:microsoft.com/office/officeart/2005/8/layout/hierarchy1"/>
-    <dgm:cxn modelId="{CE02321B-69A8-4980-978F-83AD14921001}" type="presOf" srcId="{05CF61FD-F37E-4903-AD79-70AA9CB12F3F}" destId="{32C02F5D-2AFD-4AEB-B702-B9D5EDFC6578}" srcOrd="0" destOrd="0" presId="urn:microsoft.com/office/officeart/2005/8/layout/hierarchy1"/>
-    <dgm:cxn modelId="{BF00A399-77B2-4125-B995-7616FC863775}" srcId="{4B45486A-C81F-4BA8-AEEE-9DE931EFB1FA}" destId="{1245DEF0-43F9-4230-A81A-980D178A756B}" srcOrd="0" destOrd="0" parTransId="{5B17717F-5F4F-4947-AB7B-DAE68E73538F}" sibTransId="{25111504-0341-4C43-A925-DF7D742E0DDA}"/>
-    <dgm:cxn modelId="{0C81EE67-A3E4-4EAD-80AA-6E643B11BB2D}" srcId="{C46F31FD-7EF3-4F4B-8006-EB508A8405C9}" destId="{1B3B97B0-B938-409A-9DAC-AC4DD6ADD01A}" srcOrd="0" destOrd="0" parTransId="{BC132D8D-8A59-44F1-B428-7713B5EC9CE0}" sibTransId="{A30620E4-2007-4890-A419-3D76282B53F5}"/>
-    <dgm:cxn modelId="{F9ED598F-B741-46B2-9855-6BC1EF4960A2}" srcId="{8A45DCF4-0B7F-46CA-9AEF-991A8D1BAF57}" destId="{7162E3DE-4C59-4744-BCED-861246BAEF57}" srcOrd="0" destOrd="0" parTransId="{76F1315D-B542-43FB-9D86-6BE542DF0E15}" sibTransId="{60140E2A-23DB-433A-BA37-E9C855D374C5}"/>
-    <dgm:cxn modelId="{8E3F73B6-7570-48A2-8D3E-5F55C8F26E10}" type="presOf" srcId="{A1F77813-DA0D-40D1-849D-ADC41B82CA0A}" destId="{A87540D3-F830-41BD-9A10-CD1CDC824B11}" srcOrd="0" destOrd="0" presId="urn:microsoft.com/office/officeart/2005/8/layout/hierarchy1"/>
     <dgm:cxn modelId="{5E9ABDD8-A4C8-4311-8E22-095A10782938}" type="presOf" srcId="{C46F31FD-7EF3-4F4B-8006-EB508A8405C9}" destId="{177B5FD7-7D73-4372-BC75-34654571A3BB}" srcOrd="0" destOrd="0" presId="urn:microsoft.com/office/officeart/2005/8/layout/hierarchy1"/>
-    <dgm:cxn modelId="{24167296-3544-47F0-B5A5-A6C96250833A}" type="presOf" srcId="{661C1B7C-9DE2-4F22-9F48-D9E13FD0A79C}" destId="{32523095-824A-4E5E-BB13-108F6A7832E0}" srcOrd="0" destOrd="0" presId="urn:microsoft.com/office/officeart/2005/8/layout/hierarchy1"/>
-    <dgm:cxn modelId="{144E2FA1-2A12-4DFA-9F92-4CA965AB49DF}" srcId="{A1F77813-DA0D-40D1-849D-ADC41B82CA0A}" destId="{97CC8D6F-7204-402E-87DC-7604A04F6E35}" srcOrd="2" destOrd="0" parTransId="{D9BCAE30-25CA-412D-BFB1-7A093D7B456C}" sibTransId="{9D019E7E-FD7F-43FC-9D6F-7B4B0E8D5D5E}"/>
-    <dgm:cxn modelId="{37AAFB12-7D55-4975-B579-53FF4FA0DC8F}" srcId="{4B45486A-C81F-4BA8-AEEE-9DE931EFB1FA}" destId="{A1F77813-DA0D-40D1-849D-ADC41B82CA0A}" srcOrd="1" destOrd="0" parTransId="{895A8415-186E-42CB-BDCC-8AB59FE0924A}" sibTransId="{5A466318-7B41-4E02-9BA3-5CC1F40C55A0}"/>
-    <dgm:cxn modelId="{98DFA557-F20C-4801-8F68-223FF86CC266}" srcId="{E9335B92-0993-47B6-89C4-6972D0CA941C}" destId="{7A07C836-60D9-43DE-AF7A-2D0935F9CA94}" srcOrd="1" destOrd="0" parTransId="{C9DAD4B7-FD70-4DA8-8A22-1CEC23CCEB6F}" sibTransId="{44D52721-CF83-4C4F-8CB7-60B199CAA2F0}"/>
-    <dgm:cxn modelId="{99B26500-0EFF-4874-AC8F-B2819FF57375}" type="presOf" srcId="{D9BCAE30-25CA-412D-BFB1-7A093D7B456C}" destId="{1DA52C46-0957-45D5-84AB-55922474A93E}" srcOrd="0" destOrd="0" presId="urn:microsoft.com/office/officeart/2005/8/layout/hierarchy1"/>
-    <dgm:cxn modelId="{CA281C70-4AE4-43D2-8F20-CC466E1A20BE}" type="presOf" srcId="{7162E3DE-4C59-4744-BCED-861246BAEF57}" destId="{20B05BA1-6646-492F-999C-1460239F9202}" srcOrd="0" destOrd="0" presId="urn:microsoft.com/office/officeart/2005/8/layout/hierarchy1"/>
-    <dgm:cxn modelId="{43552E58-0FA8-4F74-8018-8DB6077B94AB}" type="presOf" srcId="{BC132D8D-8A59-44F1-B428-7713B5EC9CE0}" destId="{324CF935-1935-47CA-83E5-96840FBFE437}" srcOrd="0" destOrd="0" presId="urn:microsoft.com/office/officeart/2005/8/layout/hierarchy1"/>
-    <dgm:cxn modelId="{407AD1C1-6AAC-46E4-9968-F8EBC6AEA97C}" srcId="{A1F77813-DA0D-40D1-849D-ADC41B82CA0A}" destId="{4E3C1994-F7FD-4AA9-A246-70726C143854}" srcOrd="0" destOrd="0" parTransId="{EA9BA22A-E1F0-45A9-A49C-BFCDA2B55294}" sibTransId="{F60BD05B-7EEE-4AC9-A656-2EF63AFC4F50}"/>
     <dgm:cxn modelId="{BA0795DE-BB84-42E4-98C9-8EAC04DD6FE1}" type="presOf" srcId="{5BAED453-83A7-400E-86A2-EA1960D19236}" destId="{1E699749-40DD-43BD-989A-11CDE10DACB8}" srcOrd="0" destOrd="0" presId="urn:microsoft.com/office/officeart/2005/8/layout/hierarchy1"/>
     <dgm:cxn modelId="{8E9734E0-03BE-44E9-8CE2-EF39A2FA919F}" srcId="{1245DEF0-43F9-4230-A81A-980D178A756B}" destId="{E9335B92-0993-47B6-89C4-6972D0CA941C}" srcOrd="1" destOrd="0" parTransId="{5BAED453-83A7-400E-86A2-EA1960D19236}" sibTransId="{2C0EB7C8-6D02-420F-9F91-6A1DCCB56FE7}"/>
-    <dgm:cxn modelId="{94B35808-9676-4E4D-AA5B-87FA8A0CC2FF}" type="presOf" srcId="{5B17717F-5F4F-4947-AB7B-DAE68E73538F}" destId="{FE690589-86B8-43FE-A41B-9D62D6430AB9}" srcOrd="0" destOrd="0" presId="urn:microsoft.com/office/officeart/2005/8/layout/hierarchy1"/>
-    <dgm:cxn modelId="{F75C077A-E342-4D2D-811B-775F96758E7B}" type="presOf" srcId="{1245DEF0-43F9-4230-A81A-980D178A756B}" destId="{FB5950E2-7620-4BF1-A0C5-66658ABCFA8F}" srcOrd="0" destOrd="0" presId="urn:microsoft.com/office/officeart/2005/8/layout/hierarchy1"/>
-    <dgm:cxn modelId="{9C57A9D3-69FC-4592-87D8-2410B37AF685}" srcId="{1245DEF0-43F9-4230-A81A-980D178A756B}" destId="{661C1B7C-9DE2-4F22-9F48-D9E13FD0A79C}" srcOrd="2" destOrd="0" parTransId="{D569D02A-F937-4D6C-94F5-E1A26484808F}" sibTransId="{3DF7AEEB-672D-4A22-822B-E33F06B96715}"/>
-    <dgm:cxn modelId="{6FEE0535-6156-4D1B-AC42-DE47746F3864}" srcId="{661C1B7C-9DE2-4F22-9F48-D9E13FD0A79C}" destId="{8A45DCF4-0B7F-46CA-9AEF-991A8D1BAF57}" srcOrd="1" destOrd="0" parTransId="{739CE320-AEBA-41DF-A329-8EC1ABB51056}" sibTransId="{CE30BABE-A9C7-47E1-BF15-E3CDB0BD6DDF}"/>
-    <dgm:cxn modelId="{0D984E5E-D7B0-48AF-989E-EBC8F84C1F84}" type="presOf" srcId="{86E7B6D8-3187-4F63-AB19-DA0A507E63CF}" destId="{214BC148-D85A-42E7-A41D-4CA859ED54EA}" srcOrd="0" destOrd="0" presId="urn:microsoft.com/office/officeart/2005/8/layout/hierarchy1"/>
+    <dgm:cxn modelId="{CC1FCDE1-B2BD-43AA-8A84-6E8C4224F9F6}" type="presOf" srcId="{AB724194-8C5F-4EC8-85D3-603E2D37F61D}" destId="{5F05445E-1615-45FE-91D2-CAEDE209D812}" srcOrd="0" destOrd="0" presId="urn:microsoft.com/office/officeart/2005/8/layout/hierarchy1"/>
+    <dgm:cxn modelId="{212F78F3-41A0-468C-B6CC-5F3377BDB846}" type="presOf" srcId="{64F125AA-06E5-408C-92F0-29B683643E21}" destId="{9EDCDDC1-BD6E-485B-A244-E75823256875}" srcOrd="0" destOrd="0" presId="urn:microsoft.com/office/officeart/2005/8/layout/hierarchy1"/>
+    <dgm:cxn modelId="{80EF00F9-397F-4E70-990F-EA02BC9876A0}" type="presOf" srcId="{76F1315D-B542-43FB-9D86-6BE542DF0E15}" destId="{25CB3E1E-92FB-4EC3-9A10-DAD0D4E284CF}" srcOrd="0" destOrd="0" presId="urn:microsoft.com/office/officeart/2005/8/layout/hierarchy1"/>
     <dgm:cxn modelId="{0708126B-1541-4F1D-AB0B-98B34730BC3D}" type="presParOf" srcId="{5C3B16B1-445C-4658-9392-3CFE011BBD0E}" destId="{B5B783EA-3F60-456D-B956-C15D100CFAFA}" srcOrd="0" destOrd="0" presId="urn:microsoft.com/office/officeart/2005/8/layout/hierarchy1"/>
     <dgm:cxn modelId="{ABDEEBF5-A9E2-410B-82A4-733D132924AA}" type="presParOf" srcId="{B5B783EA-3F60-456D-B956-C15D100CFAFA}" destId="{26566B0B-CB5C-4A70-9D71-C23D5DD8EA24}" srcOrd="0" destOrd="0" presId="urn:microsoft.com/office/officeart/2005/8/layout/hierarchy1"/>
     <dgm:cxn modelId="{E7271F5F-1843-4982-B840-845E69E23F04}" type="presParOf" srcId="{26566B0B-CB5C-4A70-9D71-C23D5DD8EA24}" destId="{A1EC8563-E52D-43B7-93E8-8019F4515D5B}" srcOrd="0" destOrd="0" presId="urn:microsoft.com/office/officeart/2005/8/layout/hierarchy1"/>
@@ -2941,7 +2802,7 @@
         <a:lstStyle/>
         <a:p>
           <a:r>
-            <a:rPr lang="en-CA" dirty="0" smtClean="0"/>
+            <a:rPr lang="en-CA" dirty="0"/>
             <a:t>filename</a:t>
           </a:r>
           <a:endParaRPr lang="en-US" dirty="0"/>
@@ -2978,10 +2839,9 @@
         <a:lstStyle/>
         <a:p>
           <a:r>
-            <a:rPr lang="en-US" dirty="0" smtClean="0"/>
-            <a:t>Documents</a:t>
+            <a:rPr lang="en-US" dirty="0"/>
+            <a:t>documents</a:t>
           </a:r>
-          <a:endParaRPr lang="en-US" dirty="0"/>
         </a:p>
       </dgm:t>
     </dgm:pt>
@@ -3015,7 +2875,7 @@
         <a:lstStyle/>
         <a:p>
           <a:r>
-            <a:rPr lang="en-US" dirty="0" err="1" smtClean="0"/>
+            <a:rPr lang="en-US" dirty="0" err="1"/>
             <a:t>documentid-xxxxx</a:t>
           </a:r>
           <a:endParaRPr lang="en-US" dirty="0"/>
@@ -3052,10 +2912,9 @@
         <a:lstStyle/>
         <a:p>
           <a:r>
-            <a:rPr lang="en-US" dirty="0" smtClean="0"/>
+            <a:rPr lang="en-US" dirty="0"/>
             <a:t>files</a:t>
           </a:r>
-          <a:endParaRPr lang="en-US" dirty="0"/>
         </a:p>
       </dgm:t>
     </dgm:pt>
@@ -3089,7 +2948,7 @@
         <a:lstStyle/>
         <a:p>
           <a:r>
-            <a:rPr lang="en-US" dirty="0" err="1" smtClean="0"/>
+            <a:rPr lang="en-US" dirty="0" err="1"/>
             <a:t>fileid-xxxxx</a:t>
           </a:r>
           <a:endParaRPr lang="en-US" dirty="0"/>
@@ -3126,18 +2985,17 @@
         <a:lstStyle/>
         <a:p>
           <a:r>
-            <a:rPr lang="en-US" dirty="0" smtClean="0"/>
+            <a:rPr lang="en-US" dirty="0"/>
             <a:t>Folder# (&lt;</a:t>
           </a:r>
           <a:r>
-            <a:rPr lang="en-US" dirty="0" err="1" smtClean="0"/>
+            <a:rPr lang="en-US" dirty="0" err="1"/>
             <a:t>pos</a:t>
           </a:r>
           <a:r>
-            <a:rPr lang="en-US" dirty="0" smtClean="0"/>
+            <a:rPr lang="en-US" dirty="0"/>
             <a:t>&gt;)</a:t>
           </a:r>
-          <a:endParaRPr lang="en-US" dirty="0"/>
         </a:p>
       </dgm:t>
     </dgm:pt>
@@ -3171,11 +3029,11 @@
         <a:lstStyle/>
         <a:p>
           <a:r>
-            <a:rPr lang="en-CA" dirty="0" err="1" smtClean="0"/>
+            <a:rPr lang="en-CA" dirty="0" err="1"/>
             <a:t>documentid</a:t>
           </a:r>
           <a:r>
-            <a:rPr lang="en-CA" dirty="0" smtClean="0"/>
+            <a:rPr lang="en-CA" dirty="0"/>
             <a:t>-XXXXX</a:t>
           </a:r>
           <a:endParaRPr lang="en-US" dirty="0"/>
@@ -3212,7 +3070,7 @@
         <a:lstStyle/>
         <a:p>
           <a:r>
-            <a:rPr lang="en-CA" dirty="0" smtClean="0"/>
+            <a:rPr lang="en-CA" dirty="0"/>
             <a:t>files</a:t>
           </a:r>
           <a:endParaRPr lang="en-US" dirty="0"/>
@@ -3249,11 +3107,11 @@
         <a:lstStyle/>
         <a:p>
           <a:r>
-            <a:rPr lang="en-CA" dirty="0" err="1" smtClean="0"/>
+            <a:rPr lang="en-CA" dirty="0" err="1"/>
             <a:t>fileid</a:t>
           </a:r>
           <a:r>
-            <a:rPr lang="en-CA" dirty="0" smtClean="0"/>
+            <a:rPr lang="en-CA" dirty="0"/>
             <a:t>-XXXXX</a:t>
           </a:r>
           <a:endParaRPr lang="en-US" dirty="0"/>
@@ -3290,14 +3148,13 @@
         <a:lstStyle/>
         <a:p>
           <a:r>
-            <a:rPr lang="en-US" dirty="0" err="1" smtClean="0"/>
+            <a:rPr lang="en-US" dirty="0" err="1"/>
             <a:t>fileid</a:t>
           </a:r>
           <a:r>
-            <a:rPr lang="en-US" dirty="0" smtClean="0"/>
+            <a:rPr lang="en-US" dirty="0"/>
             <a:t>-XXXXX</a:t>
           </a:r>
-          <a:endParaRPr lang="en-US" dirty="0"/>
         </a:p>
       </dgm:t>
     </dgm:pt>
@@ -3331,15 +3188,15 @@
         <a:lstStyle/>
         <a:p>
           <a:r>
-            <a:rPr lang="en-CA" dirty="0" smtClean="0"/>
+            <a:rPr lang="en-CA" dirty="0"/>
             <a:t>folder#-on-disk (“&lt;</a:t>
           </a:r>
           <a:r>
-            <a:rPr lang="en-CA" dirty="0" err="1" smtClean="0"/>
+            <a:rPr lang="en-CA" dirty="0" err="1"/>
             <a:t>pos</a:t>
           </a:r>
           <a:r>
-            <a:rPr lang="en-CA" dirty="0" smtClean="0"/>
+            <a:rPr lang="en-CA" dirty="0"/>
             <a:t>&gt;”)</a:t>
           </a:r>
           <a:endParaRPr lang="en-US" dirty="0"/>
@@ -3379,13 +3236,6 @@
         </dgm:presLayoutVars>
       </dgm:prSet>
       <dgm:spPr/>
-      <dgm:t>
-        <a:bodyPr/>
-        <a:lstStyle/>
-        <a:p>
-          <a:endParaRPr lang="en-US"/>
-        </a:p>
-      </dgm:t>
     </dgm:pt>
     <dgm:pt modelId="{7A63DD22-0A0B-4E8E-B668-CD566800B7D2}" type="pres">
       <dgm:prSet presAssocID="{1C1D920D-4869-42C0-8C9A-561DAC474211}" presName="hierFlow" presStyleCnt="0"/>
@@ -3416,13 +3266,6 @@
         </dgm:presLayoutVars>
       </dgm:prSet>
       <dgm:spPr/>
-      <dgm:t>
-        <a:bodyPr/>
-        <a:lstStyle/>
-        <a:p>
-          <a:endParaRPr lang="en-US"/>
-        </a:p>
-      </dgm:t>
     </dgm:pt>
     <dgm:pt modelId="{C5181F1A-EA94-4F4D-BE99-4C2D227F86D2}" type="pres">
       <dgm:prSet presAssocID="{47BA4117-B167-4821-84EE-950B0611161E}" presName="hierChild2" presStyleCnt="0"/>
@@ -3431,24 +3274,10 @@
     <dgm:pt modelId="{8E3B58DF-34D0-4C03-B6D2-E5DB350A6AAA}" type="pres">
       <dgm:prSet presAssocID="{308C2BE8-8975-4B67-BF3B-3BFA6218D37D}" presName="Name25" presStyleLbl="parChTrans1D2" presStyleIdx="0" presStyleCnt="1"/>
       <dgm:spPr/>
-      <dgm:t>
-        <a:bodyPr/>
-        <a:lstStyle/>
-        <a:p>
-          <a:endParaRPr lang="en-US"/>
-        </a:p>
-      </dgm:t>
     </dgm:pt>
     <dgm:pt modelId="{DEDEEF15-26DA-451B-92E3-081DD8A523ED}" type="pres">
       <dgm:prSet presAssocID="{308C2BE8-8975-4B67-BF3B-3BFA6218D37D}" presName="connTx" presStyleLbl="parChTrans1D2" presStyleIdx="0" presStyleCnt="1"/>
       <dgm:spPr/>
-      <dgm:t>
-        <a:bodyPr/>
-        <a:lstStyle/>
-        <a:p>
-          <a:endParaRPr lang="en-US"/>
-        </a:p>
-      </dgm:t>
     </dgm:pt>
     <dgm:pt modelId="{B1A39D2E-1B42-4BC3-BC89-9ECFD732169A}" type="pres">
       <dgm:prSet presAssocID="{644A2989-8F7E-489A-A51A-FC4600A8F6EE}" presName="Name30" presStyleCnt="0"/>
@@ -3457,13 +3286,6 @@
     <dgm:pt modelId="{DE031C7F-D6B5-4DDD-A407-A162439B4539}" type="pres">
       <dgm:prSet presAssocID="{644A2989-8F7E-489A-A51A-FC4600A8F6EE}" presName="level2Shape" presStyleLbl="node2" presStyleIdx="0" presStyleCnt="1"/>
       <dgm:spPr/>
-      <dgm:t>
-        <a:bodyPr/>
-        <a:lstStyle/>
-        <a:p>
-          <a:endParaRPr lang="en-US"/>
-        </a:p>
-      </dgm:t>
     </dgm:pt>
     <dgm:pt modelId="{E2EF6B1F-FB41-4D1E-AC59-CCEC651B8AC8}" type="pres">
       <dgm:prSet presAssocID="{644A2989-8F7E-489A-A51A-FC4600A8F6EE}" presName="hierChild3" presStyleCnt="0"/>
@@ -3472,24 +3294,10 @@
     <dgm:pt modelId="{9381C90B-005C-4E0F-8CC9-097F73422BB1}" type="pres">
       <dgm:prSet presAssocID="{914CC7BB-D87F-447A-8E29-BB7E6A8AFF9A}" presName="Name25" presStyleLbl="parChTrans1D3" presStyleIdx="0" presStyleCnt="2"/>
       <dgm:spPr/>
-      <dgm:t>
-        <a:bodyPr/>
-        <a:lstStyle/>
-        <a:p>
-          <a:endParaRPr lang="en-US"/>
-        </a:p>
-      </dgm:t>
     </dgm:pt>
     <dgm:pt modelId="{111F041D-BA8C-499D-BDBF-A7D56E3E4DF9}" type="pres">
       <dgm:prSet presAssocID="{914CC7BB-D87F-447A-8E29-BB7E6A8AFF9A}" presName="connTx" presStyleLbl="parChTrans1D3" presStyleIdx="0" presStyleCnt="2"/>
       <dgm:spPr/>
-      <dgm:t>
-        <a:bodyPr/>
-        <a:lstStyle/>
-        <a:p>
-          <a:endParaRPr lang="en-US"/>
-        </a:p>
-      </dgm:t>
     </dgm:pt>
     <dgm:pt modelId="{B0B0F239-648E-47D6-8297-D36105F7B94E}" type="pres">
       <dgm:prSet presAssocID="{7E880787-1118-4A03-84CC-74E8A81F6102}" presName="Name30" presStyleCnt="0"/>
@@ -3498,13 +3306,6 @@
     <dgm:pt modelId="{B58C9A5B-2D90-461E-ADB2-6E186FE39CC5}" type="pres">
       <dgm:prSet presAssocID="{7E880787-1118-4A03-84CC-74E8A81F6102}" presName="level2Shape" presStyleLbl="node3" presStyleIdx="0" presStyleCnt="2"/>
       <dgm:spPr/>
-      <dgm:t>
-        <a:bodyPr/>
-        <a:lstStyle/>
-        <a:p>
-          <a:endParaRPr lang="en-US"/>
-        </a:p>
-      </dgm:t>
     </dgm:pt>
     <dgm:pt modelId="{DB7F820A-3C1C-475F-A4BE-C94FC218CC74}" type="pres">
       <dgm:prSet presAssocID="{7E880787-1118-4A03-84CC-74E8A81F6102}" presName="hierChild3" presStyleCnt="0"/>
@@ -3513,24 +3314,10 @@
     <dgm:pt modelId="{F14575ED-5A42-4A17-9613-94490AA8C452}" type="pres">
       <dgm:prSet presAssocID="{61FD40AA-7D9F-4112-8543-CAF2B39F1F13}" presName="Name25" presStyleLbl="parChTrans1D3" presStyleIdx="1" presStyleCnt="2"/>
       <dgm:spPr/>
-      <dgm:t>
-        <a:bodyPr/>
-        <a:lstStyle/>
-        <a:p>
-          <a:endParaRPr lang="en-US"/>
-        </a:p>
-      </dgm:t>
     </dgm:pt>
     <dgm:pt modelId="{80856505-6AEA-41D2-ADBA-55AB85C2B9A7}" type="pres">
       <dgm:prSet presAssocID="{61FD40AA-7D9F-4112-8543-CAF2B39F1F13}" presName="connTx" presStyleLbl="parChTrans1D3" presStyleIdx="1" presStyleCnt="2"/>
       <dgm:spPr/>
-      <dgm:t>
-        <a:bodyPr/>
-        <a:lstStyle/>
-        <a:p>
-          <a:endParaRPr lang="en-US"/>
-        </a:p>
-      </dgm:t>
     </dgm:pt>
     <dgm:pt modelId="{0FC36FEC-93A8-4EF2-817F-6D5F81A13038}" type="pres">
       <dgm:prSet presAssocID="{65ACF156-AB71-4F01-9A61-D1BC7D5ACFF4}" presName="Name30" presStyleCnt="0"/>
@@ -3539,13 +3326,6 @@
     <dgm:pt modelId="{DCD1D2C2-2966-461E-8F5A-C41D9BFC37E2}" type="pres">
       <dgm:prSet presAssocID="{65ACF156-AB71-4F01-9A61-D1BC7D5ACFF4}" presName="level2Shape" presStyleLbl="node3" presStyleIdx="1" presStyleCnt="2"/>
       <dgm:spPr/>
-      <dgm:t>
-        <a:bodyPr/>
-        <a:lstStyle/>
-        <a:p>
-          <a:endParaRPr lang="en-US"/>
-        </a:p>
-      </dgm:t>
     </dgm:pt>
     <dgm:pt modelId="{25249DD7-F67E-40B3-9BF7-FF49188FC612}" type="pres">
       <dgm:prSet presAssocID="{65ACF156-AB71-4F01-9A61-D1BC7D5ACFF4}" presName="hierChild3" presStyleCnt="0"/>
@@ -3554,24 +3334,10 @@
     <dgm:pt modelId="{76D43436-595F-414A-BA43-EA7E22B1CFC5}" type="pres">
       <dgm:prSet presAssocID="{06DD9CE4-4367-4488-B14C-10339EB0F944}" presName="Name25" presStyleLbl="parChTrans1D4" presStyleIdx="0" presStyleCnt="2"/>
       <dgm:spPr/>
-      <dgm:t>
-        <a:bodyPr/>
-        <a:lstStyle/>
-        <a:p>
-          <a:endParaRPr lang="en-US"/>
-        </a:p>
-      </dgm:t>
     </dgm:pt>
     <dgm:pt modelId="{6DE16CBA-4479-44F3-A9AE-B697A0700058}" type="pres">
       <dgm:prSet presAssocID="{06DD9CE4-4367-4488-B14C-10339EB0F944}" presName="connTx" presStyleLbl="parChTrans1D4" presStyleIdx="0" presStyleCnt="2"/>
       <dgm:spPr/>
-      <dgm:t>
-        <a:bodyPr/>
-        <a:lstStyle/>
-        <a:p>
-          <a:endParaRPr lang="en-US"/>
-        </a:p>
-      </dgm:t>
     </dgm:pt>
     <dgm:pt modelId="{84CF14A4-0120-4F25-B8D7-BC9BC0E9509B}" type="pres">
       <dgm:prSet presAssocID="{1BA7ADD4-40CF-45F5-AC45-FB3493AD24C8}" presName="Name30" presStyleCnt="0"/>
@@ -3580,13 +3346,6 @@
     <dgm:pt modelId="{9B202F8D-8EDC-48DF-B3AB-FDDC81555B13}" type="pres">
       <dgm:prSet presAssocID="{1BA7ADD4-40CF-45F5-AC45-FB3493AD24C8}" presName="level2Shape" presStyleLbl="node4" presStyleIdx="0" presStyleCnt="2"/>
       <dgm:spPr/>
-      <dgm:t>
-        <a:bodyPr/>
-        <a:lstStyle/>
-        <a:p>
-          <a:endParaRPr lang="en-US"/>
-        </a:p>
-      </dgm:t>
     </dgm:pt>
     <dgm:pt modelId="{DD4343E3-5BD7-40E3-ABFC-202DD7905D06}" type="pres">
       <dgm:prSet presAssocID="{1BA7ADD4-40CF-45F5-AC45-FB3493AD24C8}" presName="hierChild3" presStyleCnt="0"/>
@@ -3595,24 +3354,10 @@
     <dgm:pt modelId="{0F2BFFF4-27C4-450E-8707-34CA7733E510}" type="pres">
       <dgm:prSet presAssocID="{7C1BB756-D811-4FE0-8F70-601DC66D0218}" presName="Name25" presStyleLbl="parChTrans1D4" presStyleIdx="1" presStyleCnt="2"/>
       <dgm:spPr/>
-      <dgm:t>
-        <a:bodyPr/>
-        <a:lstStyle/>
-        <a:p>
-          <a:endParaRPr lang="en-US"/>
-        </a:p>
-      </dgm:t>
     </dgm:pt>
     <dgm:pt modelId="{92EBC177-62D5-4CF0-B8E2-3ADD5486C7E7}" type="pres">
       <dgm:prSet presAssocID="{7C1BB756-D811-4FE0-8F70-601DC66D0218}" presName="connTx" presStyleLbl="parChTrans1D4" presStyleIdx="1" presStyleCnt="2"/>
       <dgm:spPr/>
-      <dgm:t>
-        <a:bodyPr/>
-        <a:lstStyle/>
-        <a:p>
-          <a:endParaRPr lang="en-US"/>
-        </a:p>
-      </dgm:t>
     </dgm:pt>
     <dgm:pt modelId="{AA6D2308-97C5-4D67-80FB-17E2A7FAB76E}" type="pres">
       <dgm:prSet presAssocID="{9672E566-1DFD-4B50-A665-9742C147F4BD}" presName="Name30" presStyleCnt="0"/>
@@ -3621,13 +3366,6 @@
     <dgm:pt modelId="{F96D7DC7-AC53-4034-A177-84900CE52899}" type="pres">
       <dgm:prSet presAssocID="{9672E566-1DFD-4B50-A665-9742C147F4BD}" presName="level2Shape" presStyleLbl="node4" presStyleIdx="1" presStyleCnt="2"/>
       <dgm:spPr/>
-      <dgm:t>
-        <a:bodyPr/>
-        <a:lstStyle/>
-        <a:p>
-          <a:endParaRPr lang="en-US"/>
-        </a:p>
-      </dgm:t>
     </dgm:pt>
     <dgm:pt modelId="{D7903E77-D662-4817-8DC5-83DDA543FB21}" type="pres">
       <dgm:prSet presAssocID="{9672E566-1DFD-4B50-A665-9742C147F4BD}" presName="hierChild3" presStyleCnt="0"/>
@@ -3644,13 +3382,6 @@
     <dgm:pt modelId="{65C7E491-E181-432C-8F0B-22821565C2DB}" type="pres">
       <dgm:prSet presAssocID="{72B91052-35EA-483F-B916-3C89261DA008}" presName="bgRect" presStyleLbl="bgShp" presStyleIdx="0" presStyleCnt="5"/>
       <dgm:spPr/>
-      <dgm:t>
-        <a:bodyPr/>
-        <a:lstStyle/>
-        <a:p>
-          <a:endParaRPr lang="en-US"/>
-        </a:p>
-      </dgm:t>
     </dgm:pt>
     <dgm:pt modelId="{7CA2F712-4314-46D9-A56F-98E99FC1ABFB}" type="pres">
       <dgm:prSet presAssocID="{72B91052-35EA-483F-B916-3C89261DA008}" presName="bgRectTx" presStyleLbl="bgShp" presStyleIdx="0" presStyleCnt="5">
@@ -3659,13 +3390,6 @@
         </dgm:presLayoutVars>
       </dgm:prSet>
       <dgm:spPr/>
-      <dgm:t>
-        <a:bodyPr/>
-        <a:lstStyle/>
-        <a:p>
-          <a:endParaRPr lang="en-US"/>
-        </a:p>
-      </dgm:t>
     </dgm:pt>
     <dgm:pt modelId="{C93E8580-8D98-4FF8-AC0D-6555CCC253C1}" type="pres">
       <dgm:prSet presAssocID="{72B91052-35EA-483F-B916-3C89261DA008}" presName="spComp" presStyleCnt="0"/>
@@ -3682,13 +3406,6 @@
     <dgm:pt modelId="{A289BB92-8B90-480F-A606-371CB7F8FF78}" type="pres">
       <dgm:prSet presAssocID="{684F7AF3-3955-4923-BB94-BE04D21A5838}" presName="bgRect" presStyleLbl="bgShp" presStyleIdx="1" presStyleCnt="5"/>
       <dgm:spPr/>
-      <dgm:t>
-        <a:bodyPr/>
-        <a:lstStyle/>
-        <a:p>
-          <a:endParaRPr lang="en-US"/>
-        </a:p>
-      </dgm:t>
     </dgm:pt>
     <dgm:pt modelId="{967BCDEA-9C1A-4641-9539-4CDCE3565D56}" type="pres">
       <dgm:prSet presAssocID="{684F7AF3-3955-4923-BB94-BE04D21A5838}" presName="bgRectTx" presStyleLbl="bgShp" presStyleIdx="1" presStyleCnt="5">
@@ -3697,13 +3414,6 @@
         </dgm:presLayoutVars>
       </dgm:prSet>
       <dgm:spPr/>
-      <dgm:t>
-        <a:bodyPr/>
-        <a:lstStyle/>
-        <a:p>
-          <a:endParaRPr lang="en-US"/>
-        </a:p>
-      </dgm:t>
     </dgm:pt>
     <dgm:pt modelId="{C44E69D1-9928-4144-A2C7-B637B64D4EDA}" type="pres">
       <dgm:prSet presAssocID="{684F7AF3-3955-4923-BB94-BE04D21A5838}" presName="spComp" presStyleCnt="0"/>
@@ -3720,13 +3430,6 @@
     <dgm:pt modelId="{D0454AE9-6993-4940-9027-1700D3D535DF}" type="pres">
       <dgm:prSet presAssocID="{D6DCC9C8-9E7B-40C7-B645-EDAEB08DED5B}" presName="bgRect" presStyleLbl="bgShp" presStyleIdx="2" presStyleCnt="5"/>
       <dgm:spPr/>
-      <dgm:t>
-        <a:bodyPr/>
-        <a:lstStyle/>
-        <a:p>
-          <a:endParaRPr lang="en-US"/>
-        </a:p>
-      </dgm:t>
     </dgm:pt>
     <dgm:pt modelId="{7E40AA55-086A-4B48-8DC5-8851C19C4DAF}" type="pres">
       <dgm:prSet presAssocID="{D6DCC9C8-9E7B-40C7-B645-EDAEB08DED5B}" presName="bgRectTx" presStyleLbl="bgShp" presStyleIdx="2" presStyleCnt="5">
@@ -3735,13 +3438,6 @@
         </dgm:presLayoutVars>
       </dgm:prSet>
       <dgm:spPr/>
-      <dgm:t>
-        <a:bodyPr/>
-        <a:lstStyle/>
-        <a:p>
-          <a:endParaRPr lang="en-US"/>
-        </a:p>
-      </dgm:t>
     </dgm:pt>
     <dgm:pt modelId="{77F11558-D287-428D-9E7B-41F68508E14B}" type="pres">
       <dgm:prSet presAssocID="{D6DCC9C8-9E7B-40C7-B645-EDAEB08DED5B}" presName="spComp" presStyleCnt="0"/>
@@ -3758,13 +3454,6 @@
     <dgm:pt modelId="{C1960B5E-B84B-49D5-9465-101913758759}" type="pres">
       <dgm:prSet presAssocID="{27D702D5-9211-494A-94E3-867D99E08A33}" presName="bgRect" presStyleLbl="bgShp" presStyleIdx="3" presStyleCnt="5"/>
       <dgm:spPr/>
-      <dgm:t>
-        <a:bodyPr/>
-        <a:lstStyle/>
-        <a:p>
-          <a:endParaRPr lang="en-US"/>
-        </a:p>
-      </dgm:t>
     </dgm:pt>
     <dgm:pt modelId="{B9D305F2-720C-4F28-BA3F-FDA9BD26DE12}" type="pres">
       <dgm:prSet presAssocID="{27D702D5-9211-494A-94E3-867D99E08A33}" presName="bgRectTx" presStyleLbl="bgShp" presStyleIdx="3" presStyleCnt="5">
@@ -3773,13 +3462,6 @@
         </dgm:presLayoutVars>
       </dgm:prSet>
       <dgm:spPr/>
-      <dgm:t>
-        <a:bodyPr/>
-        <a:lstStyle/>
-        <a:p>
-          <a:endParaRPr lang="en-US"/>
-        </a:p>
-      </dgm:t>
     </dgm:pt>
     <dgm:pt modelId="{84B25049-02F9-472E-8500-D387A215118C}" type="pres">
       <dgm:prSet presAssocID="{27D702D5-9211-494A-94E3-867D99E08A33}" presName="spComp" presStyleCnt="0"/>
@@ -3796,13 +3478,6 @@
     <dgm:pt modelId="{40B5F15E-82A3-4E0E-81D3-505AC497FF96}" type="pres">
       <dgm:prSet presAssocID="{5AAE728B-5BDB-4D95-A520-46C52DDA886A}" presName="bgRect" presStyleLbl="bgShp" presStyleIdx="4" presStyleCnt="5"/>
       <dgm:spPr/>
-      <dgm:t>
-        <a:bodyPr/>
-        <a:lstStyle/>
-        <a:p>
-          <a:endParaRPr lang="en-US"/>
-        </a:p>
-      </dgm:t>
     </dgm:pt>
     <dgm:pt modelId="{553CB591-0D23-4B9F-8A69-D03B373A74F7}" type="pres">
       <dgm:prSet presAssocID="{5AAE728B-5BDB-4D95-A520-46C52DDA886A}" presName="bgRectTx" presStyleLbl="bgShp" presStyleIdx="4" presStyleCnt="5">
@@ -3811,54 +3486,47 @@
         </dgm:presLayoutVars>
       </dgm:prSet>
       <dgm:spPr/>
-      <dgm:t>
-        <a:bodyPr/>
-        <a:lstStyle/>
-        <a:p>
-          <a:endParaRPr lang="en-US"/>
-        </a:p>
-      </dgm:t>
     </dgm:pt>
   </dgm:ptLst>
   <dgm:cxnLst>
-    <dgm:cxn modelId="{9E99EB7E-4086-49AF-9A47-492978EEE290}" type="presOf" srcId="{7C1BB756-D811-4FE0-8F70-601DC66D0218}" destId="{92EBC177-62D5-4CF0-B8E2-3ADD5486C7E7}" srcOrd="1" destOrd="0" presId="urn:microsoft.com/office/officeart/2005/8/layout/hierarchy5"/>
-    <dgm:cxn modelId="{FBB6C4C3-165A-4192-AEF5-647362593FF7}" type="presOf" srcId="{684F7AF3-3955-4923-BB94-BE04D21A5838}" destId="{A289BB92-8B90-480F-A606-371CB7F8FF78}" srcOrd="0" destOrd="0" presId="urn:microsoft.com/office/officeart/2005/8/layout/hierarchy5"/>
-    <dgm:cxn modelId="{AF3B3CB7-0DF1-41BB-A1DF-57932B9BC1A4}" type="presOf" srcId="{914CC7BB-D87F-447A-8E29-BB7E6A8AFF9A}" destId="{111F041D-BA8C-499D-BDBF-A7D56E3E4DF9}" srcOrd="1" destOrd="0" presId="urn:microsoft.com/office/officeart/2005/8/layout/hierarchy5"/>
+    <dgm:cxn modelId="{F4303F00-E294-4688-93FF-D4D5EB831051}" srcId="{47BA4117-B167-4821-84EE-950B0611161E}" destId="{644A2989-8F7E-489A-A51A-FC4600A8F6EE}" srcOrd="0" destOrd="0" parTransId="{308C2BE8-8975-4B67-BF3B-3BFA6218D37D}" sibTransId="{B0874FCA-C483-4266-968E-362739B81F8A}"/>
+    <dgm:cxn modelId="{0B7AFC06-EA97-4E92-8F59-86DBCCA8C171}" srcId="{1C1D920D-4869-42C0-8C9A-561DAC474211}" destId="{5AAE728B-5BDB-4D95-A520-46C52DDA886A}" srcOrd="5" destOrd="0" parTransId="{D8178EE8-29F3-4632-B4CC-DC85AD6C4AF5}" sibTransId="{43B50810-A31F-43B8-BC64-06205FA6B3EB}"/>
     <dgm:cxn modelId="{25280D0D-E007-48BB-8E92-11021B3E50B1}" type="presOf" srcId="{27D702D5-9211-494A-94E3-867D99E08A33}" destId="{B9D305F2-720C-4F28-BA3F-FDA9BD26DE12}" srcOrd="1" destOrd="0" presId="urn:microsoft.com/office/officeart/2005/8/layout/hierarchy5"/>
+    <dgm:cxn modelId="{4DAB1D0E-EEC9-49DA-B604-3A88FC695389}" type="presOf" srcId="{5AAE728B-5BDB-4D95-A520-46C52DDA886A}" destId="{40B5F15E-82A3-4E0E-81D3-505AC497FF96}" srcOrd="0" destOrd="0" presId="urn:microsoft.com/office/officeart/2005/8/layout/hierarchy5"/>
+    <dgm:cxn modelId="{204F3E0F-3572-43C1-B00E-356215AFD51D}" type="presOf" srcId="{06DD9CE4-4367-4488-B14C-10339EB0F944}" destId="{76D43436-595F-414A-BA43-EA7E22B1CFC5}" srcOrd="0" destOrd="0" presId="urn:microsoft.com/office/officeart/2005/8/layout/hierarchy5"/>
+    <dgm:cxn modelId="{59CE5A15-B9BC-45CD-9128-F885C9892190}" type="presOf" srcId="{27D702D5-9211-494A-94E3-867D99E08A33}" destId="{C1960B5E-B84B-49D5-9465-101913758759}" srcOrd="0" destOrd="0" presId="urn:microsoft.com/office/officeart/2005/8/layout/hierarchy5"/>
     <dgm:cxn modelId="{67C3C822-DDE1-4936-839B-C9A1095018C1}" type="presOf" srcId="{308C2BE8-8975-4B67-BF3B-3BFA6218D37D}" destId="{DEDEEF15-26DA-451B-92E3-081DD8A523ED}" srcOrd="1" destOrd="0" presId="urn:microsoft.com/office/officeart/2005/8/layout/hierarchy5"/>
-    <dgm:cxn modelId="{0B7AFC06-EA97-4E92-8F59-86DBCCA8C171}" srcId="{1C1D920D-4869-42C0-8C9A-561DAC474211}" destId="{5AAE728B-5BDB-4D95-A520-46C52DDA886A}" srcOrd="5" destOrd="0" parTransId="{D8178EE8-29F3-4632-B4CC-DC85AD6C4AF5}" sibTransId="{43B50810-A31F-43B8-BC64-06205FA6B3EB}"/>
-    <dgm:cxn modelId="{865337E3-EF4C-4A84-8DCB-4F87C08BAAA3}" type="presOf" srcId="{47BA4117-B167-4821-84EE-950B0611161E}" destId="{46022313-EBCA-4190-B7CB-84D6BC5398C5}" srcOrd="0" destOrd="0" presId="urn:microsoft.com/office/officeart/2005/8/layout/hierarchy5"/>
-    <dgm:cxn modelId="{3415A7E2-EAE4-4C33-9734-E79A0BD37770}" type="presOf" srcId="{914CC7BB-D87F-447A-8E29-BB7E6A8AFF9A}" destId="{9381C90B-005C-4E0F-8CC9-097F73422BB1}" srcOrd="0" destOrd="0" presId="urn:microsoft.com/office/officeart/2005/8/layout/hierarchy5"/>
-    <dgm:cxn modelId="{59CE5A15-B9BC-45CD-9128-F885C9892190}" type="presOf" srcId="{27D702D5-9211-494A-94E3-867D99E08A33}" destId="{C1960B5E-B84B-49D5-9465-101913758759}" srcOrd="0" destOrd="0" presId="urn:microsoft.com/office/officeart/2005/8/layout/hierarchy5"/>
+    <dgm:cxn modelId="{D76E1D24-357D-41E1-9F32-C9FB67623362}" type="presOf" srcId="{9672E566-1DFD-4B50-A665-9742C147F4BD}" destId="{F96D7DC7-AC53-4034-A177-84900CE52899}" srcOrd="0" destOrd="0" presId="urn:microsoft.com/office/officeart/2005/8/layout/hierarchy5"/>
+    <dgm:cxn modelId="{F96FE32D-D9A4-41C1-BE0B-C789569BD296}" srcId="{1C1D920D-4869-42C0-8C9A-561DAC474211}" destId="{47BA4117-B167-4821-84EE-950B0611161E}" srcOrd="0" destOrd="0" parTransId="{CFC96E73-4757-40E0-AFFA-58DE8818E275}" sibTransId="{ABC73BA2-1DC5-40A3-B314-738EBD775D92}"/>
     <dgm:cxn modelId="{1FA5DD30-F5CD-4B84-AA56-C1528A35F1C3}" srcId="{644A2989-8F7E-489A-A51A-FC4600A8F6EE}" destId="{7E880787-1118-4A03-84CC-74E8A81F6102}" srcOrd="0" destOrd="0" parTransId="{914CC7BB-D87F-447A-8E29-BB7E6A8AFF9A}" sibTransId="{834FE5FE-2B60-4048-A004-300E288D35FE}"/>
-    <dgm:cxn modelId="{B77563D5-BE72-4511-BEE1-5CCD89E6C830}" type="presOf" srcId="{06DD9CE4-4367-4488-B14C-10339EB0F944}" destId="{6DE16CBA-4479-44F3-A9AE-B697A0700058}" srcOrd="1" destOrd="0" presId="urn:microsoft.com/office/officeart/2005/8/layout/hierarchy5"/>
-    <dgm:cxn modelId="{14D3D4CF-108F-4857-910C-128609F2B629}" type="presOf" srcId="{7E880787-1118-4A03-84CC-74E8A81F6102}" destId="{B58C9A5B-2D90-461E-ADB2-6E186FE39CC5}" srcOrd="0" destOrd="0" presId="urn:microsoft.com/office/officeart/2005/8/layout/hierarchy5"/>
+    <dgm:cxn modelId="{B44B3B3B-A0EA-41B2-AC8B-2795EB04098A}" srcId="{644A2989-8F7E-489A-A51A-FC4600A8F6EE}" destId="{65ACF156-AB71-4F01-9A61-D1BC7D5ACFF4}" srcOrd="1" destOrd="0" parTransId="{61FD40AA-7D9F-4112-8543-CAF2B39F1F13}" sibTransId="{B6C25AB8-A036-4697-8652-D69BBBB671AB}"/>
+    <dgm:cxn modelId="{598A0E3C-1429-4501-8817-FFD6D1AF6EE1}" type="presOf" srcId="{61FD40AA-7D9F-4112-8543-CAF2B39F1F13}" destId="{F14575ED-5A42-4A17-9613-94490AA8C452}" srcOrd="0" destOrd="0" presId="urn:microsoft.com/office/officeart/2005/8/layout/hierarchy5"/>
+    <dgm:cxn modelId="{2CF91840-4DA7-43F4-947E-5024238BAAD7}" srcId="{1C1D920D-4869-42C0-8C9A-561DAC474211}" destId="{27D702D5-9211-494A-94E3-867D99E08A33}" srcOrd="4" destOrd="0" parTransId="{D79676B5-9FBF-4271-A037-6C222973D963}" sibTransId="{1022B1AA-6CDD-45D6-A9D6-3DE23554FB8E}"/>
+    <dgm:cxn modelId="{9CD92340-B2D5-4A3B-A126-039D6665184F}" srcId="{1C1D920D-4869-42C0-8C9A-561DAC474211}" destId="{72B91052-35EA-483F-B916-3C89261DA008}" srcOrd="1" destOrd="0" parTransId="{58B724E0-990B-4FAA-B6C8-8D0D507B941B}" sibTransId="{2C5E3348-06DF-482C-95A2-9AB32DF9A370}"/>
+    <dgm:cxn modelId="{5346A253-2BAC-44F0-9BE4-6BB5E1AAE4C6}" type="presOf" srcId="{61FD40AA-7D9F-4112-8543-CAF2B39F1F13}" destId="{80856505-6AEA-41D2-ADBA-55AB85C2B9A7}" srcOrd="1" destOrd="0" presId="urn:microsoft.com/office/officeart/2005/8/layout/hierarchy5"/>
+    <dgm:cxn modelId="{073DDE67-F393-4A88-8740-849ED07A4035}" type="presOf" srcId="{308C2BE8-8975-4B67-BF3B-3BFA6218D37D}" destId="{8E3B58DF-34D0-4C03-B6D2-E5DB350A6AAA}" srcOrd="0" destOrd="0" presId="urn:microsoft.com/office/officeart/2005/8/layout/hierarchy5"/>
+    <dgm:cxn modelId="{8D7D2672-7F0A-41AE-B626-943081E57FFA}" type="presOf" srcId="{1C1D920D-4869-42C0-8C9A-561DAC474211}" destId="{A2BC3774-96F0-444A-8EF5-C26F08BAE144}" srcOrd="0" destOrd="0" presId="urn:microsoft.com/office/officeart/2005/8/layout/hierarchy5"/>
     <dgm:cxn modelId="{B93AC372-B074-4374-B69E-BB6E0B8743FB}" type="presOf" srcId="{1BA7ADD4-40CF-45F5-AC45-FB3493AD24C8}" destId="{9B202F8D-8EDC-48DF-B3AB-FDDC81555B13}" srcOrd="0" destOrd="0" presId="urn:microsoft.com/office/officeart/2005/8/layout/hierarchy5"/>
-    <dgm:cxn modelId="{18E38AAD-37A5-4A99-94F8-8D3EE0777F82}" type="presOf" srcId="{D6DCC9C8-9E7B-40C7-B645-EDAEB08DED5B}" destId="{D0454AE9-6993-4940-9027-1700D3D535DF}" srcOrd="0" destOrd="0" presId="urn:microsoft.com/office/officeart/2005/8/layout/hierarchy5"/>
-    <dgm:cxn modelId="{A44445F1-EF6A-4A84-A38A-EBED78829FA0}" srcId="{1C1D920D-4869-42C0-8C9A-561DAC474211}" destId="{D6DCC9C8-9E7B-40C7-B645-EDAEB08DED5B}" srcOrd="3" destOrd="0" parTransId="{2835462C-D5A3-4841-9A59-DF36A0A00AC3}" sibTransId="{08B74EE2-7FBD-4FB8-BC7F-C0C11CE81A95}"/>
-    <dgm:cxn modelId="{5346A253-2BAC-44F0-9BE4-6BB5E1AAE4C6}" type="presOf" srcId="{61FD40AA-7D9F-4112-8543-CAF2B39F1F13}" destId="{80856505-6AEA-41D2-ADBA-55AB85C2B9A7}" srcOrd="1" destOrd="0" presId="urn:microsoft.com/office/officeart/2005/8/layout/hierarchy5"/>
-    <dgm:cxn modelId="{9CD92340-B2D5-4A3B-A126-039D6665184F}" srcId="{1C1D920D-4869-42C0-8C9A-561DAC474211}" destId="{72B91052-35EA-483F-B916-3C89261DA008}" srcOrd="1" destOrd="0" parTransId="{58B724E0-990B-4FAA-B6C8-8D0D507B941B}" sibTransId="{2C5E3348-06DF-482C-95A2-9AB32DF9A370}"/>
-    <dgm:cxn modelId="{073DDE67-F393-4A88-8740-849ED07A4035}" type="presOf" srcId="{308C2BE8-8975-4B67-BF3B-3BFA6218D37D}" destId="{8E3B58DF-34D0-4C03-B6D2-E5DB350A6AAA}" srcOrd="0" destOrd="0" presId="urn:microsoft.com/office/officeart/2005/8/layout/hierarchy5"/>
-    <dgm:cxn modelId="{2CF91840-4DA7-43F4-947E-5024238BAAD7}" srcId="{1C1D920D-4869-42C0-8C9A-561DAC474211}" destId="{27D702D5-9211-494A-94E3-867D99E08A33}" srcOrd="4" destOrd="0" parTransId="{D79676B5-9FBF-4271-A037-6C222973D963}" sibTransId="{1022B1AA-6CDD-45D6-A9D6-3DE23554FB8E}"/>
-    <dgm:cxn modelId="{4DAB1D0E-EEC9-49DA-B604-3A88FC695389}" type="presOf" srcId="{5AAE728B-5BDB-4D95-A520-46C52DDA886A}" destId="{40B5F15E-82A3-4E0E-81D3-505AC497FF96}" srcOrd="0" destOrd="0" presId="urn:microsoft.com/office/officeart/2005/8/layout/hierarchy5"/>
-    <dgm:cxn modelId="{6F6BA5A8-137C-4720-94FA-0C4835CCFA79}" srcId="{1BA7ADD4-40CF-45F5-AC45-FB3493AD24C8}" destId="{9672E566-1DFD-4B50-A665-9742C147F4BD}" srcOrd="0" destOrd="0" parTransId="{7C1BB756-D811-4FE0-8F70-601DC66D0218}" sibTransId="{C0DC18EA-D502-4F92-822F-26018CAADEBC}"/>
-    <dgm:cxn modelId="{42E523E8-DABD-4573-BF09-827BD1CA39D3}" type="presOf" srcId="{72B91052-35EA-483F-B916-3C89261DA008}" destId="{65C7E491-E181-432C-8F0B-22821565C2DB}" srcOrd="0" destOrd="0" presId="urn:microsoft.com/office/officeart/2005/8/layout/hierarchy5"/>
-    <dgm:cxn modelId="{898C3BC2-F538-4419-A037-E69DDA69CEC2}" type="presOf" srcId="{7C1BB756-D811-4FE0-8F70-601DC66D0218}" destId="{0F2BFFF4-27C4-450E-8707-34CA7733E510}" srcOrd="0" destOrd="0" presId="urn:microsoft.com/office/officeart/2005/8/layout/hierarchy5"/>
-    <dgm:cxn modelId="{598A0E3C-1429-4501-8817-FFD6D1AF6EE1}" type="presOf" srcId="{61FD40AA-7D9F-4112-8543-CAF2B39F1F13}" destId="{F14575ED-5A42-4A17-9613-94490AA8C452}" srcOrd="0" destOrd="0" presId="urn:microsoft.com/office/officeart/2005/8/layout/hierarchy5"/>
-    <dgm:cxn modelId="{B44B3B3B-A0EA-41B2-AC8B-2795EB04098A}" srcId="{644A2989-8F7E-489A-A51A-FC4600A8F6EE}" destId="{65ACF156-AB71-4F01-9A61-D1BC7D5ACFF4}" srcOrd="1" destOrd="0" parTransId="{61FD40AA-7D9F-4112-8543-CAF2B39F1F13}" sibTransId="{B6C25AB8-A036-4697-8652-D69BBBB671AB}"/>
-    <dgm:cxn modelId="{204F3E0F-3572-43C1-B00E-356215AFD51D}" type="presOf" srcId="{06DD9CE4-4367-4488-B14C-10339EB0F944}" destId="{76D43436-595F-414A-BA43-EA7E22B1CFC5}" srcOrd="0" destOrd="0" presId="urn:microsoft.com/office/officeart/2005/8/layout/hierarchy5"/>
-    <dgm:cxn modelId="{FB68EDE6-51D2-433E-9FFE-880E60E75B6B}" type="presOf" srcId="{D6DCC9C8-9E7B-40C7-B645-EDAEB08DED5B}" destId="{7E40AA55-086A-4B48-8DC5-8851C19C4DAF}" srcOrd="1" destOrd="0" presId="urn:microsoft.com/office/officeart/2005/8/layout/hierarchy5"/>
-    <dgm:cxn modelId="{F4303F00-E294-4688-93FF-D4D5EB831051}" srcId="{47BA4117-B167-4821-84EE-950B0611161E}" destId="{644A2989-8F7E-489A-A51A-FC4600A8F6EE}" srcOrd="0" destOrd="0" parTransId="{308C2BE8-8975-4B67-BF3B-3BFA6218D37D}" sibTransId="{B0874FCA-C483-4266-968E-362739B81F8A}"/>
-    <dgm:cxn modelId="{520C1AEA-A826-4904-9E63-34C30359E1CC}" type="presOf" srcId="{65ACF156-AB71-4F01-9A61-D1BC7D5ACFF4}" destId="{DCD1D2C2-2966-461E-8F5A-C41D9BFC37E2}" srcOrd="0" destOrd="0" presId="urn:microsoft.com/office/officeart/2005/8/layout/hierarchy5"/>
     <dgm:cxn modelId="{40846877-BA73-4894-B793-0B42FFB9030E}" type="presOf" srcId="{5AAE728B-5BDB-4D95-A520-46C52DDA886A}" destId="{553CB591-0D23-4B9F-8A69-D03B373A74F7}" srcOrd="1" destOrd="0" presId="urn:microsoft.com/office/officeart/2005/8/layout/hierarchy5"/>
     <dgm:cxn modelId="{280B897D-9E35-4CF3-ABA7-6240C3B34838}" type="presOf" srcId="{72B91052-35EA-483F-B916-3C89261DA008}" destId="{7CA2F712-4314-46D9-A56F-98E99FC1ABFB}" srcOrd="1" destOrd="0" presId="urn:microsoft.com/office/officeart/2005/8/layout/hierarchy5"/>
-    <dgm:cxn modelId="{D76E1D24-357D-41E1-9F32-C9FB67623362}" type="presOf" srcId="{9672E566-1DFD-4B50-A665-9742C147F4BD}" destId="{F96D7DC7-AC53-4034-A177-84900CE52899}" srcOrd="0" destOrd="0" presId="urn:microsoft.com/office/officeart/2005/8/layout/hierarchy5"/>
+    <dgm:cxn modelId="{9E99EB7E-4086-49AF-9A47-492978EEE290}" type="presOf" srcId="{7C1BB756-D811-4FE0-8F70-601DC66D0218}" destId="{92EBC177-62D5-4CF0-B8E2-3ADD5486C7E7}" srcOrd="1" destOrd="0" presId="urn:microsoft.com/office/officeart/2005/8/layout/hierarchy5"/>
     <dgm:cxn modelId="{CF150784-C2EF-42A8-893B-57DEF60A1917}" type="presOf" srcId="{684F7AF3-3955-4923-BB94-BE04D21A5838}" destId="{967BCDEA-9C1A-4641-9539-4CDCE3565D56}" srcOrd="1" destOrd="0" presId="urn:microsoft.com/office/officeart/2005/8/layout/hierarchy5"/>
-    <dgm:cxn modelId="{F96FE32D-D9A4-41C1-BE0B-C789569BD296}" srcId="{1C1D920D-4869-42C0-8C9A-561DAC474211}" destId="{47BA4117-B167-4821-84EE-950B0611161E}" srcOrd="0" destOrd="0" parTransId="{CFC96E73-4757-40E0-AFFA-58DE8818E275}" sibTransId="{ABC73BA2-1DC5-40A3-B314-738EBD775D92}"/>
-    <dgm:cxn modelId="{8D7D2672-7F0A-41AE-B626-943081E57FFA}" type="presOf" srcId="{1C1D920D-4869-42C0-8C9A-561DAC474211}" destId="{A2BC3774-96F0-444A-8EF5-C26F08BAE144}" srcOrd="0" destOrd="0" presId="urn:microsoft.com/office/officeart/2005/8/layout/hierarchy5"/>
+    <dgm:cxn modelId="{6F6BA5A8-137C-4720-94FA-0C4835CCFA79}" srcId="{1BA7ADD4-40CF-45F5-AC45-FB3493AD24C8}" destId="{9672E566-1DFD-4B50-A665-9742C147F4BD}" srcOrd="0" destOrd="0" parTransId="{7C1BB756-D811-4FE0-8F70-601DC66D0218}" sibTransId="{C0DC18EA-D502-4F92-822F-26018CAADEBC}"/>
+    <dgm:cxn modelId="{18E38AAD-37A5-4A99-94F8-8D3EE0777F82}" type="presOf" srcId="{D6DCC9C8-9E7B-40C7-B645-EDAEB08DED5B}" destId="{D0454AE9-6993-4940-9027-1700D3D535DF}" srcOrd="0" destOrd="0" presId="urn:microsoft.com/office/officeart/2005/8/layout/hierarchy5"/>
     <dgm:cxn modelId="{800381B4-A431-4992-B12D-900FE442BB89}" srcId="{1C1D920D-4869-42C0-8C9A-561DAC474211}" destId="{684F7AF3-3955-4923-BB94-BE04D21A5838}" srcOrd="2" destOrd="0" parTransId="{6E8F4C9C-2727-4004-A543-6D1CCB37D6AB}" sibTransId="{C453E201-F7F4-48F7-8840-C012365C24A0}"/>
+    <dgm:cxn modelId="{AF3B3CB7-0DF1-41BB-A1DF-57932B9BC1A4}" type="presOf" srcId="{914CC7BB-D87F-447A-8E29-BB7E6A8AFF9A}" destId="{111F041D-BA8C-499D-BDBF-A7D56E3E4DF9}" srcOrd="1" destOrd="0" presId="urn:microsoft.com/office/officeart/2005/8/layout/hierarchy5"/>
+    <dgm:cxn modelId="{898C3BC2-F538-4419-A037-E69DDA69CEC2}" type="presOf" srcId="{7C1BB756-D811-4FE0-8F70-601DC66D0218}" destId="{0F2BFFF4-27C4-450E-8707-34CA7733E510}" srcOrd="0" destOrd="0" presId="urn:microsoft.com/office/officeart/2005/8/layout/hierarchy5"/>
+    <dgm:cxn modelId="{FBB6C4C3-165A-4192-AEF5-647362593FF7}" type="presOf" srcId="{684F7AF3-3955-4923-BB94-BE04D21A5838}" destId="{A289BB92-8B90-480F-A606-371CB7F8FF78}" srcOrd="0" destOrd="0" presId="urn:microsoft.com/office/officeart/2005/8/layout/hierarchy5"/>
     <dgm:cxn modelId="{DE2647CD-1D99-4CF1-9F91-2EDF6016089A}" type="presOf" srcId="{644A2989-8F7E-489A-A51A-FC4600A8F6EE}" destId="{DE031C7F-D6B5-4DDD-A407-A162439B4539}" srcOrd="0" destOrd="0" presId="urn:microsoft.com/office/officeart/2005/8/layout/hierarchy5"/>
+    <dgm:cxn modelId="{14D3D4CF-108F-4857-910C-128609F2B629}" type="presOf" srcId="{7E880787-1118-4A03-84CC-74E8A81F6102}" destId="{B58C9A5B-2D90-461E-ADB2-6E186FE39CC5}" srcOrd="0" destOrd="0" presId="urn:microsoft.com/office/officeart/2005/8/layout/hierarchy5"/>
+    <dgm:cxn modelId="{B77563D5-BE72-4511-BEE1-5CCD89E6C830}" type="presOf" srcId="{06DD9CE4-4367-4488-B14C-10339EB0F944}" destId="{6DE16CBA-4479-44F3-A9AE-B697A0700058}" srcOrd="1" destOrd="0" presId="urn:microsoft.com/office/officeart/2005/8/layout/hierarchy5"/>
     <dgm:cxn modelId="{BC8E7CD6-85E2-4ACC-9553-1A77D4A94FF6}" srcId="{65ACF156-AB71-4F01-9A61-D1BC7D5ACFF4}" destId="{1BA7ADD4-40CF-45F5-AC45-FB3493AD24C8}" srcOrd="0" destOrd="0" parTransId="{06DD9CE4-4367-4488-B14C-10339EB0F944}" sibTransId="{2A650CC5-A875-4898-A9FD-2F095B26D040}"/>
+    <dgm:cxn modelId="{3415A7E2-EAE4-4C33-9734-E79A0BD37770}" type="presOf" srcId="{914CC7BB-D87F-447A-8E29-BB7E6A8AFF9A}" destId="{9381C90B-005C-4E0F-8CC9-097F73422BB1}" srcOrd="0" destOrd="0" presId="urn:microsoft.com/office/officeart/2005/8/layout/hierarchy5"/>
+    <dgm:cxn modelId="{865337E3-EF4C-4A84-8DCB-4F87C08BAAA3}" type="presOf" srcId="{47BA4117-B167-4821-84EE-950B0611161E}" destId="{46022313-EBCA-4190-B7CB-84D6BC5398C5}" srcOrd="0" destOrd="0" presId="urn:microsoft.com/office/officeart/2005/8/layout/hierarchy5"/>
+    <dgm:cxn modelId="{FB68EDE6-51D2-433E-9FFE-880E60E75B6B}" type="presOf" srcId="{D6DCC9C8-9E7B-40C7-B645-EDAEB08DED5B}" destId="{7E40AA55-086A-4B48-8DC5-8851C19C4DAF}" srcOrd="1" destOrd="0" presId="urn:microsoft.com/office/officeart/2005/8/layout/hierarchy5"/>
+    <dgm:cxn modelId="{42E523E8-DABD-4573-BF09-827BD1CA39D3}" type="presOf" srcId="{72B91052-35EA-483F-B916-3C89261DA008}" destId="{65C7E491-E181-432C-8F0B-22821565C2DB}" srcOrd="0" destOrd="0" presId="urn:microsoft.com/office/officeart/2005/8/layout/hierarchy5"/>
+    <dgm:cxn modelId="{520C1AEA-A826-4904-9E63-34C30359E1CC}" type="presOf" srcId="{65ACF156-AB71-4F01-9A61-D1BC7D5ACFF4}" destId="{DCD1D2C2-2966-461E-8F5A-C41D9BFC37E2}" srcOrd="0" destOrd="0" presId="urn:microsoft.com/office/officeart/2005/8/layout/hierarchy5"/>
+    <dgm:cxn modelId="{A44445F1-EF6A-4A84-A38A-EBED78829FA0}" srcId="{1C1D920D-4869-42C0-8C9A-561DAC474211}" destId="{D6DCC9C8-9E7B-40C7-B645-EDAEB08DED5B}" srcOrd="3" destOrd="0" parTransId="{2835462C-D5A3-4841-9A59-DF36A0A00AC3}" sibTransId="{08B74EE2-7FBD-4FB8-BC7F-C0C11CE81A95}"/>
     <dgm:cxn modelId="{D17FD29B-99C1-46EB-ACD7-59F2A3B21794}" type="presParOf" srcId="{A2BC3774-96F0-444A-8EF5-C26F08BAE144}" destId="{7A63DD22-0A0B-4E8E-B668-CD566800B7D2}" srcOrd="0" destOrd="0" presId="urn:microsoft.com/office/officeart/2005/8/layout/hierarchy5"/>
     <dgm:cxn modelId="{727DAEC8-9A1B-42BF-A476-8279291E8DC0}" type="presParOf" srcId="{7A63DD22-0A0B-4E8E-B668-CD566800B7D2}" destId="{848D94CF-5D79-4858-8FA6-1F146640436E}" srcOrd="0" destOrd="0" presId="urn:microsoft.com/office/officeart/2005/8/layout/hierarchy5"/>
     <dgm:cxn modelId="{4D9F298E-76D4-4D37-AD78-0107BEA49C79}" type="presParOf" srcId="{7A63DD22-0A0B-4E8E-B668-CD566800B7D2}" destId="{5B9AF6F6-2CDF-49F3-8FBE-746E1471FAA7}" srcOrd="1" destOrd="0" presId="urn:microsoft.com/office/officeart/2005/8/layout/hierarchy5"/>
@@ -4002,7 +3670,193 @@
       </dsp:nvSpPr>
       <dsp:spPr>
         <a:xfrm>
-          <a:off x="7348569" y="2023340"/>
+          <a:off x="7220743" y="2023340"/>
+          <a:ext cx="173546" cy="292724"/>
+        </a:xfrm>
+        <a:custGeom>
+          <a:avLst/>
+          <a:gdLst/>
+          <a:ahLst/>
+          <a:cxnLst/>
+          <a:rect l="0" t="0" r="0" b="0"/>
+          <a:pathLst>
+            <a:path>
+              <a:moveTo>
+                <a:pt x="173546" y="0"/>
+              </a:moveTo>
+              <a:lnTo>
+                <a:pt x="173546" y="199483"/>
+              </a:lnTo>
+              <a:lnTo>
+                <a:pt x="0" y="199483"/>
+              </a:lnTo>
+              <a:lnTo>
+                <a:pt x="0" y="292724"/>
+              </a:lnTo>
+            </a:path>
+          </a:pathLst>
+        </a:custGeom>
+        <a:noFill/>
+        <a:ln w="12700" cap="flat" cmpd="sng" algn="ctr">
+          <a:solidFill>
+            <a:schemeClr val="accent1">
+              <a:shade val="80000"/>
+              <a:hueOff val="0"/>
+              <a:satOff val="0"/>
+              <a:lumOff val="0"/>
+              <a:alphaOff val="0"/>
+            </a:schemeClr>
+          </a:solidFill>
+          <a:prstDash val="solid"/>
+          <a:miter lim="800000"/>
+        </a:ln>
+        <a:effectLst/>
+      </dsp:spPr>
+      <dsp:style>
+        <a:lnRef idx="2">
+          <a:scrgbClr r="0" g="0" b="0"/>
+        </a:lnRef>
+        <a:fillRef idx="0">
+          <a:scrgbClr r="0" g="0" b="0"/>
+        </a:fillRef>
+        <a:effectRef idx="0">
+          <a:scrgbClr r="0" g="0" b="0"/>
+        </a:effectRef>
+        <a:fontRef idx="minor"/>
+      </dsp:style>
+    </dsp:sp>
+    <dsp:sp modelId="{D63F6A73-1AA5-4E17-A1AA-CDEF17CF0698}">
+      <dsp:nvSpPr>
+        <dsp:cNvPr id="0" name=""/>
+        <dsp:cNvSpPr/>
+      </dsp:nvSpPr>
+      <dsp:spPr>
+        <a:xfrm>
+          <a:off x="5990575" y="2023340"/>
+          <a:ext cx="1403714" cy="292724"/>
+        </a:xfrm>
+        <a:custGeom>
+          <a:avLst/>
+          <a:gdLst/>
+          <a:ahLst/>
+          <a:cxnLst/>
+          <a:rect l="0" t="0" r="0" b="0"/>
+          <a:pathLst>
+            <a:path>
+              <a:moveTo>
+                <a:pt x="1403714" y="0"/>
+              </a:moveTo>
+              <a:lnTo>
+                <a:pt x="1403714" y="199483"/>
+              </a:lnTo>
+              <a:lnTo>
+                <a:pt x="0" y="199483"/>
+              </a:lnTo>
+              <a:lnTo>
+                <a:pt x="0" y="292724"/>
+              </a:lnTo>
+            </a:path>
+          </a:pathLst>
+        </a:custGeom>
+        <a:noFill/>
+        <a:ln w="12700" cap="flat" cmpd="sng" algn="ctr">
+          <a:solidFill>
+            <a:schemeClr val="accent1">
+              <a:shade val="80000"/>
+              <a:hueOff val="0"/>
+              <a:satOff val="0"/>
+              <a:lumOff val="0"/>
+              <a:alphaOff val="0"/>
+            </a:schemeClr>
+          </a:solidFill>
+          <a:prstDash val="solid"/>
+          <a:miter lim="800000"/>
+        </a:ln>
+        <a:effectLst/>
+      </dsp:spPr>
+      <dsp:style>
+        <a:lnRef idx="2">
+          <a:scrgbClr r="0" g="0" b="0"/>
+        </a:lnRef>
+        <a:fillRef idx="0">
+          <a:scrgbClr r="0" g="0" b="0"/>
+        </a:fillRef>
+        <a:effectRef idx="0">
+          <a:scrgbClr r="0" g="0" b="0"/>
+        </a:effectRef>
+        <a:fontRef idx="minor"/>
+      </dsp:style>
+    </dsp:sp>
+    <dsp:sp modelId="{A787A79F-FE1A-477E-83CD-31B61485D15B}">
+      <dsp:nvSpPr>
+        <dsp:cNvPr id="0" name=""/>
+        <dsp:cNvSpPr/>
+      </dsp:nvSpPr>
+      <dsp:spPr>
+        <a:xfrm>
+          <a:off x="5154721" y="1091487"/>
+          <a:ext cx="2239567" cy="292724"/>
+        </a:xfrm>
+        <a:custGeom>
+          <a:avLst/>
+          <a:gdLst/>
+          <a:ahLst/>
+          <a:cxnLst/>
+          <a:rect l="0" t="0" r="0" b="0"/>
+          <a:pathLst>
+            <a:path>
+              <a:moveTo>
+                <a:pt x="0" y="0"/>
+              </a:moveTo>
+              <a:lnTo>
+                <a:pt x="0" y="199483"/>
+              </a:lnTo>
+              <a:lnTo>
+                <a:pt x="2239567" y="199483"/>
+              </a:lnTo>
+              <a:lnTo>
+                <a:pt x="2239567" y="292724"/>
+              </a:lnTo>
+            </a:path>
+          </a:pathLst>
+        </a:custGeom>
+        <a:noFill/>
+        <a:ln w="12700" cap="flat" cmpd="sng" algn="ctr">
+          <a:solidFill>
+            <a:schemeClr val="accent1">
+              <a:shade val="60000"/>
+              <a:hueOff val="0"/>
+              <a:satOff val="0"/>
+              <a:lumOff val="0"/>
+              <a:alphaOff val="0"/>
+            </a:schemeClr>
+          </a:solidFill>
+          <a:prstDash val="solid"/>
+          <a:miter lim="800000"/>
+        </a:ln>
+        <a:effectLst/>
+      </dsp:spPr>
+      <dsp:style>
+        <a:lnRef idx="2">
+          <a:scrgbClr r="0" g="0" b="0"/>
+        </a:lnRef>
+        <a:fillRef idx="0">
+          <a:scrgbClr r="0" g="0" b="0"/>
+        </a:fillRef>
+        <a:effectRef idx="0">
+          <a:scrgbClr r="0" g="0" b="0"/>
+        </a:effectRef>
+        <a:fontRef idx="minor"/>
+      </dsp:style>
+    </dsp:sp>
+    <dsp:sp modelId="{25CB3E1E-92FB-4EC3-9A10-DAD0D4E284CF}">
+      <dsp:nvSpPr>
+        <dsp:cNvPr id="0" name=""/>
+        <dsp:cNvSpPr/>
+      </dsp:nvSpPr>
+      <dsp:spPr>
+        <a:xfrm>
+          <a:off x="5329770" y="3887045"/>
           <a:ext cx="91440" cy="292724"/>
         </a:xfrm>
         <a:custGeom>
@@ -4051,186 +3905,6 @@
         <a:fontRef idx="minor"/>
       </dsp:style>
     </dsp:sp>
-    <dsp:sp modelId="{D63F6A73-1AA5-4E17-A1AA-CDEF17CF0698}">
-      <dsp:nvSpPr>
-        <dsp:cNvPr id="0" name=""/>
-        <dsp:cNvSpPr/>
-      </dsp:nvSpPr>
-      <dsp:spPr>
-        <a:xfrm>
-          <a:off x="6164121" y="2023340"/>
-          <a:ext cx="1230168" cy="292724"/>
-        </a:xfrm>
-        <a:custGeom>
-          <a:avLst/>
-          <a:gdLst/>
-          <a:ahLst/>
-          <a:cxnLst/>
-          <a:rect l="0" t="0" r="0" b="0"/>
-          <a:pathLst>
-            <a:path>
-              <a:moveTo>
-                <a:pt x="1230168" y="0"/>
-              </a:moveTo>
-              <a:lnTo>
-                <a:pt x="1230168" y="199483"/>
-              </a:lnTo>
-              <a:lnTo>
-                <a:pt x="0" y="199483"/>
-              </a:lnTo>
-              <a:lnTo>
-                <a:pt x="0" y="292724"/>
-              </a:lnTo>
-            </a:path>
-          </a:pathLst>
-        </a:custGeom>
-        <a:noFill/>
-        <a:ln w="12700" cap="flat" cmpd="sng" algn="ctr">
-          <a:solidFill>
-            <a:schemeClr val="accent1">
-              <a:shade val="80000"/>
-              <a:hueOff val="0"/>
-              <a:satOff val="0"/>
-              <a:lumOff val="0"/>
-              <a:alphaOff val="0"/>
-            </a:schemeClr>
-          </a:solidFill>
-          <a:prstDash val="solid"/>
-          <a:miter lim="800000"/>
-        </a:ln>
-        <a:effectLst/>
-      </dsp:spPr>
-      <dsp:style>
-        <a:lnRef idx="2">
-          <a:scrgbClr r="0" g="0" b="0"/>
-        </a:lnRef>
-        <a:fillRef idx="0">
-          <a:scrgbClr r="0" g="0" b="0"/>
-        </a:fillRef>
-        <a:effectRef idx="0">
-          <a:scrgbClr r="0" g="0" b="0"/>
-        </a:effectRef>
-        <a:fontRef idx="minor"/>
-      </dsp:style>
-    </dsp:sp>
-    <dsp:sp modelId="{A787A79F-FE1A-477E-83CD-31B61485D15B}">
-      <dsp:nvSpPr>
-        <dsp:cNvPr id="0" name=""/>
-        <dsp:cNvSpPr/>
-      </dsp:nvSpPr>
-      <dsp:spPr>
-        <a:xfrm>
-          <a:off x="5241494" y="1091487"/>
-          <a:ext cx="2152794" cy="292724"/>
-        </a:xfrm>
-        <a:custGeom>
-          <a:avLst/>
-          <a:gdLst/>
-          <a:ahLst/>
-          <a:cxnLst/>
-          <a:rect l="0" t="0" r="0" b="0"/>
-          <a:pathLst>
-            <a:path>
-              <a:moveTo>
-                <a:pt x="0" y="0"/>
-              </a:moveTo>
-              <a:lnTo>
-                <a:pt x="0" y="199483"/>
-              </a:lnTo>
-              <a:lnTo>
-                <a:pt x="2152794" y="199483"/>
-              </a:lnTo>
-              <a:lnTo>
-                <a:pt x="2152794" y="292724"/>
-              </a:lnTo>
-            </a:path>
-          </a:pathLst>
-        </a:custGeom>
-        <a:noFill/>
-        <a:ln w="12700" cap="flat" cmpd="sng" algn="ctr">
-          <a:solidFill>
-            <a:schemeClr val="accent1">
-              <a:shade val="60000"/>
-              <a:hueOff val="0"/>
-              <a:satOff val="0"/>
-              <a:lumOff val="0"/>
-              <a:alphaOff val="0"/>
-            </a:schemeClr>
-          </a:solidFill>
-          <a:prstDash val="solid"/>
-          <a:miter lim="800000"/>
-        </a:ln>
-        <a:effectLst/>
-      </dsp:spPr>
-      <dsp:style>
-        <a:lnRef idx="2">
-          <a:scrgbClr r="0" g="0" b="0"/>
-        </a:lnRef>
-        <a:fillRef idx="0">
-          <a:scrgbClr r="0" g="0" b="0"/>
-        </a:fillRef>
-        <a:effectRef idx="0">
-          <a:scrgbClr r="0" g="0" b="0"/>
-        </a:effectRef>
-        <a:fontRef idx="minor"/>
-      </dsp:style>
-    </dsp:sp>
-    <dsp:sp modelId="{25CB3E1E-92FB-4EC3-9A10-DAD0D4E284CF}">
-      <dsp:nvSpPr>
-        <dsp:cNvPr id="0" name=""/>
-        <dsp:cNvSpPr/>
-      </dsp:nvSpPr>
-      <dsp:spPr>
-        <a:xfrm>
-          <a:off x="5503317" y="3887045"/>
-          <a:ext cx="91440" cy="292724"/>
-        </a:xfrm>
-        <a:custGeom>
-          <a:avLst/>
-          <a:gdLst/>
-          <a:ahLst/>
-          <a:cxnLst/>
-          <a:rect l="0" t="0" r="0" b="0"/>
-          <a:pathLst>
-            <a:path>
-              <a:moveTo>
-                <a:pt x="45720" y="0"/>
-              </a:moveTo>
-              <a:lnTo>
-                <a:pt x="45720" y="292724"/>
-              </a:lnTo>
-            </a:path>
-          </a:pathLst>
-        </a:custGeom>
-        <a:noFill/>
-        <a:ln w="12700" cap="flat" cmpd="sng" algn="ctr">
-          <a:solidFill>
-            <a:schemeClr val="accent1">
-              <a:shade val="80000"/>
-              <a:hueOff val="0"/>
-              <a:satOff val="0"/>
-              <a:lumOff val="0"/>
-              <a:alphaOff val="0"/>
-            </a:schemeClr>
-          </a:solidFill>
-          <a:prstDash val="solid"/>
-          <a:miter lim="800000"/>
-        </a:ln>
-        <a:effectLst/>
-      </dsp:spPr>
-      <dsp:style>
-        <a:lnRef idx="2">
-          <a:scrgbClr r="0" g="0" b="0"/>
-        </a:lnRef>
-        <a:fillRef idx="0">
-          <a:scrgbClr r="0" g="0" b="0"/>
-        </a:fillRef>
-        <a:effectRef idx="0">
-          <a:scrgbClr r="0" g="0" b="0"/>
-        </a:effectRef>
-        <a:fontRef idx="minor"/>
-      </dsp:style>
-    </dsp:sp>
     <dsp:sp modelId="{F97D9EDF-E13F-4D0F-8781-B5A71300B23F}">
       <dsp:nvSpPr>
         <dsp:cNvPr id="0" name=""/>
@@ -4238,7 +3912,7 @@
       </dsp:nvSpPr>
       <dsp:spPr>
         <a:xfrm>
-          <a:off x="4933952" y="2955193"/>
+          <a:off x="4760406" y="2955193"/>
           <a:ext cx="615084" cy="292724"/>
         </a:xfrm>
         <a:custGeom>
@@ -4300,7 +3974,7 @@
       </dsp:nvSpPr>
       <dsp:spPr>
         <a:xfrm>
-          <a:off x="4273148" y="3887045"/>
+          <a:off x="4099602" y="3887045"/>
           <a:ext cx="91440" cy="292724"/>
         </a:xfrm>
         <a:custGeom>
@@ -4356,7 +4030,7 @@
       </dsp:nvSpPr>
       <dsp:spPr>
         <a:xfrm>
-          <a:off x="4318868" y="2955193"/>
+          <a:off x="4145322" y="2955193"/>
           <a:ext cx="615084" cy="292724"/>
         </a:xfrm>
         <a:custGeom>
@@ -4418,7 +4092,7 @@
       </dsp:nvSpPr>
       <dsp:spPr>
         <a:xfrm>
-          <a:off x="3088699" y="2023340"/>
+          <a:off x="2915153" y="2023340"/>
           <a:ext cx="1845252" cy="292724"/>
         </a:xfrm>
         <a:custGeom>
@@ -4480,7 +4154,7 @@
       </dsp:nvSpPr>
       <dsp:spPr>
         <a:xfrm>
-          <a:off x="2473615" y="2955193"/>
+          <a:off x="2300069" y="2955193"/>
           <a:ext cx="615084" cy="292724"/>
         </a:xfrm>
         <a:custGeom>
@@ -4542,7 +4216,7 @@
       </dsp:nvSpPr>
       <dsp:spPr>
         <a:xfrm>
-          <a:off x="1858531" y="2955193"/>
+          <a:off x="1684985" y="2955193"/>
           <a:ext cx="615084" cy="292724"/>
         </a:xfrm>
         <a:custGeom>
@@ -4604,7 +4278,7 @@
       </dsp:nvSpPr>
       <dsp:spPr>
         <a:xfrm>
-          <a:off x="2473615" y="2023340"/>
+          <a:off x="2300069" y="2023340"/>
           <a:ext cx="615084" cy="292724"/>
         </a:xfrm>
         <a:custGeom>
@@ -4666,7 +4340,7 @@
       </dsp:nvSpPr>
       <dsp:spPr>
         <a:xfrm>
-          <a:off x="1243447" y="2023340"/>
+          <a:off x="1069901" y="2023340"/>
           <a:ext cx="1845252" cy="292724"/>
         </a:xfrm>
         <a:custGeom>
@@ -4728,8 +4402,8 @@
       </dsp:nvSpPr>
       <dsp:spPr>
         <a:xfrm>
-          <a:off x="3088699" y="1091487"/>
-          <a:ext cx="2152794" cy="292724"/>
+          <a:off x="2915153" y="1091487"/>
+          <a:ext cx="2239567" cy="292724"/>
         </a:xfrm>
         <a:custGeom>
           <a:avLst/>
@@ -4740,10 +4414,10 @@
           <a:pathLst>
             <a:path>
               <a:moveTo>
-                <a:pt x="2152794" y="0"/>
+                <a:pt x="2239567" y="0"/>
               </a:moveTo>
               <a:lnTo>
-                <a:pt x="2152794" y="199483"/>
+                <a:pt x="2239567" y="199483"/>
               </a:lnTo>
               <a:lnTo>
                 <a:pt x="0" y="199483"/>
@@ -4790,7 +4464,7 @@
       </dsp:nvSpPr>
       <dsp:spPr>
         <a:xfrm>
-          <a:off x="4430627" y="1102"/>
+          <a:off x="4343854" y="1102"/>
           <a:ext cx="1621735" cy="1090385"/>
         </a:xfrm>
         <a:prstGeom prst="roundRect">
@@ -4842,7 +4516,7 @@
       </dsp:nvSpPr>
       <dsp:spPr>
         <a:xfrm>
-          <a:off x="4542460" y="107344"/>
+          <a:off x="4455687" y="107344"/>
           <a:ext cx="1621735" cy="1090385"/>
         </a:xfrm>
         <a:prstGeom prst="roundRect">
@@ -4891,7 +4565,7 @@
         </a:bodyPr>
         <a:lstStyle/>
         <a:p>
-          <a:pPr lvl="0" algn="ctr" defTabSz="533400">
+          <a:pPr marL="0" lvl="0" indent="0" algn="ctr" defTabSz="533400">
             <a:lnSpc>
               <a:spcPct val="90000"/>
             </a:lnSpc>
@@ -4901,32 +4575,33 @@
             <a:spcAft>
               <a:spcPct val="35000"/>
             </a:spcAft>
+            <a:buNone/>
           </a:pPr>
           <a:r>
-            <a:rPr lang="en-CA" sz="1200" b="1" kern="1200" dirty="0" err="1" smtClean="0"/>
+            <a:rPr lang="en-CA" sz="1200" b="1" kern="1200" dirty="0" err="1"/>
             <a:t>repositoryid-eprintid-lastmoddate</a:t>
           </a:r>
           <a:r>
-            <a:rPr lang="en-CA" sz="1200" b="1" kern="1200" dirty="0" smtClean="0"/>
+            <a:rPr lang="en-CA" sz="1200" b="1" kern="1200" dirty="0"/>
             <a:t> folder </a:t>
           </a:r>
           <a:r>
-            <a:rPr lang="en-CA" sz="1200" kern="1200" dirty="0" smtClean="0"/>
+            <a:rPr lang="en-CA" sz="1200" kern="1200" dirty="0"/>
             <a:t>(for example </a:t>
           </a:r>
           <a:r>
-            <a:rPr lang="en-CA" sz="1200" kern="1200" baseline="0" dirty="0" smtClean="0"/>
+            <a:rPr lang="en-CA" sz="1200" kern="1200" baseline="0" dirty="0"/>
             <a:t>library-981471-2016-11-05_05-20-53</a:t>
           </a:r>
           <a:r>
-            <a:rPr lang="en-CA" sz="1200" kern="1200" dirty="0" smtClean="0"/>
+            <a:rPr lang="en-CA" sz="1200" kern="1200" dirty="0"/>
             <a:t>)</a:t>
           </a:r>
           <a:endParaRPr lang="en-US" sz="1200" kern="1200" dirty="0"/>
         </a:p>
       </dsp:txBody>
       <dsp:txXfrm>
-        <a:off x="4574396" y="139280"/>
+        <a:off x="4487623" y="139280"/>
         <a:ext cx="1557863" cy="1026513"/>
       </dsp:txXfrm>
     </dsp:sp>
@@ -4937,7 +4612,7 @@
       </dsp:nvSpPr>
       <dsp:spPr>
         <a:xfrm>
-          <a:off x="2585449" y="1384212"/>
+          <a:off x="2411903" y="1384212"/>
           <a:ext cx="1006501" cy="639128"/>
         </a:xfrm>
         <a:prstGeom prst="roundRect">
@@ -4989,7 +4664,7 @@
       </dsp:nvSpPr>
       <dsp:spPr>
         <a:xfrm>
-          <a:off x="2697282" y="1490453"/>
+          <a:off x="2523736" y="1490453"/>
           <a:ext cx="1006501" cy="639128"/>
         </a:xfrm>
         <a:prstGeom prst="roundRect">
@@ -5038,7 +4713,7 @@
         </a:bodyPr>
         <a:lstStyle/>
         <a:p>
-          <a:pPr lvl="0" algn="ctr" defTabSz="622300">
+          <a:pPr marL="0" lvl="0" indent="0" algn="ctr" defTabSz="622300">
             <a:lnSpc>
               <a:spcPct val="90000"/>
             </a:lnSpc>
@@ -5048,16 +4723,16 @@
             <a:spcAft>
               <a:spcPct val="35000"/>
             </a:spcAft>
+            <a:buNone/>
           </a:pPr>
           <a:r>
-            <a:rPr lang="en-US" sz="1400" kern="1200" baseline="0" dirty="0" smtClean="0"/>
+            <a:rPr lang="en-US" sz="1400" kern="1200" baseline="0" dirty="0"/>
             <a:t>objects</a:t>
           </a:r>
-          <a:endParaRPr lang="en-US" sz="1400" kern="1200" baseline="0" dirty="0"/>
         </a:p>
       </dsp:txBody>
       <dsp:txXfrm>
-        <a:off x="2716001" y="1509172"/>
+        <a:off x="2542455" y="1509172"/>
         <a:ext cx="969063" cy="601690"/>
       </dsp:txXfrm>
     </dsp:sp>
@@ -5068,7 +4743,7 @@
       </dsp:nvSpPr>
       <dsp:spPr>
         <a:xfrm>
-          <a:off x="740196" y="2316064"/>
+          <a:off x="566650" y="2316064"/>
           <a:ext cx="1006501" cy="639128"/>
         </a:xfrm>
         <a:prstGeom prst="roundRect">
@@ -5120,7 +4795,7 @@
       </dsp:nvSpPr>
       <dsp:spPr>
         <a:xfrm>
-          <a:off x="852029" y="2422306"/>
+          <a:off x="678483" y="2422306"/>
           <a:ext cx="1006501" cy="639128"/>
         </a:xfrm>
         <a:prstGeom prst="roundRect">
@@ -5169,7 +4844,7 @@
         </a:bodyPr>
         <a:lstStyle/>
         <a:p>
-          <a:pPr lvl="0" algn="ctr" defTabSz="622300">
+          <a:pPr marL="0" lvl="0" indent="0" algn="ctr" defTabSz="622300">
             <a:lnSpc>
               <a:spcPct val="90000"/>
             </a:lnSpc>
@@ -5179,16 +4854,16 @@
             <a:spcAft>
               <a:spcPct val="35000"/>
             </a:spcAft>
+            <a:buNone/>
           </a:pPr>
           <a:r>
-            <a:rPr lang="en-US" sz="1400" kern="1200" baseline="0" dirty="0" smtClean="0"/>
-            <a:t>Documents</a:t>
+            <a:rPr lang="en-US" sz="1400" kern="1200" baseline="0" dirty="0"/>
+            <a:t>documents</a:t>
           </a:r>
-          <a:endParaRPr lang="en-US" sz="1400" kern="1200" baseline="0" dirty="0"/>
         </a:p>
       </dsp:txBody>
       <dsp:txXfrm>
-        <a:off x="870748" y="2441025"/>
+        <a:off x="697202" y="2441025"/>
         <a:ext cx="969063" cy="601690"/>
       </dsp:txXfrm>
     </dsp:sp>
@@ -5199,7 +4874,7 @@
       </dsp:nvSpPr>
       <dsp:spPr>
         <a:xfrm>
-          <a:off x="1970364" y="2316064"/>
+          <a:off x="1796818" y="2316064"/>
           <a:ext cx="1006501" cy="639128"/>
         </a:xfrm>
         <a:prstGeom prst="roundRect">
@@ -5251,7 +4926,7 @@
       </dsp:nvSpPr>
       <dsp:spPr>
         <a:xfrm>
-          <a:off x="2082198" y="2422306"/>
+          <a:off x="1908652" y="2422306"/>
           <a:ext cx="1006501" cy="639128"/>
         </a:xfrm>
         <a:prstGeom prst="roundRect">
@@ -5300,7 +4975,7 @@
         </a:bodyPr>
         <a:lstStyle/>
         <a:p>
-          <a:pPr lvl="0" algn="ctr" defTabSz="622300">
+          <a:pPr marL="0" lvl="0" indent="0" algn="ctr" defTabSz="622300">
             <a:lnSpc>
               <a:spcPct val="90000"/>
             </a:lnSpc>
@@ -5310,16 +4985,16 @@
             <a:spcAft>
               <a:spcPct val="35000"/>
             </a:spcAft>
+            <a:buNone/>
           </a:pPr>
           <a:r>
-            <a:rPr lang="en-US" sz="1400" kern="1200" baseline="0" dirty="0" smtClean="0"/>
+            <a:rPr lang="en-US" sz="1400" kern="1200" baseline="0" dirty="0"/>
             <a:t>revisions</a:t>
           </a:r>
-          <a:endParaRPr lang="en-US" sz="1400" kern="1200" baseline="0" dirty="0"/>
         </a:p>
       </dsp:txBody>
       <dsp:txXfrm>
-        <a:off x="2100917" y="2441025"/>
+        <a:off x="1927371" y="2441025"/>
         <a:ext cx="969063" cy="601690"/>
       </dsp:txXfrm>
     </dsp:sp>
@@ -5330,7 +5005,7 @@
       </dsp:nvSpPr>
       <dsp:spPr>
         <a:xfrm>
-          <a:off x="1355280" y="3247917"/>
+          <a:off x="1181734" y="3247917"/>
           <a:ext cx="1006501" cy="639128"/>
         </a:xfrm>
         <a:prstGeom prst="roundRect">
@@ -5382,7 +5057,7 @@
       </dsp:nvSpPr>
       <dsp:spPr>
         <a:xfrm>
-          <a:off x="1467114" y="3354159"/>
+          <a:off x="1293568" y="3354159"/>
           <a:ext cx="1006501" cy="639128"/>
         </a:xfrm>
         <a:prstGeom prst="roundRect">
@@ -5431,7 +5106,7 @@
         </a:bodyPr>
         <a:lstStyle/>
         <a:p>
-          <a:pPr lvl="0" algn="ctr" defTabSz="577850">
+          <a:pPr marL="0" lvl="0" indent="0" algn="ctr" defTabSz="577850">
             <a:lnSpc>
               <a:spcPct val="90000"/>
             </a:lnSpc>
@@ -5441,16 +5116,16 @@
             <a:spcAft>
               <a:spcPct val="35000"/>
             </a:spcAft>
+            <a:buNone/>
           </a:pPr>
           <a:r>
-            <a:rPr lang="en-US" sz="1300" kern="1200" baseline="0" dirty="0" smtClean="0"/>
+            <a:rPr lang="en-US" sz="1300" kern="1200" baseline="0" dirty="0"/>
             <a:t>1.xml</a:t>
           </a:r>
-          <a:endParaRPr lang="en-US" sz="1300" kern="1200" baseline="0" dirty="0"/>
         </a:p>
       </dsp:txBody>
       <dsp:txXfrm>
-        <a:off x="1485833" y="3372878"/>
+        <a:off x="1312287" y="3372878"/>
         <a:ext cx="969063" cy="601690"/>
       </dsp:txXfrm>
     </dsp:sp>
@@ -5461,7 +5136,7 @@
       </dsp:nvSpPr>
       <dsp:spPr>
         <a:xfrm>
-          <a:off x="2585449" y="3247917"/>
+          <a:off x="2411903" y="3247917"/>
           <a:ext cx="1006501" cy="639128"/>
         </a:xfrm>
         <a:prstGeom prst="roundRect">
@@ -5513,7 +5188,7 @@
       </dsp:nvSpPr>
       <dsp:spPr>
         <a:xfrm>
-          <a:off x="2697282" y="3354159"/>
+          <a:off x="2523736" y="3354159"/>
           <a:ext cx="1006501" cy="639128"/>
         </a:xfrm>
         <a:prstGeom prst="roundRect">
@@ -5562,7 +5237,7 @@
         </a:bodyPr>
         <a:lstStyle/>
         <a:p>
-          <a:pPr lvl="0" algn="ctr" defTabSz="577850">
+          <a:pPr marL="0" lvl="0" indent="0" algn="ctr" defTabSz="577850">
             <a:lnSpc>
               <a:spcPct val="90000"/>
             </a:lnSpc>
@@ -5572,16 +5247,16 @@
             <a:spcAft>
               <a:spcPct val="35000"/>
             </a:spcAft>
+            <a:buNone/>
           </a:pPr>
           <a:r>
-            <a:rPr lang="en-US" sz="1300" kern="1200" baseline="0" dirty="0" smtClean="0"/>
+            <a:rPr lang="en-US" sz="1300" kern="1200" baseline="0" dirty="0"/>
             <a:t>2.xml</a:t>
           </a:r>
-          <a:endParaRPr lang="en-US" sz="1300" kern="1200" baseline="0" dirty="0"/>
         </a:p>
       </dsp:txBody>
       <dsp:txXfrm>
-        <a:off x="2716001" y="3372878"/>
+        <a:off x="2542455" y="3372878"/>
         <a:ext cx="969063" cy="601690"/>
       </dsp:txXfrm>
     </dsp:sp>
@@ -5592,7 +5267,7 @@
       </dsp:nvSpPr>
       <dsp:spPr>
         <a:xfrm>
-          <a:off x="4430701" y="2316064"/>
+          <a:off x="4257155" y="2316064"/>
           <a:ext cx="1006501" cy="639128"/>
         </a:xfrm>
         <a:prstGeom prst="roundRect">
@@ -5644,7 +5319,7 @@
       </dsp:nvSpPr>
       <dsp:spPr>
         <a:xfrm>
-          <a:off x="4542535" y="2422306"/>
+          <a:off x="4368989" y="2422306"/>
           <a:ext cx="1006501" cy="639128"/>
         </a:xfrm>
         <a:prstGeom prst="roundRect">
@@ -5693,7 +5368,7 @@
         </a:bodyPr>
         <a:lstStyle/>
         <a:p>
-          <a:pPr lvl="0" algn="ctr" defTabSz="577850">
+          <a:pPr marL="0" lvl="0" indent="0" algn="ctr" defTabSz="577850">
             <a:lnSpc>
               <a:spcPct val="90000"/>
             </a:lnSpc>
@@ -5703,16 +5378,17 @@
             <a:spcAft>
               <a:spcPct val="35000"/>
             </a:spcAft>
+            <a:buNone/>
           </a:pPr>
           <a:r>
-            <a:rPr lang="en-US" sz="1300" kern="1200" smtClean="0"/>
+            <a:rPr lang="en-US" sz="1300" kern="1200"/>
             <a:t>derivatives</a:t>
           </a:r>
           <a:endParaRPr lang="en-US" sz="1300" kern="1200" baseline="0" dirty="0"/>
         </a:p>
       </dsp:txBody>
       <dsp:txXfrm>
-        <a:off x="4561254" y="2441025"/>
+        <a:off x="4387708" y="2441025"/>
         <a:ext cx="969063" cy="601690"/>
       </dsp:txXfrm>
     </dsp:sp>
@@ -5723,7 +5399,7 @@
       </dsp:nvSpPr>
       <dsp:spPr>
         <a:xfrm>
-          <a:off x="3815617" y="3247917"/>
+          <a:off x="3642071" y="3247917"/>
           <a:ext cx="1006501" cy="639128"/>
         </a:xfrm>
         <a:prstGeom prst="roundRect">
@@ -5775,7 +5451,7 @@
       </dsp:nvSpPr>
       <dsp:spPr>
         <a:xfrm>
-          <a:off x="3927451" y="3354159"/>
+          <a:off x="3753905" y="3354159"/>
           <a:ext cx="1006501" cy="639128"/>
         </a:xfrm>
         <a:prstGeom prst="roundRect">
@@ -5824,7 +5500,7 @@
         </a:bodyPr>
         <a:lstStyle/>
         <a:p>
-          <a:pPr lvl="0" algn="ctr" defTabSz="577850">
+          <a:pPr marL="0" lvl="0" indent="0" algn="ctr" defTabSz="577850">
             <a:lnSpc>
               <a:spcPct val="90000"/>
             </a:lnSpc>
@@ -5834,24 +5510,24 @@
             <a:spcAft>
               <a:spcPct val="35000"/>
             </a:spcAft>
+            <a:buNone/>
           </a:pPr>
           <a:r>
-            <a:rPr lang="en-US" sz="1300" kern="1200" baseline="0" dirty="0" smtClean="0"/>
+            <a:rPr lang="en-US" sz="1300" kern="1200" baseline="0" dirty="0"/>
             <a:t>Folder # on disk (&lt;</a:t>
           </a:r>
           <a:r>
-            <a:rPr lang="en-US" sz="1300" kern="1200" baseline="0" dirty="0" err="1" smtClean="0"/>
+            <a:rPr lang="en-US" sz="1300" kern="1200" baseline="0" dirty="0" err="1"/>
             <a:t>pos</a:t>
           </a:r>
           <a:r>
-            <a:rPr lang="en-US" sz="1300" kern="1200" baseline="0" dirty="0" smtClean="0"/>
+            <a:rPr lang="en-US" sz="1300" kern="1200" baseline="0" dirty="0"/>
             <a:t>&gt;)</a:t>
           </a:r>
-          <a:endParaRPr lang="en-US" sz="1300" kern="1200" baseline="0" dirty="0"/>
         </a:p>
       </dsp:txBody>
       <dsp:txXfrm>
-        <a:off x="3946170" y="3372878"/>
+        <a:off x="3772624" y="3372878"/>
         <a:ext cx="969063" cy="601690"/>
       </dsp:txXfrm>
     </dsp:sp>
@@ -5862,7 +5538,7 @@
       </dsp:nvSpPr>
       <dsp:spPr>
         <a:xfrm>
-          <a:off x="3815617" y="4179769"/>
+          <a:off x="3642071" y="4179769"/>
           <a:ext cx="1006501" cy="639128"/>
         </a:xfrm>
         <a:prstGeom prst="roundRect">
@@ -5914,7 +5590,7 @@
       </dsp:nvSpPr>
       <dsp:spPr>
         <a:xfrm>
-          <a:off x="3927451" y="4286011"/>
+          <a:off x="3753905" y="4286011"/>
           <a:ext cx="1006501" cy="639128"/>
         </a:xfrm>
         <a:prstGeom prst="roundRect">
@@ -5963,7 +5639,7 @@
         </a:bodyPr>
         <a:lstStyle/>
         <a:p>
-          <a:pPr lvl="0" algn="ctr" defTabSz="577850">
+          <a:pPr marL="0" lvl="0" indent="0" algn="ctr" defTabSz="577850">
             <a:lnSpc>
               <a:spcPct val="90000"/>
             </a:lnSpc>
@@ -5973,16 +5649,16 @@
             <a:spcAft>
               <a:spcPct val="35000"/>
             </a:spcAft>
+            <a:buNone/>
           </a:pPr>
           <a:r>
-            <a:rPr lang="en-US" sz="1300" kern="1200" baseline="0" dirty="0" smtClean="0"/>
+            <a:rPr lang="en-US" sz="1300" kern="1200" baseline="0" dirty="0"/>
             <a:t>filename</a:t>
           </a:r>
-          <a:endParaRPr lang="en-US" sz="1300" kern="1200" baseline="0" dirty="0"/>
         </a:p>
       </dsp:txBody>
       <dsp:txXfrm>
-        <a:off x="3946170" y="4304730"/>
+        <a:off x="3772624" y="4304730"/>
         <a:ext cx="969063" cy="601690"/>
       </dsp:txXfrm>
     </dsp:sp>
@@ -5993,7 +5669,7 @@
       </dsp:nvSpPr>
       <dsp:spPr>
         <a:xfrm>
-          <a:off x="5045786" y="3247917"/>
+          <a:off x="4872240" y="3247917"/>
           <a:ext cx="1006501" cy="639128"/>
         </a:xfrm>
         <a:prstGeom prst="roundRect">
@@ -6045,7 +5721,7 @@
       </dsp:nvSpPr>
       <dsp:spPr>
         <a:xfrm>
-          <a:off x="5157619" y="3354159"/>
+          <a:off x="4984073" y="3354159"/>
           <a:ext cx="1006501" cy="639128"/>
         </a:xfrm>
         <a:prstGeom prst="roundRect">
@@ -6094,7 +5770,7 @@
         </a:bodyPr>
         <a:lstStyle/>
         <a:p>
-          <a:pPr lvl="0" algn="ctr" defTabSz="577850">
+          <a:pPr marL="0" lvl="0" indent="0" algn="ctr" defTabSz="577850">
             <a:lnSpc>
               <a:spcPct val="90000"/>
             </a:lnSpc>
@@ -6104,24 +5780,24 @@
             <a:spcAft>
               <a:spcPct val="35000"/>
             </a:spcAft>
+            <a:buNone/>
           </a:pPr>
           <a:r>
-            <a:rPr lang="en-US" sz="1300" kern="1200" baseline="0" dirty="0" smtClean="0"/>
+            <a:rPr lang="en-US" sz="1300" kern="1200" baseline="0" dirty="0"/>
             <a:t>Folder # on disk (&lt;</a:t>
           </a:r>
           <a:r>
-            <a:rPr lang="en-US" sz="1300" kern="1200" baseline="0" dirty="0" err="1" smtClean="0"/>
+            <a:rPr lang="en-US" sz="1300" kern="1200" baseline="0" dirty="0" err="1"/>
             <a:t>pos</a:t>
           </a:r>
           <a:r>
-            <a:rPr lang="en-US" sz="1300" kern="1200" baseline="0" dirty="0" smtClean="0"/>
+            <a:rPr lang="en-US" sz="1300" kern="1200" baseline="0" dirty="0"/>
             <a:t>&gt;)</a:t>
           </a:r>
-          <a:endParaRPr lang="en-US" sz="1300" kern="1200" baseline="0" dirty="0"/>
         </a:p>
       </dsp:txBody>
       <dsp:txXfrm>
-        <a:off x="5176338" y="3372878"/>
+        <a:off x="5002792" y="3372878"/>
         <a:ext cx="969063" cy="601690"/>
       </dsp:txXfrm>
     </dsp:sp>
@@ -6132,7 +5808,7 @@
       </dsp:nvSpPr>
       <dsp:spPr>
         <a:xfrm>
-          <a:off x="5045786" y="4179769"/>
+          <a:off x="4872240" y="4179769"/>
           <a:ext cx="1006501" cy="639128"/>
         </a:xfrm>
         <a:prstGeom prst="roundRect">
@@ -6184,7 +5860,7 @@
       </dsp:nvSpPr>
       <dsp:spPr>
         <a:xfrm>
-          <a:off x="5157619" y="4286011"/>
+          <a:off x="4984073" y="4286011"/>
           <a:ext cx="1006501" cy="639128"/>
         </a:xfrm>
         <a:prstGeom prst="roundRect">
@@ -6233,7 +5909,7 @@
         </a:bodyPr>
         <a:lstStyle/>
         <a:p>
-          <a:pPr lvl="0" algn="ctr" defTabSz="577850">
+          <a:pPr marL="0" lvl="0" indent="0" algn="ctr" defTabSz="577850">
             <a:lnSpc>
               <a:spcPct val="90000"/>
             </a:lnSpc>
@@ -6243,16 +5919,16 @@
             <a:spcAft>
               <a:spcPct val="35000"/>
             </a:spcAft>
+            <a:buNone/>
           </a:pPr>
           <a:r>
-            <a:rPr lang="en-US" sz="1300" kern="1200" baseline="0" dirty="0" smtClean="0"/>
+            <a:rPr lang="en-US" sz="1300" kern="1200" baseline="0" dirty="0"/>
             <a:t>filename</a:t>
           </a:r>
-          <a:endParaRPr lang="en-US" sz="1300" kern="1200" baseline="0" dirty="0"/>
         </a:p>
       </dsp:txBody>
       <dsp:txXfrm>
-        <a:off x="5176338" y="4304730"/>
+        <a:off x="5002792" y="4304730"/>
         <a:ext cx="969063" cy="601690"/>
       </dsp:txXfrm>
     </dsp:sp>
@@ -6364,7 +6040,7 @@
         </a:bodyPr>
         <a:lstStyle/>
         <a:p>
-          <a:pPr lvl="0" algn="ctr" defTabSz="622300">
+          <a:pPr marL="0" lvl="0" indent="0" algn="ctr" defTabSz="622300">
             <a:lnSpc>
               <a:spcPct val="90000"/>
             </a:lnSpc>
@@ -6374,12 +6050,12 @@
             <a:spcAft>
               <a:spcPct val="35000"/>
             </a:spcAft>
+            <a:buNone/>
           </a:pPr>
           <a:r>
-            <a:rPr lang="en-US" sz="1400" kern="1200" baseline="0" dirty="0" smtClean="0"/>
+            <a:rPr lang="en-US" sz="1400" kern="1200" baseline="0" dirty="0"/>
             <a:t>metadata</a:t>
           </a:r>
-          <a:endParaRPr lang="en-US" sz="1400" kern="1200" baseline="0" dirty="0"/>
         </a:p>
       </dsp:txBody>
       <dsp:txXfrm>
@@ -6394,7 +6070,7 @@
       </dsp:nvSpPr>
       <dsp:spPr>
         <a:xfrm>
-          <a:off x="5660870" y="2316064"/>
+          <a:off x="5487324" y="2316064"/>
           <a:ext cx="1006501" cy="639128"/>
         </a:xfrm>
         <a:prstGeom prst="roundRect">
@@ -6446,7 +6122,7 @@
       </dsp:nvSpPr>
       <dsp:spPr>
         <a:xfrm>
-          <a:off x="5772704" y="2422306"/>
+          <a:off x="5599157" y="2422306"/>
           <a:ext cx="1006501" cy="639128"/>
         </a:xfrm>
         <a:prstGeom prst="roundRect">
@@ -6495,7 +6171,7 @@
         </a:bodyPr>
         <a:lstStyle/>
         <a:p>
-          <a:pPr lvl="0" algn="ctr" defTabSz="622300">
+          <a:pPr marL="0" lvl="0" indent="0" algn="ctr" defTabSz="622300">
             <a:lnSpc>
               <a:spcPct val="90000"/>
             </a:lnSpc>
@@ -6505,16 +6181,16 @@
             <a:spcAft>
               <a:spcPct val="35000"/>
             </a:spcAft>
+            <a:buNone/>
           </a:pPr>
           <a:r>
-            <a:rPr lang="en-US" sz="1400" kern="1200" baseline="0" dirty="0" smtClean="0"/>
+            <a:rPr lang="en-US" sz="1400" kern="1200" baseline="0" dirty="0"/>
             <a:t>checksum.md5</a:t>
           </a:r>
-          <a:endParaRPr lang="en-US" sz="1400" kern="1200" baseline="0" dirty="0"/>
         </a:p>
       </dsp:txBody>
       <dsp:txXfrm>
-        <a:off x="5791423" y="2441025"/>
+        <a:off x="5617876" y="2441025"/>
         <a:ext cx="969063" cy="601690"/>
       </dsp:txXfrm>
     </dsp:sp>
@@ -6525,7 +6201,7 @@
       </dsp:nvSpPr>
       <dsp:spPr>
         <a:xfrm>
-          <a:off x="6891039" y="2316064"/>
+          <a:off x="6717492" y="2316064"/>
           <a:ext cx="1006501" cy="639128"/>
         </a:xfrm>
         <a:prstGeom prst="roundRect">
@@ -6577,7 +6253,7 @@
       </dsp:nvSpPr>
       <dsp:spPr>
         <a:xfrm>
-          <a:off x="7002872" y="2422306"/>
+          <a:off x="6829326" y="2422306"/>
           <a:ext cx="1006501" cy="639128"/>
         </a:xfrm>
         <a:prstGeom prst="roundRect">
@@ -6626,7 +6302,7 @@
         </a:bodyPr>
         <a:lstStyle/>
         <a:p>
-          <a:pPr lvl="0" algn="ctr" defTabSz="622300">
+          <a:pPr marL="0" lvl="0" indent="0" algn="ctr" defTabSz="622300">
             <a:lnSpc>
               <a:spcPct val="90000"/>
             </a:lnSpc>
@@ -6636,16 +6312,16 @@
             <a:spcAft>
               <a:spcPct val="35000"/>
             </a:spcAft>
+            <a:buNone/>
           </a:pPr>
           <a:r>
-            <a:rPr lang="en-US" sz="1400" kern="1200" baseline="0" dirty="0" smtClean="0"/>
+            <a:rPr lang="en-US" sz="1400" kern="1200" baseline="0" dirty="0"/>
             <a:t>EP3.xml</a:t>
           </a:r>
-          <a:endParaRPr lang="en-US" sz="1400" kern="1200" baseline="0" dirty="0"/>
         </a:p>
       </dsp:txBody>
       <dsp:txXfrm>
-        <a:off x="7021591" y="2441025"/>
+        <a:off x="6848045" y="2441025"/>
         <a:ext cx="969063" cy="601690"/>
       </dsp:txXfrm>
     </dsp:sp>
@@ -6656,8 +6332,8 @@
       </dsp:nvSpPr>
       <dsp:spPr>
         <a:xfrm>
-          <a:off x="8121207" y="2316064"/>
-          <a:ext cx="1006501" cy="639128"/>
+          <a:off x="7947661" y="2316064"/>
+          <a:ext cx="1353593" cy="639128"/>
         </a:xfrm>
         <a:prstGeom prst="roundRect">
           <a:avLst>
@@ -6708,8 +6384,8 @@
       </dsp:nvSpPr>
       <dsp:spPr>
         <a:xfrm>
-          <a:off x="8233041" y="2422306"/>
-          <a:ext cx="1006501" cy="639128"/>
+          <a:off x="8059495" y="2422306"/>
+          <a:ext cx="1353593" cy="639128"/>
         </a:xfrm>
         <a:prstGeom prst="roundRect">
           <a:avLst>
@@ -6757,7 +6433,7 @@
         </a:bodyPr>
         <a:lstStyle/>
         <a:p>
-          <a:pPr lvl="0" algn="ctr" defTabSz="622300">
+          <a:pPr marL="0" lvl="0" indent="0" algn="ctr" defTabSz="622300">
             <a:lnSpc>
               <a:spcPct val="90000"/>
             </a:lnSpc>
@@ -6767,17 +6443,24 @@
             <a:spcAft>
               <a:spcPct val="35000"/>
             </a:spcAft>
+            <a:buNone/>
           </a:pPr>
           <a:r>
-            <a:rPr lang="en-US" sz="1400" kern="1200" baseline="0" dirty="0" smtClean="0"/>
-            <a:t>DublinCore.txt</a:t>
+            <a:rPr lang="en-US" sz="1400" kern="1200" baseline="0" dirty="0" err="1"/>
+            <a:t>metadata.json</a:t>
           </a:r>
-          <a:endParaRPr lang="en-US" sz="1400" kern="1200" baseline="0" dirty="0"/>
+          <a:br>
+            <a:rPr lang="en-US" sz="1400" kern="1200" baseline="0" dirty="0"/>
+          </a:br>
+          <a:r>
+            <a:rPr lang="en-US" sz="1400" kern="1200" baseline="0" dirty="0"/>
+            <a:t>(Dublin Core)</a:t>
+          </a:r>
         </a:p>
       </dsp:txBody>
       <dsp:txXfrm>
-        <a:off x="8251760" y="2441025"/>
-        <a:ext cx="969063" cy="601690"/>
+        <a:off x="8078214" y="2441025"/>
+        <a:ext cx="1316155" cy="601690"/>
       </dsp:txXfrm>
     </dsp:sp>
   </dsp:spTree>
@@ -6839,7 +6522,7 @@
         </a:bodyPr>
         <a:lstStyle/>
         <a:p>
-          <a:pPr lvl="0" algn="ctr" defTabSz="977900">
+          <a:pPr marL="0" lvl="0" indent="0" algn="ctr" defTabSz="977900">
             <a:lnSpc>
               <a:spcPct val="90000"/>
             </a:lnSpc>
@@ -6849,20 +6532,20 @@
             <a:spcAft>
               <a:spcPct val="35000"/>
             </a:spcAft>
+            <a:buNone/>
           </a:pPr>
           <a:r>
-            <a:rPr lang="en-US" sz="2200" kern="1200" dirty="0" smtClean="0"/>
+            <a:rPr lang="en-US" sz="2200" kern="1200" dirty="0"/>
             <a:t>Folder# (&lt;</a:t>
           </a:r>
           <a:r>
-            <a:rPr lang="en-US" sz="2200" kern="1200" dirty="0" err="1" smtClean="0"/>
+            <a:rPr lang="en-US" sz="2200" kern="1200" dirty="0" err="1"/>
             <a:t>pos</a:t>
           </a:r>
           <a:r>
-            <a:rPr lang="en-US" sz="2200" kern="1200" dirty="0" smtClean="0"/>
+            <a:rPr lang="en-US" sz="2200" kern="1200" dirty="0"/>
             <a:t>&gt;)</a:t>
           </a:r>
-          <a:endParaRPr lang="en-US" sz="2200" kern="1200" dirty="0"/>
         </a:p>
       </dsp:txBody>
       <dsp:txXfrm>
@@ -6917,7 +6600,7 @@
         </a:bodyPr>
         <a:lstStyle/>
         <a:p>
-          <a:pPr lvl="0" algn="ctr" defTabSz="977900">
+          <a:pPr marL="0" lvl="0" indent="0" algn="ctr" defTabSz="977900">
             <a:lnSpc>
               <a:spcPct val="90000"/>
             </a:lnSpc>
@@ -6927,9 +6610,10 @@
             <a:spcAft>
               <a:spcPct val="35000"/>
             </a:spcAft>
+            <a:buNone/>
           </a:pPr>
           <a:r>
-            <a:rPr lang="en-US" sz="2200" kern="1200" dirty="0" err="1" smtClean="0"/>
+            <a:rPr lang="en-US" sz="2200" kern="1200" dirty="0" err="1"/>
             <a:t>fileid-xxxxx</a:t>
           </a:r>
           <a:endParaRPr lang="en-US" sz="2200" kern="1200" dirty="0"/>
@@ -6987,7 +6671,7 @@
         </a:bodyPr>
         <a:lstStyle/>
         <a:p>
-          <a:pPr lvl="0" algn="ctr" defTabSz="977900">
+          <a:pPr marL="0" lvl="0" indent="0" algn="ctr" defTabSz="977900">
             <a:lnSpc>
               <a:spcPct val="90000"/>
             </a:lnSpc>
@@ -6997,12 +6681,12 @@
             <a:spcAft>
               <a:spcPct val="35000"/>
             </a:spcAft>
+            <a:buNone/>
           </a:pPr>
           <a:r>
-            <a:rPr lang="en-US" sz="2200" kern="1200" dirty="0" smtClean="0"/>
+            <a:rPr lang="en-US" sz="2200" kern="1200" dirty="0"/>
             <a:t>files</a:t>
           </a:r>
-          <a:endParaRPr lang="en-US" sz="2200" kern="1200" dirty="0"/>
         </a:p>
       </dsp:txBody>
       <dsp:txXfrm>
@@ -7057,7 +6741,7 @@
         </a:bodyPr>
         <a:lstStyle/>
         <a:p>
-          <a:pPr lvl="0" algn="ctr" defTabSz="977900">
+          <a:pPr marL="0" lvl="0" indent="0" algn="ctr" defTabSz="977900">
             <a:lnSpc>
               <a:spcPct val="90000"/>
             </a:lnSpc>
@@ -7067,9 +6751,10 @@
             <a:spcAft>
               <a:spcPct val="35000"/>
             </a:spcAft>
+            <a:buNone/>
           </a:pPr>
           <a:r>
-            <a:rPr lang="en-US" sz="2200" kern="1200" dirty="0" err="1" smtClean="0"/>
+            <a:rPr lang="en-US" sz="2200" kern="1200" dirty="0" err="1"/>
             <a:t>documentid-xxxxx</a:t>
           </a:r>
           <a:endParaRPr lang="en-US" sz="2200" kern="1200" dirty="0"/>
@@ -7127,7 +6812,7 @@
         </a:bodyPr>
         <a:lstStyle/>
         <a:p>
-          <a:pPr lvl="0" algn="ctr" defTabSz="977900">
+          <a:pPr marL="0" lvl="0" indent="0" algn="ctr" defTabSz="977900">
             <a:lnSpc>
               <a:spcPct val="90000"/>
             </a:lnSpc>
@@ -7137,12 +6822,12 @@
             <a:spcAft>
               <a:spcPct val="35000"/>
             </a:spcAft>
+            <a:buNone/>
           </a:pPr>
           <a:r>
-            <a:rPr lang="en-US" sz="2200" kern="1200" dirty="0" smtClean="0"/>
-            <a:t>Documents</a:t>
+            <a:rPr lang="en-US" sz="2200" kern="1200" dirty="0"/>
+            <a:t>documents</a:t>
           </a:r>
-          <a:endParaRPr lang="en-US" sz="2200" kern="1200" dirty="0"/>
         </a:p>
       </dsp:txBody>
       <dsp:txXfrm>
@@ -7207,7 +6892,7 @@
         </a:bodyPr>
         <a:lstStyle/>
         <a:p>
-          <a:pPr lvl="0" algn="ctr" defTabSz="977900">
+          <a:pPr marL="0" lvl="0" indent="0" algn="ctr" defTabSz="977900">
             <a:lnSpc>
               <a:spcPct val="90000"/>
             </a:lnSpc>
@@ -7217,13 +6902,14 @@
             <a:spcAft>
               <a:spcPct val="35000"/>
             </a:spcAft>
+            <a:buNone/>
           </a:pPr>
           <a:r>
-            <a:rPr lang="en-CA" sz="2200" kern="1200" dirty="0" err="1" smtClean="0"/>
+            <a:rPr lang="en-CA" sz="2200" kern="1200" dirty="0" err="1"/>
             <a:t>documentid</a:t>
           </a:r>
           <a:r>
-            <a:rPr lang="en-CA" sz="2200" kern="1200" dirty="0" smtClean="0"/>
+            <a:rPr lang="en-CA" sz="2200" kern="1200" dirty="0"/>
             <a:t>-XXXXX</a:t>
           </a:r>
           <a:endParaRPr lang="en-US" sz="2200" kern="1200" dirty="0"/>
@@ -7295,7 +6981,7 @@
         </a:bodyPr>
         <a:lstStyle/>
         <a:p>
-          <a:pPr lvl="0" algn="ctr" defTabSz="222250">
+          <a:pPr marL="0" lvl="0" indent="0" algn="ctr" defTabSz="222250">
             <a:lnSpc>
               <a:spcPct val="90000"/>
             </a:lnSpc>
@@ -7305,6 +6991,7 @@
             <a:spcAft>
               <a:spcPct val="35000"/>
             </a:spcAft>
+            <a:buNone/>
           </a:pPr>
           <a:endParaRPr lang="en-US" sz="500" kern="1200"/>
         </a:p>
@@ -7371,7 +7058,7 @@
         </a:bodyPr>
         <a:lstStyle/>
         <a:p>
-          <a:pPr lvl="0" algn="ctr" defTabSz="977900">
+          <a:pPr marL="0" lvl="0" indent="0" algn="ctr" defTabSz="977900">
             <a:lnSpc>
               <a:spcPct val="90000"/>
             </a:lnSpc>
@@ -7381,9 +7068,10 @@
             <a:spcAft>
               <a:spcPct val="35000"/>
             </a:spcAft>
+            <a:buNone/>
           </a:pPr>
           <a:r>
-            <a:rPr lang="en-CA" sz="2200" kern="1200" dirty="0" smtClean="0"/>
+            <a:rPr lang="en-CA" sz="2200" kern="1200" dirty="0"/>
             <a:t>files</a:t>
           </a:r>
           <a:endParaRPr lang="en-US" sz="2200" kern="1200" dirty="0"/>
@@ -7455,7 +7143,7 @@
         </a:bodyPr>
         <a:lstStyle/>
         <a:p>
-          <a:pPr lvl="0" algn="ctr" defTabSz="222250">
+          <a:pPr marL="0" lvl="0" indent="0" algn="ctr" defTabSz="222250">
             <a:lnSpc>
               <a:spcPct val="90000"/>
             </a:lnSpc>
@@ -7465,6 +7153,7 @@
             <a:spcAft>
               <a:spcPct val="35000"/>
             </a:spcAft>
+            <a:buNone/>
           </a:pPr>
           <a:endParaRPr lang="en-US" sz="500" kern="1200"/>
         </a:p>
@@ -7531,7 +7220,7 @@
         </a:bodyPr>
         <a:lstStyle/>
         <a:p>
-          <a:pPr lvl="0" algn="ctr" defTabSz="977900">
+          <a:pPr marL="0" lvl="0" indent="0" algn="ctr" defTabSz="977900">
             <a:lnSpc>
               <a:spcPct val="90000"/>
             </a:lnSpc>
@@ -7541,13 +7230,14 @@
             <a:spcAft>
               <a:spcPct val="35000"/>
             </a:spcAft>
+            <a:buNone/>
           </a:pPr>
           <a:r>
-            <a:rPr lang="en-CA" sz="2200" kern="1200" dirty="0" err="1" smtClean="0"/>
+            <a:rPr lang="en-CA" sz="2200" kern="1200" dirty="0" err="1"/>
             <a:t>fileid</a:t>
           </a:r>
           <a:r>
-            <a:rPr lang="en-CA" sz="2200" kern="1200" dirty="0" smtClean="0"/>
+            <a:rPr lang="en-CA" sz="2200" kern="1200" dirty="0"/>
             <a:t>-XXXXX</a:t>
           </a:r>
           <a:endParaRPr lang="en-US" sz="2200" kern="1200" dirty="0"/>
@@ -7619,7 +7309,7 @@
         </a:bodyPr>
         <a:lstStyle/>
         <a:p>
-          <a:pPr lvl="0" algn="ctr" defTabSz="222250">
+          <a:pPr marL="0" lvl="0" indent="0" algn="ctr" defTabSz="222250">
             <a:lnSpc>
               <a:spcPct val="90000"/>
             </a:lnSpc>
@@ -7629,6 +7319,7 @@
             <a:spcAft>
               <a:spcPct val="35000"/>
             </a:spcAft>
+            <a:buNone/>
           </a:pPr>
           <a:endParaRPr lang="en-US" sz="500" kern="1200"/>
         </a:p>
@@ -7695,7 +7386,7 @@
         </a:bodyPr>
         <a:lstStyle/>
         <a:p>
-          <a:pPr lvl="0" algn="ctr" defTabSz="977900">
+          <a:pPr marL="0" lvl="0" indent="0" algn="ctr" defTabSz="977900">
             <a:lnSpc>
               <a:spcPct val="90000"/>
             </a:lnSpc>
@@ -7705,16 +7396,16 @@
             <a:spcAft>
               <a:spcPct val="35000"/>
             </a:spcAft>
+            <a:buNone/>
           </a:pPr>
           <a:r>
-            <a:rPr lang="en-US" sz="2200" kern="1200" dirty="0" err="1" smtClean="0"/>
+            <a:rPr lang="en-US" sz="2200" kern="1200" dirty="0" err="1"/>
             <a:t>fileid</a:t>
           </a:r>
           <a:r>
-            <a:rPr lang="en-US" sz="2200" kern="1200" dirty="0" smtClean="0"/>
+            <a:rPr lang="en-US" sz="2200" kern="1200" dirty="0"/>
             <a:t>-XXXXX</a:t>
           </a:r>
-          <a:endParaRPr lang="en-US" sz="2200" kern="1200" dirty="0"/>
         </a:p>
       </dsp:txBody>
       <dsp:txXfrm>
@@ -7783,7 +7474,7 @@
         </a:bodyPr>
         <a:lstStyle/>
         <a:p>
-          <a:pPr lvl="0" algn="ctr" defTabSz="222250">
+          <a:pPr marL="0" lvl="0" indent="0" algn="ctr" defTabSz="222250">
             <a:lnSpc>
               <a:spcPct val="90000"/>
             </a:lnSpc>
@@ -7793,6 +7484,7 @@
             <a:spcAft>
               <a:spcPct val="35000"/>
             </a:spcAft>
+            <a:buNone/>
           </a:pPr>
           <a:endParaRPr lang="en-US" sz="500" kern="1200"/>
         </a:p>
@@ -7859,7 +7551,7 @@
         </a:bodyPr>
         <a:lstStyle/>
         <a:p>
-          <a:pPr lvl="0" algn="ctr" defTabSz="977900">
+          <a:pPr marL="0" lvl="0" indent="0" algn="ctr" defTabSz="977900">
             <a:lnSpc>
               <a:spcPct val="90000"/>
             </a:lnSpc>
@@ -7869,17 +7561,18 @@
             <a:spcAft>
               <a:spcPct val="35000"/>
             </a:spcAft>
+            <a:buNone/>
           </a:pPr>
           <a:r>
-            <a:rPr lang="en-CA" sz="2200" kern="1200" dirty="0" smtClean="0"/>
+            <a:rPr lang="en-CA" sz="2200" kern="1200" dirty="0"/>
             <a:t>folder#-on-disk (“&lt;</a:t>
           </a:r>
           <a:r>
-            <a:rPr lang="en-CA" sz="2200" kern="1200" dirty="0" err="1" smtClean="0"/>
+            <a:rPr lang="en-CA" sz="2200" kern="1200" dirty="0" err="1"/>
             <a:t>pos</a:t>
           </a:r>
           <a:r>
-            <a:rPr lang="en-CA" sz="2200" kern="1200" dirty="0" smtClean="0"/>
+            <a:rPr lang="en-CA" sz="2200" kern="1200" dirty="0"/>
             <a:t>&gt;”)</a:t>
           </a:r>
           <a:endParaRPr lang="en-US" sz="2200" kern="1200" dirty="0"/>
@@ -7951,7 +7644,7 @@
         </a:bodyPr>
         <a:lstStyle/>
         <a:p>
-          <a:pPr lvl="0" algn="ctr" defTabSz="222250">
+          <a:pPr marL="0" lvl="0" indent="0" algn="ctr" defTabSz="222250">
             <a:lnSpc>
               <a:spcPct val="90000"/>
             </a:lnSpc>
@@ -7961,6 +7654,7 @@
             <a:spcAft>
               <a:spcPct val="35000"/>
             </a:spcAft>
+            <a:buNone/>
           </a:pPr>
           <a:endParaRPr lang="en-US" sz="500" kern="1200"/>
         </a:p>
@@ -8027,7 +7721,7 @@
         </a:bodyPr>
         <a:lstStyle/>
         <a:p>
-          <a:pPr lvl="0" algn="ctr" defTabSz="977900">
+          <a:pPr marL="0" lvl="0" indent="0" algn="ctr" defTabSz="977900">
             <a:lnSpc>
               <a:spcPct val="90000"/>
             </a:lnSpc>
@@ -8037,9 +7731,10 @@
             <a:spcAft>
               <a:spcPct val="35000"/>
             </a:spcAft>
+            <a:buNone/>
           </a:pPr>
           <a:r>
-            <a:rPr lang="en-CA" sz="2200" kern="1200" dirty="0" smtClean="0"/>
+            <a:rPr lang="en-CA" sz="2200" kern="1200" dirty="0"/>
             <a:t>filename</a:t>
           </a:r>
           <a:endParaRPr lang="en-US" sz="2200" kern="1200" dirty="0"/>
@@ -11341,7 +11036,7 @@
           <a:p>
             <a:fld id="{631DEFAC-41BF-4E6E-9128-9BCF41586C00}" type="datetimeFigureOut">
               <a:rPr lang="en-US" smtClean="0"/>
-              <a:t>11/8/2018</a:t>
+              <a:t>11/12/18</a:t>
             </a:fld>
             <a:endParaRPr lang="en-US"/>
           </a:p>
@@ -11405,38 +11100,37 @@
           <a:p>
             <a:pPr lvl="0"/>
             <a:r>
-              <a:rPr lang="en-US" smtClean="0"/>
+              <a:rPr lang="en-US"/>
               <a:t>Edit Master text styles</a:t>
             </a:r>
           </a:p>
           <a:p>
             <a:pPr lvl="1"/>
             <a:r>
-              <a:rPr lang="en-US" smtClean="0"/>
+              <a:rPr lang="en-US"/>
               <a:t>Second level</a:t>
             </a:r>
           </a:p>
           <a:p>
             <a:pPr lvl="2"/>
             <a:r>
-              <a:rPr lang="en-US" smtClean="0"/>
+              <a:rPr lang="en-US"/>
               <a:t>Third level</a:t>
             </a:r>
           </a:p>
           <a:p>
             <a:pPr lvl="3"/>
             <a:r>
-              <a:rPr lang="en-US" smtClean="0"/>
+              <a:rPr lang="en-US"/>
               <a:t>Fourth level</a:t>
             </a:r>
           </a:p>
           <a:p>
             <a:pPr lvl="4"/>
             <a:r>
-              <a:rPr lang="en-US" smtClean="0"/>
+              <a:rPr lang="en-US"/>
               <a:t>Fifth level</a:t>
             </a:r>
-            <a:endParaRPr lang="en-US"/>
           </a:p>
         </p:txBody>
       </p:sp>
@@ -11819,7 +11513,7 @@
           </a:lstStyle>
           <a:p>
             <a:r>
-              <a:rPr lang="en-US" smtClean="0"/>
+              <a:rPr lang="en-US"/>
               <a:t>Click to edit Master title style</a:t>
             </a:r>
             <a:endParaRPr lang="en-US" dirty="0"/>
@@ -11884,7 +11578,7 @@
           </a:lstStyle>
           <a:p>
             <a:r>
-              <a:rPr lang="en-US" smtClean="0"/>
+              <a:rPr lang="en-US"/>
               <a:t>Click to edit Master subtitle style</a:t>
             </a:r>
             <a:endParaRPr lang="en-US" dirty="0"/>
@@ -11907,10 +11601,9 @@
           <a:lstStyle/>
           <a:p>
             <a:r>
-              <a:rPr lang="en-US" smtClean="0"/>
+              <a:rPr lang="en-US"/>
               <a:t>5/28/2018</a:t>
             </a:r>
-            <a:endParaRPr lang="en-US"/>
           </a:p>
         </p:txBody>
       </p:sp>
@@ -12002,7 +11695,7 @@
           <a:lstStyle/>
           <a:p>
             <a:r>
-              <a:rPr lang="en-US" smtClean="0"/>
+              <a:rPr lang="en-US"/>
               <a:t>Click to edit Master title style</a:t>
             </a:r>
             <a:endParaRPr lang="en-US" dirty="0"/>
@@ -12026,35 +11719,35 @@
           <a:p>
             <a:pPr lvl="0"/>
             <a:r>
-              <a:rPr lang="en-US" smtClean="0"/>
+              <a:rPr lang="en-US"/>
               <a:t>Edit Master text styles</a:t>
             </a:r>
           </a:p>
           <a:p>
             <a:pPr lvl="1"/>
             <a:r>
-              <a:rPr lang="en-US" smtClean="0"/>
+              <a:rPr lang="en-US"/>
               <a:t>Second level</a:t>
             </a:r>
           </a:p>
           <a:p>
             <a:pPr lvl="2"/>
             <a:r>
-              <a:rPr lang="en-US" smtClean="0"/>
+              <a:rPr lang="en-US"/>
               <a:t>Third level</a:t>
             </a:r>
           </a:p>
           <a:p>
             <a:pPr lvl="3"/>
             <a:r>
-              <a:rPr lang="en-US" smtClean="0"/>
+              <a:rPr lang="en-US"/>
               <a:t>Fourth level</a:t>
             </a:r>
           </a:p>
           <a:p>
             <a:pPr lvl="4"/>
             <a:r>
-              <a:rPr lang="en-US" smtClean="0"/>
+              <a:rPr lang="en-US"/>
               <a:t>Fifth level</a:t>
             </a:r>
             <a:endParaRPr lang="en-US" dirty="0"/>
@@ -12077,10 +11770,9 @@
           <a:lstStyle/>
           <a:p>
             <a:r>
-              <a:rPr lang="en-US" smtClean="0"/>
+              <a:rPr lang="en-US"/>
               <a:t>5/28/2018</a:t>
             </a:r>
-            <a:endParaRPr lang="en-US"/>
           </a:p>
         </p:txBody>
       </p:sp>
@@ -12177,7 +11869,7 @@
           <a:lstStyle/>
           <a:p>
             <a:r>
-              <a:rPr lang="en-US" smtClean="0"/>
+              <a:rPr lang="en-US"/>
               <a:t>Click to edit Master title style</a:t>
             </a:r>
             <a:endParaRPr lang="en-US" dirty="0"/>
@@ -12206,35 +11898,35 @@
           <a:p>
             <a:pPr lvl="0"/>
             <a:r>
-              <a:rPr lang="en-US" smtClean="0"/>
+              <a:rPr lang="en-US"/>
               <a:t>Edit Master text styles</a:t>
             </a:r>
           </a:p>
           <a:p>
             <a:pPr lvl="1"/>
             <a:r>
-              <a:rPr lang="en-US" smtClean="0"/>
+              <a:rPr lang="en-US"/>
               <a:t>Second level</a:t>
             </a:r>
           </a:p>
           <a:p>
             <a:pPr lvl="2"/>
             <a:r>
-              <a:rPr lang="en-US" smtClean="0"/>
+              <a:rPr lang="en-US"/>
               <a:t>Third level</a:t>
             </a:r>
           </a:p>
           <a:p>
             <a:pPr lvl="3"/>
             <a:r>
-              <a:rPr lang="en-US" smtClean="0"/>
+              <a:rPr lang="en-US"/>
               <a:t>Fourth level</a:t>
             </a:r>
           </a:p>
           <a:p>
             <a:pPr lvl="4"/>
             <a:r>
-              <a:rPr lang="en-US" smtClean="0"/>
+              <a:rPr lang="en-US"/>
               <a:t>Fifth level</a:t>
             </a:r>
             <a:endParaRPr lang="en-US" dirty="0"/>
@@ -12257,10 +11949,9 @@
           <a:lstStyle/>
           <a:p>
             <a:r>
-              <a:rPr lang="en-US" smtClean="0"/>
+              <a:rPr lang="en-US"/>
               <a:t>5/28/2018</a:t>
             </a:r>
-            <a:endParaRPr lang="en-US"/>
           </a:p>
         </p:txBody>
       </p:sp>
@@ -12352,7 +12043,7 @@
           <a:lstStyle/>
           <a:p>
             <a:r>
-              <a:rPr lang="en-US" smtClean="0"/>
+              <a:rPr lang="en-US"/>
               <a:t>Click to edit Master title style</a:t>
             </a:r>
             <a:endParaRPr lang="en-US" dirty="0"/>
@@ -12376,35 +12067,35 @@
           <a:p>
             <a:pPr lvl="0"/>
             <a:r>
-              <a:rPr lang="en-US" smtClean="0"/>
+              <a:rPr lang="en-US"/>
               <a:t>Edit Master text styles</a:t>
             </a:r>
           </a:p>
           <a:p>
             <a:pPr lvl="1"/>
             <a:r>
-              <a:rPr lang="en-US" smtClean="0"/>
+              <a:rPr lang="en-US"/>
               <a:t>Second level</a:t>
             </a:r>
           </a:p>
           <a:p>
             <a:pPr lvl="2"/>
             <a:r>
-              <a:rPr lang="en-US" smtClean="0"/>
+              <a:rPr lang="en-US"/>
               <a:t>Third level</a:t>
             </a:r>
           </a:p>
           <a:p>
             <a:pPr lvl="3"/>
             <a:r>
-              <a:rPr lang="en-US" smtClean="0"/>
+              <a:rPr lang="en-US"/>
               <a:t>Fourth level</a:t>
             </a:r>
           </a:p>
           <a:p>
             <a:pPr lvl="4"/>
             <a:r>
-              <a:rPr lang="en-US" smtClean="0"/>
+              <a:rPr lang="en-US"/>
               <a:t>Fifth level</a:t>
             </a:r>
             <a:endParaRPr lang="en-US" dirty="0"/>
@@ -12427,10 +12118,9 @@
           <a:lstStyle/>
           <a:p>
             <a:r>
-              <a:rPr lang="en-US" smtClean="0"/>
+              <a:rPr lang="en-US"/>
               <a:t>5/28/2018</a:t>
             </a:r>
-            <a:endParaRPr lang="en-US"/>
           </a:p>
         </p:txBody>
       </p:sp>
@@ -12531,7 +12221,7 @@
           </a:lstStyle>
           <a:p>
             <a:r>
-              <a:rPr lang="en-US" smtClean="0"/>
+              <a:rPr lang="en-US"/>
               <a:t>Click to edit Master title style</a:t>
             </a:r>
             <a:endParaRPr lang="en-US" dirty="0"/>
@@ -12651,7 +12341,7 @@
           <a:p>
             <a:pPr lvl="0"/>
             <a:r>
-              <a:rPr lang="en-US" smtClean="0"/>
+              <a:rPr lang="en-US"/>
               <a:t>Edit Master text styles</a:t>
             </a:r>
           </a:p>
@@ -12673,10 +12363,9 @@
           <a:lstStyle/>
           <a:p>
             <a:r>
-              <a:rPr lang="en-US" smtClean="0"/>
+              <a:rPr lang="en-US"/>
               <a:t>5/28/2018</a:t>
             </a:r>
-            <a:endParaRPr lang="en-US"/>
           </a:p>
         </p:txBody>
       </p:sp>
@@ -12768,7 +12457,7 @@
           <a:lstStyle/>
           <a:p>
             <a:r>
-              <a:rPr lang="en-US" smtClean="0"/>
+              <a:rPr lang="en-US"/>
               <a:t>Click to edit Master title style</a:t>
             </a:r>
             <a:endParaRPr lang="en-US" dirty="0"/>
@@ -12797,35 +12486,35 @@
           <a:p>
             <a:pPr lvl="0"/>
             <a:r>
-              <a:rPr lang="en-US" smtClean="0"/>
+              <a:rPr lang="en-US"/>
               <a:t>Edit Master text styles</a:t>
             </a:r>
           </a:p>
           <a:p>
             <a:pPr lvl="1"/>
             <a:r>
-              <a:rPr lang="en-US" smtClean="0"/>
+              <a:rPr lang="en-US"/>
               <a:t>Second level</a:t>
             </a:r>
           </a:p>
           <a:p>
             <a:pPr lvl="2"/>
             <a:r>
-              <a:rPr lang="en-US" smtClean="0"/>
+              <a:rPr lang="en-US"/>
               <a:t>Third level</a:t>
             </a:r>
           </a:p>
           <a:p>
             <a:pPr lvl="3"/>
             <a:r>
-              <a:rPr lang="en-US" smtClean="0"/>
+              <a:rPr lang="en-US"/>
               <a:t>Fourth level</a:t>
             </a:r>
           </a:p>
           <a:p>
             <a:pPr lvl="4"/>
             <a:r>
-              <a:rPr lang="en-US" smtClean="0"/>
+              <a:rPr lang="en-US"/>
               <a:t>Fifth level</a:t>
             </a:r>
             <a:endParaRPr lang="en-US" dirty="0"/>
@@ -12854,35 +12543,35 @@
           <a:p>
             <a:pPr lvl="0"/>
             <a:r>
-              <a:rPr lang="en-US" smtClean="0"/>
+              <a:rPr lang="en-US"/>
               <a:t>Edit Master text styles</a:t>
             </a:r>
           </a:p>
           <a:p>
             <a:pPr lvl="1"/>
             <a:r>
-              <a:rPr lang="en-US" smtClean="0"/>
+              <a:rPr lang="en-US"/>
               <a:t>Second level</a:t>
             </a:r>
           </a:p>
           <a:p>
             <a:pPr lvl="2"/>
             <a:r>
-              <a:rPr lang="en-US" smtClean="0"/>
+              <a:rPr lang="en-US"/>
               <a:t>Third level</a:t>
             </a:r>
           </a:p>
           <a:p>
             <a:pPr lvl="3"/>
             <a:r>
-              <a:rPr lang="en-US" smtClean="0"/>
+              <a:rPr lang="en-US"/>
               <a:t>Fourth level</a:t>
             </a:r>
           </a:p>
           <a:p>
             <a:pPr lvl="4"/>
             <a:r>
-              <a:rPr lang="en-US" smtClean="0"/>
+              <a:rPr lang="en-US"/>
               <a:t>Fifth level</a:t>
             </a:r>
             <a:endParaRPr lang="en-US" dirty="0"/>
@@ -12905,10 +12594,9 @@
           <a:lstStyle/>
           <a:p>
             <a:r>
-              <a:rPr lang="en-US" smtClean="0"/>
+              <a:rPr lang="en-US"/>
               <a:t>5/28/2018</a:t>
             </a:r>
-            <a:endParaRPr lang="en-US"/>
           </a:p>
         </p:txBody>
       </p:sp>
@@ -13005,7 +12693,7 @@
           <a:lstStyle/>
           <a:p>
             <a:r>
-              <a:rPr lang="en-US" smtClean="0"/>
+              <a:rPr lang="en-US"/>
               <a:t>Click to edit Master title style</a:t>
             </a:r>
             <a:endParaRPr lang="en-US" dirty="0"/>
@@ -13071,7 +12759,7 @@
           <a:p>
             <a:pPr lvl="0"/>
             <a:r>
-              <a:rPr lang="en-US" smtClean="0"/>
+              <a:rPr lang="en-US"/>
               <a:t>Edit Master text styles</a:t>
             </a:r>
           </a:p>
@@ -13099,35 +12787,35 @@
           <a:p>
             <a:pPr lvl="0"/>
             <a:r>
-              <a:rPr lang="en-US" smtClean="0"/>
+              <a:rPr lang="en-US"/>
               <a:t>Edit Master text styles</a:t>
             </a:r>
           </a:p>
           <a:p>
             <a:pPr lvl="1"/>
             <a:r>
-              <a:rPr lang="en-US" smtClean="0"/>
+              <a:rPr lang="en-US"/>
               <a:t>Second level</a:t>
             </a:r>
           </a:p>
           <a:p>
             <a:pPr lvl="2"/>
             <a:r>
-              <a:rPr lang="en-US" smtClean="0"/>
+              <a:rPr lang="en-US"/>
               <a:t>Third level</a:t>
             </a:r>
           </a:p>
           <a:p>
             <a:pPr lvl="3"/>
             <a:r>
-              <a:rPr lang="en-US" smtClean="0"/>
+              <a:rPr lang="en-US"/>
               <a:t>Fourth level</a:t>
             </a:r>
           </a:p>
           <a:p>
             <a:pPr lvl="4"/>
             <a:r>
-              <a:rPr lang="en-US" smtClean="0"/>
+              <a:rPr lang="en-US"/>
               <a:t>Fifth level</a:t>
             </a:r>
             <a:endParaRPr lang="en-US" dirty="0"/>
@@ -13193,7 +12881,7 @@
           <a:p>
             <a:pPr lvl="0"/>
             <a:r>
-              <a:rPr lang="en-US" smtClean="0"/>
+              <a:rPr lang="en-US"/>
               <a:t>Edit Master text styles</a:t>
             </a:r>
           </a:p>
@@ -13221,35 +12909,35 @@
           <a:p>
             <a:pPr lvl="0"/>
             <a:r>
-              <a:rPr lang="en-US" smtClean="0"/>
+              <a:rPr lang="en-US"/>
               <a:t>Edit Master text styles</a:t>
             </a:r>
           </a:p>
           <a:p>
             <a:pPr lvl="1"/>
             <a:r>
-              <a:rPr lang="en-US" smtClean="0"/>
+              <a:rPr lang="en-US"/>
               <a:t>Second level</a:t>
             </a:r>
           </a:p>
           <a:p>
             <a:pPr lvl="2"/>
             <a:r>
-              <a:rPr lang="en-US" smtClean="0"/>
+              <a:rPr lang="en-US"/>
               <a:t>Third level</a:t>
             </a:r>
           </a:p>
           <a:p>
             <a:pPr lvl="3"/>
             <a:r>
-              <a:rPr lang="en-US" smtClean="0"/>
+              <a:rPr lang="en-US"/>
               <a:t>Fourth level</a:t>
             </a:r>
           </a:p>
           <a:p>
             <a:pPr lvl="4"/>
             <a:r>
-              <a:rPr lang="en-US" smtClean="0"/>
+              <a:rPr lang="en-US"/>
               <a:t>Fifth level</a:t>
             </a:r>
             <a:endParaRPr lang="en-US" dirty="0"/>
@@ -13272,10 +12960,9 @@
           <a:lstStyle/>
           <a:p>
             <a:r>
-              <a:rPr lang="en-US" smtClean="0"/>
+              <a:rPr lang="en-US"/>
               <a:t>5/28/2018</a:t>
             </a:r>
-            <a:endParaRPr lang="en-US"/>
           </a:p>
         </p:txBody>
       </p:sp>
@@ -13367,7 +13054,7 @@
           <a:lstStyle/>
           <a:p>
             <a:r>
-              <a:rPr lang="en-US" smtClean="0"/>
+              <a:rPr lang="en-US"/>
               <a:t>Click to edit Master title style</a:t>
             </a:r>
             <a:endParaRPr lang="en-US" dirty="0"/>
@@ -13390,10 +13077,9 @@
           <a:lstStyle/>
           <a:p>
             <a:r>
-              <a:rPr lang="en-US" smtClean="0"/>
+              <a:rPr lang="en-US"/>
               <a:t>5/28/2018</a:t>
             </a:r>
-            <a:endParaRPr lang="en-US"/>
           </a:p>
         </p:txBody>
       </p:sp>
@@ -13485,10 +13171,9 @@
           <a:lstStyle/>
           <a:p>
             <a:r>
-              <a:rPr lang="en-US" smtClean="0"/>
+              <a:rPr lang="en-US"/>
               <a:t>5/28/2018</a:t>
             </a:r>
-            <a:endParaRPr lang="en-US"/>
           </a:p>
         </p:txBody>
       </p:sp>
@@ -13589,7 +13274,7 @@
           </a:lstStyle>
           <a:p>
             <a:r>
-              <a:rPr lang="en-US" smtClean="0"/>
+              <a:rPr lang="en-US"/>
               <a:t>Click to edit Master title style</a:t>
             </a:r>
             <a:endParaRPr lang="en-US" dirty="0"/>
@@ -13646,35 +13331,35 @@
           <a:p>
             <a:pPr lvl="0"/>
             <a:r>
-              <a:rPr lang="en-US" smtClean="0"/>
+              <a:rPr lang="en-US"/>
               <a:t>Edit Master text styles</a:t>
             </a:r>
           </a:p>
           <a:p>
             <a:pPr lvl="1"/>
             <a:r>
-              <a:rPr lang="en-US" smtClean="0"/>
+              <a:rPr lang="en-US"/>
               <a:t>Second level</a:t>
             </a:r>
           </a:p>
           <a:p>
             <a:pPr lvl="2"/>
             <a:r>
-              <a:rPr lang="en-US" smtClean="0"/>
+              <a:rPr lang="en-US"/>
               <a:t>Third level</a:t>
             </a:r>
           </a:p>
           <a:p>
             <a:pPr lvl="3"/>
             <a:r>
-              <a:rPr lang="en-US" smtClean="0"/>
+              <a:rPr lang="en-US"/>
               <a:t>Fourth level</a:t>
             </a:r>
           </a:p>
           <a:p>
             <a:pPr lvl="4"/>
             <a:r>
-              <a:rPr lang="en-US" smtClean="0"/>
+              <a:rPr lang="en-US"/>
               <a:t>Fifth level</a:t>
             </a:r>
             <a:endParaRPr lang="en-US" dirty="0"/>
@@ -13740,7 +13425,7 @@
           <a:p>
             <a:pPr lvl="0"/>
             <a:r>
-              <a:rPr lang="en-US" smtClean="0"/>
+              <a:rPr lang="en-US"/>
               <a:t>Edit Master text styles</a:t>
             </a:r>
           </a:p>
@@ -13762,10 +13447,9 @@
           <a:lstStyle/>
           <a:p>
             <a:r>
-              <a:rPr lang="en-US" smtClean="0"/>
+              <a:rPr lang="en-US"/>
               <a:t>5/28/2018</a:t>
             </a:r>
-            <a:endParaRPr lang="en-US"/>
           </a:p>
         </p:txBody>
       </p:sp>
@@ -13866,7 +13550,7 @@
           </a:lstStyle>
           <a:p>
             <a:r>
-              <a:rPr lang="en-US" smtClean="0"/>
+              <a:rPr lang="en-US"/>
               <a:t>Click to edit Master title style</a:t>
             </a:r>
             <a:endParaRPr lang="en-US" dirty="0"/>
@@ -13931,7 +13615,7 @@
           </a:lstStyle>
           <a:p>
             <a:r>
-              <a:rPr lang="en-US" smtClean="0"/>
+              <a:rPr lang="en-US"/>
               <a:t>Click icon to add picture</a:t>
             </a:r>
             <a:endParaRPr lang="en-US" dirty="0"/>
@@ -13997,7 +13681,7 @@
           <a:p>
             <a:pPr lvl="0"/>
             <a:r>
-              <a:rPr lang="en-US" smtClean="0"/>
+              <a:rPr lang="en-US"/>
               <a:t>Edit Master text styles</a:t>
             </a:r>
           </a:p>
@@ -14019,10 +13703,9 @@
           <a:lstStyle/>
           <a:p>
             <a:r>
-              <a:rPr lang="en-US" smtClean="0"/>
+              <a:rPr lang="en-US"/>
               <a:t>5/28/2018</a:t>
             </a:r>
-            <a:endParaRPr lang="en-US"/>
           </a:p>
         </p:txBody>
       </p:sp>
@@ -14129,7 +13812,7 @@
           <a:lstStyle/>
           <a:p>
             <a:r>
-              <a:rPr lang="en-US" smtClean="0"/>
+              <a:rPr lang="en-US"/>
               <a:t>Click to edit Master title style</a:t>
             </a:r>
             <a:endParaRPr lang="en-US" dirty="0"/>
@@ -14163,35 +13846,35 @@
           <a:p>
             <a:pPr lvl="0"/>
             <a:r>
-              <a:rPr lang="en-US" smtClean="0"/>
+              <a:rPr lang="en-US"/>
               <a:t>Edit Master text styles</a:t>
             </a:r>
           </a:p>
           <a:p>
             <a:pPr lvl="1"/>
             <a:r>
-              <a:rPr lang="en-US" smtClean="0"/>
+              <a:rPr lang="en-US"/>
               <a:t>Second level</a:t>
             </a:r>
           </a:p>
           <a:p>
             <a:pPr lvl="2"/>
             <a:r>
-              <a:rPr lang="en-US" smtClean="0"/>
+              <a:rPr lang="en-US"/>
               <a:t>Third level</a:t>
             </a:r>
           </a:p>
           <a:p>
             <a:pPr lvl="3"/>
             <a:r>
-              <a:rPr lang="en-US" smtClean="0"/>
+              <a:rPr lang="en-US"/>
               <a:t>Fourth level</a:t>
             </a:r>
           </a:p>
           <a:p>
             <a:pPr lvl="4"/>
             <a:r>
-              <a:rPr lang="en-US" smtClean="0"/>
+              <a:rPr lang="en-US"/>
               <a:t>Fifth level</a:t>
             </a:r>
             <a:endParaRPr lang="en-US" dirty="0"/>
@@ -14232,10 +13915,9 @@
           </a:lstStyle>
           <a:p>
             <a:r>
-              <a:rPr lang="en-US" smtClean="0"/>
+              <a:rPr lang="en-US"/>
               <a:t>5/28/2018</a:t>
             </a:r>
-            <a:endParaRPr lang="en-US"/>
           </a:p>
         </p:txBody>
       </p:sp>
@@ -14655,10 +14337,9 @@
           <a:lstStyle/>
           <a:p>
             <a:r>
-              <a:rPr lang="en-US" dirty="0" smtClean="0"/>
+              <a:rPr lang="en-US" dirty="0"/>
               <a:t>Digital Preservation Export Structure</a:t>
             </a:r>
-            <a:endParaRPr lang="en-US" dirty="0"/>
           </a:p>
         </p:txBody>
       </p:sp>
@@ -14669,7 +14350,7 @@
           <p:nvPr>
             <p:extLst>
               <p:ext uri="{D42A27DB-BD31-4B8C-83A1-F6EECF244321}">
-                <p14:modId xmlns:p14="http://schemas.microsoft.com/office/powerpoint/2010/main" val="2654924564"/>
+                <p14:modId xmlns:p14="http://schemas.microsoft.com/office/powerpoint/2010/main" val="905344828"/>
               </p:ext>
             </p:extLst>
           </p:nvPr>
@@ -14717,13 +14398,6 @@
   <p:clrMapOvr>
     <a:masterClrMapping/>
   </p:clrMapOvr>
-  <p:timing>
-    <p:tnLst>
-      <p:par>
-        <p:cTn id="1" dur="indefinite" restart="never" nodeType="tmRoot"/>
-      </p:par>
-    </p:tnLst>
-  </p:timing>
 </p:sld>
 </file>
 
@@ -14760,10 +14434,9 @@
           <a:lstStyle/>
           <a:p>
             <a:r>
-              <a:rPr lang="en-US" dirty="0" smtClean="0"/>
+              <a:rPr lang="en-US" dirty="0"/>
               <a:t>Digital Preservation Export Structure</a:t>
             </a:r>
-            <a:endParaRPr lang="en-US" dirty="0"/>
           </a:p>
         </p:txBody>
       </p:sp>
@@ -14774,7 +14447,7 @@
           <p:nvPr>
             <p:extLst>
               <p:ext uri="{D42A27DB-BD31-4B8C-83A1-F6EECF244321}">
-                <p14:modId xmlns:p14="http://schemas.microsoft.com/office/powerpoint/2010/main" val="1010954058"/>
+                <p14:modId xmlns:p14="http://schemas.microsoft.com/office/powerpoint/2010/main" val="1040042033"/>
               </p:ext>
             </p:extLst>
           </p:nvPr>
@@ -14822,13 +14495,6 @@
   <p:clrMapOvr>
     <a:masterClrMapping/>
   </p:clrMapOvr>
-  <p:timing>
-    <p:tnLst>
-      <p:par>
-        <p:cTn id="1" dur="indefinite" restart="never" nodeType="tmRoot"/>
-      </p:par>
-    </p:tnLst>
-  </p:timing>
 </p:sld>
 </file>
 

</xml_diff>

<commit_message>
Updated export structure to move "revisions" folder under metadata
</commit_message>
<xml_diff>
--- a/EPrintsArchivematicaExportStructure-v2.pptx
+++ b/EPrintsArchivematicaExportStructure-v2.pptx
@@ -1760,6 +1760,10 @@
             <a:rPr lang="en-US" sz="1400" baseline="0" dirty="0" err="1"/>
             <a:t>metadata.json</a:t>
           </a:r>
+          <a:r>
+            <a:rPr lang="en-US" sz="1400" baseline="0" dirty="0"/>
+            <a:t/>
+          </a:r>
           <a:br>
             <a:rPr lang="en-US" sz="1400" baseline="0" dirty="0"/>
           </a:br>
@@ -1818,114 +1822,6 @@
       </dgm:t>
     </dgm:pt>
     <dgm:pt modelId="{5A466318-7B41-4E02-9BA3-5CC1F40C55A0}" type="sibTrans" cxnId="{37AAFB12-7D55-4975-B579-53FF4FA0DC8F}">
-      <dgm:prSet/>
-      <dgm:spPr/>
-      <dgm:t>
-        <a:bodyPr/>
-        <a:lstStyle/>
-        <a:p>
-          <a:endParaRPr lang="en-US"/>
-        </a:p>
-      </dgm:t>
-    </dgm:pt>
-    <dgm:pt modelId="{E9335B92-0993-47B6-89C4-6972D0CA941C}">
-      <dgm:prSet phldrT="[Text]" custT="1"/>
-      <dgm:spPr/>
-      <dgm:t>
-        <a:bodyPr/>
-        <a:lstStyle/>
-        <a:p>
-          <a:r>
-            <a:rPr lang="en-US" sz="1400" baseline="0" dirty="0"/>
-            <a:t>revisions</a:t>
-          </a:r>
-        </a:p>
-      </dgm:t>
-    </dgm:pt>
-    <dgm:pt modelId="{5BAED453-83A7-400E-86A2-EA1960D19236}" type="parTrans" cxnId="{8E9734E0-03BE-44E9-8CE2-EF39A2FA919F}">
-      <dgm:prSet/>
-      <dgm:spPr/>
-      <dgm:t>
-        <a:bodyPr/>
-        <a:lstStyle/>
-        <a:p>
-          <a:endParaRPr lang="en-US"/>
-        </a:p>
-      </dgm:t>
-    </dgm:pt>
-    <dgm:pt modelId="{2C0EB7C8-6D02-420F-9F91-6A1DCCB56FE7}" type="sibTrans" cxnId="{8E9734E0-03BE-44E9-8CE2-EF39A2FA919F}">
-      <dgm:prSet/>
-      <dgm:spPr/>
-      <dgm:t>
-        <a:bodyPr/>
-        <a:lstStyle/>
-        <a:p>
-          <a:endParaRPr lang="en-US"/>
-        </a:p>
-      </dgm:t>
-    </dgm:pt>
-    <dgm:pt modelId="{64F125AA-06E5-408C-92F0-29B683643E21}">
-      <dgm:prSet phldrT="[Text]"/>
-      <dgm:spPr/>
-      <dgm:t>
-        <a:bodyPr/>
-        <a:lstStyle/>
-        <a:p>
-          <a:r>
-            <a:rPr lang="en-US" baseline="0" dirty="0"/>
-            <a:t>1.xml</a:t>
-          </a:r>
-        </a:p>
-      </dgm:t>
-    </dgm:pt>
-    <dgm:pt modelId="{C55E3E45-29B2-4823-A3C7-C27C8F7667A0}" type="parTrans" cxnId="{ED586B17-354D-430F-9CCF-4E7EBDBAFDD3}">
-      <dgm:prSet/>
-      <dgm:spPr/>
-      <dgm:t>
-        <a:bodyPr/>
-        <a:lstStyle/>
-        <a:p>
-          <a:endParaRPr lang="en-US"/>
-        </a:p>
-      </dgm:t>
-    </dgm:pt>
-    <dgm:pt modelId="{E7AE558F-65BD-445E-96CE-3F7051CC59DF}" type="sibTrans" cxnId="{ED586B17-354D-430F-9CCF-4E7EBDBAFDD3}">
-      <dgm:prSet/>
-      <dgm:spPr/>
-      <dgm:t>
-        <a:bodyPr/>
-        <a:lstStyle/>
-        <a:p>
-          <a:endParaRPr lang="en-US"/>
-        </a:p>
-      </dgm:t>
-    </dgm:pt>
-    <dgm:pt modelId="{7A07C836-60D9-43DE-AF7A-2D0935F9CA94}">
-      <dgm:prSet phldrT="[Text]"/>
-      <dgm:spPr/>
-      <dgm:t>
-        <a:bodyPr/>
-        <a:lstStyle/>
-        <a:p>
-          <a:r>
-            <a:rPr lang="en-US" baseline="0" dirty="0"/>
-            <a:t>2.xml</a:t>
-          </a:r>
-        </a:p>
-      </dgm:t>
-    </dgm:pt>
-    <dgm:pt modelId="{C9DAD4B7-FD70-4DA8-8A22-1CEC23CCEB6F}" type="parTrans" cxnId="{98DFA557-F20C-4801-8F68-223FF86CC266}">
-      <dgm:prSet/>
-      <dgm:spPr/>
-      <dgm:t>
-        <a:bodyPr/>
-        <a:lstStyle/>
-        <a:p>
-          <a:endParaRPr lang="en-US"/>
-        </a:p>
-      </dgm:t>
-    </dgm:pt>
-    <dgm:pt modelId="{44D52721-CF83-4C4F-8CB7-60B199CAA2F0}" type="sibTrans" cxnId="{98DFA557-F20C-4801-8F68-223FF86CC266}">
       <dgm:prSet/>
       <dgm:spPr/>
       <dgm:t>
@@ -2205,6 +2101,115 @@
         </a:p>
       </dgm:t>
     </dgm:pt>
+    <dgm:pt modelId="{4AB3E4C6-43C2-48D1-A38B-01ECD40F1524}">
+      <dgm:prSet phldrT="[Text]" custT="1"/>
+      <dgm:spPr/>
+      <dgm:t>
+        <a:bodyPr/>
+        <a:lstStyle/>
+        <a:p>
+          <a:r>
+            <a:rPr lang="en-US" sz="1400" baseline="0" smtClean="0"/>
+            <a:t>revisions</a:t>
+          </a:r>
+          <a:endParaRPr lang="en-US" sz="1400" baseline="0" dirty="0"/>
+        </a:p>
+      </dgm:t>
+    </dgm:pt>
+    <dgm:pt modelId="{407FEB63-8158-4A0B-85C2-5B7A8B48439B}" type="parTrans" cxnId="{DF1CFB2D-4438-4528-B0EE-DB35A2DB0ECE}">
+      <dgm:prSet/>
+      <dgm:spPr/>
+      <dgm:t>
+        <a:bodyPr/>
+        <a:lstStyle/>
+        <a:p>
+          <a:endParaRPr lang="en-US"/>
+        </a:p>
+      </dgm:t>
+    </dgm:pt>
+    <dgm:pt modelId="{81EF869D-083B-48AD-A0E4-BA08709DE1B3}" type="sibTrans" cxnId="{DF1CFB2D-4438-4528-B0EE-DB35A2DB0ECE}">
+      <dgm:prSet/>
+      <dgm:spPr/>
+      <dgm:t>
+        <a:bodyPr/>
+        <a:lstStyle/>
+        <a:p>
+          <a:endParaRPr lang="en-US"/>
+        </a:p>
+      </dgm:t>
+    </dgm:pt>
+    <dgm:pt modelId="{4515D76F-57B5-49C6-A6F1-D374F67D1C57}">
+      <dgm:prSet phldrT="[Text]"/>
+      <dgm:spPr/>
+      <dgm:t>
+        <a:bodyPr/>
+        <a:lstStyle/>
+        <a:p>
+          <a:r>
+            <a:rPr lang="en-US" baseline="0" dirty="0"/>
+            <a:t>1.xml</a:t>
+          </a:r>
+        </a:p>
+      </dgm:t>
+    </dgm:pt>
+    <dgm:pt modelId="{43F3177A-6443-45D1-BB60-F0C6515A522C}" type="parTrans" cxnId="{60221A22-0180-4043-B993-B680A713A303}">
+      <dgm:prSet/>
+      <dgm:spPr/>
+      <dgm:t>
+        <a:bodyPr/>
+        <a:lstStyle/>
+        <a:p>
+          <a:endParaRPr lang="en-US"/>
+        </a:p>
+      </dgm:t>
+    </dgm:pt>
+    <dgm:pt modelId="{FA477417-EB19-4B2B-BFA5-E1652C6CF4FC}" type="sibTrans" cxnId="{60221A22-0180-4043-B993-B680A713A303}">
+      <dgm:prSet/>
+      <dgm:spPr/>
+      <dgm:t>
+        <a:bodyPr/>
+        <a:lstStyle/>
+        <a:p>
+          <a:endParaRPr lang="en-US"/>
+        </a:p>
+      </dgm:t>
+    </dgm:pt>
+    <dgm:pt modelId="{B9051C09-EEE7-4B39-97BB-062B0ADD8898}">
+      <dgm:prSet phldrT="[Text]"/>
+      <dgm:spPr/>
+      <dgm:t>
+        <a:bodyPr/>
+        <a:lstStyle/>
+        <a:p>
+          <a:r>
+            <a:rPr lang="en-US" baseline="0" dirty="0"/>
+            <a:t>2.xml</a:t>
+          </a:r>
+        </a:p>
+      </dgm:t>
+    </dgm:pt>
+    <dgm:pt modelId="{56856F2B-3CEE-4255-992F-EF7B88167994}" type="parTrans" cxnId="{B3414DB1-D1CB-4EDB-B189-BE2BB97D1F9B}">
+      <dgm:prSet/>
+      <dgm:spPr/>
+      <dgm:t>
+        <a:bodyPr/>
+        <a:lstStyle/>
+        <a:p>
+          <a:endParaRPr lang="en-US"/>
+        </a:p>
+      </dgm:t>
+    </dgm:pt>
+    <dgm:pt modelId="{F119A380-1BEB-42D8-87C2-364C7E802DCE}" type="sibTrans" cxnId="{B3414DB1-D1CB-4EDB-B189-BE2BB97D1F9B}">
+      <dgm:prSet/>
+      <dgm:spPr/>
+      <dgm:t>
+        <a:bodyPr/>
+        <a:lstStyle/>
+        <a:p>
+          <a:endParaRPr lang="en-US"/>
+        </a:p>
+      </dgm:t>
+    </dgm:pt>
     <dgm:pt modelId="{5C3B16B1-445C-4658-9392-3CFE011BBD0E}" type="pres">
       <dgm:prSet presAssocID="{B43C9653-F421-437D-A8FF-7EE550C290C6}" presName="hierChild1" presStyleCnt="0">
         <dgm:presLayoutVars>
@@ -2216,6 +2221,13 @@
         </dgm:presLayoutVars>
       </dgm:prSet>
       <dgm:spPr/>
+      <dgm:t>
+        <a:bodyPr/>
+        <a:lstStyle/>
+        <a:p>
+          <a:endParaRPr lang="en-US"/>
+        </a:p>
+      </dgm:t>
     </dgm:pt>
     <dgm:pt modelId="{B5B783EA-3F60-456D-B956-C15D100CFAFA}" type="pres">
       <dgm:prSet presAssocID="{4B45486A-C81F-4BA8-AEEE-9DE931EFB1FA}" presName="hierRoot1" presStyleCnt="0"/>
@@ -2236,6 +2248,13 @@
         </dgm:presLayoutVars>
       </dgm:prSet>
       <dgm:spPr/>
+      <dgm:t>
+        <a:bodyPr/>
+        <a:lstStyle/>
+        <a:p>
+          <a:endParaRPr lang="en-US"/>
+        </a:p>
+      </dgm:t>
     </dgm:pt>
     <dgm:pt modelId="{CDC816B4-8B63-477C-8B7A-197E11BBC8B8}" type="pres">
       <dgm:prSet presAssocID="{4B45486A-C81F-4BA8-AEEE-9DE931EFB1FA}" presName="hierChild2" presStyleCnt="0"/>
@@ -2244,6 +2263,13 @@
     <dgm:pt modelId="{FE690589-86B8-43FE-A41B-9D62D6430AB9}" type="pres">
       <dgm:prSet presAssocID="{5B17717F-5F4F-4947-AB7B-DAE68E73538F}" presName="Name10" presStyleLbl="parChTrans1D2" presStyleIdx="0" presStyleCnt="2"/>
       <dgm:spPr/>
+      <dgm:t>
+        <a:bodyPr/>
+        <a:lstStyle/>
+        <a:p>
+          <a:endParaRPr lang="en-US"/>
+        </a:p>
+      </dgm:t>
     </dgm:pt>
     <dgm:pt modelId="{2E813B83-67FC-4842-8F47-5BD60EFFD4EF}" type="pres">
       <dgm:prSet presAssocID="{1245DEF0-43F9-4230-A81A-980D178A756B}" presName="hierRoot2" presStyleCnt="0"/>
@@ -2264,6 +2290,13 @@
         </dgm:presLayoutVars>
       </dgm:prSet>
       <dgm:spPr/>
+      <dgm:t>
+        <a:bodyPr/>
+        <a:lstStyle/>
+        <a:p>
+          <a:endParaRPr lang="en-US"/>
+        </a:p>
+      </dgm:t>
     </dgm:pt>
     <dgm:pt modelId="{A545A776-4A9C-49F1-B844-5D1CB6AB55A3}" type="pres">
       <dgm:prSet presAssocID="{1245DEF0-43F9-4230-A81A-980D178A756B}" presName="hierChild3" presStyleCnt="0"/>
@@ -2272,6 +2305,13 @@
     <dgm:pt modelId="{214BC148-D85A-42E7-A41D-4CA859ED54EA}" type="pres">
       <dgm:prSet presAssocID="{86E7B6D8-3187-4F63-AB19-DA0A507E63CF}" presName="Name17" presStyleLbl="parChTrans1D3" presStyleIdx="0" presStyleCnt="6"/>
       <dgm:spPr/>
+      <dgm:t>
+        <a:bodyPr/>
+        <a:lstStyle/>
+        <a:p>
+          <a:endParaRPr lang="en-US"/>
+        </a:p>
+      </dgm:t>
     </dgm:pt>
     <dgm:pt modelId="{1861795F-C5CA-4BE7-819C-873DBF56D0BE}" type="pres">
       <dgm:prSet presAssocID="{B425ABC7-A3E0-4EA9-B0B0-C88BCA4327A4}" presName="hierRoot3" presStyleCnt="0"/>
@@ -2292,230 +2332,223 @@
         </dgm:presLayoutVars>
       </dgm:prSet>
       <dgm:spPr/>
+      <dgm:t>
+        <a:bodyPr/>
+        <a:lstStyle/>
+        <a:p>
+          <a:endParaRPr lang="en-US"/>
+        </a:p>
+      </dgm:t>
     </dgm:pt>
     <dgm:pt modelId="{5561ED40-59AD-4660-8B04-5C85B27DCD5A}" type="pres">
       <dgm:prSet presAssocID="{B425ABC7-A3E0-4EA9-B0B0-C88BCA4327A4}" presName="hierChild4" presStyleCnt="0"/>
       <dgm:spPr/>
     </dgm:pt>
-    <dgm:pt modelId="{1E699749-40DD-43BD-989A-11CDE10DACB8}" type="pres">
-      <dgm:prSet presAssocID="{5BAED453-83A7-400E-86A2-EA1960D19236}" presName="Name17" presStyleLbl="parChTrans1D3" presStyleIdx="1" presStyleCnt="6"/>
-      <dgm:spPr/>
-    </dgm:pt>
-    <dgm:pt modelId="{B6B2C192-AFBE-4A82-A431-3314275135C0}" type="pres">
-      <dgm:prSet presAssocID="{E9335B92-0993-47B6-89C4-6972D0CA941C}" presName="hierRoot3" presStyleCnt="0"/>
-      <dgm:spPr/>
-    </dgm:pt>
-    <dgm:pt modelId="{D376F932-287F-4D59-B5BB-0ABA099B2D17}" type="pres">
-      <dgm:prSet presAssocID="{E9335B92-0993-47B6-89C4-6972D0CA941C}" presName="composite3" presStyleCnt="0"/>
-      <dgm:spPr/>
-    </dgm:pt>
-    <dgm:pt modelId="{DBCC1B88-3490-4A64-952E-E20BB6003DEF}" type="pres">
-      <dgm:prSet presAssocID="{E9335B92-0993-47B6-89C4-6972D0CA941C}" presName="background3" presStyleLbl="node3" presStyleIdx="1" presStyleCnt="6"/>
-      <dgm:spPr/>
-    </dgm:pt>
-    <dgm:pt modelId="{7627023D-68E6-41F5-A314-0DE0565DC153}" type="pres">
-      <dgm:prSet presAssocID="{E9335B92-0993-47B6-89C4-6972D0CA941C}" presName="text3" presStyleLbl="fgAcc3" presStyleIdx="1" presStyleCnt="6">
+    <dgm:pt modelId="{473607A1-27FB-4066-9BF8-178C56FE0884}" type="pres">
+      <dgm:prSet presAssocID="{D569D02A-F937-4D6C-94F5-E1A26484808F}" presName="Name17" presStyleLbl="parChTrans1D3" presStyleIdx="1" presStyleCnt="6"/>
+      <dgm:spPr/>
+      <dgm:t>
+        <a:bodyPr/>
+        <a:lstStyle/>
+        <a:p>
+          <a:endParaRPr lang="en-US"/>
+        </a:p>
+      </dgm:t>
+    </dgm:pt>
+    <dgm:pt modelId="{14F4B5FD-47A0-498E-B045-62C5FA24C0B1}" type="pres">
+      <dgm:prSet presAssocID="{661C1B7C-9DE2-4F22-9F48-D9E13FD0A79C}" presName="hierRoot3" presStyleCnt="0"/>
+      <dgm:spPr/>
+    </dgm:pt>
+    <dgm:pt modelId="{E4E30506-6B2D-48AE-B58D-7CC98EBE1D1A}" type="pres">
+      <dgm:prSet presAssocID="{661C1B7C-9DE2-4F22-9F48-D9E13FD0A79C}" presName="composite3" presStyleCnt="0"/>
+      <dgm:spPr/>
+    </dgm:pt>
+    <dgm:pt modelId="{293A0CDE-33F3-46EC-8856-E5BA013A63E4}" type="pres">
+      <dgm:prSet presAssocID="{661C1B7C-9DE2-4F22-9F48-D9E13FD0A79C}" presName="background3" presStyleLbl="node3" presStyleIdx="1" presStyleCnt="6"/>
+      <dgm:spPr/>
+    </dgm:pt>
+    <dgm:pt modelId="{32523095-824A-4E5E-BB13-108F6A7832E0}" type="pres">
+      <dgm:prSet presAssocID="{661C1B7C-9DE2-4F22-9F48-D9E13FD0A79C}" presName="text3" presStyleLbl="fgAcc3" presStyleIdx="1" presStyleCnt="6">
         <dgm:presLayoutVars>
           <dgm:chPref val="3"/>
         </dgm:presLayoutVars>
       </dgm:prSet>
       <dgm:spPr/>
-    </dgm:pt>
-    <dgm:pt modelId="{B1624760-0347-41AC-B52B-07007A5782D2}" type="pres">
-      <dgm:prSet presAssocID="{E9335B92-0993-47B6-89C4-6972D0CA941C}" presName="hierChild4" presStyleCnt="0"/>
-      <dgm:spPr/>
-    </dgm:pt>
-    <dgm:pt modelId="{AB4DEF6B-F751-4C7A-BF3F-FD72A33585F1}" type="pres">
-      <dgm:prSet presAssocID="{C55E3E45-29B2-4823-A3C7-C27C8F7667A0}" presName="Name23" presStyleLbl="parChTrans1D4" presStyleIdx="0" presStyleCnt="6"/>
-      <dgm:spPr/>
-    </dgm:pt>
-    <dgm:pt modelId="{58DC693E-E1D3-467A-B6CA-C8F50A302DDD}" type="pres">
-      <dgm:prSet presAssocID="{64F125AA-06E5-408C-92F0-29B683643E21}" presName="hierRoot4" presStyleCnt="0"/>
-      <dgm:spPr/>
-    </dgm:pt>
-    <dgm:pt modelId="{1B62C28E-3E70-4DD2-AE97-9BB6280B0519}" type="pres">
-      <dgm:prSet presAssocID="{64F125AA-06E5-408C-92F0-29B683643E21}" presName="composite4" presStyleCnt="0"/>
-      <dgm:spPr/>
-    </dgm:pt>
-    <dgm:pt modelId="{CE0F9948-6955-4301-8F2D-E0BD63D5DDCE}" type="pres">
-      <dgm:prSet presAssocID="{64F125AA-06E5-408C-92F0-29B683643E21}" presName="background4" presStyleLbl="node4" presStyleIdx="0" presStyleCnt="6"/>
-      <dgm:spPr/>
-    </dgm:pt>
-    <dgm:pt modelId="{9EDCDDC1-BD6E-485B-A244-E75823256875}" type="pres">
-      <dgm:prSet presAssocID="{64F125AA-06E5-408C-92F0-29B683643E21}" presName="text4" presStyleLbl="fgAcc4" presStyleIdx="0" presStyleCnt="6">
+      <dgm:t>
+        <a:bodyPr/>
+        <a:lstStyle/>
+        <a:p>
+          <a:endParaRPr lang="en-US"/>
+        </a:p>
+      </dgm:t>
+    </dgm:pt>
+    <dgm:pt modelId="{4542F0FE-00E5-453A-B97B-DAE3107FD65A}" type="pres">
+      <dgm:prSet presAssocID="{661C1B7C-9DE2-4F22-9F48-D9E13FD0A79C}" presName="hierChild4" presStyleCnt="0"/>
+      <dgm:spPr/>
+    </dgm:pt>
+    <dgm:pt modelId="{D7FFCED2-D1F7-4DA4-BB3E-2D58E8B264B2}" type="pres">
+      <dgm:prSet presAssocID="{1584C53A-2447-4E17-BF0C-3B02003F65C9}" presName="Name23" presStyleLbl="parChTrans1D4" presStyleIdx="0" presStyleCnt="6"/>
+      <dgm:spPr/>
+      <dgm:t>
+        <a:bodyPr/>
+        <a:lstStyle/>
+        <a:p>
+          <a:endParaRPr lang="en-US"/>
+        </a:p>
+      </dgm:t>
+    </dgm:pt>
+    <dgm:pt modelId="{3D6E0F52-D4E2-4F2D-A696-F99AA680D5B6}" type="pres">
+      <dgm:prSet presAssocID="{C46F31FD-7EF3-4F4B-8006-EB508A8405C9}" presName="hierRoot4" presStyleCnt="0"/>
+      <dgm:spPr/>
+    </dgm:pt>
+    <dgm:pt modelId="{DF224BC2-6718-4DB5-8CA7-323E60B772E0}" type="pres">
+      <dgm:prSet presAssocID="{C46F31FD-7EF3-4F4B-8006-EB508A8405C9}" presName="composite4" presStyleCnt="0"/>
+      <dgm:spPr/>
+    </dgm:pt>
+    <dgm:pt modelId="{C37F13D2-50DF-46CE-B8DA-DB2E58BF9FDF}" type="pres">
+      <dgm:prSet presAssocID="{C46F31FD-7EF3-4F4B-8006-EB508A8405C9}" presName="background4" presStyleLbl="node4" presStyleIdx="0" presStyleCnt="6"/>
+      <dgm:spPr/>
+    </dgm:pt>
+    <dgm:pt modelId="{177B5FD7-7D73-4372-BC75-34654571A3BB}" type="pres">
+      <dgm:prSet presAssocID="{C46F31FD-7EF3-4F4B-8006-EB508A8405C9}" presName="text4" presStyleLbl="fgAcc4" presStyleIdx="0" presStyleCnt="6">
         <dgm:presLayoutVars>
           <dgm:chPref val="3"/>
         </dgm:presLayoutVars>
       </dgm:prSet>
       <dgm:spPr/>
-    </dgm:pt>
-    <dgm:pt modelId="{8F6BDE23-129C-4537-9475-9D0A98BAFE26}" type="pres">
-      <dgm:prSet presAssocID="{64F125AA-06E5-408C-92F0-29B683643E21}" presName="hierChild5" presStyleCnt="0"/>
-      <dgm:spPr/>
-    </dgm:pt>
-    <dgm:pt modelId="{4E7DC508-651C-4AC7-A964-6592E1FBDF76}" type="pres">
-      <dgm:prSet presAssocID="{C9DAD4B7-FD70-4DA8-8A22-1CEC23CCEB6F}" presName="Name23" presStyleLbl="parChTrans1D4" presStyleIdx="1" presStyleCnt="6"/>
-      <dgm:spPr/>
-    </dgm:pt>
-    <dgm:pt modelId="{E3980E9A-6EAC-4DEF-B328-559B332EEC70}" type="pres">
-      <dgm:prSet presAssocID="{7A07C836-60D9-43DE-AF7A-2D0935F9CA94}" presName="hierRoot4" presStyleCnt="0"/>
-      <dgm:spPr/>
-    </dgm:pt>
-    <dgm:pt modelId="{1CF207BE-B511-4745-A2CB-E8F9615E4477}" type="pres">
-      <dgm:prSet presAssocID="{7A07C836-60D9-43DE-AF7A-2D0935F9CA94}" presName="composite4" presStyleCnt="0"/>
-      <dgm:spPr/>
-    </dgm:pt>
-    <dgm:pt modelId="{EC212F02-5A53-441E-BA40-74A46D8B49AA}" type="pres">
-      <dgm:prSet presAssocID="{7A07C836-60D9-43DE-AF7A-2D0935F9CA94}" presName="background4" presStyleLbl="node4" presStyleIdx="1" presStyleCnt="6"/>
-      <dgm:spPr/>
-    </dgm:pt>
-    <dgm:pt modelId="{F5D33BEE-6B78-4387-ABEC-A540DAF8CDC3}" type="pres">
-      <dgm:prSet presAssocID="{7A07C836-60D9-43DE-AF7A-2D0935F9CA94}" presName="text4" presStyleLbl="fgAcc4" presStyleIdx="1" presStyleCnt="6">
+      <dgm:t>
+        <a:bodyPr/>
+        <a:lstStyle/>
+        <a:p>
+          <a:endParaRPr lang="en-US"/>
+        </a:p>
+      </dgm:t>
+    </dgm:pt>
+    <dgm:pt modelId="{C85F226C-FD04-4104-B4B0-99C42A0CE069}" type="pres">
+      <dgm:prSet presAssocID="{C46F31FD-7EF3-4F4B-8006-EB508A8405C9}" presName="hierChild5" presStyleCnt="0"/>
+      <dgm:spPr/>
+    </dgm:pt>
+    <dgm:pt modelId="{324CF935-1935-47CA-83E5-96840FBFE437}" type="pres">
+      <dgm:prSet presAssocID="{BC132D8D-8A59-44F1-B428-7713B5EC9CE0}" presName="Name23" presStyleLbl="parChTrans1D4" presStyleIdx="1" presStyleCnt="6"/>
+      <dgm:spPr/>
+      <dgm:t>
+        <a:bodyPr/>
+        <a:lstStyle/>
+        <a:p>
+          <a:endParaRPr lang="en-US"/>
+        </a:p>
+      </dgm:t>
+    </dgm:pt>
+    <dgm:pt modelId="{291BC579-3B45-449C-9349-6D984D701B25}" type="pres">
+      <dgm:prSet presAssocID="{1B3B97B0-B938-409A-9DAC-AC4DD6ADD01A}" presName="hierRoot4" presStyleCnt="0"/>
+      <dgm:spPr/>
+    </dgm:pt>
+    <dgm:pt modelId="{795B192E-DE6C-446D-A2FC-42258C1BACB6}" type="pres">
+      <dgm:prSet presAssocID="{1B3B97B0-B938-409A-9DAC-AC4DD6ADD01A}" presName="composite4" presStyleCnt="0"/>
+      <dgm:spPr/>
+    </dgm:pt>
+    <dgm:pt modelId="{37473B37-D036-441C-AF30-D277B72B0661}" type="pres">
+      <dgm:prSet presAssocID="{1B3B97B0-B938-409A-9DAC-AC4DD6ADD01A}" presName="background4" presStyleLbl="node4" presStyleIdx="1" presStyleCnt="6"/>
+      <dgm:spPr/>
+    </dgm:pt>
+    <dgm:pt modelId="{20F962D1-CEF5-4AC2-8C8B-9B1FB6606F81}" type="pres">
+      <dgm:prSet presAssocID="{1B3B97B0-B938-409A-9DAC-AC4DD6ADD01A}" presName="text4" presStyleLbl="fgAcc4" presStyleIdx="1" presStyleCnt="6">
         <dgm:presLayoutVars>
           <dgm:chPref val="3"/>
         </dgm:presLayoutVars>
       </dgm:prSet>
       <dgm:spPr/>
-    </dgm:pt>
-    <dgm:pt modelId="{F70054BB-1C25-44F7-B3F3-A19F66A4F5F7}" type="pres">
-      <dgm:prSet presAssocID="{7A07C836-60D9-43DE-AF7A-2D0935F9CA94}" presName="hierChild5" presStyleCnt="0"/>
-      <dgm:spPr/>
-    </dgm:pt>
-    <dgm:pt modelId="{473607A1-27FB-4066-9BF8-178C56FE0884}" type="pres">
-      <dgm:prSet presAssocID="{D569D02A-F937-4D6C-94F5-E1A26484808F}" presName="Name17" presStyleLbl="parChTrans1D3" presStyleIdx="2" presStyleCnt="6"/>
-      <dgm:spPr/>
-    </dgm:pt>
-    <dgm:pt modelId="{14F4B5FD-47A0-498E-B045-62C5FA24C0B1}" type="pres">
-      <dgm:prSet presAssocID="{661C1B7C-9DE2-4F22-9F48-D9E13FD0A79C}" presName="hierRoot3" presStyleCnt="0"/>
-      <dgm:spPr/>
-    </dgm:pt>
-    <dgm:pt modelId="{E4E30506-6B2D-48AE-B58D-7CC98EBE1D1A}" type="pres">
-      <dgm:prSet presAssocID="{661C1B7C-9DE2-4F22-9F48-D9E13FD0A79C}" presName="composite3" presStyleCnt="0"/>
-      <dgm:spPr/>
-    </dgm:pt>
-    <dgm:pt modelId="{293A0CDE-33F3-46EC-8856-E5BA013A63E4}" type="pres">
-      <dgm:prSet presAssocID="{661C1B7C-9DE2-4F22-9F48-D9E13FD0A79C}" presName="background3" presStyleLbl="node3" presStyleIdx="2" presStyleCnt="6"/>
-      <dgm:spPr/>
-    </dgm:pt>
-    <dgm:pt modelId="{32523095-824A-4E5E-BB13-108F6A7832E0}" type="pres">
-      <dgm:prSet presAssocID="{661C1B7C-9DE2-4F22-9F48-D9E13FD0A79C}" presName="text3" presStyleLbl="fgAcc3" presStyleIdx="2" presStyleCnt="6">
+      <dgm:t>
+        <a:bodyPr/>
+        <a:lstStyle/>
+        <a:p>
+          <a:endParaRPr lang="en-US"/>
+        </a:p>
+      </dgm:t>
+    </dgm:pt>
+    <dgm:pt modelId="{EC06A080-4EA3-4270-B6C0-492C4204E145}" type="pres">
+      <dgm:prSet presAssocID="{1B3B97B0-B938-409A-9DAC-AC4DD6ADD01A}" presName="hierChild5" presStyleCnt="0"/>
+      <dgm:spPr/>
+    </dgm:pt>
+    <dgm:pt modelId="{F97D9EDF-E13F-4D0F-8781-B5A71300B23F}" type="pres">
+      <dgm:prSet presAssocID="{739CE320-AEBA-41DF-A329-8EC1ABB51056}" presName="Name23" presStyleLbl="parChTrans1D4" presStyleIdx="2" presStyleCnt="6"/>
+      <dgm:spPr/>
+      <dgm:t>
+        <a:bodyPr/>
+        <a:lstStyle/>
+        <a:p>
+          <a:endParaRPr lang="en-US"/>
+        </a:p>
+      </dgm:t>
+    </dgm:pt>
+    <dgm:pt modelId="{D7133F53-39AA-4123-9CB2-219D8D78E05A}" type="pres">
+      <dgm:prSet presAssocID="{8A45DCF4-0B7F-46CA-9AEF-991A8D1BAF57}" presName="hierRoot4" presStyleCnt="0"/>
+      <dgm:spPr/>
+    </dgm:pt>
+    <dgm:pt modelId="{18932B38-A7C3-4E2A-920A-A5663DA6AF2B}" type="pres">
+      <dgm:prSet presAssocID="{8A45DCF4-0B7F-46CA-9AEF-991A8D1BAF57}" presName="composite4" presStyleCnt="0"/>
+      <dgm:spPr/>
+    </dgm:pt>
+    <dgm:pt modelId="{7EA5CF7E-3592-4848-AEBD-D3159C97287C}" type="pres">
+      <dgm:prSet presAssocID="{8A45DCF4-0B7F-46CA-9AEF-991A8D1BAF57}" presName="background4" presStyleLbl="node4" presStyleIdx="2" presStyleCnt="6"/>
+      <dgm:spPr/>
+    </dgm:pt>
+    <dgm:pt modelId="{A29A621D-FDB0-41DF-A1D4-75FD9D5980A5}" type="pres">
+      <dgm:prSet presAssocID="{8A45DCF4-0B7F-46CA-9AEF-991A8D1BAF57}" presName="text4" presStyleLbl="fgAcc4" presStyleIdx="2" presStyleCnt="6">
         <dgm:presLayoutVars>
           <dgm:chPref val="3"/>
         </dgm:presLayoutVars>
       </dgm:prSet>
       <dgm:spPr/>
-    </dgm:pt>
-    <dgm:pt modelId="{4542F0FE-00E5-453A-B97B-DAE3107FD65A}" type="pres">
-      <dgm:prSet presAssocID="{661C1B7C-9DE2-4F22-9F48-D9E13FD0A79C}" presName="hierChild4" presStyleCnt="0"/>
-      <dgm:spPr/>
-    </dgm:pt>
-    <dgm:pt modelId="{D7FFCED2-D1F7-4DA4-BB3E-2D58E8B264B2}" type="pres">
-      <dgm:prSet presAssocID="{1584C53A-2447-4E17-BF0C-3B02003F65C9}" presName="Name23" presStyleLbl="parChTrans1D4" presStyleIdx="2" presStyleCnt="6"/>
-      <dgm:spPr/>
-    </dgm:pt>
-    <dgm:pt modelId="{3D6E0F52-D4E2-4F2D-A696-F99AA680D5B6}" type="pres">
-      <dgm:prSet presAssocID="{C46F31FD-7EF3-4F4B-8006-EB508A8405C9}" presName="hierRoot4" presStyleCnt="0"/>
-      <dgm:spPr/>
-    </dgm:pt>
-    <dgm:pt modelId="{DF224BC2-6718-4DB5-8CA7-323E60B772E0}" type="pres">
-      <dgm:prSet presAssocID="{C46F31FD-7EF3-4F4B-8006-EB508A8405C9}" presName="composite4" presStyleCnt="0"/>
-      <dgm:spPr/>
-    </dgm:pt>
-    <dgm:pt modelId="{C37F13D2-50DF-46CE-B8DA-DB2E58BF9FDF}" type="pres">
-      <dgm:prSet presAssocID="{C46F31FD-7EF3-4F4B-8006-EB508A8405C9}" presName="background4" presStyleLbl="node4" presStyleIdx="2" presStyleCnt="6"/>
-      <dgm:spPr/>
-    </dgm:pt>
-    <dgm:pt modelId="{177B5FD7-7D73-4372-BC75-34654571A3BB}" type="pres">
-      <dgm:prSet presAssocID="{C46F31FD-7EF3-4F4B-8006-EB508A8405C9}" presName="text4" presStyleLbl="fgAcc4" presStyleIdx="2" presStyleCnt="6">
+      <dgm:t>
+        <a:bodyPr/>
+        <a:lstStyle/>
+        <a:p>
+          <a:endParaRPr lang="en-US"/>
+        </a:p>
+      </dgm:t>
+    </dgm:pt>
+    <dgm:pt modelId="{02328E74-9A9C-4760-B858-D3F30E2EA876}" type="pres">
+      <dgm:prSet presAssocID="{8A45DCF4-0B7F-46CA-9AEF-991A8D1BAF57}" presName="hierChild5" presStyleCnt="0"/>
+      <dgm:spPr/>
+    </dgm:pt>
+    <dgm:pt modelId="{25CB3E1E-92FB-4EC3-9A10-DAD0D4E284CF}" type="pres">
+      <dgm:prSet presAssocID="{76F1315D-B542-43FB-9D86-6BE542DF0E15}" presName="Name23" presStyleLbl="parChTrans1D4" presStyleIdx="3" presStyleCnt="6"/>
+      <dgm:spPr/>
+      <dgm:t>
+        <a:bodyPr/>
+        <a:lstStyle/>
+        <a:p>
+          <a:endParaRPr lang="en-US"/>
+        </a:p>
+      </dgm:t>
+    </dgm:pt>
+    <dgm:pt modelId="{7AD8DACF-6C37-473E-B3BE-41D7929DF690}" type="pres">
+      <dgm:prSet presAssocID="{7162E3DE-4C59-4744-BCED-861246BAEF57}" presName="hierRoot4" presStyleCnt="0"/>
+      <dgm:spPr/>
+    </dgm:pt>
+    <dgm:pt modelId="{EB431D17-9CF6-4E51-ABB0-7196C0E0A81B}" type="pres">
+      <dgm:prSet presAssocID="{7162E3DE-4C59-4744-BCED-861246BAEF57}" presName="composite4" presStyleCnt="0"/>
+      <dgm:spPr/>
+    </dgm:pt>
+    <dgm:pt modelId="{85C74A9C-AAF1-40A4-BEAC-47F880039518}" type="pres">
+      <dgm:prSet presAssocID="{7162E3DE-4C59-4744-BCED-861246BAEF57}" presName="background4" presStyleLbl="node4" presStyleIdx="3" presStyleCnt="6"/>
+      <dgm:spPr/>
+    </dgm:pt>
+    <dgm:pt modelId="{20B05BA1-6646-492F-999C-1460239F9202}" type="pres">
+      <dgm:prSet presAssocID="{7162E3DE-4C59-4744-BCED-861246BAEF57}" presName="text4" presStyleLbl="fgAcc4" presStyleIdx="3" presStyleCnt="6">
         <dgm:presLayoutVars>
           <dgm:chPref val="3"/>
         </dgm:presLayoutVars>
       </dgm:prSet>
       <dgm:spPr/>
-    </dgm:pt>
-    <dgm:pt modelId="{C85F226C-FD04-4104-B4B0-99C42A0CE069}" type="pres">
-      <dgm:prSet presAssocID="{C46F31FD-7EF3-4F4B-8006-EB508A8405C9}" presName="hierChild5" presStyleCnt="0"/>
-      <dgm:spPr/>
-    </dgm:pt>
-    <dgm:pt modelId="{324CF935-1935-47CA-83E5-96840FBFE437}" type="pres">
-      <dgm:prSet presAssocID="{BC132D8D-8A59-44F1-B428-7713B5EC9CE0}" presName="Name23" presStyleLbl="parChTrans1D4" presStyleIdx="3" presStyleCnt="6"/>
-      <dgm:spPr/>
-    </dgm:pt>
-    <dgm:pt modelId="{291BC579-3B45-449C-9349-6D984D701B25}" type="pres">
-      <dgm:prSet presAssocID="{1B3B97B0-B938-409A-9DAC-AC4DD6ADD01A}" presName="hierRoot4" presStyleCnt="0"/>
-      <dgm:spPr/>
-    </dgm:pt>
-    <dgm:pt modelId="{795B192E-DE6C-446D-A2FC-42258C1BACB6}" type="pres">
-      <dgm:prSet presAssocID="{1B3B97B0-B938-409A-9DAC-AC4DD6ADD01A}" presName="composite4" presStyleCnt="0"/>
-      <dgm:spPr/>
-    </dgm:pt>
-    <dgm:pt modelId="{37473B37-D036-441C-AF30-D277B72B0661}" type="pres">
-      <dgm:prSet presAssocID="{1B3B97B0-B938-409A-9DAC-AC4DD6ADD01A}" presName="background4" presStyleLbl="node4" presStyleIdx="3" presStyleCnt="6"/>
-      <dgm:spPr/>
-    </dgm:pt>
-    <dgm:pt modelId="{20F962D1-CEF5-4AC2-8C8B-9B1FB6606F81}" type="pres">
-      <dgm:prSet presAssocID="{1B3B97B0-B938-409A-9DAC-AC4DD6ADD01A}" presName="text4" presStyleLbl="fgAcc4" presStyleIdx="3" presStyleCnt="6">
-        <dgm:presLayoutVars>
-          <dgm:chPref val="3"/>
-        </dgm:presLayoutVars>
-      </dgm:prSet>
-      <dgm:spPr/>
-    </dgm:pt>
-    <dgm:pt modelId="{EC06A080-4EA3-4270-B6C0-492C4204E145}" type="pres">
-      <dgm:prSet presAssocID="{1B3B97B0-B938-409A-9DAC-AC4DD6ADD01A}" presName="hierChild5" presStyleCnt="0"/>
-      <dgm:spPr/>
-    </dgm:pt>
-    <dgm:pt modelId="{F97D9EDF-E13F-4D0F-8781-B5A71300B23F}" type="pres">
-      <dgm:prSet presAssocID="{739CE320-AEBA-41DF-A329-8EC1ABB51056}" presName="Name23" presStyleLbl="parChTrans1D4" presStyleIdx="4" presStyleCnt="6"/>
-      <dgm:spPr/>
-    </dgm:pt>
-    <dgm:pt modelId="{D7133F53-39AA-4123-9CB2-219D8D78E05A}" type="pres">
-      <dgm:prSet presAssocID="{8A45DCF4-0B7F-46CA-9AEF-991A8D1BAF57}" presName="hierRoot4" presStyleCnt="0"/>
-      <dgm:spPr/>
-    </dgm:pt>
-    <dgm:pt modelId="{18932B38-A7C3-4E2A-920A-A5663DA6AF2B}" type="pres">
-      <dgm:prSet presAssocID="{8A45DCF4-0B7F-46CA-9AEF-991A8D1BAF57}" presName="composite4" presStyleCnt="0"/>
-      <dgm:spPr/>
-    </dgm:pt>
-    <dgm:pt modelId="{7EA5CF7E-3592-4848-AEBD-D3159C97287C}" type="pres">
-      <dgm:prSet presAssocID="{8A45DCF4-0B7F-46CA-9AEF-991A8D1BAF57}" presName="background4" presStyleLbl="node4" presStyleIdx="4" presStyleCnt="6"/>
-      <dgm:spPr/>
-    </dgm:pt>
-    <dgm:pt modelId="{A29A621D-FDB0-41DF-A1D4-75FD9D5980A5}" type="pres">
-      <dgm:prSet presAssocID="{8A45DCF4-0B7F-46CA-9AEF-991A8D1BAF57}" presName="text4" presStyleLbl="fgAcc4" presStyleIdx="4" presStyleCnt="6">
-        <dgm:presLayoutVars>
-          <dgm:chPref val="3"/>
-        </dgm:presLayoutVars>
-      </dgm:prSet>
-      <dgm:spPr/>
-    </dgm:pt>
-    <dgm:pt modelId="{02328E74-9A9C-4760-B858-D3F30E2EA876}" type="pres">
-      <dgm:prSet presAssocID="{8A45DCF4-0B7F-46CA-9AEF-991A8D1BAF57}" presName="hierChild5" presStyleCnt="0"/>
-      <dgm:spPr/>
-    </dgm:pt>
-    <dgm:pt modelId="{25CB3E1E-92FB-4EC3-9A10-DAD0D4E284CF}" type="pres">
-      <dgm:prSet presAssocID="{76F1315D-B542-43FB-9D86-6BE542DF0E15}" presName="Name23" presStyleLbl="parChTrans1D4" presStyleIdx="5" presStyleCnt="6"/>
-      <dgm:spPr/>
-    </dgm:pt>
-    <dgm:pt modelId="{7AD8DACF-6C37-473E-B3BE-41D7929DF690}" type="pres">
-      <dgm:prSet presAssocID="{7162E3DE-4C59-4744-BCED-861246BAEF57}" presName="hierRoot4" presStyleCnt="0"/>
-      <dgm:spPr/>
-    </dgm:pt>
-    <dgm:pt modelId="{EB431D17-9CF6-4E51-ABB0-7196C0E0A81B}" type="pres">
-      <dgm:prSet presAssocID="{7162E3DE-4C59-4744-BCED-861246BAEF57}" presName="composite4" presStyleCnt="0"/>
-      <dgm:spPr/>
-    </dgm:pt>
-    <dgm:pt modelId="{85C74A9C-AAF1-40A4-BEAC-47F880039518}" type="pres">
-      <dgm:prSet presAssocID="{7162E3DE-4C59-4744-BCED-861246BAEF57}" presName="background4" presStyleLbl="node4" presStyleIdx="5" presStyleCnt="6"/>
-      <dgm:spPr/>
-    </dgm:pt>
-    <dgm:pt modelId="{20B05BA1-6646-492F-999C-1460239F9202}" type="pres">
-      <dgm:prSet presAssocID="{7162E3DE-4C59-4744-BCED-861246BAEF57}" presName="text4" presStyleLbl="fgAcc4" presStyleIdx="5" presStyleCnt="6">
-        <dgm:presLayoutVars>
-          <dgm:chPref val="3"/>
-        </dgm:presLayoutVars>
-      </dgm:prSet>
-      <dgm:spPr/>
+      <dgm:t>
+        <a:bodyPr/>
+        <a:lstStyle/>
+        <a:p>
+          <a:endParaRPr lang="en-US"/>
+        </a:p>
+      </dgm:t>
     </dgm:pt>
     <dgm:pt modelId="{5B558020-9358-4DF4-9D37-7F7E70282668}" type="pres">
       <dgm:prSet presAssocID="{7162E3DE-4C59-4744-BCED-861246BAEF57}" presName="hierChild5" presStyleCnt="0"/>
@@ -2524,6 +2557,13 @@
     <dgm:pt modelId="{A787A79F-FE1A-477E-83CD-31B61485D15B}" type="pres">
       <dgm:prSet presAssocID="{895A8415-186E-42CB-BDCC-8AB59FE0924A}" presName="Name10" presStyleLbl="parChTrans1D2" presStyleIdx="1" presStyleCnt="2"/>
       <dgm:spPr/>
+      <dgm:t>
+        <a:bodyPr/>
+        <a:lstStyle/>
+        <a:p>
+          <a:endParaRPr lang="en-US"/>
+        </a:p>
+      </dgm:t>
     </dgm:pt>
     <dgm:pt modelId="{200DA2B1-DB13-4514-A7C7-571C481AC327}" type="pres">
       <dgm:prSet presAssocID="{A1F77813-DA0D-40D1-849D-ADC41B82CA0A}" presName="hierRoot2" presStyleCnt="0"/>
@@ -2544,14 +2584,28 @@
         </dgm:presLayoutVars>
       </dgm:prSet>
       <dgm:spPr/>
+      <dgm:t>
+        <a:bodyPr/>
+        <a:lstStyle/>
+        <a:p>
+          <a:endParaRPr lang="en-US"/>
+        </a:p>
+      </dgm:t>
     </dgm:pt>
     <dgm:pt modelId="{74DD70C0-1A9D-4786-BF4C-4C79CB3BB47E}" type="pres">
       <dgm:prSet presAssocID="{A1F77813-DA0D-40D1-849D-ADC41B82CA0A}" presName="hierChild3" presStyleCnt="0"/>
       <dgm:spPr/>
     </dgm:pt>
     <dgm:pt modelId="{D63F6A73-1AA5-4E17-A1AA-CDEF17CF0698}" type="pres">
-      <dgm:prSet presAssocID="{EA9BA22A-E1F0-45A9-A49C-BFCDA2B55294}" presName="Name17" presStyleLbl="parChTrans1D3" presStyleIdx="3" presStyleCnt="6"/>
-      <dgm:spPr/>
+      <dgm:prSet presAssocID="{EA9BA22A-E1F0-45A9-A49C-BFCDA2B55294}" presName="Name17" presStyleLbl="parChTrans1D3" presStyleIdx="2" presStyleCnt="6"/>
+      <dgm:spPr/>
+      <dgm:t>
+        <a:bodyPr/>
+        <a:lstStyle/>
+        <a:p>
+          <a:endParaRPr lang="en-US"/>
+        </a:p>
+      </dgm:t>
     </dgm:pt>
     <dgm:pt modelId="{19BD0C4C-4CB7-4910-AE37-DEE6BA3AA649}" type="pres">
       <dgm:prSet presAssocID="{4E3C1994-F7FD-4AA9-A246-70726C143854}" presName="hierRoot3" presStyleCnt="0"/>
@@ -2562,24 +2616,38 @@
       <dgm:spPr/>
     </dgm:pt>
     <dgm:pt modelId="{E05D9250-02A1-466E-9394-D878C6B21066}" type="pres">
-      <dgm:prSet presAssocID="{4E3C1994-F7FD-4AA9-A246-70726C143854}" presName="background3" presStyleLbl="node3" presStyleIdx="3" presStyleCnt="6"/>
+      <dgm:prSet presAssocID="{4E3C1994-F7FD-4AA9-A246-70726C143854}" presName="background3" presStyleLbl="node3" presStyleIdx="2" presStyleCnt="6"/>
       <dgm:spPr/>
     </dgm:pt>
     <dgm:pt modelId="{9450FCFE-5D5E-48BB-B65E-15E8D1D3F1C8}" type="pres">
-      <dgm:prSet presAssocID="{4E3C1994-F7FD-4AA9-A246-70726C143854}" presName="text3" presStyleLbl="fgAcc3" presStyleIdx="3" presStyleCnt="6">
+      <dgm:prSet presAssocID="{4E3C1994-F7FD-4AA9-A246-70726C143854}" presName="text3" presStyleLbl="fgAcc3" presStyleIdx="2" presStyleCnt="6">
         <dgm:presLayoutVars>
           <dgm:chPref val="3"/>
         </dgm:presLayoutVars>
       </dgm:prSet>
       <dgm:spPr/>
+      <dgm:t>
+        <a:bodyPr/>
+        <a:lstStyle/>
+        <a:p>
+          <a:endParaRPr lang="en-US"/>
+        </a:p>
+      </dgm:t>
     </dgm:pt>
     <dgm:pt modelId="{23A957FA-95B7-4FA1-9693-52C098751AE4}" type="pres">
       <dgm:prSet presAssocID="{4E3C1994-F7FD-4AA9-A246-70726C143854}" presName="hierChild4" presStyleCnt="0"/>
       <dgm:spPr/>
     </dgm:pt>
     <dgm:pt modelId="{5F05445E-1615-45FE-91D2-CAEDE209D812}" type="pres">
-      <dgm:prSet presAssocID="{AB724194-8C5F-4EC8-85D3-603E2D37F61D}" presName="Name17" presStyleLbl="parChTrans1D3" presStyleIdx="4" presStyleCnt="6"/>
-      <dgm:spPr/>
+      <dgm:prSet presAssocID="{AB724194-8C5F-4EC8-85D3-603E2D37F61D}" presName="Name17" presStyleLbl="parChTrans1D3" presStyleIdx="3" presStyleCnt="6"/>
+      <dgm:spPr/>
+      <dgm:t>
+        <a:bodyPr/>
+        <a:lstStyle/>
+        <a:p>
+          <a:endParaRPr lang="en-US"/>
+        </a:p>
+      </dgm:t>
     </dgm:pt>
     <dgm:pt modelId="{DFCE1A6F-019D-4538-B805-6D6247E2BD3A}" type="pres">
       <dgm:prSet presAssocID="{05CF61FD-F37E-4903-AD79-70AA9CB12F3F}" presName="hierRoot3" presStyleCnt="0"/>
@@ -2590,24 +2658,38 @@
       <dgm:spPr/>
     </dgm:pt>
     <dgm:pt modelId="{D1DB5463-056A-4879-ADA8-42770FCA7B99}" type="pres">
-      <dgm:prSet presAssocID="{05CF61FD-F37E-4903-AD79-70AA9CB12F3F}" presName="background3" presStyleLbl="node3" presStyleIdx="4" presStyleCnt="6"/>
+      <dgm:prSet presAssocID="{05CF61FD-F37E-4903-AD79-70AA9CB12F3F}" presName="background3" presStyleLbl="node3" presStyleIdx="3" presStyleCnt="6"/>
       <dgm:spPr/>
     </dgm:pt>
     <dgm:pt modelId="{32C02F5D-2AFD-4AEB-B702-B9D5EDFC6578}" type="pres">
-      <dgm:prSet presAssocID="{05CF61FD-F37E-4903-AD79-70AA9CB12F3F}" presName="text3" presStyleLbl="fgAcc3" presStyleIdx="4" presStyleCnt="6">
+      <dgm:prSet presAssocID="{05CF61FD-F37E-4903-AD79-70AA9CB12F3F}" presName="text3" presStyleLbl="fgAcc3" presStyleIdx="3" presStyleCnt="6">
         <dgm:presLayoutVars>
           <dgm:chPref val="3"/>
         </dgm:presLayoutVars>
       </dgm:prSet>
       <dgm:spPr/>
+      <dgm:t>
+        <a:bodyPr/>
+        <a:lstStyle/>
+        <a:p>
+          <a:endParaRPr lang="en-US"/>
+        </a:p>
+      </dgm:t>
     </dgm:pt>
     <dgm:pt modelId="{CE844B5D-CFD6-46F3-8F96-FA66B458E731}" type="pres">
       <dgm:prSet presAssocID="{05CF61FD-F37E-4903-AD79-70AA9CB12F3F}" presName="hierChild4" presStyleCnt="0"/>
       <dgm:spPr/>
     </dgm:pt>
     <dgm:pt modelId="{1DA52C46-0957-45D5-84AB-55922474A93E}" type="pres">
-      <dgm:prSet presAssocID="{D9BCAE30-25CA-412D-BFB1-7A093D7B456C}" presName="Name17" presStyleLbl="parChTrans1D3" presStyleIdx="5" presStyleCnt="6"/>
-      <dgm:spPr/>
+      <dgm:prSet presAssocID="{D9BCAE30-25CA-412D-BFB1-7A093D7B456C}" presName="Name17" presStyleLbl="parChTrans1D3" presStyleIdx="4" presStyleCnt="6"/>
+      <dgm:spPr/>
+      <dgm:t>
+        <a:bodyPr/>
+        <a:lstStyle/>
+        <a:p>
+          <a:endParaRPr lang="en-US"/>
+        </a:p>
+      </dgm:t>
     </dgm:pt>
     <dgm:pt modelId="{B361F2AB-21D9-4FF8-AA78-C63CDCC29FE2}" type="pres">
       <dgm:prSet presAssocID="{97CC8D6F-7204-402E-87DC-7604A04F6E35}" presName="hierRoot3" presStyleCnt="0"/>
@@ -2618,68 +2700,180 @@
       <dgm:spPr/>
     </dgm:pt>
     <dgm:pt modelId="{B898930F-812D-4B70-A930-6FC5D6860FF4}" type="pres">
-      <dgm:prSet presAssocID="{97CC8D6F-7204-402E-87DC-7604A04F6E35}" presName="background3" presStyleLbl="node3" presStyleIdx="5" presStyleCnt="6"/>
+      <dgm:prSet presAssocID="{97CC8D6F-7204-402E-87DC-7604A04F6E35}" presName="background3" presStyleLbl="node3" presStyleIdx="4" presStyleCnt="6"/>
       <dgm:spPr/>
     </dgm:pt>
     <dgm:pt modelId="{B6D96C63-9EA5-4EBC-BCFA-CF10C3B1CC41}" type="pres">
-      <dgm:prSet presAssocID="{97CC8D6F-7204-402E-87DC-7604A04F6E35}" presName="text3" presStyleLbl="fgAcc3" presStyleIdx="5" presStyleCnt="6" custScaleX="134485">
+      <dgm:prSet presAssocID="{97CC8D6F-7204-402E-87DC-7604A04F6E35}" presName="text3" presStyleLbl="fgAcc3" presStyleIdx="4" presStyleCnt="6" custScaleX="134485">
         <dgm:presLayoutVars>
           <dgm:chPref val="3"/>
         </dgm:presLayoutVars>
       </dgm:prSet>
       <dgm:spPr/>
+      <dgm:t>
+        <a:bodyPr/>
+        <a:lstStyle/>
+        <a:p>
+          <a:endParaRPr lang="en-US"/>
+        </a:p>
+      </dgm:t>
     </dgm:pt>
     <dgm:pt modelId="{98607042-D20F-4DCA-91D3-97310D23C553}" type="pres">
       <dgm:prSet presAssocID="{97CC8D6F-7204-402E-87DC-7604A04F6E35}" presName="hierChild4" presStyleCnt="0"/>
       <dgm:spPr/>
     </dgm:pt>
+    <dgm:pt modelId="{A5C7B76E-693C-419E-80D9-A29E24C8EA4A}" type="pres">
+      <dgm:prSet presAssocID="{407FEB63-8158-4A0B-85C2-5B7A8B48439B}" presName="Name17" presStyleLbl="parChTrans1D3" presStyleIdx="5" presStyleCnt="6"/>
+      <dgm:spPr/>
+    </dgm:pt>
+    <dgm:pt modelId="{FC80C44F-44C5-45E4-B448-44CA66B1FE92}" type="pres">
+      <dgm:prSet presAssocID="{4AB3E4C6-43C2-48D1-A38B-01ECD40F1524}" presName="hierRoot3" presStyleCnt="0"/>
+      <dgm:spPr/>
+    </dgm:pt>
+    <dgm:pt modelId="{13383E24-A607-4C77-980F-7C484C201091}" type="pres">
+      <dgm:prSet presAssocID="{4AB3E4C6-43C2-48D1-A38B-01ECD40F1524}" presName="composite3" presStyleCnt="0"/>
+      <dgm:spPr/>
+    </dgm:pt>
+    <dgm:pt modelId="{295D90B2-D32A-4489-A429-CF0E105F5327}" type="pres">
+      <dgm:prSet presAssocID="{4AB3E4C6-43C2-48D1-A38B-01ECD40F1524}" presName="background3" presStyleLbl="node3" presStyleIdx="5" presStyleCnt="6"/>
+      <dgm:spPr/>
+    </dgm:pt>
+    <dgm:pt modelId="{103AD321-37C2-4DAA-B852-908F5B3EB6A8}" type="pres">
+      <dgm:prSet presAssocID="{4AB3E4C6-43C2-48D1-A38B-01ECD40F1524}" presName="text3" presStyleLbl="fgAcc3" presStyleIdx="5" presStyleCnt="6">
+        <dgm:presLayoutVars>
+          <dgm:chPref val="3"/>
+        </dgm:presLayoutVars>
+      </dgm:prSet>
+      <dgm:spPr/>
+      <dgm:t>
+        <a:bodyPr/>
+        <a:lstStyle/>
+        <a:p>
+          <a:endParaRPr lang="en-US"/>
+        </a:p>
+      </dgm:t>
+    </dgm:pt>
+    <dgm:pt modelId="{2D99F221-B4BC-4817-B919-E290D01C2906}" type="pres">
+      <dgm:prSet presAssocID="{4AB3E4C6-43C2-48D1-A38B-01ECD40F1524}" presName="hierChild4" presStyleCnt="0"/>
+      <dgm:spPr/>
+    </dgm:pt>
+    <dgm:pt modelId="{08D92B9D-B990-423A-876F-1E3FED113F39}" type="pres">
+      <dgm:prSet presAssocID="{43F3177A-6443-45D1-BB60-F0C6515A522C}" presName="Name23" presStyleLbl="parChTrans1D4" presStyleIdx="4" presStyleCnt="6"/>
+      <dgm:spPr/>
+    </dgm:pt>
+    <dgm:pt modelId="{88925BA9-63E3-4E9F-82A1-1FFB5B7B5BD3}" type="pres">
+      <dgm:prSet presAssocID="{4515D76F-57B5-49C6-A6F1-D374F67D1C57}" presName="hierRoot4" presStyleCnt="0"/>
+      <dgm:spPr/>
+    </dgm:pt>
+    <dgm:pt modelId="{79FE83DE-4C87-440A-80C3-8C241A54F12F}" type="pres">
+      <dgm:prSet presAssocID="{4515D76F-57B5-49C6-A6F1-D374F67D1C57}" presName="composite4" presStyleCnt="0"/>
+      <dgm:spPr/>
+    </dgm:pt>
+    <dgm:pt modelId="{939DAF17-CDD6-4135-AE9C-F83D4C44C91B}" type="pres">
+      <dgm:prSet presAssocID="{4515D76F-57B5-49C6-A6F1-D374F67D1C57}" presName="background4" presStyleLbl="node4" presStyleIdx="4" presStyleCnt="6"/>
+      <dgm:spPr/>
+    </dgm:pt>
+    <dgm:pt modelId="{0EF8C61B-402E-46C8-A5B4-80DF33CB4364}" type="pres">
+      <dgm:prSet presAssocID="{4515D76F-57B5-49C6-A6F1-D374F67D1C57}" presName="text4" presStyleLbl="fgAcc4" presStyleIdx="4" presStyleCnt="6">
+        <dgm:presLayoutVars>
+          <dgm:chPref val="3"/>
+        </dgm:presLayoutVars>
+      </dgm:prSet>
+      <dgm:spPr/>
+      <dgm:t>
+        <a:bodyPr/>
+        <a:lstStyle/>
+        <a:p>
+          <a:endParaRPr lang="en-US"/>
+        </a:p>
+      </dgm:t>
+    </dgm:pt>
+    <dgm:pt modelId="{34AD7175-B254-4011-905B-1B28FD034CFB}" type="pres">
+      <dgm:prSet presAssocID="{4515D76F-57B5-49C6-A6F1-D374F67D1C57}" presName="hierChild5" presStyleCnt="0"/>
+      <dgm:spPr/>
+    </dgm:pt>
+    <dgm:pt modelId="{30CE19D5-C21C-471E-A851-7A903D8FE7CD}" type="pres">
+      <dgm:prSet presAssocID="{56856F2B-3CEE-4255-992F-EF7B88167994}" presName="Name23" presStyleLbl="parChTrans1D4" presStyleIdx="5" presStyleCnt="6"/>
+      <dgm:spPr/>
+    </dgm:pt>
+    <dgm:pt modelId="{FECF9DA1-2C76-499B-A2C5-0308E310D50F}" type="pres">
+      <dgm:prSet presAssocID="{B9051C09-EEE7-4B39-97BB-062B0ADD8898}" presName="hierRoot4" presStyleCnt="0"/>
+      <dgm:spPr/>
+    </dgm:pt>
+    <dgm:pt modelId="{5DB3C1C0-4477-4A48-AAAB-4696F24CE13C}" type="pres">
+      <dgm:prSet presAssocID="{B9051C09-EEE7-4B39-97BB-062B0ADD8898}" presName="composite4" presStyleCnt="0"/>
+      <dgm:spPr/>
+    </dgm:pt>
+    <dgm:pt modelId="{84B620C5-363F-4C1E-9940-E9AB072DE63B}" type="pres">
+      <dgm:prSet presAssocID="{B9051C09-EEE7-4B39-97BB-062B0ADD8898}" presName="background4" presStyleLbl="node4" presStyleIdx="5" presStyleCnt="6"/>
+      <dgm:spPr/>
+    </dgm:pt>
+    <dgm:pt modelId="{A25BC8F9-7585-41FB-BA74-6F019EEC87A7}" type="pres">
+      <dgm:prSet presAssocID="{B9051C09-EEE7-4B39-97BB-062B0ADD8898}" presName="text4" presStyleLbl="fgAcc4" presStyleIdx="5" presStyleCnt="6">
+        <dgm:presLayoutVars>
+          <dgm:chPref val="3"/>
+        </dgm:presLayoutVars>
+      </dgm:prSet>
+      <dgm:spPr/>
+      <dgm:t>
+        <a:bodyPr/>
+        <a:lstStyle/>
+        <a:p>
+          <a:endParaRPr lang="en-US"/>
+        </a:p>
+      </dgm:t>
+    </dgm:pt>
+    <dgm:pt modelId="{DB0053A0-0014-4E2D-BFE3-082A5275F560}" type="pres">
+      <dgm:prSet presAssocID="{B9051C09-EEE7-4B39-97BB-062B0ADD8898}" presName="hierChild5" presStyleCnt="0"/>
+      <dgm:spPr/>
+    </dgm:pt>
   </dgm:ptLst>
   <dgm:cxnLst>
+    <dgm:cxn modelId="{9C57A9D3-69FC-4592-87D8-2410B37AF685}" srcId="{1245DEF0-43F9-4230-A81A-980D178A756B}" destId="{661C1B7C-9DE2-4F22-9F48-D9E13FD0A79C}" srcOrd="1" destOrd="0" parTransId="{D569D02A-F937-4D6C-94F5-E1A26484808F}" sibTransId="{3DF7AEEB-672D-4A22-822B-E33F06B96715}"/>
+    <dgm:cxn modelId="{E541FA80-401F-437A-8E87-47D9C74EA60E}" type="presOf" srcId="{B43C9653-F421-437D-A8FF-7EE550C290C6}" destId="{5C3B16B1-445C-4658-9392-3CFE011BBD0E}" srcOrd="0" destOrd="0" presId="urn:microsoft.com/office/officeart/2005/8/layout/hierarchy1"/>
+    <dgm:cxn modelId="{AC7B448B-EF95-48DA-B089-EAD90EFFED55}" type="presOf" srcId="{4E3C1994-F7FD-4AA9-A246-70726C143854}" destId="{9450FCFE-5D5E-48BB-B65E-15E8D1D3F1C8}" srcOrd="0" destOrd="0" presId="urn:microsoft.com/office/officeart/2005/8/layout/hierarchy1"/>
+    <dgm:cxn modelId="{CC1FCDE1-B2BD-43AA-8A84-6E8C4224F9F6}" type="presOf" srcId="{AB724194-8C5F-4EC8-85D3-603E2D37F61D}" destId="{5F05445E-1615-45FE-91D2-CAEDE209D812}" srcOrd="0" destOrd="0" presId="urn:microsoft.com/office/officeart/2005/8/layout/hierarchy1"/>
+    <dgm:cxn modelId="{FED7E166-BD0F-4F6A-AD63-C4156D9C3877}" srcId="{1245DEF0-43F9-4230-A81A-980D178A756B}" destId="{B425ABC7-A3E0-4EA9-B0B0-C88BCA4327A4}" srcOrd="0" destOrd="0" parTransId="{86E7B6D8-3187-4F63-AB19-DA0A507E63CF}" sibTransId="{31DC6FC8-7155-44AB-A0C2-7E3659723262}"/>
+    <dgm:cxn modelId="{407AD1C1-6AAC-46E4-9968-F8EBC6AEA97C}" srcId="{A1F77813-DA0D-40D1-849D-ADC41B82CA0A}" destId="{4E3C1994-F7FD-4AA9-A246-70726C143854}" srcOrd="0" destOrd="0" parTransId="{EA9BA22A-E1F0-45A9-A49C-BFCDA2B55294}" sibTransId="{F60BD05B-7EEE-4AC9-A656-2EF63AFC4F50}"/>
+    <dgm:cxn modelId="{C14C6686-931F-419F-8C59-1B1DA642E4F1}" type="presOf" srcId="{895A8415-186E-42CB-BDCC-8AB59FE0924A}" destId="{A787A79F-FE1A-477E-83CD-31B61485D15B}" srcOrd="0" destOrd="0" presId="urn:microsoft.com/office/officeart/2005/8/layout/hierarchy1"/>
+    <dgm:cxn modelId="{F9ED598F-B741-46B2-9855-6BC1EF4960A2}" srcId="{8A45DCF4-0B7F-46CA-9AEF-991A8D1BAF57}" destId="{7162E3DE-4C59-4744-BCED-861246BAEF57}" srcOrd="0" destOrd="0" parTransId="{76F1315D-B542-43FB-9D86-6BE542DF0E15}" sibTransId="{60140E2A-23DB-433A-BA37-E9C855D374C5}"/>
+    <dgm:cxn modelId="{60221A22-0180-4043-B993-B680A713A303}" srcId="{4AB3E4C6-43C2-48D1-A38B-01ECD40F1524}" destId="{4515D76F-57B5-49C6-A6F1-D374F67D1C57}" srcOrd="0" destOrd="0" parTransId="{43F3177A-6443-45D1-BB60-F0C6515A522C}" sibTransId="{FA477417-EB19-4B2B-BFA5-E1652C6CF4FC}"/>
+    <dgm:cxn modelId="{643D424E-311C-473F-9492-AC0D835DEDB9}" srcId="{661C1B7C-9DE2-4F22-9F48-D9E13FD0A79C}" destId="{C46F31FD-7EF3-4F4B-8006-EB508A8405C9}" srcOrd="0" destOrd="0" parTransId="{1584C53A-2447-4E17-BF0C-3B02003F65C9}" sibTransId="{8E13F906-C0D5-4414-91F5-3F34A73ECAE7}"/>
+    <dgm:cxn modelId="{DF1CFB2D-4438-4528-B0EE-DB35A2DB0ECE}" srcId="{A1F77813-DA0D-40D1-849D-ADC41B82CA0A}" destId="{4AB3E4C6-43C2-48D1-A38B-01ECD40F1524}" srcOrd="3" destOrd="0" parTransId="{407FEB63-8158-4A0B-85C2-5B7A8B48439B}" sibTransId="{81EF869D-083B-48AD-A0E4-BA08709DE1B3}"/>
+    <dgm:cxn modelId="{EEBAF1C6-AE25-44CB-B124-98985B2A0DA0}" type="presOf" srcId="{739CE320-AEBA-41DF-A329-8EC1ABB51056}" destId="{F97D9EDF-E13F-4D0F-8781-B5A71300B23F}" srcOrd="0" destOrd="0" presId="urn:microsoft.com/office/officeart/2005/8/layout/hierarchy1"/>
+    <dgm:cxn modelId="{6FEE0535-6156-4D1B-AC42-DE47746F3864}" srcId="{661C1B7C-9DE2-4F22-9F48-D9E13FD0A79C}" destId="{8A45DCF4-0B7F-46CA-9AEF-991A8D1BAF57}" srcOrd="1" destOrd="0" parTransId="{739CE320-AEBA-41DF-A329-8EC1ABB51056}" sibTransId="{CE30BABE-A9C7-47E1-BF15-E3CDB0BD6DDF}"/>
+    <dgm:cxn modelId="{D14F051A-2F5F-40FE-9E52-B650DB516405}" srcId="{A1F77813-DA0D-40D1-849D-ADC41B82CA0A}" destId="{05CF61FD-F37E-4903-AD79-70AA9CB12F3F}" srcOrd="1" destOrd="0" parTransId="{AB724194-8C5F-4EC8-85D3-603E2D37F61D}" sibTransId="{068CFE31-F983-4A97-99AB-0E7DB4DBE228}"/>
+    <dgm:cxn modelId="{CF3D752F-A15A-4D96-A157-62E1081780C8}" type="presOf" srcId="{4515D76F-57B5-49C6-A6F1-D374F67D1C57}" destId="{0EF8C61B-402E-46C8-A5B4-80DF33CB4364}" srcOrd="0" destOrd="0" presId="urn:microsoft.com/office/officeart/2005/8/layout/hierarchy1"/>
     <dgm:cxn modelId="{99B26500-0EFF-4874-AC8F-B2819FF57375}" type="presOf" srcId="{D9BCAE30-25CA-412D-BFB1-7A093D7B456C}" destId="{1DA52C46-0957-45D5-84AB-55922474A93E}" srcOrd="0" destOrd="0" presId="urn:microsoft.com/office/officeart/2005/8/layout/hierarchy1"/>
+    <dgm:cxn modelId="{37AAFB12-7D55-4975-B579-53FF4FA0DC8F}" srcId="{4B45486A-C81F-4BA8-AEEE-9DE931EFB1FA}" destId="{A1F77813-DA0D-40D1-849D-ADC41B82CA0A}" srcOrd="1" destOrd="0" parTransId="{895A8415-186E-42CB-BDCC-8AB59FE0924A}" sibTransId="{5A466318-7B41-4E02-9BA3-5CC1F40C55A0}"/>
+    <dgm:cxn modelId="{F75C077A-E342-4D2D-811B-775F96758E7B}" type="presOf" srcId="{1245DEF0-43F9-4230-A81A-980D178A756B}" destId="{FB5950E2-7620-4BF1-A0C5-66658ABCFA8F}" srcOrd="0" destOrd="0" presId="urn:microsoft.com/office/officeart/2005/8/layout/hierarchy1"/>
+    <dgm:cxn modelId="{438F213C-CCF9-4742-9C2A-6A42CFE0313B}" type="presOf" srcId="{EA9BA22A-E1F0-45A9-A49C-BFCDA2B55294}" destId="{D63F6A73-1AA5-4E17-A1AA-CDEF17CF0698}" srcOrd="0" destOrd="0" presId="urn:microsoft.com/office/officeart/2005/8/layout/hierarchy1"/>
     <dgm:cxn modelId="{94B35808-9676-4E4D-AA5B-87FA8A0CC2FF}" type="presOf" srcId="{5B17717F-5F4F-4947-AB7B-DAE68E73538F}" destId="{FE690589-86B8-43FE-A41B-9D62D6430AB9}" srcOrd="0" destOrd="0" presId="urn:microsoft.com/office/officeart/2005/8/layout/hierarchy1"/>
-    <dgm:cxn modelId="{BD52400B-5A4C-4B5A-830B-F25660B8E292}" type="presOf" srcId="{7A07C836-60D9-43DE-AF7A-2D0935F9CA94}" destId="{F5D33BEE-6B78-4387-ABEC-A540DAF8CDC3}" srcOrd="0" destOrd="0" presId="urn:microsoft.com/office/officeart/2005/8/layout/hierarchy1"/>
-    <dgm:cxn modelId="{37AAFB12-7D55-4975-B579-53FF4FA0DC8F}" srcId="{4B45486A-C81F-4BA8-AEEE-9DE931EFB1FA}" destId="{A1F77813-DA0D-40D1-849D-ADC41B82CA0A}" srcOrd="1" destOrd="0" parTransId="{895A8415-186E-42CB-BDCC-8AB59FE0924A}" sibTransId="{5A466318-7B41-4E02-9BA3-5CC1F40C55A0}"/>
-    <dgm:cxn modelId="{ED586B17-354D-430F-9CCF-4E7EBDBAFDD3}" srcId="{E9335B92-0993-47B6-89C4-6972D0CA941C}" destId="{64F125AA-06E5-408C-92F0-29B683643E21}" srcOrd="0" destOrd="0" parTransId="{C55E3E45-29B2-4823-A3C7-C27C8F7667A0}" sibTransId="{E7AE558F-65BD-445E-96CE-3F7051CC59DF}"/>
-    <dgm:cxn modelId="{D14F051A-2F5F-40FE-9E52-B650DB516405}" srcId="{A1F77813-DA0D-40D1-849D-ADC41B82CA0A}" destId="{05CF61FD-F37E-4903-AD79-70AA9CB12F3F}" srcOrd="1" destOrd="0" parTransId="{AB724194-8C5F-4EC8-85D3-603E2D37F61D}" sibTransId="{068CFE31-F983-4A97-99AB-0E7DB4DBE228}"/>
+    <dgm:cxn modelId="{152FE795-72D4-483B-9C53-478C1FEFC4BF}" type="presOf" srcId="{97CC8D6F-7204-402E-87DC-7604A04F6E35}" destId="{B6D96C63-9EA5-4EBC-BCFA-CF10C3B1CC41}" srcOrd="0" destOrd="0" presId="urn:microsoft.com/office/officeart/2005/8/layout/hierarchy1"/>
     <dgm:cxn modelId="{CE02321B-69A8-4980-978F-83AD14921001}" type="presOf" srcId="{05CF61FD-F37E-4903-AD79-70AA9CB12F3F}" destId="{32C02F5D-2AFD-4AEB-B702-B9D5EDFC6578}" srcOrd="0" destOrd="0" presId="urn:microsoft.com/office/officeart/2005/8/layout/hierarchy1"/>
-    <dgm:cxn modelId="{E1AFB322-2683-4AE1-A86E-F7F38C2EAF8C}" type="presOf" srcId="{C55E3E45-29B2-4823-A3C7-C27C8F7667A0}" destId="{AB4DEF6B-F751-4C7A-BF3F-FD72A33585F1}" srcOrd="0" destOrd="0" presId="urn:microsoft.com/office/officeart/2005/8/layout/hierarchy1"/>
+    <dgm:cxn modelId="{68E0C329-C319-41DA-AC5A-0CFCC6DD48D8}" type="presOf" srcId="{1584C53A-2447-4E17-BF0C-3B02003F65C9}" destId="{D7FFCED2-D1F7-4DA4-BB3E-2D58E8B264B2}" srcOrd="0" destOrd="0" presId="urn:microsoft.com/office/officeart/2005/8/layout/hierarchy1"/>
+    <dgm:cxn modelId="{A756884D-E609-4F13-8867-48B057F62E35}" type="presOf" srcId="{4B45486A-C81F-4BA8-AEEE-9DE931EFB1FA}" destId="{E427CD53-C7F2-47C3-8E2D-9550FFDB0AF1}" srcOrd="0" destOrd="0" presId="urn:microsoft.com/office/officeart/2005/8/layout/hierarchy1"/>
+    <dgm:cxn modelId="{5AC25F68-4D27-4CA9-8EAA-D1FD0420558E}" type="presOf" srcId="{8A45DCF4-0B7F-46CA-9AEF-991A8D1BAF57}" destId="{A29A621D-FDB0-41DF-A1D4-75FD9D5980A5}" srcOrd="0" destOrd="0" presId="urn:microsoft.com/office/officeart/2005/8/layout/hierarchy1"/>
+    <dgm:cxn modelId="{8E3F73B6-7570-48A2-8D3E-5F55C8F26E10}" type="presOf" srcId="{A1F77813-DA0D-40D1-849D-ADC41B82CA0A}" destId="{A87540D3-F830-41BD-9A10-CD1CDC824B11}" srcOrd="0" destOrd="0" presId="urn:microsoft.com/office/officeart/2005/8/layout/hierarchy1"/>
     <dgm:cxn modelId="{0C7BA123-2460-4071-98B6-4EF20F62745C}" srcId="{B43C9653-F421-437D-A8FF-7EE550C290C6}" destId="{4B45486A-C81F-4BA8-AEEE-9DE931EFB1FA}" srcOrd="0" destOrd="0" parTransId="{41C4AF9B-8E76-47CD-8504-20380E0795DD}" sibTransId="{6349A96A-7EA5-43ED-BA44-4B7D120CF195}"/>
-    <dgm:cxn modelId="{68E0C329-C319-41DA-AC5A-0CFCC6DD48D8}" type="presOf" srcId="{1584C53A-2447-4E17-BF0C-3B02003F65C9}" destId="{D7FFCED2-D1F7-4DA4-BB3E-2D58E8B264B2}" srcOrd="0" destOrd="0" presId="urn:microsoft.com/office/officeart/2005/8/layout/hierarchy1"/>
-    <dgm:cxn modelId="{6FEE0535-6156-4D1B-AC42-DE47746F3864}" srcId="{661C1B7C-9DE2-4F22-9F48-D9E13FD0A79C}" destId="{8A45DCF4-0B7F-46CA-9AEF-991A8D1BAF57}" srcOrd="1" destOrd="0" parTransId="{739CE320-AEBA-41DF-A329-8EC1ABB51056}" sibTransId="{CE30BABE-A9C7-47E1-BF15-E3CDB0BD6DDF}"/>
-    <dgm:cxn modelId="{438F213C-CCF9-4742-9C2A-6A42CFE0313B}" type="presOf" srcId="{EA9BA22A-E1F0-45A9-A49C-BFCDA2B55294}" destId="{D63F6A73-1AA5-4E17-A1AA-CDEF17CF0698}" srcOrd="0" destOrd="0" presId="urn:microsoft.com/office/officeart/2005/8/layout/hierarchy1"/>
-    <dgm:cxn modelId="{A756884D-E609-4F13-8867-48B057F62E35}" type="presOf" srcId="{4B45486A-C81F-4BA8-AEEE-9DE931EFB1FA}" destId="{E427CD53-C7F2-47C3-8E2D-9550FFDB0AF1}" srcOrd="0" destOrd="0" presId="urn:microsoft.com/office/officeart/2005/8/layout/hierarchy1"/>
-    <dgm:cxn modelId="{643D424E-311C-473F-9492-AC0D835DEDB9}" srcId="{661C1B7C-9DE2-4F22-9F48-D9E13FD0A79C}" destId="{C46F31FD-7EF3-4F4B-8006-EB508A8405C9}" srcOrd="0" destOrd="0" parTransId="{1584C53A-2447-4E17-BF0C-3B02003F65C9}" sibTransId="{8E13F906-C0D5-4414-91F5-3F34A73ECAE7}"/>
-    <dgm:cxn modelId="{98DFA557-F20C-4801-8F68-223FF86CC266}" srcId="{E9335B92-0993-47B6-89C4-6972D0CA941C}" destId="{7A07C836-60D9-43DE-AF7A-2D0935F9CA94}" srcOrd="1" destOrd="0" parTransId="{C9DAD4B7-FD70-4DA8-8A22-1CEC23CCEB6F}" sibTransId="{44D52721-CF83-4C4F-8CB7-60B199CAA2F0}"/>
+    <dgm:cxn modelId="{CC27D775-36D9-4FD9-AA89-224B0B06D58E}" type="presOf" srcId="{1B3B97B0-B938-409A-9DAC-AC4DD6ADD01A}" destId="{20F962D1-CEF5-4AC2-8C8B-9B1FB6606F81}" srcOrd="0" destOrd="0" presId="urn:microsoft.com/office/officeart/2005/8/layout/hierarchy1"/>
+    <dgm:cxn modelId="{B3414DB1-D1CB-4EDB-B189-BE2BB97D1F9B}" srcId="{4AB3E4C6-43C2-48D1-A38B-01ECD40F1524}" destId="{B9051C09-EEE7-4B39-97BB-062B0ADD8898}" srcOrd="1" destOrd="0" parTransId="{56856F2B-3CEE-4255-992F-EF7B88167994}" sibTransId="{F119A380-1BEB-42D8-87C2-364C7E802DCE}"/>
+    <dgm:cxn modelId="{0C81EE67-A3E4-4EAD-80AA-6E643B11BB2D}" srcId="{C46F31FD-7EF3-4F4B-8006-EB508A8405C9}" destId="{1B3B97B0-B938-409A-9DAC-AC4DD6ADD01A}" srcOrd="0" destOrd="0" parTransId="{BC132D8D-8A59-44F1-B428-7713B5EC9CE0}" sibTransId="{A30620E4-2007-4890-A419-3D76282B53F5}"/>
+    <dgm:cxn modelId="{144E2FA1-2A12-4DFA-9F92-4CA965AB49DF}" srcId="{A1F77813-DA0D-40D1-849D-ADC41B82CA0A}" destId="{97CC8D6F-7204-402E-87DC-7604A04F6E35}" srcOrd="2" destOrd="0" parTransId="{D9BCAE30-25CA-412D-BFB1-7A093D7B456C}" sibTransId="{9D019E7E-FD7F-43FC-9D6F-7B4B0E8D5D5E}"/>
+    <dgm:cxn modelId="{24167296-3544-47F0-B5A5-A6C96250833A}" type="presOf" srcId="{661C1B7C-9DE2-4F22-9F48-D9E13FD0A79C}" destId="{32523095-824A-4E5E-BB13-108F6A7832E0}" srcOrd="0" destOrd="0" presId="urn:microsoft.com/office/officeart/2005/8/layout/hierarchy1"/>
+    <dgm:cxn modelId="{8EDBECAB-7899-4AE4-993D-027751B192A1}" type="presOf" srcId="{B9051C09-EEE7-4B39-97BB-062B0ADD8898}" destId="{A25BC8F9-7585-41FB-BA74-6F019EEC87A7}" srcOrd="0" destOrd="0" presId="urn:microsoft.com/office/officeart/2005/8/layout/hierarchy1"/>
+    <dgm:cxn modelId="{5E9ABDD8-A4C8-4311-8E22-095A10782938}" type="presOf" srcId="{C46F31FD-7EF3-4F4B-8006-EB508A8405C9}" destId="{177B5FD7-7D73-4372-BC75-34654571A3BB}" srcOrd="0" destOrd="0" presId="urn:microsoft.com/office/officeart/2005/8/layout/hierarchy1"/>
+    <dgm:cxn modelId="{CA281C70-4AE4-43D2-8F20-CC466E1A20BE}" type="presOf" srcId="{7162E3DE-4C59-4744-BCED-861246BAEF57}" destId="{20B05BA1-6646-492F-999C-1460239F9202}" srcOrd="0" destOrd="0" presId="urn:microsoft.com/office/officeart/2005/8/layout/hierarchy1"/>
+    <dgm:cxn modelId="{30FDE1A7-28A8-424B-B65B-F68F8ACD8DBE}" type="presOf" srcId="{407FEB63-8158-4A0B-85C2-5B7A8B48439B}" destId="{A5C7B76E-693C-419E-80D9-A29E24C8EA4A}" srcOrd="0" destOrd="0" presId="urn:microsoft.com/office/officeart/2005/8/layout/hierarchy1"/>
+    <dgm:cxn modelId="{969DDE65-34D2-464E-ADA3-3C6E86198F74}" type="presOf" srcId="{D569D02A-F937-4D6C-94F5-E1A26484808F}" destId="{473607A1-27FB-4066-9BF8-178C56FE0884}" srcOrd="0" destOrd="0" presId="urn:microsoft.com/office/officeart/2005/8/layout/hierarchy1"/>
+    <dgm:cxn modelId="{FD5DD260-5E00-4DFD-89DB-72E22E240CB2}" type="presOf" srcId="{B425ABC7-A3E0-4EA9-B0B0-C88BCA4327A4}" destId="{6CEFDF5F-67FB-45AE-8A7B-7CF5868E41CA}" srcOrd="0" destOrd="0" presId="urn:microsoft.com/office/officeart/2005/8/layout/hierarchy1"/>
+    <dgm:cxn modelId="{CA5C245C-59B1-4909-8FE3-6D3A17474C39}" type="presOf" srcId="{56856F2B-3CEE-4255-992F-EF7B88167994}" destId="{30CE19D5-C21C-471E-A851-7A903D8FE7CD}" srcOrd="0" destOrd="0" presId="urn:microsoft.com/office/officeart/2005/8/layout/hierarchy1"/>
+    <dgm:cxn modelId="{80EF00F9-397F-4E70-990F-EA02BC9876A0}" type="presOf" srcId="{76F1315D-B542-43FB-9D86-6BE542DF0E15}" destId="{25CB3E1E-92FB-4EC3-9A10-DAD0D4E284CF}" srcOrd="0" destOrd="0" presId="urn:microsoft.com/office/officeart/2005/8/layout/hierarchy1"/>
+    <dgm:cxn modelId="{3C36BBFA-C237-464D-BFB7-BBE4F83D5308}" type="presOf" srcId="{43F3177A-6443-45D1-BB60-F0C6515A522C}" destId="{08D92B9D-B990-423A-876F-1E3FED113F39}" srcOrd="0" destOrd="0" presId="urn:microsoft.com/office/officeart/2005/8/layout/hierarchy1"/>
     <dgm:cxn modelId="{43552E58-0FA8-4F74-8018-8DB6077B94AB}" type="presOf" srcId="{BC132D8D-8A59-44F1-B428-7713B5EC9CE0}" destId="{324CF935-1935-47CA-83E5-96840FBFE437}" srcOrd="0" destOrd="0" presId="urn:microsoft.com/office/officeart/2005/8/layout/hierarchy1"/>
     <dgm:cxn modelId="{0D984E5E-D7B0-48AF-989E-EBC8F84C1F84}" type="presOf" srcId="{86E7B6D8-3187-4F63-AB19-DA0A507E63CF}" destId="{214BC148-D85A-42E7-A41D-4CA859ED54EA}" srcOrd="0" destOrd="0" presId="urn:microsoft.com/office/officeart/2005/8/layout/hierarchy1"/>
-    <dgm:cxn modelId="{FD5DD260-5E00-4DFD-89DB-72E22E240CB2}" type="presOf" srcId="{B425ABC7-A3E0-4EA9-B0B0-C88BCA4327A4}" destId="{6CEFDF5F-67FB-45AE-8A7B-7CF5868E41CA}" srcOrd="0" destOrd="0" presId="urn:microsoft.com/office/officeart/2005/8/layout/hierarchy1"/>
-    <dgm:cxn modelId="{969DDE65-34D2-464E-ADA3-3C6E86198F74}" type="presOf" srcId="{D569D02A-F937-4D6C-94F5-E1A26484808F}" destId="{473607A1-27FB-4066-9BF8-178C56FE0884}" srcOrd="0" destOrd="0" presId="urn:microsoft.com/office/officeart/2005/8/layout/hierarchy1"/>
-    <dgm:cxn modelId="{FED7E166-BD0F-4F6A-AD63-C4156D9C3877}" srcId="{1245DEF0-43F9-4230-A81A-980D178A756B}" destId="{B425ABC7-A3E0-4EA9-B0B0-C88BCA4327A4}" srcOrd="0" destOrd="0" parTransId="{86E7B6D8-3187-4F63-AB19-DA0A507E63CF}" sibTransId="{31DC6FC8-7155-44AB-A0C2-7E3659723262}"/>
-    <dgm:cxn modelId="{0C81EE67-A3E4-4EAD-80AA-6E643B11BB2D}" srcId="{C46F31FD-7EF3-4F4B-8006-EB508A8405C9}" destId="{1B3B97B0-B938-409A-9DAC-AC4DD6ADD01A}" srcOrd="0" destOrd="0" parTransId="{BC132D8D-8A59-44F1-B428-7713B5EC9CE0}" sibTransId="{A30620E4-2007-4890-A419-3D76282B53F5}"/>
-    <dgm:cxn modelId="{5AC25F68-4D27-4CA9-8EAA-D1FD0420558E}" type="presOf" srcId="{8A45DCF4-0B7F-46CA-9AEF-991A8D1BAF57}" destId="{A29A621D-FDB0-41DF-A1D4-75FD9D5980A5}" srcOrd="0" destOrd="0" presId="urn:microsoft.com/office/officeart/2005/8/layout/hierarchy1"/>
-    <dgm:cxn modelId="{CA281C70-4AE4-43D2-8F20-CC466E1A20BE}" type="presOf" srcId="{7162E3DE-4C59-4744-BCED-861246BAEF57}" destId="{20B05BA1-6646-492F-999C-1460239F9202}" srcOrd="0" destOrd="0" presId="urn:microsoft.com/office/officeart/2005/8/layout/hierarchy1"/>
-    <dgm:cxn modelId="{CC27D775-36D9-4FD9-AA89-224B0B06D58E}" type="presOf" srcId="{1B3B97B0-B938-409A-9DAC-AC4DD6ADD01A}" destId="{20F962D1-CEF5-4AC2-8C8B-9B1FB6606F81}" srcOrd="0" destOrd="0" presId="urn:microsoft.com/office/officeart/2005/8/layout/hierarchy1"/>
-    <dgm:cxn modelId="{F75C077A-E342-4D2D-811B-775F96758E7B}" type="presOf" srcId="{1245DEF0-43F9-4230-A81A-980D178A756B}" destId="{FB5950E2-7620-4BF1-A0C5-66658ABCFA8F}" srcOrd="0" destOrd="0" presId="urn:microsoft.com/office/officeart/2005/8/layout/hierarchy1"/>
-    <dgm:cxn modelId="{E541FA80-401F-437A-8E87-47D9C74EA60E}" type="presOf" srcId="{B43C9653-F421-437D-A8FF-7EE550C290C6}" destId="{5C3B16B1-445C-4658-9392-3CFE011BBD0E}" srcOrd="0" destOrd="0" presId="urn:microsoft.com/office/officeart/2005/8/layout/hierarchy1"/>
-    <dgm:cxn modelId="{C14C6686-931F-419F-8C59-1B1DA642E4F1}" type="presOf" srcId="{895A8415-186E-42CB-BDCC-8AB59FE0924A}" destId="{A787A79F-FE1A-477E-83CD-31B61485D15B}" srcOrd="0" destOrd="0" presId="urn:microsoft.com/office/officeart/2005/8/layout/hierarchy1"/>
-    <dgm:cxn modelId="{AC7B448B-EF95-48DA-B089-EAD90EFFED55}" type="presOf" srcId="{4E3C1994-F7FD-4AA9-A246-70726C143854}" destId="{9450FCFE-5D5E-48BB-B65E-15E8D1D3F1C8}" srcOrd="0" destOrd="0" presId="urn:microsoft.com/office/officeart/2005/8/layout/hierarchy1"/>
-    <dgm:cxn modelId="{F9ED598F-B741-46B2-9855-6BC1EF4960A2}" srcId="{8A45DCF4-0B7F-46CA-9AEF-991A8D1BAF57}" destId="{7162E3DE-4C59-4744-BCED-861246BAEF57}" srcOrd="0" destOrd="0" parTransId="{76F1315D-B542-43FB-9D86-6BE542DF0E15}" sibTransId="{60140E2A-23DB-433A-BA37-E9C855D374C5}"/>
-    <dgm:cxn modelId="{152FE795-72D4-483B-9C53-478C1FEFC4BF}" type="presOf" srcId="{97CC8D6F-7204-402E-87DC-7604A04F6E35}" destId="{B6D96C63-9EA5-4EBC-BCFA-CF10C3B1CC41}" srcOrd="0" destOrd="0" presId="urn:microsoft.com/office/officeart/2005/8/layout/hierarchy1"/>
-    <dgm:cxn modelId="{24167296-3544-47F0-B5A5-A6C96250833A}" type="presOf" srcId="{661C1B7C-9DE2-4F22-9F48-D9E13FD0A79C}" destId="{32523095-824A-4E5E-BB13-108F6A7832E0}" srcOrd="0" destOrd="0" presId="urn:microsoft.com/office/officeart/2005/8/layout/hierarchy1"/>
-    <dgm:cxn modelId="{5B3AE197-A292-4E97-8248-02703C8F52C8}" type="presOf" srcId="{E9335B92-0993-47B6-89C4-6972D0CA941C}" destId="{7627023D-68E6-41F5-A314-0DE0565DC153}" srcOrd="0" destOrd="0" presId="urn:microsoft.com/office/officeart/2005/8/layout/hierarchy1"/>
+    <dgm:cxn modelId="{61BC1C0F-8388-46E7-8B14-FC5438CFAC6B}" type="presOf" srcId="{4AB3E4C6-43C2-48D1-A38B-01ECD40F1524}" destId="{103AD321-37C2-4DAA-B852-908F5B3EB6A8}" srcOrd="0" destOrd="0" presId="urn:microsoft.com/office/officeart/2005/8/layout/hierarchy1"/>
     <dgm:cxn modelId="{BF00A399-77B2-4125-B995-7616FC863775}" srcId="{4B45486A-C81F-4BA8-AEEE-9DE931EFB1FA}" destId="{1245DEF0-43F9-4230-A81A-980D178A756B}" srcOrd="0" destOrd="0" parTransId="{5B17717F-5F4F-4947-AB7B-DAE68E73538F}" sibTransId="{25111504-0341-4C43-A925-DF7D742E0DDA}"/>
-    <dgm:cxn modelId="{144E2FA1-2A12-4DFA-9F92-4CA965AB49DF}" srcId="{A1F77813-DA0D-40D1-849D-ADC41B82CA0A}" destId="{97CC8D6F-7204-402E-87DC-7604A04F6E35}" srcOrd="2" destOrd="0" parTransId="{D9BCAE30-25CA-412D-BFB1-7A093D7B456C}" sibTransId="{9D019E7E-FD7F-43FC-9D6F-7B4B0E8D5D5E}"/>
-    <dgm:cxn modelId="{8E3F73B6-7570-48A2-8D3E-5F55C8F26E10}" type="presOf" srcId="{A1F77813-DA0D-40D1-849D-ADC41B82CA0A}" destId="{A87540D3-F830-41BD-9A10-CD1CDC824B11}" srcOrd="0" destOrd="0" presId="urn:microsoft.com/office/officeart/2005/8/layout/hierarchy1"/>
-    <dgm:cxn modelId="{407AD1C1-6AAC-46E4-9968-F8EBC6AEA97C}" srcId="{A1F77813-DA0D-40D1-849D-ADC41B82CA0A}" destId="{4E3C1994-F7FD-4AA9-A246-70726C143854}" srcOrd="0" destOrd="0" parTransId="{EA9BA22A-E1F0-45A9-A49C-BFCDA2B55294}" sibTransId="{F60BD05B-7EEE-4AC9-A656-2EF63AFC4F50}"/>
-    <dgm:cxn modelId="{EEBAF1C6-AE25-44CB-B124-98985B2A0DA0}" type="presOf" srcId="{739CE320-AEBA-41DF-A329-8EC1ABB51056}" destId="{F97D9EDF-E13F-4D0F-8781-B5A71300B23F}" srcOrd="0" destOrd="0" presId="urn:microsoft.com/office/officeart/2005/8/layout/hierarchy1"/>
-    <dgm:cxn modelId="{9C57A9D3-69FC-4592-87D8-2410B37AF685}" srcId="{1245DEF0-43F9-4230-A81A-980D178A756B}" destId="{661C1B7C-9DE2-4F22-9F48-D9E13FD0A79C}" srcOrd="2" destOrd="0" parTransId="{D569D02A-F937-4D6C-94F5-E1A26484808F}" sibTransId="{3DF7AEEB-672D-4A22-822B-E33F06B96715}"/>
-    <dgm:cxn modelId="{1B417BD4-D391-4610-A918-DAB180A2AC6B}" type="presOf" srcId="{C9DAD4B7-FD70-4DA8-8A22-1CEC23CCEB6F}" destId="{4E7DC508-651C-4AC7-A964-6592E1FBDF76}" srcOrd="0" destOrd="0" presId="urn:microsoft.com/office/officeart/2005/8/layout/hierarchy1"/>
-    <dgm:cxn modelId="{5E9ABDD8-A4C8-4311-8E22-095A10782938}" type="presOf" srcId="{C46F31FD-7EF3-4F4B-8006-EB508A8405C9}" destId="{177B5FD7-7D73-4372-BC75-34654571A3BB}" srcOrd="0" destOrd="0" presId="urn:microsoft.com/office/officeart/2005/8/layout/hierarchy1"/>
-    <dgm:cxn modelId="{BA0795DE-BB84-42E4-98C9-8EAC04DD6FE1}" type="presOf" srcId="{5BAED453-83A7-400E-86A2-EA1960D19236}" destId="{1E699749-40DD-43BD-989A-11CDE10DACB8}" srcOrd="0" destOrd="0" presId="urn:microsoft.com/office/officeart/2005/8/layout/hierarchy1"/>
-    <dgm:cxn modelId="{8E9734E0-03BE-44E9-8CE2-EF39A2FA919F}" srcId="{1245DEF0-43F9-4230-A81A-980D178A756B}" destId="{E9335B92-0993-47B6-89C4-6972D0CA941C}" srcOrd="1" destOrd="0" parTransId="{5BAED453-83A7-400E-86A2-EA1960D19236}" sibTransId="{2C0EB7C8-6D02-420F-9F91-6A1DCCB56FE7}"/>
-    <dgm:cxn modelId="{CC1FCDE1-B2BD-43AA-8A84-6E8C4224F9F6}" type="presOf" srcId="{AB724194-8C5F-4EC8-85D3-603E2D37F61D}" destId="{5F05445E-1615-45FE-91D2-CAEDE209D812}" srcOrd="0" destOrd="0" presId="urn:microsoft.com/office/officeart/2005/8/layout/hierarchy1"/>
-    <dgm:cxn modelId="{212F78F3-41A0-468C-B6CC-5F3377BDB846}" type="presOf" srcId="{64F125AA-06E5-408C-92F0-29B683643E21}" destId="{9EDCDDC1-BD6E-485B-A244-E75823256875}" srcOrd="0" destOrd="0" presId="urn:microsoft.com/office/officeart/2005/8/layout/hierarchy1"/>
-    <dgm:cxn modelId="{80EF00F9-397F-4E70-990F-EA02BC9876A0}" type="presOf" srcId="{76F1315D-B542-43FB-9D86-6BE542DF0E15}" destId="{25CB3E1E-92FB-4EC3-9A10-DAD0D4E284CF}" srcOrd="0" destOrd="0" presId="urn:microsoft.com/office/officeart/2005/8/layout/hierarchy1"/>
     <dgm:cxn modelId="{0708126B-1541-4F1D-AB0B-98B34730BC3D}" type="presParOf" srcId="{5C3B16B1-445C-4658-9392-3CFE011BBD0E}" destId="{B5B783EA-3F60-456D-B956-C15D100CFAFA}" srcOrd="0" destOrd="0" presId="urn:microsoft.com/office/officeart/2005/8/layout/hierarchy1"/>
     <dgm:cxn modelId="{ABDEEBF5-A9E2-410B-82A4-733D132924AA}" type="presParOf" srcId="{B5B783EA-3F60-456D-B956-C15D100CFAFA}" destId="{26566B0B-CB5C-4A70-9D71-C23D5DD8EA24}" srcOrd="0" destOrd="0" presId="urn:microsoft.com/office/officeart/2005/8/layout/hierarchy1"/>
     <dgm:cxn modelId="{E7271F5F-1843-4982-B840-845E69E23F04}" type="presParOf" srcId="{26566B0B-CB5C-4A70-9D71-C23D5DD8EA24}" destId="{A1EC8563-E52D-43B7-93E8-8019F4515D5B}" srcOrd="0" destOrd="0" presId="urn:microsoft.com/office/officeart/2005/8/layout/hierarchy1"/>
@@ -2697,26 +2891,8 @@
     <dgm:cxn modelId="{755A22B6-6905-4EB6-9788-2641DE9EB969}" type="presParOf" srcId="{942EB1F9-3419-4003-B9F0-9A25E5280AB4}" destId="{8BDBAD30-377F-47F5-A05C-86EC9F72A604}" srcOrd="0" destOrd="0" presId="urn:microsoft.com/office/officeart/2005/8/layout/hierarchy1"/>
     <dgm:cxn modelId="{3C9503D3-5CFE-4C03-A0C4-870C19388FB7}" type="presParOf" srcId="{942EB1F9-3419-4003-B9F0-9A25E5280AB4}" destId="{6CEFDF5F-67FB-45AE-8A7B-7CF5868E41CA}" srcOrd="1" destOrd="0" presId="urn:microsoft.com/office/officeart/2005/8/layout/hierarchy1"/>
     <dgm:cxn modelId="{CAAAE11B-003D-4C29-9288-B8A43F888A7C}" type="presParOf" srcId="{1861795F-C5CA-4BE7-819C-873DBF56D0BE}" destId="{5561ED40-59AD-4660-8B04-5C85B27DCD5A}" srcOrd="1" destOrd="0" presId="urn:microsoft.com/office/officeart/2005/8/layout/hierarchy1"/>
-    <dgm:cxn modelId="{F52D9D1D-7DCE-485A-9683-2510BC504F57}" type="presParOf" srcId="{A545A776-4A9C-49F1-B844-5D1CB6AB55A3}" destId="{1E699749-40DD-43BD-989A-11CDE10DACB8}" srcOrd="2" destOrd="0" presId="urn:microsoft.com/office/officeart/2005/8/layout/hierarchy1"/>
-    <dgm:cxn modelId="{0F3164FF-C1D5-4013-84DC-66C468462445}" type="presParOf" srcId="{A545A776-4A9C-49F1-B844-5D1CB6AB55A3}" destId="{B6B2C192-AFBE-4A82-A431-3314275135C0}" srcOrd="3" destOrd="0" presId="urn:microsoft.com/office/officeart/2005/8/layout/hierarchy1"/>
-    <dgm:cxn modelId="{F2928791-C679-401A-8497-11ED742BD353}" type="presParOf" srcId="{B6B2C192-AFBE-4A82-A431-3314275135C0}" destId="{D376F932-287F-4D59-B5BB-0ABA099B2D17}" srcOrd="0" destOrd="0" presId="urn:microsoft.com/office/officeart/2005/8/layout/hierarchy1"/>
-    <dgm:cxn modelId="{C5D467D7-684C-4766-A826-EEFD526E3CAD}" type="presParOf" srcId="{D376F932-287F-4D59-B5BB-0ABA099B2D17}" destId="{DBCC1B88-3490-4A64-952E-E20BB6003DEF}" srcOrd="0" destOrd="0" presId="urn:microsoft.com/office/officeart/2005/8/layout/hierarchy1"/>
-    <dgm:cxn modelId="{82C2489C-B39A-4156-9375-F301F7FDAB4B}" type="presParOf" srcId="{D376F932-287F-4D59-B5BB-0ABA099B2D17}" destId="{7627023D-68E6-41F5-A314-0DE0565DC153}" srcOrd="1" destOrd="0" presId="urn:microsoft.com/office/officeart/2005/8/layout/hierarchy1"/>
-    <dgm:cxn modelId="{4F6FA0E5-1793-4826-9802-D3FEAB5B3F47}" type="presParOf" srcId="{B6B2C192-AFBE-4A82-A431-3314275135C0}" destId="{B1624760-0347-41AC-B52B-07007A5782D2}" srcOrd="1" destOrd="0" presId="urn:microsoft.com/office/officeart/2005/8/layout/hierarchy1"/>
-    <dgm:cxn modelId="{4FDF6718-4142-4C46-8A55-968109C582B7}" type="presParOf" srcId="{B1624760-0347-41AC-B52B-07007A5782D2}" destId="{AB4DEF6B-F751-4C7A-BF3F-FD72A33585F1}" srcOrd="0" destOrd="0" presId="urn:microsoft.com/office/officeart/2005/8/layout/hierarchy1"/>
-    <dgm:cxn modelId="{47762ECB-B5CC-4797-AE45-3B9A480027EC}" type="presParOf" srcId="{B1624760-0347-41AC-B52B-07007A5782D2}" destId="{58DC693E-E1D3-467A-B6CA-C8F50A302DDD}" srcOrd="1" destOrd="0" presId="urn:microsoft.com/office/officeart/2005/8/layout/hierarchy1"/>
-    <dgm:cxn modelId="{9D40962D-0739-44B1-B175-370423E4F341}" type="presParOf" srcId="{58DC693E-E1D3-467A-B6CA-C8F50A302DDD}" destId="{1B62C28E-3E70-4DD2-AE97-9BB6280B0519}" srcOrd="0" destOrd="0" presId="urn:microsoft.com/office/officeart/2005/8/layout/hierarchy1"/>
-    <dgm:cxn modelId="{F9BCC9BC-08BC-4D88-8853-3B769806CD4B}" type="presParOf" srcId="{1B62C28E-3E70-4DD2-AE97-9BB6280B0519}" destId="{CE0F9948-6955-4301-8F2D-E0BD63D5DDCE}" srcOrd="0" destOrd="0" presId="urn:microsoft.com/office/officeart/2005/8/layout/hierarchy1"/>
-    <dgm:cxn modelId="{5A1298B2-B181-43EC-8B50-460C3EE391BF}" type="presParOf" srcId="{1B62C28E-3E70-4DD2-AE97-9BB6280B0519}" destId="{9EDCDDC1-BD6E-485B-A244-E75823256875}" srcOrd="1" destOrd="0" presId="urn:microsoft.com/office/officeart/2005/8/layout/hierarchy1"/>
-    <dgm:cxn modelId="{E5AD729A-B0D5-4330-97A7-A23F5A13B7FC}" type="presParOf" srcId="{58DC693E-E1D3-467A-B6CA-C8F50A302DDD}" destId="{8F6BDE23-129C-4537-9475-9D0A98BAFE26}" srcOrd="1" destOrd="0" presId="urn:microsoft.com/office/officeart/2005/8/layout/hierarchy1"/>
-    <dgm:cxn modelId="{E3F36914-E990-409F-9FD7-7462224D1EBA}" type="presParOf" srcId="{B1624760-0347-41AC-B52B-07007A5782D2}" destId="{4E7DC508-651C-4AC7-A964-6592E1FBDF76}" srcOrd="2" destOrd="0" presId="urn:microsoft.com/office/officeart/2005/8/layout/hierarchy1"/>
-    <dgm:cxn modelId="{0B54D172-B684-4A90-AE4A-E711030FBAB5}" type="presParOf" srcId="{B1624760-0347-41AC-B52B-07007A5782D2}" destId="{E3980E9A-6EAC-4DEF-B328-559B332EEC70}" srcOrd="3" destOrd="0" presId="urn:microsoft.com/office/officeart/2005/8/layout/hierarchy1"/>
-    <dgm:cxn modelId="{7D6AAC50-44C8-4428-90C5-C61D651A3614}" type="presParOf" srcId="{E3980E9A-6EAC-4DEF-B328-559B332EEC70}" destId="{1CF207BE-B511-4745-A2CB-E8F9615E4477}" srcOrd="0" destOrd="0" presId="urn:microsoft.com/office/officeart/2005/8/layout/hierarchy1"/>
-    <dgm:cxn modelId="{D83AB4FC-0BF4-4055-B5D6-A251D4BFE27C}" type="presParOf" srcId="{1CF207BE-B511-4745-A2CB-E8F9615E4477}" destId="{EC212F02-5A53-441E-BA40-74A46D8B49AA}" srcOrd="0" destOrd="0" presId="urn:microsoft.com/office/officeart/2005/8/layout/hierarchy1"/>
-    <dgm:cxn modelId="{312AE279-D040-4501-8900-3D1D19240447}" type="presParOf" srcId="{1CF207BE-B511-4745-A2CB-E8F9615E4477}" destId="{F5D33BEE-6B78-4387-ABEC-A540DAF8CDC3}" srcOrd="1" destOrd="0" presId="urn:microsoft.com/office/officeart/2005/8/layout/hierarchy1"/>
-    <dgm:cxn modelId="{DB2DDF0A-6939-44E2-8494-74C8D5B84769}" type="presParOf" srcId="{E3980E9A-6EAC-4DEF-B328-559B332EEC70}" destId="{F70054BB-1C25-44F7-B3F3-A19F66A4F5F7}" srcOrd="1" destOrd="0" presId="urn:microsoft.com/office/officeart/2005/8/layout/hierarchy1"/>
-    <dgm:cxn modelId="{A7AD4F34-5A52-4DB1-A68B-752362607D3D}" type="presParOf" srcId="{A545A776-4A9C-49F1-B844-5D1CB6AB55A3}" destId="{473607A1-27FB-4066-9BF8-178C56FE0884}" srcOrd="4" destOrd="0" presId="urn:microsoft.com/office/officeart/2005/8/layout/hierarchy1"/>
-    <dgm:cxn modelId="{92DF957C-6B23-401E-854D-CCF8A4370410}" type="presParOf" srcId="{A545A776-4A9C-49F1-B844-5D1CB6AB55A3}" destId="{14F4B5FD-47A0-498E-B045-62C5FA24C0B1}" srcOrd="5" destOrd="0" presId="urn:microsoft.com/office/officeart/2005/8/layout/hierarchy1"/>
+    <dgm:cxn modelId="{A7AD4F34-5A52-4DB1-A68B-752362607D3D}" type="presParOf" srcId="{A545A776-4A9C-49F1-B844-5D1CB6AB55A3}" destId="{473607A1-27FB-4066-9BF8-178C56FE0884}" srcOrd="2" destOrd="0" presId="urn:microsoft.com/office/officeart/2005/8/layout/hierarchy1"/>
+    <dgm:cxn modelId="{92DF957C-6B23-401E-854D-CCF8A4370410}" type="presParOf" srcId="{A545A776-4A9C-49F1-B844-5D1CB6AB55A3}" destId="{14F4B5FD-47A0-498E-B045-62C5FA24C0B1}" srcOrd="3" destOrd="0" presId="urn:microsoft.com/office/officeart/2005/8/layout/hierarchy1"/>
     <dgm:cxn modelId="{5760E6D7-BB5F-4F42-ACD6-6BE8DE7D3A80}" type="presParOf" srcId="{14F4B5FD-47A0-498E-B045-62C5FA24C0B1}" destId="{E4E30506-6B2D-48AE-B58D-7CC98EBE1D1A}" srcOrd="0" destOrd="0" presId="urn:microsoft.com/office/officeart/2005/8/layout/hierarchy1"/>
     <dgm:cxn modelId="{AFFAE48B-0184-4C17-A21D-9BFBFC6FC99A}" type="presParOf" srcId="{E4E30506-6B2D-48AE-B58D-7CC98EBE1D1A}" destId="{293A0CDE-33F3-46EC-8856-E5BA013A63E4}" srcOrd="0" destOrd="0" presId="urn:microsoft.com/office/officeart/2005/8/layout/hierarchy1"/>
     <dgm:cxn modelId="{D9C8F36C-8D7A-4C07-BEFD-A5E32235ECF2}" type="presParOf" srcId="{E4E30506-6B2D-48AE-B58D-7CC98EBE1D1A}" destId="{32523095-824A-4E5E-BB13-108F6A7832E0}" srcOrd="1" destOrd="0" presId="urn:microsoft.com/office/officeart/2005/8/layout/hierarchy1"/>
@@ -2769,6 +2945,24 @@
     <dgm:cxn modelId="{DD51A420-AE0B-4A37-8EE8-A9BA01ED78CD}" type="presParOf" srcId="{23DC551F-C7BF-4D5D-96C9-79CCCF4F5F01}" destId="{B898930F-812D-4B70-A930-6FC5D6860FF4}" srcOrd="0" destOrd="0" presId="urn:microsoft.com/office/officeart/2005/8/layout/hierarchy1"/>
     <dgm:cxn modelId="{98E7B643-8089-47BE-9713-81993B853B83}" type="presParOf" srcId="{23DC551F-C7BF-4D5D-96C9-79CCCF4F5F01}" destId="{B6D96C63-9EA5-4EBC-BCFA-CF10C3B1CC41}" srcOrd="1" destOrd="0" presId="urn:microsoft.com/office/officeart/2005/8/layout/hierarchy1"/>
     <dgm:cxn modelId="{70B6B052-4D79-4764-B7C9-1928507CBDB2}" type="presParOf" srcId="{B361F2AB-21D9-4FF8-AA78-C63CDCC29FE2}" destId="{98607042-D20F-4DCA-91D3-97310D23C553}" srcOrd="1" destOrd="0" presId="urn:microsoft.com/office/officeart/2005/8/layout/hierarchy1"/>
+    <dgm:cxn modelId="{90477063-AB6F-4EAE-A86B-E3CC3403BD4E}" type="presParOf" srcId="{74DD70C0-1A9D-4786-BF4C-4C79CB3BB47E}" destId="{A5C7B76E-693C-419E-80D9-A29E24C8EA4A}" srcOrd="6" destOrd="0" presId="urn:microsoft.com/office/officeart/2005/8/layout/hierarchy1"/>
+    <dgm:cxn modelId="{738DD54B-7609-4737-98A3-F1159444ADF3}" type="presParOf" srcId="{74DD70C0-1A9D-4786-BF4C-4C79CB3BB47E}" destId="{FC80C44F-44C5-45E4-B448-44CA66B1FE92}" srcOrd="7" destOrd="0" presId="urn:microsoft.com/office/officeart/2005/8/layout/hierarchy1"/>
+    <dgm:cxn modelId="{681C2C66-F0F3-4F63-AF55-584D7EC71F1E}" type="presParOf" srcId="{FC80C44F-44C5-45E4-B448-44CA66B1FE92}" destId="{13383E24-A607-4C77-980F-7C484C201091}" srcOrd="0" destOrd="0" presId="urn:microsoft.com/office/officeart/2005/8/layout/hierarchy1"/>
+    <dgm:cxn modelId="{5E9C7B10-5670-464E-B7FD-1E558F9A6B6F}" type="presParOf" srcId="{13383E24-A607-4C77-980F-7C484C201091}" destId="{295D90B2-D32A-4489-A429-CF0E105F5327}" srcOrd="0" destOrd="0" presId="urn:microsoft.com/office/officeart/2005/8/layout/hierarchy1"/>
+    <dgm:cxn modelId="{F969A056-33E6-40A2-8ED3-4EE1AA037E8E}" type="presParOf" srcId="{13383E24-A607-4C77-980F-7C484C201091}" destId="{103AD321-37C2-4DAA-B852-908F5B3EB6A8}" srcOrd="1" destOrd="0" presId="urn:microsoft.com/office/officeart/2005/8/layout/hierarchy1"/>
+    <dgm:cxn modelId="{4AF839CC-A8B3-4404-A707-06A26CCC9E41}" type="presParOf" srcId="{FC80C44F-44C5-45E4-B448-44CA66B1FE92}" destId="{2D99F221-B4BC-4817-B919-E290D01C2906}" srcOrd="1" destOrd="0" presId="urn:microsoft.com/office/officeart/2005/8/layout/hierarchy1"/>
+    <dgm:cxn modelId="{D76A49A6-030B-419E-A77B-64236CED853E}" type="presParOf" srcId="{2D99F221-B4BC-4817-B919-E290D01C2906}" destId="{08D92B9D-B990-423A-876F-1E3FED113F39}" srcOrd="0" destOrd="0" presId="urn:microsoft.com/office/officeart/2005/8/layout/hierarchy1"/>
+    <dgm:cxn modelId="{5E89620D-FE23-4490-81E4-58A2CDB131E3}" type="presParOf" srcId="{2D99F221-B4BC-4817-B919-E290D01C2906}" destId="{88925BA9-63E3-4E9F-82A1-1FFB5B7B5BD3}" srcOrd="1" destOrd="0" presId="urn:microsoft.com/office/officeart/2005/8/layout/hierarchy1"/>
+    <dgm:cxn modelId="{F73ED9FC-C2D3-430E-A9CA-588B86E8DB9F}" type="presParOf" srcId="{88925BA9-63E3-4E9F-82A1-1FFB5B7B5BD3}" destId="{79FE83DE-4C87-440A-80C3-8C241A54F12F}" srcOrd="0" destOrd="0" presId="urn:microsoft.com/office/officeart/2005/8/layout/hierarchy1"/>
+    <dgm:cxn modelId="{36C13735-396D-4075-8FB8-2CF32F8B79C0}" type="presParOf" srcId="{79FE83DE-4C87-440A-80C3-8C241A54F12F}" destId="{939DAF17-CDD6-4135-AE9C-F83D4C44C91B}" srcOrd="0" destOrd="0" presId="urn:microsoft.com/office/officeart/2005/8/layout/hierarchy1"/>
+    <dgm:cxn modelId="{ED75FC62-2651-4D7B-B23C-51DA426DDF2D}" type="presParOf" srcId="{79FE83DE-4C87-440A-80C3-8C241A54F12F}" destId="{0EF8C61B-402E-46C8-A5B4-80DF33CB4364}" srcOrd="1" destOrd="0" presId="urn:microsoft.com/office/officeart/2005/8/layout/hierarchy1"/>
+    <dgm:cxn modelId="{1C5E6FBC-FDD1-4958-ADE2-2F0FB7003A0D}" type="presParOf" srcId="{88925BA9-63E3-4E9F-82A1-1FFB5B7B5BD3}" destId="{34AD7175-B254-4011-905B-1B28FD034CFB}" srcOrd="1" destOrd="0" presId="urn:microsoft.com/office/officeart/2005/8/layout/hierarchy1"/>
+    <dgm:cxn modelId="{B5F7CCFB-440B-4C65-98D1-CBE3FA74AD3B}" type="presParOf" srcId="{2D99F221-B4BC-4817-B919-E290D01C2906}" destId="{30CE19D5-C21C-471E-A851-7A903D8FE7CD}" srcOrd="2" destOrd="0" presId="urn:microsoft.com/office/officeart/2005/8/layout/hierarchy1"/>
+    <dgm:cxn modelId="{9E32768D-D801-4856-BFD3-C981E51FCB1E}" type="presParOf" srcId="{2D99F221-B4BC-4817-B919-E290D01C2906}" destId="{FECF9DA1-2C76-499B-A2C5-0308E310D50F}" srcOrd="3" destOrd="0" presId="urn:microsoft.com/office/officeart/2005/8/layout/hierarchy1"/>
+    <dgm:cxn modelId="{B41E7496-83B1-4575-A538-78B74949225C}" type="presParOf" srcId="{FECF9DA1-2C76-499B-A2C5-0308E310D50F}" destId="{5DB3C1C0-4477-4A48-AAAB-4696F24CE13C}" srcOrd="0" destOrd="0" presId="urn:microsoft.com/office/officeart/2005/8/layout/hierarchy1"/>
+    <dgm:cxn modelId="{66BEA1A9-122B-49AB-A817-8DCC81DB5BF4}" type="presParOf" srcId="{5DB3C1C0-4477-4A48-AAAB-4696F24CE13C}" destId="{84B620C5-363F-4C1E-9940-E9AB072DE63B}" srcOrd="0" destOrd="0" presId="urn:microsoft.com/office/officeart/2005/8/layout/hierarchy1"/>
+    <dgm:cxn modelId="{C8EF4D84-6800-40C8-9472-857237C68331}" type="presParOf" srcId="{5DB3C1C0-4477-4A48-AAAB-4696F24CE13C}" destId="{A25BC8F9-7585-41FB-BA74-6F019EEC87A7}" srcOrd="1" destOrd="0" presId="urn:microsoft.com/office/officeart/2005/8/layout/hierarchy1"/>
+    <dgm:cxn modelId="{29D583ED-2AF9-49ED-9F82-217BBF978EA5}" type="presParOf" srcId="{FECF9DA1-2C76-499B-A2C5-0308E310D50F}" destId="{DB0053A0-0014-4E2D-BFE3-082A5275F560}" srcOrd="1" destOrd="0" presId="urn:microsoft.com/office/officeart/2005/8/layout/hierarchy1"/>
   </dgm:cxnLst>
   <dgm:bg/>
   <dgm:whole/>
@@ -3236,6 +3430,13 @@
         </dgm:presLayoutVars>
       </dgm:prSet>
       <dgm:spPr/>
+      <dgm:t>
+        <a:bodyPr/>
+        <a:lstStyle/>
+        <a:p>
+          <a:endParaRPr lang="en-US"/>
+        </a:p>
+      </dgm:t>
     </dgm:pt>
     <dgm:pt modelId="{7A63DD22-0A0B-4E8E-B668-CD566800B7D2}" type="pres">
       <dgm:prSet presAssocID="{1C1D920D-4869-42C0-8C9A-561DAC474211}" presName="hierFlow" presStyleCnt="0"/>
@@ -3266,6 +3467,13 @@
         </dgm:presLayoutVars>
       </dgm:prSet>
       <dgm:spPr/>
+      <dgm:t>
+        <a:bodyPr/>
+        <a:lstStyle/>
+        <a:p>
+          <a:endParaRPr lang="en-US"/>
+        </a:p>
+      </dgm:t>
     </dgm:pt>
     <dgm:pt modelId="{C5181F1A-EA94-4F4D-BE99-4C2D227F86D2}" type="pres">
       <dgm:prSet presAssocID="{47BA4117-B167-4821-84EE-950B0611161E}" presName="hierChild2" presStyleCnt="0"/>
@@ -3274,10 +3482,24 @@
     <dgm:pt modelId="{8E3B58DF-34D0-4C03-B6D2-E5DB350A6AAA}" type="pres">
       <dgm:prSet presAssocID="{308C2BE8-8975-4B67-BF3B-3BFA6218D37D}" presName="Name25" presStyleLbl="parChTrans1D2" presStyleIdx="0" presStyleCnt="1"/>
       <dgm:spPr/>
+      <dgm:t>
+        <a:bodyPr/>
+        <a:lstStyle/>
+        <a:p>
+          <a:endParaRPr lang="en-US"/>
+        </a:p>
+      </dgm:t>
     </dgm:pt>
     <dgm:pt modelId="{DEDEEF15-26DA-451B-92E3-081DD8A523ED}" type="pres">
       <dgm:prSet presAssocID="{308C2BE8-8975-4B67-BF3B-3BFA6218D37D}" presName="connTx" presStyleLbl="parChTrans1D2" presStyleIdx="0" presStyleCnt="1"/>
       <dgm:spPr/>
+      <dgm:t>
+        <a:bodyPr/>
+        <a:lstStyle/>
+        <a:p>
+          <a:endParaRPr lang="en-US"/>
+        </a:p>
+      </dgm:t>
     </dgm:pt>
     <dgm:pt modelId="{B1A39D2E-1B42-4BC3-BC89-9ECFD732169A}" type="pres">
       <dgm:prSet presAssocID="{644A2989-8F7E-489A-A51A-FC4600A8F6EE}" presName="Name30" presStyleCnt="0"/>
@@ -3286,6 +3508,13 @@
     <dgm:pt modelId="{DE031C7F-D6B5-4DDD-A407-A162439B4539}" type="pres">
       <dgm:prSet presAssocID="{644A2989-8F7E-489A-A51A-FC4600A8F6EE}" presName="level2Shape" presStyleLbl="node2" presStyleIdx="0" presStyleCnt="1"/>
       <dgm:spPr/>
+      <dgm:t>
+        <a:bodyPr/>
+        <a:lstStyle/>
+        <a:p>
+          <a:endParaRPr lang="en-US"/>
+        </a:p>
+      </dgm:t>
     </dgm:pt>
     <dgm:pt modelId="{E2EF6B1F-FB41-4D1E-AC59-CCEC651B8AC8}" type="pres">
       <dgm:prSet presAssocID="{644A2989-8F7E-489A-A51A-FC4600A8F6EE}" presName="hierChild3" presStyleCnt="0"/>
@@ -3294,10 +3523,24 @@
     <dgm:pt modelId="{9381C90B-005C-4E0F-8CC9-097F73422BB1}" type="pres">
       <dgm:prSet presAssocID="{914CC7BB-D87F-447A-8E29-BB7E6A8AFF9A}" presName="Name25" presStyleLbl="parChTrans1D3" presStyleIdx="0" presStyleCnt="2"/>
       <dgm:spPr/>
+      <dgm:t>
+        <a:bodyPr/>
+        <a:lstStyle/>
+        <a:p>
+          <a:endParaRPr lang="en-US"/>
+        </a:p>
+      </dgm:t>
     </dgm:pt>
     <dgm:pt modelId="{111F041D-BA8C-499D-BDBF-A7D56E3E4DF9}" type="pres">
       <dgm:prSet presAssocID="{914CC7BB-D87F-447A-8E29-BB7E6A8AFF9A}" presName="connTx" presStyleLbl="parChTrans1D3" presStyleIdx="0" presStyleCnt="2"/>
       <dgm:spPr/>
+      <dgm:t>
+        <a:bodyPr/>
+        <a:lstStyle/>
+        <a:p>
+          <a:endParaRPr lang="en-US"/>
+        </a:p>
+      </dgm:t>
     </dgm:pt>
     <dgm:pt modelId="{B0B0F239-648E-47D6-8297-D36105F7B94E}" type="pres">
       <dgm:prSet presAssocID="{7E880787-1118-4A03-84CC-74E8A81F6102}" presName="Name30" presStyleCnt="0"/>
@@ -3306,6 +3549,13 @@
     <dgm:pt modelId="{B58C9A5B-2D90-461E-ADB2-6E186FE39CC5}" type="pres">
       <dgm:prSet presAssocID="{7E880787-1118-4A03-84CC-74E8A81F6102}" presName="level2Shape" presStyleLbl="node3" presStyleIdx="0" presStyleCnt="2"/>
       <dgm:spPr/>
+      <dgm:t>
+        <a:bodyPr/>
+        <a:lstStyle/>
+        <a:p>
+          <a:endParaRPr lang="en-US"/>
+        </a:p>
+      </dgm:t>
     </dgm:pt>
     <dgm:pt modelId="{DB7F820A-3C1C-475F-A4BE-C94FC218CC74}" type="pres">
       <dgm:prSet presAssocID="{7E880787-1118-4A03-84CC-74E8A81F6102}" presName="hierChild3" presStyleCnt="0"/>
@@ -3314,10 +3564,24 @@
     <dgm:pt modelId="{F14575ED-5A42-4A17-9613-94490AA8C452}" type="pres">
       <dgm:prSet presAssocID="{61FD40AA-7D9F-4112-8543-CAF2B39F1F13}" presName="Name25" presStyleLbl="parChTrans1D3" presStyleIdx="1" presStyleCnt="2"/>
       <dgm:spPr/>
+      <dgm:t>
+        <a:bodyPr/>
+        <a:lstStyle/>
+        <a:p>
+          <a:endParaRPr lang="en-US"/>
+        </a:p>
+      </dgm:t>
     </dgm:pt>
     <dgm:pt modelId="{80856505-6AEA-41D2-ADBA-55AB85C2B9A7}" type="pres">
       <dgm:prSet presAssocID="{61FD40AA-7D9F-4112-8543-CAF2B39F1F13}" presName="connTx" presStyleLbl="parChTrans1D3" presStyleIdx="1" presStyleCnt="2"/>
       <dgm:spPr/>
+      <dgm:t>
+        <a:bodyPr/>
+        <a:lstStyle/>
+        <a:p>
+          <a:endParaRPr lang="en-US"/>
+        </a:p>
+      </dgm:t>
     </dgm:pt>
     <dgm:pt modelId="{0FC36FEC-93A8-4EF2-817F-6D5F81A13038}" type="pres">
       <dgm:prSet presAssocID="{65ACF156-AB71-4F01-9A61-D1BC7D5ACFF4}" presName="Name30" presStyleCnt="0"/>
@@ -3326,6 +3590,13 @@
     <dgm:pt modelId="{DCD1D2C2-2966-461E-8F5A-C41D9BFC37E2}" type="pres">
       <dgm:prSet presAssocID="{65ACF156-AB71-4F01-9A61-D1BC7D5ACFF4}" presName="level2Shape" presStyleLbl="node3" presStyleIdx="1" presStyleCnt="2"/>
       <dgm:spPr/>
+      <dgm:t>
+        <a:bodyPr/>
+        <a:lstStyle/>
+        <a:p>
+          <a:endParaRPr lang="en-US"/>
+        </a:p>
+      </dgm:t>
     </dgm:pt>
     <dgm:pt modelId="{25249DD7-F67E-40B3-9BF7-FF49188FC612}" type="pres">
       <dgm:prSet presAssocID="{65ACF156-AB71-4F01-9A61-D1BC7D5ACFF4}" presName="hierChild3" presStyleCnt="0"/>
@@ -3334,10 +3605,24 @@
     <dgm:pt modelId="{76D43436-595F-414A-BA43-EA7E22B1CFC5}" type="pres">
       <dgm:prSet presAssocID="{06DD9CE4-4367-4488-B14C-10339EB0F944}" presName="Name25" presStyleLbl="parChTrans1D4" presStyleIdx="0" presStyleCnt="2"/>
       <dgm:spPr/>
+      <dgm:t>
+        <a:bodyPr/>
+        <a:lstStyle/>
+        <a:p>
+          <a:endParaRPr lang="en-US"/>
+        </a:p>
+      </dgm:t>
     </dgm:pt>
     <dgm:pt modelId="{6DE16CBA-4479-44F3-A9AE-B697A0700058}" type="pres">
       <dgm:prSet presAssocID="{06DD9CE4-4367-4488-B14C-10339EB0F944}" presName="connTx" presStyleLbl="parChTrans1D4" presStyleIdx="0" presStyleCnt="2"/>
       <dgm:spPr/>
+      <dgm:t>
+        <a:bodyPr/>
+        <a:lstStyle/>
+        <a:p>
+          <a:endParaRPr lang="en-US"/>
+        </a:p>
+      </dgm:t>
     </dgm:pt>
     <dgm:pt modelId="{84CF14A4-0120-4F25-B8D7-BC9BC0E9509B}" type="pres">
       <dgm:prSet presAssocID="{1BA7ADD4-40CF-45F5-AC45-FB3493AD24C8}" presName="Name30" presStyleCnt="0"/>
@@ -3346,6 +3631,13 @@
     <dgm:pt modelId="{9B202F8D-8EDC-48DF-B3AB-FDDC81555B13}" type="pres">
       <dgm:prSet presAssocID="{1BA7ADD4-40CF-45F5-AC45-FB3493AD24C8}" presName="level2Shape" presStyleLbl="node4" presStyleIdx="0" presStyleCnt="2"/>
       <dgm:spPr/>
+      <dgm:t>
+        <a:bodyPr/>
+        <a:lstStyle/>
+        <a:p>
+          <a:endParaRPr lang="en-US"/>
+        </a:p>
+      </dgm:t>
     </dgm:pt>
     <dgm:pt modelId="{DD4343E3-5BD7-40E3-ABFC-202DD7905D06}" type="pres">
       <dgm:prSet presAssocID="{1BA7ADD4-40CF-45F5-AC45-FB3493AD24C8}" presName="hierChild3" presStyleCnt="0"/>
@@ -3354,10 +3646,24 @@
     <dgm:pt modelId="{0F2BFFF4-27C4-450E-8707-34CA7733E510}" type="pres">
       <dgm:prSet presAssocID="{7C1BB756-D811-4FE0-8F70-601DC66D0218}" presName="Name25" presStyleLbl="parChTrans1D4" presStyleIdx="1" presStyleCnt="2"/>
       <dgm:spPr/>
+      <dgm:t>
+        <a:bodyPr/>
+        <a:lstStyle/>
+        <a:p>
+          <a:endParaRPr lang="en-US"/>
+        </a:p>
+      </dgm:t>
     </dgm:pt>
     <dgm:pt modelId="{92EBC177-62D5-4CF0-B8E2-3ADD5486C7E7}" type="pres">
       <dgm:prSet presAssocID="{7C1BB756-D811-4FE0-8F70-601DC66D0218}" presName="connTx" presStyleLbl="parChTrans1D4" presStyleIdx="1" presStyleCnt="2"/>
       <dgm:spPr/>
+      <dgm:t>
+        <a:bodyPr/>
+        <a:lstStyle/>
+        <a:p>
+          <a:endParaRPr lang="en-US"/>
+        </a:p>
+      </dgm:t>
     </dgm:pt>
     <dgm:pt modelId="{AA6D2308-97C5-4D67-80FB-17E2A7FAB76E}" type="pres">
       <dgm:prSet presAssocID="{9672E566-1DFD-4B50-A665-9742C147F4BD}" presName="Name30" presStyleCnt="0"/>
@@ -3366,6 +3672,13 @@
     <dgm:pt modelId="{F96D7DC7-AC53-4034-A177-84900CE52899}" type="pres">
       <dgm:prSet presAssocID="{9672E566-1DFD-4B50-A665-9742C147F4BD}" presName="level2Shape" presStyleLbl="node4" presStyleIdx="1" presStyleCnt="2"/>
       <dgm:spPr/>
+      <dgm:t>
+        <a:bodyPr/>
+        <a:lstStyle/>
+        <a:p>
+          <a:endParaRPr lang="en-US"/>
+        </a:p>
+      </dgm:t>
     </dgm:pt>
     <dgm:pt modelId="{D7903E77-D662-4817-8DC5-83DDA543FB21}" type="pres">
       <dgm:prSet presAssocID="{9672E566-1DFD-4B50-A665-9742C147F4BD}" presName="hierChild3" presStyleCnt="0"/>
@@ -3382,6 +3695,13 @@
     <dgm:pt modelId="{65C7E491-E181-432C-8F0B-22821565C2DB}" type="pres">
       <dgm:prSet presAssocID="{72B91052-35EA-483F-B916-3C89261DA008}" presName="bgRect" presStyleLbl="bgShp" presStyleIdx="0" presStyleCnt="5"/>
       <dgm:spPr/>
+      <dgm:t>
+        <a:bodyPr/>
+        <a:lstStyle/>
+        <a:p>
+          <a:endParaRPr lang="en-US"/>
+        </a:p>
+      </dgm:t>
     </dgm:pt>
     <dgm:pt modelId="{7CA2F712-4314-46D9-A56F-98E99FC1ABFB}" type="pres">
       <dgm:prSet presAssocID="{72B91052-35EA-483F-B916-3C89261DA008}" presName="bgRectTx" presStyleLbl="bgShp" presStyleIdx="0" presStyleCnt="5">
@@ -3390,6 +3710,13 @@
         </dgm:presLayoutVars>
       </dgm:prSet>
       <dgm:spPr/>
+      <dgm:t>
+        <a:bodyPr/>
+        <a:lstStyle/>
+        <a:p>
+          <a:endParaRPr lang="en-US"/>
+        </a:p>
+      </dgm:t>
     </dgm:pt>
     <dgm:pt modelId="{C93E8580-8D98-4FF8-AC0D-6555CCC253C1}" type="pres">
       <dgm:prSet presAssocID="{72B91052-35EA-483F-B916-3C89261DA008}" presName="spComp" presStyleCnt="0"/>
@@ -3406,6 +3733,13 @@
     <dgm:pt modelId="{A289BB92-8B90-480F-A606-371CB7F8FF78}" type="pres">
       <dgm:prSet presAssocID="{684F7AF3-3955-4923-BB94-BE04D21A5838}" presName="bgRect" presStyleLbl="bgShp" presStyleIdx="1" presStyleCnt="5"/>
       <dgm:spPr/>
+      <dgm:t>
+        <a:bodyPr/>
+        <a:lstStyle/>
+        <a:p>
+          <a:endParaRPr lang="en-US"/>
+        </a:p>
+      </dgm:t>
     </dgm:pt>
     <dgm:pt modelId="{967BCDEA-9C1A-4641-9539-4CDCE3565D56}" type="pres">
       <dgm:prSet presAssocID="{684F7AF3-3955-4923-BB94-BE04D21A5838}" presName="bgRectTx" presStyleLbl="bgShp" presStyleIdx="1" presStyleCnt="5">
@@ -3414,6 +3748,13 @@
         </dgm:presLayoutVars>
       </dgm:prSet>
       <dgm:spPr/>
+      <dgm:t>
+        <a:bodyPr/>
+        <a:lstStyle/>
+        <a:p>
+          <a:endParaRPr lang="en-US"/>
+        </a:p>
+      </dgm:t>
     </dgm:pt>
     <dgm:pt modelId="{C44E69D1-9928-4144-A2C7-B637B64D4EDA}" type="pres">
       <dgm:prSet presAssocID="{684F7AF3-3955-4923-BB94-BE04D21A5838}" presName="spComp" presStyleCnt="0"/>
@@ -3430,6 +3771,13 @@
     <dgm:pt modelId="{D0454AE9-6993-4940-9027-1700D3D535DF}" type="pres">
       <dgm:prSet presAssocID="{D6DCC9C8-9E7B-40C7-B645-EDAEB08DED5B}" presName="bgRect" presStyleLbl="bgShp" presStyleIdx="2" presStyleCnt="5"/>
       <dgm:spPr/>
+      <dgm:t>
+        <a:bodyPr/>
+        <a:lstStyle/>
+        <a:p>
+          <a:endParaRPr lang="en-US"/>
+        </a:p>
+      </dgm:t>
     </dgm:pt>
     <dgm:pt modelId="{7E40AA55-086A-4B48-8DC5-8851C19C4DAF}" type="pres">
       <dgm:prSet presAssocID="{D6DCC9C8-9E7B-40C7-B645-EDAEB08DED5B}" presName="bgRectTx" presStyleLbl="bgShp" presStyleIdx="2" presStyleCnt="5">
@@ -3438,6 +3786,13 @@
         </dgm:presLayoutVars>
       </dgm:prSet>
       <dgm:spPr/>
+      <dgm:t>
+        <a:bodyPr/>
+        <a:lstStyle/>
+        <a:p>
+          <a:endParaRPr lang="en-US"/>
+        </a:p>
+      </dgm:t>
     </dgm:pt>
     <dgm:pt modelId="{77F11558-D287-428D-9E7B-41F68508E14B}" type="pres">
       <dgm:prSet presAssocID="{D6DCC9C8-9E7B-40C7-B645-EDAEB08DED5B}" presName="spComp" presStyleCnt="0"/>
@@ -3454,6 +3809,13 @@
     <dgm:pt modelId="{C1960B5E-B84B-49D5-9465-101913758759}" type="pres">
       <dgm:prSet presAssocID="{27D702D5-9211-494A-94E3-867D99E08A33}" presName="bgRect" presStyleLbl="bgShp" presStyleIdx="3" presStyleCnt="5"/>
       <dgm:spPr/>
+      <dgm:t>
+        <a:bodyPr/>
+        <a:lstStyle/>
+        <a:p>
+          <a:endParaRPr lang="en-US"/>
+        </a:p>
+      </dgm:t>
     </dgm:pt>
     <dgm:pt modelId="{B9D305F2-720C-4F28-BA3F-FDA9BD26DE12}" type="pres">
       <dgm:prSet presAssocID="{27D702D5-9211-494A-94E3-867D99E08A33}" presName="bgRectTx" presStyleLbl="bgShp" presStyleIdx="3" presStyleCnt="5">
@@ -3462,6 +3824,13 @@
         </dgm:presLayoutVars>
       </dgm:prSet>
       <dgm:spPr/>
+      <dgm:t>
+        <a:bodyPr/>
+        <a:lstStyle/>
+        <a:p>
+          <a:endParaRPr lang="en-US"/>
+        </a:p>
+      </dgm:t>
     </dgm:pt>
     <dgm:pt modelId="{84B25049-02F9-472E-8500-D387A215118C}" type="pres">
       <dgm:prSet presAssocID="{27D702D5-9211-494A-94E3-867D99E08A33}" presName="spComp" presStyleCnt="0"/>
@@ -3478,6 +3847,13 @@
     <dgm:pt modelId="{40B5F15E-82A3-4E0E-81D3-505AC497FF96}" type="pres">
       <dgm:prSet presAssocID="{5AAE728B-5BDB-4D95-A520-46C52DDA886A}" presName="bgRect" presStyleLbl="bgShp" presStyleIdx="4" presStyleCnt="5"/>
       <dgm:spPr/>
+      <dgm:t>
+        <a:bodyPr/>
+        <a:lstStyle/>
+        <a:p>
+          <a:endParaRPr lang="en-US"/>
+        </a:p>
+      </dgm:t>
     </dgm:pt>
     <dgm:pt modelId="{553CB591-0D23-4B9F-8A69-D03B373A74F7}" type="pres">
       <dgm:prSet presAssocID="{5AAE728B-5BDB-4D95-A520-46C52DDA886A}" presName="bgRectTx" presStyleLbl="bgShp" presStyleIdx="4" presStyleCnt="5">
@@ -3486,47 +3862,54 @@
         </dgm:presLayoutVars>
       </dgm:prSet>
       <dgm:spPr/>
+      <dgm:t>
+        <a:bodyPr/>
+        <a:lstStyle/>
+        <a:p>
+          <a:endParaRPr lang="en-US"/>
+        </a:p>
+      </dgm:t>
     </dgm:pt>
   </dgm:ptLst>
   <dgm:cxnLst>
-    <dgm:cxn modelId="{F4303F00-E294-4688-93FF-D4D5EB831051}" srcId="{47BA4117-B167-4821-84EE-950B0611161E}" destId="{644A2989-8F7E-489A-A51A-FC4600A8F6EE}" srcOrd="0" destOrd="0" parTransId="{308C2BE8-8975-4B67-BF3B-3BFA6218D37D}" sibTransId="{B0874FCA-C483-4266-968E-362739B81F8A}"/>
-    <dgm:cxn modelId="{0B7AFC06-EA97-4E92-8F59-86DBCCA8C171}" srcId="{1C1D920D-4869-42C0-8C9A-561DAC474211}" destId="{5AAE728B-5BDB-4D95-A520-46C52DDA886A}" srcOrd="5" destOrd="0" parTransId="{D8178EE8-29F3-4632-B4CC-DC85AD6C4AF5}" sibTransId="{43B50810-A31F-43B8-BC64-06205FA6B3EB}"/>
-    <dgm:cxn modelId="{25280D0D-E007-48BB-8E92-11021B3E50B1}" type="presOf" srcId="{27D702D5-9211-494A-94E3-867D99E08A33}" destId="{B9D305F2-720C-4F28-BA3F-FDA9BD26DE12}" srcOrd="1" destOrd="0" presId="urn:microsoft.com/office/officeart/2005/8/layout/hierarchy5"/>
     <dgm:cxn modelId="{4DAB1D0E-EEC9-49DA-B604-3A88FC695389}" type="presOf" srcId="{5AAE728B-5BDB-4D95-A520-46C52DDA886A}" destId="{40B5F15E-82A3-4E0E-81D3-505AC497FF96}" srcOrd="0" destOrd="0" presId="urn:microsoft.com/office/officeart/2005/8/layout/hierarchy5"/>
-    <dgm:cxn modelId="{204F3E0F-3572-43C1-B00E-356215AFD51D}" type="presOf" srcId="{06DD9CE4-4367-4488-B14C-10339EB0F944}" destId="{76D43436-595F-414A-BA43-EA7E22B1CFC5}" srcOrd="0" destOrd="0" presId="urn:microsoft.com/office/officeart/2005/8/layout/hierarchy5"/>
+    <dgm:cxn modelId="{40846877-BA73-4894-B793-0B42FFB9030E}" type="presOf" srcId="{5AAE728B-5BDB-4D95-A520-46C52DDA886A}" destId="{553CB591-0D23-4B9F-8A69-D03B373A74F7}" srcOrd="1" destOrd="0" presId="urn:microsoft.com/office/officeart/2005/8/layout/hierarchy5"/>
+    <dgm:cxn modelId="{67C3C822-DDE1-4936-839B-C9A1095018C1}" type="presOf" srcId="{308C2BE8-8975-4B67-BF3B-3BFA6218D37D}" destId="{DEDEEF15-26DA-451B-92E3-081DD8A523ED}" srcOrd="1" destOrd="0" presId="urn:microsoft.com/office/officeart/2005/8/layout/hierarchy5"/>
+    <dgm:cxn modelId="{5346A253-2BAC-44F0-9BE4-6BB5E1AAE4C6}" type="presOf" srcId="{61FD40AA-7D9F-4112-8543-CAF2B39F1F13}" destId="{80856505-6AEA-41D2-ADBA-55AB85C2B9A7}" srcOrd="1" destOrd="0" presId="urn:microsoft.com/office/officeart/2005/8/layout/hierarchy5"/>
+    <dgm:cxn modelId="{BC8E7CD6-85E2-4ACC-9553-1A77D4A94FF6}" srcId="{65ACF156-AB71-4F01-9A61-D1BC7D5ACFF4}" destId="{1BA7ADD4-40CF-45F5-AC45-FB3493AD24C8}" srcOrd="0" destOrd="0" parTransId="{06DD9CE4-4367-4488-B14C-10339EB0F944}" sibTransId="{2A650CC5-A875-4898-A9FD-2F095B26D040}"/>
+    <dgm:cxn modelId="{42E523E8-DABD-4573-BF09-827BD1CA39D3}" type="presOf" srcId="{72B91052-35EA-483F-B916-3C89261DA008}" destId="{65C7E491-E181-432C-8F0B-22821565C2DB}" srcOrd="0" destOrd="0" presId="urn:microsoft.com/office/officeart/2005/8/layout/hierarchy5"/>
+    <dgm:cxn modelId="{073DDE67-F393-4A88-8740-849ED07A4035}" type="presOf" srcId="{308C2BE8-8975-4B67-BF3B-3BFA6218D37D}" destId="{8E3B58DF-34D0-4C03-B6D2-E5DB350A6AAA}" srcOrd="0" destOrd="0" presId="urn:microsoft.com/office/officeart/2005/8/layout/hierarchy5"/>
+    <dgm:cxn modelId="{B93AC372-B074-4374-B69E-BB6E0B8743FB}" type="presOf" srcId="{1BA7ADD4-40CF-45F5-AC45-FB3493AD24C8}" destId="{9B202F8D-8EDC-48DF-B3AB-FDDC81555B13}" srcOrd="0" destOrd="0" presId="urn:microsoft.com/office/officeart/2005/8/layout/hierarchy5"/>
     <dgm:cxn modelId="{59CE5A15-B9BC-45CD-9128-F885C9892190}" type="presOf" srcId="{27D702D5-9211-494A-94E3-867D99E08A33}" destId="{C1960B5E-B84B-49D5-9465-101913758759}" srcOrd="0" destOrd="0" presId="urn:microsoft.com/office/officeart/2005/8/layout/hierarchy5"/>
-    <dgm:cxn modelId="{67C3C822-DDE1-4936-839B-C9A1095018C1}" type="presOf" srcId="{308C2BE8-8975-4B67-BF3B-3BFA6218D37D}" destId="{DEDEEF15-26DA-451B-92E3-081DD8A523ED}" srcOrd="1" destOrd="0" presId="urn:microsoft.com/office/officeart/2005/8/layout/hierarchy5"/>
-    <dgm:cxn modelId="{D76E1D24-357D-41E1-9F32-C9FB67623362}" type="presOf" srcId="{9672E566-1DFD-4B50-A665-9742C147F4BD}" destId="{F96D7DC7-AC53-4034-A177-84900CE52899}" srcOrd="0" destOrd="0" presId="urn:microsoft.com/office/officeart/2005/8/layout/hierarchy5"/>
+    <dgm:cxn modelId="{9E99EB7E-4086-49AF-9A47-492978EEE290}" type="presOf" srcId="{7C1BB756-D811-4FE0-8F70-601DC66D0218}" destId="{92EBC177-62D5-4CF0-B8E2-3ADD5486C7E7}" srcOrd="1" destOrd="0" presId="urn:microsoft.com/office/officeart/2005/8/layout/hierarchy5"/>
     <dgm:cxn modelId="{F96FE32D-D9A4-41C1-BE0B-C789569BD296}" srcId="{1C1D920D-4869-42C0-8C9A-561DAC474211}" destId="{47BA4117-B167-4821-84EE-950B0611161E}" srcOrd="0" destOrd="0" parTransId="{CFC96E73-4757-40E0-AFFA-58DE8818E275}" sibTransId="{ABC73BA2-1DC5-40A3-B314-738EBD775D92}"/>
     <dgm:cxn modelId="{1FA5DD30-F5CD-4B84-AA56-C1528A35F1C3}" srcId="{644A2989-8F7E-489A-A51A-FC4600A8F6EE}" destId="{7E880787-1118-4A03-84CC-74E8A81F6102}" srcOrd="0" destOrd="0" parTransId="{914CC7BB-D87F-447A-8E29-BB7E6A8AFF9A}" sibTransId="{834FE5FE-2B60-4048-A004-300E288D35FE}"/>
+    <dgm:cxn modelId="{865337E3-EF4C-4A84-8DCB-4F87C08BAAA3}" type="presOf" srcId="{47BA4117-B167-4821-84EE-950B0611161E}" destId="{46022313-EBCA-4190-B7CB-84D6BC5398C5}" srcOrd="0" destOrd="0" presId="urn:microsoft.com/office/officeart/2005/8/layout/hierarchy5"/>
+    <dgm:cxn modelId="{3415A7E2-EAE4-4C33-9734-E79A0BD37770}" type="presOf" srcId="{914CC7BB-D87F-447A-8E29-BB7E6A8AFF9A}" destId="{9381C90B-005C-4E0F-8CC9-097F73422BB1}" srcOrd="0" destOrd="0" presId="urn:microsoft.com/office/officeart/2005/8/layout/hierarchy5"/>
     <dgm:cxn modelId="{B44B3B3B-A0EA-41B2-AC8B-2795EB04098A}" srcId="{644A2989-8F7E-489A-A51A-FC4600A8F6EE}" destId="{65ACF156-AB71-4F01-9A61-D1BC7D5ACFF4}" srcOrd="1" destOrd="0" parTransId="{61FD40AA-7D9F-4112-8543-CAF2B39F1F13}" sibTransId="{B6C25AB8-A036-4697-8652-D69BBBB671AB}"/>
-    <dgm:cxn modelId="{598A0E3C-1429-4501-8817-FFD6D1AF6EE1}" type="presOf" srcId="{61FD40AA-7D9F-4112-8543-CAF2B39F1F13}" destId="{F14575ED-5A42-4A17-9613-94490AA8C452}" srcOrd="0" destOrd="0" presId="urn:microsoft.com/office/officeart/2005/8/layout/hierarchy5"/>
     <dgm:cxn modelId="{2CF91840-4DA7-43F4-947E-5024238BAAD7}" srcId="{1C1D920D-4869-42C0-8C9A-561DAC474211}" destId="{27D702D5-9211-494A-94E3-867D99E08A33}" srcOrd="4" destOrd="0" parTransId="{D79676B5-9FBF-4271-A037-6C222973D963}" sibTransId="{1022B1AA-6CDD-45D6-A9D6-3DE23554FB8E}"/>
+    <dgm:cxn modelId="{14D3D4CF-108F-4857-910C-128609F2B629}" type="presOf" srcId="{7E880787-1118-4A03-84CC-74E8A81F6102}" destId="{B58C9A5B-2D90-461E-ADB2-6E186FE39CC5}" srcOrd="0" destOrd="0" presId="urn:microsoft.com/office/officeart/2005/8/layout/hierarchy5"/>
+    <dgm:cxn modelId="{CF150784-C2EF-42A8-893B-57DEF60A1917}" type="presOf" srcId="{684F7AF3-3955-4923-BB94-BE04D21A5838}" destId="{967BCDEA-9C1A-4641-9539-4CDCE3565D56}" srcOrd="1" destOrd="0" presId="urn:microsoft.com/office/officeart/2005/8/layout/hierarchy5"/>
+    <dgm:cxn modelId="{520C1AEA-A826-4904-9E63-34C30359E1CC}" type="presOf" srcId="{65ACF156-AB71-4F01-9A61-D1BC7D5ACFF4}" destId="{DCD1D2C2-2966-461E-8F5A-C41D9BFC37E2}" srcOrd="0" destOrd="0" presId="urn:microsoft.com/office/officeart/2005/8/layout/hierarchy5"/>
     <dgm:cxn modelId="{9CD92340-B2D5-4A3B-A126-039D6665184F}" srcId="{1C1D920D-4869-42C0-8C9A-561DAC474211}" destId="{72B91052-35EA-483F-B916-3C89261DA008}" srcOrd="1" destOrd="0" parTransId="{58B724E0-990B-4FAA-B6C8-8D0D507B941B}" sibTransId="{2C5E3348-06DF-482C-95A2-9AB32DF9A370}"/>
-    <dgm:cxn modelId="{5346A253-2BAC-44F0-9BE4-6BB5E1AAE4C6}" type="presOf" srcId="{61FD40AA-7D9F-4112-8543-CAF2B39F1F13}" destId="{80856505-6AEA-41D2-ADBA-55AB85C2B9A7}" srcOrd="1" destOrd="0" presId="urn:microsoft.com/office/officeart/2005/8/layout/hierarchy5"/>
-    <dgm:cxn modelId="{073DDE67-F393-4A88-8740-849ED07A4035}" type="presOf" srcId="{308C2BE8-8975-4B67-BF3B-3BFA6218D37D}" destId="{8E3B58DF-34D0-4C03-B6D2-E5DB350A6AAA}" srcOrd="0" destOrd="0" presId="urn:microsoft.com/office/officeart/2005/8/layout/hierarchy5"/>
-    <dgm:cxn modelId="{8D7D2672-7F0A-41AE-B626-943081E57FFA}" type="presOf" srcId="{1C1D920D-4869-42C0-8C9A-561DAC474211}" destId="{A2BC3774-96F0-444A-8EF5-C26F08BAE144}" srcOrd="0" destOrd="0" presId="urn:microsoft.com/office/officeart/2005/8/layout/hierarchy5"/>
-    <dgm:cxn modelId="{B93AC372-B074-4374-B69E-BB6E0B8743FB}" type="presOf" srcId="{1BA7ADD4-40CF-45F5-AC45-FB3493AD24C8}" destId="{9B202F8D-8EDC-48DF-B3AB-FDDC81555B13}" srcOrd="0" destOrd="0" presId="urn:microsoft.com/office/officeart/2005/8/layout/hierarchy5"/>
-    <dgm:cxn modelId="{40846877-BA73-4894-B793-0B42FFB9030E}" type="presOf" srcId="{5AAE728B-5BDB-4D95-A520-46C52DDA886A}" destId="{553CB591-0D23-4B9F-8A69-D03B373A74F7}" srcOrd="1" destOrd="0" presId="urn:microsoft.com/office/officeart/2005/8/layout/hierarchy5"/>
+    <dgm:cxn modelId="{DE2647CD-1D99-4CF1-9F91-2EDF6016089A}" type="presOf" srcId="{644A2989-8F7E-489A-A51A-FC4600A8F6EE}" destId="{DE031C7F-D6B5-4DDD-A407-A162439B4539}" srcOrd="0" destOrd="0" presId="urn:microsoft.com/office/officeart/2005/8/layout/hierarchy5"/>
     <dgm:cxn modelId="{280B897D-9E35-4CF3-ABA7-6240C3B34838}" type="presOf" srcId="{72B91052-35EA-483F-B916-3C89261DA008}" destId="{7CA2F712-4314-46D9-A56F-98E99FC1ABFB}" srcOrd="1" destOrd="0" presId="urn:microsoft.com/office/officeart/2005/8/layout/hierarchy5"/>
-    <dgm:cxn modelId="{9E99EB7E-4086-49AF-9A47-492978EEE290}" type="presOf" srcId="{7C1BB756-D811-4FE0-8F70-601DC66D0218}" destId="{92EBC177-62D5-4CF0-B8E2-3ADD5486C7E7}" srcOrd="1" destOrd="0" presId="urn:microsoft.com/office/officeart/2005/8/layout/hierarchy5"/>
-    <dgm:cxn modelId="{CF150784-C2EF-42A8-893B-57DEF60A1917}" type="presOf" srcId="{684F7AF3-3955-4923-BB94-BE04D21A5838}" destId="{967BCDEA-9C1A-4641-9539-4CDCE3565D56}" srcOrd="1" destOrd="0" presId="urn:microsoft.com/office/officeart/2005/8/layout/hierarchy5"/>
+    <dgm:cxn modelId="{AF3B3CB7-0DF1-41BB-A1DF-57932B9BC1A4}" type="presOf" srcId="{914CC7BB-D87F-447A-8E29-BB7E6A8AFF9A}" destId="{111F041D-BA8C-499D-BDBF-A7D56E3E4DF9}" srcOrd="1" destOrd="0" presId="urn:microsoft.com/office/officeart/2005/8/layout/hierarchy5"/>
     <dgm:cxn modelId="{6F6BA5A8-137C-4720-94FA-0C4835CCFA79}" srcId="{1BA7ADD4-40CF-45F5-AC45-FB3493AD24C8}" destId="{9672E566-1DFD-4B50-A665-9742C147F4BD}" srcOrd="0" destOrd="0" parTransId="{7C1BB756-D811-4FE0-8F70-601DC66D0218}" sibTransId="{C0DC18EA-D502-4F92-822F-26018CAADEBC}"/>
     <dgm:cxn modelId="{18E38AAD-37A5-4A99-94F8-8D3EE0777F82}" type="presOf" srcId="{D6DCC9C8-9E7B-40C7-B645-EDAEB08DED5B}" destId="{D0454AE9-6993-4940-9027-1700D3D535DF}" srcOrd="0" destOrd="0" presId="urn:microsoft.com/office/officeart/2005/8/layout/hierarchy5"/>
+    <dgm:cxn modelId="{B77563D5-BE72-4511-BEE1-5CCD89E6C830}" type="presOf" srcId="{06DD9CE4-4367-4488-B14C-10339EB0F944}" destId="{6DE16CBA-4479-44F3-A9AE-B697A0700058}" srcOrd="1" destOrd="0" presId="urn:microsoft.com/office/officeart/2005/8/layout/hierarchy5"/>
+    <dgm:cxn modelId="{FB68EDE6-51D2-433E-9FFE-880E60E75B6B}" type="presOf" srcId="{D6DCC9C8-9E7B-40C7-B645-EDAEB08DED5B}" destId="{7E40AA55-086A-4B48-8DC5-8851C19C4DAF}" srcOrd="1" destOrd="0" presId="urn:microsoft.com/office/officeart/2005/8/layout/hierarchy5"/>
+    <dgm:cxn modelId="{FBB6C4C3-165A-4192-AEF5-647362593FF7}" type="presOf" srcId="{684F7AF3-3955-4923-BB94-BE04D21A5838}" destId="{A289BB92-8B90-480F-A606-371CB7F8FF78}" srcOrd="0" destOrd="0" presId="urn:microsoft.com/office/officeart/2005/8/layout/hierarchy5"/>
     <dgm:cxn modelId="{800381B4-A431-4992-B12D-900FE442BB89}" srcId="{1C1D920D-4869-42C0-8C9A-561DAC474211}" destId="{684F7AF3-3955-4923-BB94-BE04D21A5838}" srcOrd="2" destOrd="0" parTransId="{6E8F4C9C-2727-4004-A543-6D1CCB37D6AB}" sibTransId="{C453E201-F7F4-48F7-8840-C012365C24A0}"/>
-    <dgm:cxn modelId="{AF3B3CB7-0DF1-41BB-A1DF-57932B9BC1A4}" type="presOf" srcId="{914CC7BB-D87F-447A-8E29-BB7E6A8AFF9A}" destId="{111F041D-BA8C-499D-BDBF-A7D56E3E4DF9}" srcOrd="1" destOrd="0" presId="urn:microsoft.com/office/officeart/2005/8/layout/hierarchy5"/>
+    <dgm:cxn modelId="{D76E1D24-357D-41E1-9F32-C9FB67623362}" type="presOf" srcId="{9672E566-1DFD-4B50-A665-9742C147F4BD}" destId="{F96D7DC7-AC53-4034-A177-84900CE52899}" srcOrd="0" destOrd="0" presId="urn:microsoft.com/office/officeart/2005/8/layout/hierarchy5"/>
+    <dgm:cxn modelId="{204F3E0F-3572-43C1-B00E-356215AFD51D}" type="presOf" srcId="{06DD9CE4-4367-4488-B14C-10339EB0F944}" destId="{76D43436-595F-414A-BA43-EA7E22B1CFC5}" srcOrd="0" destOrd="0" presId="urn:microsoft.com/office/officeart/2005/8/layout/hierarchy5"/>
+    <dgm:cxn modelId="{598A0E3C-1429-4501-8817-FFD6D1AF6EE1}" type="presOf" srcId="{61FD40AA-7D9F-4112-8543-CAF2B39F1F13}" destId="{F14575ED-5A42-4A17-9613-94490AA8C452}" srcOrd="0" destOrd="0" presId="urn:microsoft.com/office/officeart/2005/8/layout/hierarchy5"/>
+    <dgm:cxn modelId="{25280D0D-E007-48BB-8E92-11021B3E50B1}" type="presOf" srcId="{27D702D5-9211-494A-94E3-867D99E08A33}" destId="{B9D305F2-720C-4F28-BA3F-FDA9BD26DE12}" srcOrd="1" destOrd="0" presId="urn:microsoft.com/office/officeart/2005/8/layout/hierarchy5"/>
+    <dgm:cxn modelId="{A44445F1-EF6A-4A84-A38A-EBED78829FA0}" srcId="{1C1D920D-4869-42C0-8C9A-561DAC474211}" destId="{D6DCC9C8-9E7B-40C7-B645-EDAEB08DED5B}" srcOrd="3" destOrd="0" parTransId="{2835462C-D5A3-4841-9A59-DF36A0A00AC3}" sibTransId="{08B74EE2-7FBD-4FB8-BC7F-C0C11CE81A95}"/>
+    <dgm:cxn modelId="{F4303F00-E294-4688-93FF-D4D5EB831051}" srcId="{47BA4117-B167-4821-84EE-950B0611161E}" destId="{644A2989-8F7E-489A-A51A-FC4600A8F6EE}" srcOrd="0" destOrd="0" parTransId="{308C2BE8-8975-4B67-BF3B-3BFA6218D37D}" sibTransId="{B0874FCA-C483-4266-968E-362739B81F8A}"/>
     <dgm:cxn modelId="{898C3BC2-F538-4419-A037-E69DDA69CEC2}" type="presOf" srcId="{7C1BB756-D811-4FE0-8F70-601DC66D0218}" destId="{0F2BFFF4-27C4-450E-8707-34CA7733E510}" srcOrd="0" destOrd="0" presId="urn:microsoft.com/office/officeart/2005/8/layout/hierarchy5"/>
-    <dgm:cxn modelId="{FBB6C4C3-165A-4192-AEF5-647362593FF7}" type="presOf" srcId="{684F7AF3-3955-4923-BB94-BE04D21A5838}" destId="{A289BB92-8B90-480F-A606-371CB7F8FF78}" srcOrd="0" destOrd="0" presId="urn:microsoft.com/office/officeart/2005/8/layout/hierarchy5"/>
-    <dgm:cxn modelId="{DE2647CD-1D99-4CF1-9F91-2EDF6016089A}" type="presOf" srcId="{644A2989-8F7E-489A-A51A-FC4600A8F6EE}" destId="{DE031C7F-D6B5-4DDD-A407-A162439B4539}" srcOrd="0" destOrd="0" presId="urn:microsoft.com/office/officeart/2005/8/layout/hierarchy5"/>
-    <dgm:cxn modelId="{14D3D4CF-108F-4857-910C-128609F2B629}" type="presOf" srcId="{7E880787-1118-4A03-84CC-74E8A81F6102}" destId="{B58C9A5B-2D90-461E-ADB2-6E186FE39CC5}" srcOrd="0" destOrd="0" presId="urn:microsoft.com/office/officeart/2005/8/layout/hierarchy5"/>
-    <dgm:cxn modelId="{B77563D5-BE72-4511-BEE1-5CCD89E6C830}" type="presOf" srcId="{06DD9CE4-4367-4488-B14C-10339EB0F944}" destId="{6DE16CBA-4479-44F3-A9AE-B697A0700058}" srcOrd="1" destOrd="0" presId="urn:microsoft.com/office/officeart/2005/8/layout/hierarchy5"/>
-    <dgm:cxn modelId="{BC8E7CD6-85E2-4ACC-9553-1A77D4A94FF6}" srcId="{65ACF156-AB71-4F01-9A61-D1BC7D5ACFF4}" destId="{1BA7ADD4-40CF-45F5-AC45-FB3493AD24C8}" srcOrd="0" destOrd="0" parTransId="{06DD9CE4-4367-4488-B14C-10339EB0F944}" sibTransId="{2A650CC5-A875-4898-A9FD-2F095B26D040}"/>
-    <dgm:cxn modelId="{3415A7E2-EAE4-4C33-9734-E79A0BD37770}" type="presOf" srcId="{914CC7BB-D87F-447A-8E29-BB7E6A8AFF9A}" destId="{9381C90B-005C-4E0F-8CC9-097F73422BB1}" srcOrd="0" destOrd="0" presId="urn:microsoft.com/office/officeart/2005/8/layout/hierarchy5"/>
-    <dgm:cxn modelId="{865337E3-EF4C-4A84-8DCB-4F87C08BAAA3}" type="presOf" srcId="{47BA4117-B167-4821-84EE-950B0611161E}" destId="{46022313-EBCA-4190-B7CB-84D6BC5398C5}" srcOrd="0" destOrd="0" presId="urn:microsoft.com/office/officeart/2005/8/layout/hierarchy5"/>
-    <dgm:cxn modelId="{FB68EDE6-51D2-433E-9FFE-880E60E75B6B}" type="presOf" srcId="{D6DCC9C8-9E7B-40C7-B645-EDAEB08DED5B}" destId="{7E40AA55-086A-4B48-8DC5-8851C19C4DAF}" srcOrd="1" destOrd="0" presId="urn:microsoft.com/office/officeart/2005/8/layout/hierarchy5"/>
-    <dgm:cxn modelId="{42E523E8-DABD-4573-BF09-827BD1CA39D3}" type="presOf" srcId="{72B91052-35EA-483F-B916-3C89261DA008}" destId="{65C7E491-E181-432C-8F0B-22821565C2DB}" srcOrd="0" destOrd="0" presId="urn:microsoft.com/office/officeart/2005/8/layout/hierarchy5"/>
-    <dgm:cxn modelId="{520C1AEA-A826-4904-9E63-34C30359E1CC}" type="presOf" srcId="{65ACF156-AB71-4F01-9A61-D1BC7D5ACFF4}" destId="{DCD1D2C2-2966-461E-8F5A-C41D9BFC37E2}" srcOrd="0" destOrd="0" presId="urn:microsoft.com/office/officeart/2005/8/layout/hierarchy5"/>
-    <dgm:cxn modelId="{A44445F1-EF6A-4A84-A38A-EBED78829FA0}" srcId="{1C1D920D-4869-42C0-8C9A-561DAC474211}" destId="{D6DCC9C8-9E7B-40C7-B645-EDAEB08DED5B}" srcOrd="3" destOrd="0" parTransId="{2835462C-D5A3-4841-9A59-DF36A0A00AC3}" sibTransId="{08B74EE2-7FBD-4FB8-BC7F-C0C11CE81A95}"/>
+    <dgm:cxn modelId="{8D7D2672-7F0A-41AE-B626-943081E57FFA}" type="presOf" srcId="{1C1D920D-4869-42C0-8C9A-561DAC474211}" destId="{A2BC3774-96F0-444A-8EF5-C26F08BAE144}" srcOrd="0" destOrd="0" presId="urn:microsoft.com/office/officeart/2005/8/layout/hierarchy5"/>
+    <dgm:cxn modelId="{0B7AFC06-EA97-4E92-8F59-86DBCCA8C171}" srcId="{1C1D920D-4869-42C0-8C9A-561DAC474211}" destId="{5AAE728B-5BDB-4D95-A520-46C52DDA886A}" srcOrd="5" destOrd="0" parTransId="{D8178EE8-29F3-4632-B4CC-DC85AD6C4AF5}" sibTransId="{43B50810-A31F-43B8-BC64-06205FA6B3EB}"/>
     <dgm:cxn modelId="{D17FD29B-99C1-46EB-ACD7-59F2A3B21794}" type="presParOf" srcId="{A2BC3774-96F0-444A-8EF5-C26F08BAE144}" destId="{7A63DD22-0A0B-4E8E-B668-CD566800B7D2}" srcOrd="0" destOrd="0" presId="urn:microsoft.com/office/officeart/2005/8/layout/hierarchy5"/>
     <dgm:cxn modelId="{727DAEC8-9A1B-42BF-A476-8279291E8DC0}" type="presParOf" srcId="{7A63DD22-0A0B-4E8E-B668-CD566800B7D2}" destId="{848D94CF-5D79-4858-8FA6-1F146640436E}" srcOrd="0" destOrd="0" presId="urn:microsoft.com/office/officeart/2005/8/layout/hierarchy5"/>
     <dgm:cxn modelId="{4D9F298E-76D4-4D37-AD78-0107BEA49C79}" type="presParOf" srcId="{7A63DD22-0A0B-4E8E-B668-CD566800B7D2}" destId="{5B9AF6F6-2CDF-49F3-8FBE-746E1471FAA7}" srcOrd="1" destOrd="0" presId="urn:microsoft.com/office/officeart/2005/8/layout/hierarchy5"/>
@@ -3601,318 +3984,14 @@
       <dsp:cNvGrpSpPr/>
     </dsp:nvGrpSpPr>
     <dsp:grpSpPr/>
-    <dsp:sp modelId="{1DA52C46-0957-45D5-84AB-55922474A93E}">
+    <dsp:sp modelId="{30CE19D5-C21C-471E-A851-7A903D8FE7CD}">
       <dsp:nvSpPr>
         <dsp:cNvPr id="0" name=""/>
         <dsp:cNvSpPr/>
       </dsp:nvSpPr>
       <dsp:spPr>
         <a:xfrm>
-          <a:off x="7394289" y="2023340"/>
-          <a:ext cx="1230168" cy="292724"/>
-        </a:xfrm>
-        <a:custGeom>
-          <a:avLst/>
-          <a:gdLst/>
-          <a:ahLst/>
-          <a:cxnLst/>
-          <a:rect l="0" t="0" r="0" b="0"/>
-          <a:pathLst>
-            <a:path>
-              <a:moveTo>
-                <a:pt x="0" y="0"/>
-              </a:moveTo>
-              <a:lnTo>
-                <a:pt x="0" y="199483"/>
-              </a:lnTo>
-              <a:lnTo>
-                <a:pt x="1230168" y="199483"/>
-              </a:lnTo>
-              <a:lnTo>
-                <a:pt x="1230168" y="292724"/>
-              </a:lnTo>
-            </a:path>
-          </a:pathLst>
-        </a:custGeom>
-        <a:noFill/>
-        <a:ln w="12700" cap="flat" cmpd="sng" algn="ctr">
-          <a:solidFill>
-            <a:schemeClr val="accent1">
-              <a:shade val="80000"/>
-              <a:hueOff val="0"/>
-              <a:satOff val="0"/>
-              <a:lumOff val="0"/>
-              <a:alphaOff val="0"/>
-            </a:schemeClr>
-          </a:solidFill>
-          <a:prstDash val="solid"/>
-          <a:miter lim="800000"/>
-        </a:ln>
-        <a:effectLst/>
-      </dsp:spPr>
-      <dsp:style>
-        <a:lnRef idx="2">
-          <a:scrgbClr r="0" g="0" b="0"/>
-        </a:lnRef>
-        <a:fillRef idx="0">
-          <a:scrgbClr r="0" g="0" b="0"/>
-        </a:fillRef>
-        <a:effectRef idx="0">
-          <a:scrgbClr r="0" g="0" b="0"/>
-        </a:effectRef>
-        <a:fontRef idx="minor"/>
-      </dsp:style>
-    </dsp:sp>
-    <dsp:sp modelId="{5F05445E-1615-45FE-91D2-CAEDE209D812}">
-      <dsp:nvSpPr>
-        <dsp:cNvPr id="0" name=""/>
-        <dsp:cNvSpPr/>
-      </dsp:nvSpPr>
-      <dsp:spPr>
-        <a:xfrm>
-          <a:off x="7220743" y="2023340"/>
-          <a:ext cx="173546" cy="292724"/>
-        </a:xfrm>
-        <a:custGeom>
-          <a:avLst/>
-          <a:gdLst/>
-          <a:ahLst/>
-          <a:cxnLst/>
-          <a:rect l="0" t="0" r="0" b="0"/>
-          <a:pathLst>
-            <a:path>
-              <a:moveTo>
-                <a:pt x="173546" y="0"/>
-              </a:moveTo>
-              <a:lnTo>
-                <a:pt x="173546" y="199483"/>
-              </a:lnTo>
-              <a:lnTo>
-                <a:pt x="0" y="199483"/>
-              </a:lnTo>
-              <a:lnTo>
-                <a:pt x="0" y="292724"/>
-              </a:lnTo>
-            </a:path>
-          </a:pathLst>
-        </a:custGeom>
-        <a:noFill/>
-        <a:ln w="12700" cap="flat" cmpd="sng" algn="ctr">
-          <a:solidFill>
-            <a:schemeClr val="accent1">
-              <a:shade val="80000"/>
-              <a:hueOff val="0"/>
-              <a:satOff val="0"/>
-              <a:lumOff val="0"/>
-              <a:alphaOff val="0"/>
-            </a:schemeClr>
-          </a:solidFill>
-          <a:prstDash val="solid"/>
-          <a:miter lim="800000"/>
-        </a:ln>
-        <a:effectLst/>
-      </dsp:spPr>
-      <dsp:style>
-        <a:lnRef idx="2">
-          <a:scrgbClr r="0" g="0" b="0"/>
-        </a:lnRef>
-        <a:fillRef idx="0">
-          <a:scrgbClr r="0" g="0" b="0"/>
-        </a:fillRef>
-        <a:effectRef idx="0">
-          <a:scrgbClr r="0" g="0" b="0"/>
-        </a:effectRef>
-        <a:fontRef idx="minor"/>
-      </dsp:style>
-    </dsp:sp>
-    <dsp:sp modelId="{D63F6A73-1AA5-4E17-A1AA-CDEF17CF0698}">
-      <dsp:nvSpPr>
-        <dsp:cNvPr id="0" name=""/>
-        <dsp:cNvSpPr/>
-      </dsp:nvSpPr>
-      <dsp:spPr>
-        <a:xfrm>
-          <a:off x="5990575" y="2023340"/>
-          <a:ext cx="1403714" cy="292724"/>
-        </a:xfrm>
-        <a:custGeom>
-          <a:avLst/>
-          <a:gdLst/>
-          <a:ahLst/>
-          <a:cxnLst/>
-          <a:rect l="0" t="0" r="0" b="0"/>
-          <a:pathLst>
-            <a:path>
-              <a:moveTo>
-                <a:pt x="1403714" y="0"/>
-              </a:moveTo>
-              <a:lnTo>
-                <a:pt x="1403714" y="199483"/>
-              </a:lnTo>
-              <a:lnTo>
-                <a:pt x="0" y="199483"/>
-              </a:lnTo>
-              <a:lnTo>
-                <a:pt x="0" y="292724"/>
-              </a:lnTo>
-            </a:path>
-          </a:pathLst>
-        </a:custGeom>
-        <a:noFill/>
-        <a:ln w="12700" cap="flat" cmpd="sng" algn="ctr">
-          <a:solidFill>
-            <a:schemeClr val="accent1">
-              <a:shade val="80000"/>
-              <a:hueOff val="0"/>
-              <a:satOff val="0"/>
-              <a:lumOff val="0"/>
-              <a:alphaOff val="0"/>
-            </a:schemeClr>
-          </a:solidFill>
-          <a:prstDash val="solid"/>
-          <a:miter lim="800000"/>
-        </a:ln>
-        <a:effectLst/>
-      </dsp:spPr>
-      <dsp:style>
-        <a:lnRef idx="2">
-          <a:scrgbClr r="0" g="0" b="0"/>
-        </a:lnRef>
-        <a:fillRef idx="0">
-          <a:scrgbClr r="0" g="0" b="0"/>
-        </a:fillRef>
-        <a:effectRef idx="0">
-          <a:scrgbClr r="0" g="0" b="0"/>
-        </a:effectRef>
-        <a:fontRef idx="minor"/>
-      </dsp:style>
-    </dsp:sp>
-    <dsp:sp modelId="{A787A79F-FE1A-477E-83CD-31B61485D15B}">
-      <dsp:nvSpPr>
-        <dsp:cNvPr id="0" name=""/>
-        <dsp:cNvSpPr/>
-      </dsp:nvSpPr>
-      <dsp:spPr>
-        <a:xfrm>
-          <a:off x="5154721" y="1091487"/>
-          <a:ext cx="2239567" cy="292724"/>
-        </a:xfrm>
-        <a:custGeom>
-          <a:avLst/>
-          <a:gdLst/>
-          <a:ahLst/>
-          <a:cxnLst/>
-          <a:rect l="0" t="0" r="0" b="0"/>
-          <a:pathLst>
-            <a:path>
-              <a:moveTo>
-                <a:pt x="0" y="0"/>
-              </a:moveTo>
-              <a:lnTo>
-                <a:pt x="0" y="199483"/>
-              </a:lnTo>
-              <a:lnTo>
-                <a:pt x="2239567" y="199483"/>
-              </a:lnTo>
-              <a:lnTo>
-                <a:pt x="2239567" y="292724"/>
-              </a:lnTo>
-            </a:path>
-          </a:pathLst>
-        </a:custGeom>
-        <a:noFill/>
-        <a:ln w="12700" cap="flat" cmpd="sng" algn="ctr">
-          <a:solidFill>
-            <a:schemeClr val="accent1">
-              <a:shade val="60000"/>
-              <a:hueOff val="0"/>
-              <a:satOff val="0"/>
-              <a:lumOff val="0"/>
-              <a:alphaOff val="0"/>
-            </a:schemeClr>
-          </a:solidFill>
-          <a:prstDash val="solid"/>
-          <a:miter lim="800000"/>
-        </a:ln>
-        <a:effectLst/>
-      </dsp:spPr>
-      <dsp:style>
-        <a:lnRef idx="2">
-          <a:scrgbClr r="0" g="0" b="0"/>
-        </a:lnRef>
-        <a:fillRef idx="0">
-          <a:scrgbClr r="0" g="0" b="0"/>
-        </a:fillRef>
-        <a:effectRef idx="0">
-          <a:scrgbClr r="0" g="0" b="0"/>
-        </a:effectRef>
-        <a:fontRef idx="minor"/>
-      </dsp:style>
-    </dsp:sp>
-    <dsp:sp modelId="{25CB3E1E-92FB-4EC3-9A10-DAD0D4E284CF}">
-      <dsp:nvSpPr>
-        <dsp:cNvPr id="0" name=""/>
-        <dsp:cNvSpPr/>
-      </dsp:nvSpPr>
-      <dsp:spPr>
-        <a:xfrm>
-          <a:off x="5329770" y="3887045"/>
-          <a:ext cx="91440" cy="292724"/>
-        </a:xfrm>
-        <a:custGeom>
-          <a:avLst/>
-          <a:gdLst/>
-          <a:ahLst/>
-          <a:cxnLst/>
-          <a:rect l="0" t="0" r="0" b="0"/>
-          <a:pathLst>
-            <a:path>
-              <a:moveTo>
-                <a:pt x="45720" y="0"/>
-              </a:moveTo>
-              <a:lnTo>
-                <a:pt x="45720" y="292724"/>
-              </a:lnTo>
-            </a:path>
-          </a:pathLst>
-        </a:custGeom>
-        <a:noFill/>
-        <a:ln w="12700" cap="flat" cmpd="sng" algn="ctr">
-          <a:solidFill>
-            <a:schemeClr val="accent1">
-              <a:shade val="80000"/>
-              <a:hueOff val="0"/>
-              <a:satOff val="0"/>
-              <a:lumOff val="0"/>
-              <a:alphaOff val="0"/>
-            </a:schemeClr>
-          </a:solidFill>
-          <a:prstDash val="solid"/>
-          <a:miter lim="800000"/>
-        </a:ln>
-        <a:effectLst/>
-      </dsp:spPr>
-      <dsp:style>
-        <a:lnRef idx="2">
-          <a:scrgbClr r="0" g="0" b="0"/>
-        </a:lnRef>
-        <a:fillRef idx="0">
-          <a:scrgbClr r="0" g="0" b="0"/>
-        </a:fillRef>
-        <a:effectRef idx="0">
-          <a:scrgbClr r="0" g="0" b="0"/>
-        </a:effectRef>
-        <a:fontRef idx="minor"/>
-      </dsp:style>
-    </dsp:sp>
-    <dsp:sp modelId="{F97D9EDF-E13F-4D0F-8781-B5A71300B23F}">
-      <dsp:nvSpPr>
-        <dsp:cNvPr id="0" name=""/>
-        <dsp:cNvSpPr/>
-      </dsp:nvSpPr>
-      <dsp:spPr>
-        <a:xfrm>
-          <a:off x="4760406" y="2955193"/>
+          <a:off x="7875377" y="2955193"/>
           <a:ext cx="615084" cy="292724"/>
         </a:xfrm>
         <a:custGeom>
@@ -3967,70 +4046,14 @@
         <a:fontRef idx="minor"/>
       </dsp:style>
     </dsp:sp>
-    <dsp:sp modelId="{324CF935-1935-47CA-83E5-96840FBFE437}">
+    <dsp:sp modelId="{08D92B9D-B990-423A-876F-1E3FED113F39}">
       <dsp:nvSpPr>
         <dsp:cNvPr id="0" name=""/>
         <dsp:cNvSpPr/>
       </dsp:nvSpPr>
       <dsp:spPr>
         <a:xfrm>
-          <a:off x="4099602" y="3887045"/>
-          <a:ext cx="91440" cy="292724"/>
-        </a:xfrm>
-        <a:custGeom>
-          <a:avLst/>
-          <a:gdLst/>
-          <a:ahLst/>
-          <a:cxnLst/>
-          <a:rect l="0" t="0" r="0" b="0"/>
-          <a:pathLst>
-            <a:path>
-              <a:moveTo>
-                <a:pt x="45720" y="0"/>
-              </a:moveTo>
-              <a:lnTo>
-                <a:pt x="45720" y="292724"/>
-              </a:lnTo>
-            </a:path>
-          </a:pathLst>
-        </a:custGeom>
-        <a:noFill/>
-        <a:ln w="12700" cap="flat" cmpd="sng" algn="ctr">
-          <a:solidFill>
-            <a:schemeClr val="accent1">
-              <a:shade val="80000"/>
-              <a:hueOff val="0"/>
-              <a:satOff val="0"/>
-              <a:lumOff val="0"/>
-              <a:alphaOff val="0"/>
-            </a:schemeClr>
-          </a:solidFill>
-          <a:prstDash val="solid"/>
-          <a:miter lim="800000"/>
-        </a:ln>
-        <a:effectLst/>
-      </dsp:spPr>
-      <dsp:style>
-        <a:lnRef idx="2">
-          <a:scrgbClr r="0" g="0" b="0"/>
-        </a:lnRef>
-        <a:fillRef idx="0">
-          <a:scrgbClr r="0" g="0" b="0"/>
-        </a:fillRef>
-        <a:effectRef idx="0">
-          <a:scrgbClr r="0" g="0" b="0"/>
-        </a:effectRef>
-        <a:fontRef idx="minor"/>
-      </dsp:style>
-    </dsp:sp>
-    <dsp:sp modelId="{D7FFCED2-D1F7-4DA4-BB3E-2D58E8B264B2}">
-      <dsp:nvSpPr>
-        <dsp:cNvPr id="0" name=""/>
-        <dsp:cNvSpPr/>
-      </dsp:nvSpPr>
-      <dsp:spPr>
-        <a:xfrm>
-          <a:off x="4145322" y="2955193"/>
+          <a:off x="7260293" y="2955193"/>
           <a:ext cx="615084" cy="292724"/>
         </a:xfrm>
         <a:custGeom>
@@ -4085,15 +4108,15 @@
         <a:fontRef idx="minor"/>
       </dsp:style>
     </dsp:sp>
-    <dsp:sp modelId="{473607A1-27FB-4066-9BF8-178C56FE0884}">
+    <dsp:sp modelId="{A5C7B76E-693C-419E-80D9-A29E24C8EA4A}">
       <dsp:nvSpPr>
         <dsp:cNvPr id="0" name=""/>
         <dsp:cNvSpPr/>
       </dsp:nvSpPr>
       <dsp:spPr>
         <a:xfrm>
-          <a:off x="2915153" y="2023340"/>
-          <a:ext cx="1845252" cy="292724"/>
+          <a:off x="5856579" y="2023340"/>
+          <a:ext cx="2018798" cy="292724"/>
         </a:xfrm>
         <a:custGeom>
           <a:avLst/>
@@ -4110,10 +4133,10 @@
                 <a:pt x="0" y="199483"/>
               </a:lnTo>
               <a:lnTo>
-                <a:pt x="1845252" y="199483"/>
+                <a:pt x="2018798" y="199483"/>
               </a:lnTo>
               <a:lnTo>
-                <a:pt x="1845252" y="292724"/>
+                <a:pt x="2018798" y="292724"/>
               </a:lnTo>
             </a:path>
           </a:pathLst>
@@ -4147,14 +4170,14 @@
         <a:fontRef idx="minor"/>
       </dsp:style>
     </dsp:sp>
-    <dsp:sp modelId="{4E7DC508-651C-4AC7-A964-6592E1FBDF76}">
+    <dsp:sp modelId="{1DA52C46-0957-45D5-84AB-55922474A93E}">
       <dsp:nvSpPr>
         <dsp:cNvPr id="0" name=""/>
         <dsp:cNvSpPr/>
       </dsp:nvSpPr>
       <dsp:spPr>
         <a:xfrm>
-          <a:off x="2300069" y="2955193"/>
+          <a:off x="5856579" y="2023340"/>
           <a:ext cx="615084" cy="292724"/>
         </a:xfrm>
         <a:custGeom>
@@ -4209,14 +4232,374 @@
         <a:fontRef idx="minor"/>
       </dsp:style>
     </dsp:sp>
-    <dsp:sp modelId="{AB4DEF6B-F751-4C7A-BF3F-FD72A33585F1}">
+    <dsp:sp modelId="{5F05445E-1615-45FE-91D2-CAEDE209D812}">
       <dsp:nvSpPr>
         <dsp:cNvPr id="0" name=""/>
         <dsp:cNvSpPr/>
       </dsp:nvSpPr>
       <dsp:spPr>
         <a:xfrm>
-          <a:off x="1684985" y="2955193"/>
+          <a:off x="5067948" y="2023340"/>
+          <a:ext cx="788630" cy="292724"/>
+        </a:xfrm>
+        <a:custGeom>
+          <a:avLst/>
+          <a:gdLst/>
+          <a:ahLst/>
+          <a:cxnLst/>
+          <a:rect l="0" t="0" r="0" b="0"/>
+          <a:pathLst>
+            <a:path>
+              <a:moveTo>
+                <a:pt x="788630" y="0"/>
+              </a:moveTo>
+              <a:lnTo>
+                <a:pt x="788630" y="199483"/>
+              </a:lnTo>
+              <a:lnTo>
+                <a:pt x="0" y="199483"/>
+              </a:lnTo>
+              <a:lnTo>
+                <a:pt x="0" y="292724"/>
+              </a:lnTo>
+            </a:path>
+          </a:pathLst>
+        </a:custGeom>
+        <a:noFill/>
+        <a:ln w="12700" cap="flat" cmpd="sng" algn="ctr">
+          <a:solidFill>
+            <a:schemeClr val="accent1">
+              <a:shade val="80000"/>
+              <a:hueOff val="0"/>
+              <a:satOff val="0"/>
+              <a:lumOff val="0"/>
+              <a:alphaOff val="0"/>
+            </a:schemeClr>
+          </a:solidFill>
+          <a:prstDash val="solid"/>
+          <a:miter lim="800000"/>
+        </a:ln>
+        <a:effectLst/>
+      </dsp:spPr>
+      <dsp:style>
+        <a:lnRef idx="2">
+          <a:scrgbClr r="0" g="0" b="0"/>
+        </a:lnRef>
+        <a:fillRef idx="0">
+          <a:scrgbClr r="0" g="0" b="0"/>
+        </a:fillRef>
+        <a:effectRef idx="0">
+          <a:scrgbClr r="0" g="0" b="0"/>
+        </a:effectRef>
+        <a:fontRef idx="minor"/>
+      </dsp:style>
+    </dsp:sp>
+    <dsp:sp modelId="{D63F6A73-1AA5-4E17-A1AA-CDEF17CF0698}">
+      <dsp:nvSpPr>
+        <dsp:cNvPr id="0" name=""/>
+        <dsp:cNvSpPr/>
+      </dsp:nvSpPr>
+      <dsp:spPr>
+        <a:xfrm>
+          <a:off x="3837780" y="2023340"/>
+          <a:ext cx="2018798" cy="292724"/>
+        </a:xfrm>
+        <a:custGeom>
+          <a:avLst/>
+          <a:gdLst/>
+          <a:ahLst/>
+          <a:cxnLst/>
+          <a:rect l="0" t="0" r="0" b="0"/>
+          <a:pathLst>
+            <a:path>
+              <a:moveTo>
+                <a:pt x="2018798" y="0"/>
+              </a:moveTo>
+              <a:lnTo>
+                <a:pt x="2018798" y="199483"/>
+              </a:lnTo>
+              <a:lnTo>
+                <a:pt x="0" y="199483"/>
+              </a:lnTo>
+              <a:lnTo>
+                <a:pt x="0" y="292724"/>
+              </a:lnTo>
+            </a:path>
+          </a:pathLst>
+        </a:custGeom>
+        <a:noFill/>
+        <a:ln w="12700" cap="flat" cmpd="sng" algn="ctr">
+          <a:solidFill>
+            <a:schemeClr val="accent1">
+              <a:shade val="80000"/>
+              <a:hueOff val="0"/>
+              <a:satOff val="0"/>
+              <a:lumOff val="0"/>
+              <a:alphaOff val="0"/>
+            </a:schemeClr>
+          </a:solidFill>
+          <a:prstDash val="solid"/>
+          <a:miter lim="800000"/>
+        </a:ln>
+        <a:effectLst/>
+      </dsp:spPr>
+      <dsp:style>
+        <a:lnRef idx="2">
+          <a:scrgbClr r="0" g="0" b="0"/>
+        </a:lnRef>
+        <a:fillRef idx="0">
+          <a:scrgbClr r="0" g="0" b="0"/>
+        </a:fillRef>
+        <a:effectRef idx="0">
+          <a:scrgbClr r="0" g="0" b="0"/>
+        </a:effectRef>
+        <a:fontRef idx="minor"/>
+      </dsp:style>
+    </dsp:sp>
+    <dsp:sp modelId="{A787A79F-FE1A-477E-83CD-31B61485D15B}">
+      <dsp:nvSpPr>
+        <dsp:cNvPr id="0" name=""/>
+        <dsp:cNvSpPr/>
+      </dsp:nvSpPr>
+      <dsp:spPr>
+        <a:xfrm>
+          <a:off x="3924553" y="1091487"/>
+          <a:ext cx="1932025" cy="292724"/>
+        </a:xfrm>
+        <a:custGeom>
+          <a:avLst/>
+          <a:gdLst/>
+          <a:ahLst/>
+          <a:cxnLst/>
+          <a:rect l="0" t="0" r="0" b="0"/>
+          <a:pathLst>
+            <a:path>
+              <a:moveTo>
+                <a:pt x="0" y="0"/>
+              </a:moveTo>
+              <a:lnTo>
+                <a:pt x="0" y="199483"/>
+              </a:lnTo>
+              <a:lnTo>
+                <a:pt x="1932025" y="199483"/>
+              </a:lnTo>
+              <a:lnTo>
+                <a:pt x="1932025" y="292724"/>
+              </a:lnTo>
+            </a:path>
+          </a:pathLst>
+        </a:custGeom>
+        <a:noFill/>
+        <a:ln w="12700" cap="flat" cmpd="sng" algn="ctr">
+          <a:solidFill>
+            <a:schemeClr val="accent1">
+              <a:shade val="60000"/>
+              <a:hueOff val="0"/>
+              <a:satOff val="0"/>
+              <a:lumOff val="0"/>
+              <a:alphaOff val="0"/>
+            </a:schemeClr>
+          </a:solidFill>
+          <a:prstDash val="solid"/>
+          <a:miter lim="800000"/>
+        </a:ln>
+        <a:effectLst/>
+      </dsp:spPr>
+      <dsp:style>
+        <a:lnRef idx="2">
+          <a:scrgbClr r="0" g="0" b="0"/>
+        </a:lnRef>
+        <a:fillRef idx="0">
+          <a:scrgbClr r="0" g="0" b="0"/>
+        </a:fillRef>
+        <a:effectRef idx="0">
+          <a:scrgbClr r="0" g="0" b="0"/>
+        </a:effectRef>
+        <a:fontRef idx="minor"/>
+      </dsp:style>
+    </dsp:sp>
+    <dsp:sp modelId="{25CB3E1E-92FB-4EC3-9A10-DAD0D4E284CF}">
+      <dsp:nvSpPr>
+        <dsp:cNvPr id="0" name=""/>
+        <dsp:cNvSpPr/>
+      </dsp:nvSpPr>
+      <dsp:spPr>
+        <a:xfrm>
+          <a:off x="3176976" y="3887045"/>
+          <a:ext cx="91440" cy="292724"/>
+        </a:xfrm>
+        <a:custGeom>
+          <a:avLst/>
+          <a:gdLst/>
+          <a:ahLst/>
+          <a:cxnLst/>
+          <a:rect l="0" t="0" r="0" b="0"/>
+          <a:pathLst>
+            <a:path>
+              <a:moveTo>
+                <a:pt x="45720" y="0"/>
+              </a:moveTo>
+              <a:lnTo>
+                <a:pt x="45720" y="292724"/>
+              </a:lnTo>
+            </a:path>
+          </a:pathLst>
+        </a:custGeom>
+        <a:noFill/>
+        <a:ln w="12700" cap="flat" cmpd="sng" algn="ctr">
+          <a:solidFill>
+            <a:schemeClr val="accent1">
+              <a:shade val="80000"/>
+              <a:hueOff val="0"/>
+              <a:satOff val="0"/>
+              <a:lumOff val="0"/>
+              <a:alphaOff val="0"/>
+            </a:schemeClr>
+          </a:solidFill>
+          <a:prstDash val="solid"/>
+          <a:miter lim="800000"/>
+        </a:ln>
+        <a:effectLst/>
+      </dsp:spPr>
+      <dsp:style>
+        <a:lnRef idx="2">
+          <a:scrgbClr r="0" g="0" b="0"/>
+        </a:lnRef>
+        <a:fillRef idx="0">
+          <a:scrgbClr r="0" g="0" b="0"/>
+        </a:fillRef>
+        <a:effectRef idx="0">
+          <a:scrgbClr r="0" g="0" b="0"/>
+        </a:effectRef>
+        <a:fontRef idx="minor"/>
+      </dsp:style>
+    </dsp:sp>
+    <dsp:sp modelId="{F97D9EDF-E13F-4D0F-8781-B5A71300B23F}">
+      <dsp:nvSpPr>
+        <dsp:cNvPr id="0" name=""/>
+        <dsp:cNvSpPr/>
+      </dsp:nvSpPr>
+      <dsp:spPr>
+        <a:xfrm>
+          <a:off x="2607611" y="2955193"/>
+          <a:ext cx="615084" cy="292724"/>
+        </a:xfrm>
+        <a:custGeom>
+          <a:avLst/>
+          <a:gdLst/>
+          <a:ahLst/>
+          <a:cxnLst/>
+          <a:rect l="0" t="0" r="0" b="0"/>
+          <a:pathLst>
+            <a:path>
+              <a:moveTo>
+                <a:pt x="0" y="0"/>
+              </a:moveTo>
+              <a:lnTo>
+                <a:pt x="0" y="199483"/>
+              </a:lnTo>
+              <a:lnTo>
+                <a:pt x="615084" y="199483"/>
+              </a:lnTo>
+              <a:lnTo>
+                <a:pt x="615084" y="292724"/>
+              </a:lnTo>
+            </a:path>
+          </a:pathLst>
+        </a:custGeom>
+        <a:noFill/>
+        <a:ln w="12700" cap="flat" cmpd="sng" algn="ctr">
+          <a:solidFill>
+            <a:schemeClr val="accent1">
+              <a:shade val="80000"/>
+              <a:hueOff val="0"/>
+              <a:satOff val="0"/>
+              <a:lumOff val="0"/>
+              <a:alphaOff val="0"/>
+            </a:schemeClr>
+          </a:solidFill>
+          <a:prstDash val="solid"/>
+          <a:miter lim="800000"/>
+        </a:ln>
+        <a:effectLst/>
+      </dsp:spPr>
+      <dsp:style>
+        <a:lnRef idx="2">
+          <a:scrgbClr r="0" g="0" b="0"/>
+        </a:lnRef>
+        <a:fillRef idx="0">
+          <a:scrgbClr r="0" g="0" b="0"/>
+        </a:fillRef>
+        <a:effectRef idx="0">
+          <a:scrgbClr r="0" g="0" b="0"/>
+        </a:effectRef>
+        <a:fontRef idx="minor"/>
+      </dsp:style>
+    </dsp:sp>
+    <dsp:sp modelId="{324CF935-1935-47CA-83E5-96840FBFE437}">
+      <dsp:nvSpPr>
+        <dsp:cNvPr id="0" name=""/>
+        <dsp:cNvSpPr/>
+      </dsp:nvSpPr>
+      <dsp:spPr>
+        <a:xfrm>
+          <a:off x="1946807" y="3887045"/>
+          <a:ext cx="91440" cy="292724"/>
+        </a:xfrm>
+        <a:custGeom>
+          <a:avLst/>
+          <a:gdLst/>
+          <a:ahLst/>
+          <a:cxnLst/>
+          <a:rect l="0" t="0" r="0" b="0"/>
+          <a:pathLst>
+            <a:path>
+              <a:moveTo>
+                <a:pt x="45720" y="0"/>
+              </a:moveTo>
+              <a:lnTo>
+                <a:pt x="45720" y="292724"/>
+              </a:lnTo>
+            </a:path>
+          </a:pathLst>
+        </a:custGeom>
+        <a:noFill/>
+        <a:ln w="12700" cap="flat" cmpd="sng" algn="ctr">
+          <a:solidFill>
+            <a:schemeClr val="accent1">
+              <a:shade val="80000"/>
+              <a:hueOff val="0"/>
+              <a:satOff val="0"/>
+              <a:lumOff val="0"/>
+              <a:alphaOff val="0"/>
+            </a:schemeClr>
+          </a:solidFill>
+          <a:prstDash val="solid"/>
+          <a:miter lim="800000"/>
+        </a:ln>
+        <a:effectLst/>
+      </dsp:spPr>
+      <dsp:style>
+        <a:lnRef idx="2">
+          <a:scrgbClr r="0" g="0" b="0"/>
+        </a:lnRef>
+        <a:fillRef idx="0">
+          <a:scrgbClr r="0" g="0" b="0"/>
+        </a:fillRef>
+        <a:effectRef idx="0">
+          <a:scrgbClr r="0" g="0" b="0"/>
+        </a:effectRef>
+        <a:fontRef idx="minor"/>
+      </dsp:style>
+    </dsp:sp>
+    <dsp:sp modelId="{D7FFCED2-D1F7-4DA4-BB3E-2D58E8B264B2}">
+      <dsp:nvSpPr>
+        <dsp:cNvPr id="0" name=""/>
+        <dsp:cNvSpPr/>
+      </dsp:nvSpPr>
+      <dsp:spPr>
+        <a:xfrm>
+          <a:off x="1992527" y="2955193"/>
           <a:ext cx="615084" cy="292724"/>
         </a:xfrm>
         <a:custGeom>
@@ -4271,14 +4654,76 @@
         <a:fontRef idx="minor"/>
       </dsp:style>
     </dsp:sp>
-    <dsp:sp modelId="{1E699749-40DD-43BD-989A-11CDE10DACB8}">
+    <dsp:sp modelId="{473607A1-27FB-4066-9BF8-178C56FE0884}">
       <dsp:nvSpPr>
         <dsp:cNvPr id="0" name=""/>
         <dsp:cNvSpPr/>
       </dsp:nvSpPr>
       <dsp:spPr>
         <a:xfrm>
-          <a:off x="2300069" y="2023340"/>
+          <a:off x="1992527" y="2023340"/>
+          <a:ext cx="615084" cy="292724"/>
+        </a:xfrm>
+        <a:custGeom>
+          <a:avLst/>
+          <a:gdLst/>
+          <a:ahLst/>
+          <a:cxnLst/>
+          <a:rect l="0" t="0" r="0" b="0"/>
+          <a:pathLst>
+            <a:path>
+              <a:moveTo>
+                <a:pt x="0" y="0"/>
+              </a:moveTo>
+              <a:lnTo>
+                <a:pt x="0" y="199483"/>
+              </a:lnTo>
+              <a:lnTo>
+                <a:pt x="615084" y="199483"/>
+              </a:lnTo>
+              <a:lnTo>
+                <a:pt x="615084" y="292724"/>
+              </a:lnTo>
+            </a:path>
+          </a:pathLst>
+        </a:custGeom>
+        <a:noFill/>
+        <a:ln w="12700" cap="flat" cmpd="sng" algn="ctr">
+          <a:solidFill>
+            <a:schemeClr val="accent1">
+              <a:shade val="80000"/>
+              <a:hueOff val="0"/>
+              <a:satOff val="0"/>
+              <a:lumOff val="0"/>
+              <a:alphaOff val="0"/>
+            </a:schemeClr>
+          </a:solidFill>
+          <a:prstDash val="solid"/>
+          <a:miter lim="800000"/>
+        </a:ln>
+        <a:effectLst/>
+      </dsp:spPr>
+      <dsp:style>
+        <a:lnRef idx="2">
+          <a:scrgbClr r="0" g="0" b="0"/>
+        </a:lnRef>
+        <a:fillRef idx="0">
+          <a:scrgbClr r="0" g="0" b="0"/>
+        </a:fillRef>
+        <a:effectRef idx="0">
+          <a:scrgbClr r="0" g="0" b="0"/>
+        </a:effectRef>
+        <a:fontRef idx="minor"/>
+      </dsp:style>
+    </dsp:sp>
+    <dsp:sp modelId="{214BC148-D85A-42E7-A41D-4CA859ED54EA}">
+      <dsp:nvSpPr>
+        <dsp:cNvPr id="0" name=""/>
+        <dsp:cNvSpPr/>
+      </dsp:nvSpPr>
+      <dsp:spPr>
+        <a:xfrm>
+          <a:off x="1377443" y="2023340"/>
           <a:ext cx="615084" cy="292724"/>
         </a:xfrm>
         <a:custGeom>
@@ -4333,15 +4778,15 @@
         <a:fontRef idx="minor"/>
       </dsp:style>
     </dsp:sp>
-    <dsp:sp modelId="{214BC148-D85A-42E7-A41D-4CA859ED54EA}">
+    <dsp:sp modelId="{FE690589-86B8-43FE-A41B-9D62D6430AB9}">
       <dsp:nvSpPr>
         <dsp:cNvPr id="0" name=""/>
         <dsp:cNvSpPr/>
       </dsp:nvSpPr>
       <dsp:spPr>
         <a:xfrm>
-          <a:off x="1069901" y="2023340"/>
-          <a:ext cx="1845252" cy="292724"/>
+          <a:off x="1992527" y="1091487"/>
+          <a:ext cx="1932025" cy="292724"/>
         </a:xfrm>
         <a:custGeom>
           <a:avLst/>
@@ -4352,72 +4797,10 @@
           <a:pathLst>
             <a:path>
               <a:moveTo>
-                <a:pt x="1845252" y="0"/>
+                <a:pt x="1932025" y="0"/>
               </a:moveTo>
               <a:lnTo>
-                <a:pt x="1845252" y="199483"/>
-              </a:lnTo>
-              <a:lnTo>
-                <a:pt x="0" y="199483"/>
-              </a:lnTo>
-              <a:lnTo>
-                <a:pt x="0" y="292724"/>
-              </a:lnTo>
-            </a:path>
-          </a:pathLst>
-        </a:custGeom>
-        <a:noFill/>
-        <a:ln w="12700" cap="flat" cmpd="sng" algn="ctr">
-          <a:solidFill>
-            <a:schemeClr val="accent1">
-              <a:shade val="80000"/>
-              <a:hueOff val="0"/>
-              <a:satOff val="0"/>
-              <a:lumOff val="0"/>
-              <a:alphaOff val="0"/>
-            </a:schemeClr>
-          </a:solidFill>
-          <a:prstDash val="solid"/>
-          <a:miter lim="800000"/>
-        </a:ln>
-        <a:effectLst/>
-      </dsp:spPr>
-      <dsp:style>
-        <a:lnRef idx="2">
-          <a:scrgbClr r="0" g="0" b="0"/>
-        </a:lnRef>
-        <a:fillRef idx="0">
-          <a:scrgbClr r="0" g="0" b="0"/>
-        </a:fillRef>
-        <a:effectRef idx="0">
-          <a:scrgbClr r="0" g="0" b="0"/>
-        </a:effectRef>
-        <a:fontRef idx="minor"/>
-      </dsp:style>
-    </dsp:sp>
-    <dsp:sp modelId="{FE690589-86B8-43FE-A41B-9D62D6430AB9}">
-      <dsp:nvSpPr>
-        <dsp:cNvPr id="0" name=""/>
-        <dsp:cNvSpPr/>
-      </dsp:nvSpPr>
-      <dsp:spPr>
-        <a:xfrm>
-          <a:off x="2915153" y="1091487"/>
-          <a:ext cx="2239567" cy="292724"/>
-        </a:xfrm>
-        <a:custGeom>
-          <a:avLst/>
-          <a:gdLst/>
-          <a:ahLst/>
-          <a:cxnLst/>
-          <a:rect l="0" t="0" r="0" b="0"/>
-          <a:pathLst>
-            <a:path>
-              <a:moveTo>
-                <a:pt x="2239567" y="0"/>
-              </a:moveTo>
-              <a:lnTo>
-                <a:pt x="2239567" y="199483"/>
+                <a:pt x="1932025" y="199483"/>
               </a:lnTo>
               <a:lnTo>
                 <a:pt x="0" y="199483"/>
@@ -4464,7 +4847,7 @@
       </dsp:nvSpPr>
       <dsp:spPr>
         <a:xfrm>
-          <a:off x="4343854" y="1102"/>
+          <a:off x="3113685" y="1102"/>
           <a:ext cx="1621735" cy="1090385"/>
         </a:xfrm>
         <a:prstGeom prst="roundRect">
@@ -4516,7 +4899,7 @@
       </dsp:nvSpPr>
       <dsp:spPr>
         <a:xfrm>
-          <a:off x="4455687" y="107344"/>
+          <a:off x="3225519" y="107344"/>
           <a:ext cx="1621735" cy="1090385"/>
         </a:xfrm>
         <a:prstGeom prst="roundRect">
@@ -4565,7 +4948,7 @@
         </a:bodyPr>
         <a:lstStyle/>
         <a:p>
-          <a:pPr marL="0" lvl="0" indent="0" algn="ctr" defTabSz="533400">
+          <a:pPr lvl="0" algn="ctr" defTabSz="533400">
             <a:lnSpc>
               <a:spcPct val="90000"/>
             </a:lnSpc>
@@ -4575,7 +4958,6 @@
             <a:spcAft>
               <a:spcPct val="35000"/>
             </a:spcAft>
-            <a:buNone/>
           </a:pPr>
           <a:r>
             <a:rPr lang="en-CA" sz="1200" b="1" kern="1200" dirty="0" err="1"/>
@@ -4601,7 +4983,7 @@
         </a:p>
       </dsp:txBody>
       <dsp:txXfrm>
-        <a:off x="4487623" y="139280"/>
+        <a:off x="3257455" y="139280"/>
         <a:ext cx="1557863" cy="1026513"/>
       </dsp:txXfrm>
     </dsp:sp>
@@ -4612,7 +4994,7 @@
       </dsp:nvSpPr>
       <dsp:spPr>
         <a:xfrm>
-          <a:off x="2411903" y="1384212"/>
+          <a:off x="1489276" y="1384212"/>
           <a:ext cx="1006501" cy="639128"/>
         </a:xfrm>
         <a:prstGeom prst="roundRect">
@@ -4664,7 +5046,7 @@
       </dsp:nvSpPr>
       <dsp:spPr>
         <a:xfrm>
-          <a:off x="2523736" y="1490453"/>
+          <a:off x="1601110" y="1490453"/>
           <a:ext cx="1006501" cy="639128"/>
         </a:xfrm>
         <a:prstGeom prst="roundRect">
@@ -4713,7 +5095,7 @@
         </a:bodyPr>
         <a:lstStyle/>
         <a:p>
-          <a:pPr marL="0" lvl="0" indent="0" algn="ctr" defTabSz="622300">
+          <a:pPr lvl="0" algn="ctr" defTabSz="622300">
             <a:lnSpc>
               <a:spcPct val="90000"/>
             </a:lnSpc>
@@ -4723,7 +5105,6 @@
             <a:spcAft>
               <a:spcPct val="35000"/>
             </a:spcAft>
-            <a:buNone/>
           </a:pPr>
           <a:r>
             <a:rPr lang="en-US" sz="1400" kern="1200" baseline="0" dirty="0"/>
@@ -4732,7 +5113,7 @@
         </a:p>
       </dsp:txBody>
       <dsp:txXfrm>
-        <a:off x="2542455" y="1509172"/>
+        <a:off x="1619829" y="1509172"/>
         <a:ext cx="969063" cy="601690"/>
       </dsp:txXfrm>
     </dsp:sp>
@@ -4743,7 +5124,7 @@
       </dsp:nvSpPr>
       <dsp:spPr>
         <a:xfrm>
-          <a:off x="566650" y="2316064"/>
+          <a:off x="874192" y="2316064"/>
           <a:ext cx="1006501" cy="639128"/>
         </a:xfrm>
         <a:prstGeom prst="roundRect">
@@ -4795,7 +5176,7 @@
       </dsp:nvSpPr>
       <dsp:spPr>
         <a:xfrm>
-          <a:off x="678483" y="2422306"/>
+          <a:off x="986026" y="2422306"/>
           <a:ext cx="1006501" cy="639128"/>
         </a:xfrm>
         <a:prstGeom prst="roundRect">
@@ -4844,7 +5225,7 @@
         </a:bodyPr>
         <a:lstStyle/>
         <a:p>
-          <a:pPr marL="0" lvl="0" indent="0" algn="ctr" defTabSz="622300">
+          <a:pPr lvl="0" algn="ctr" defTabSz="622300">
             <a:lnSpc>
               <a:spcPct val="90000"/>
             </a:lnSpc>
@@ -4854,7 +5235,6 @@
             <a:spcAft>
               <a:spcPct val="35000"/>
             </a:spcAft>
-            <a:buNone/>
           </a:pPr>
           <a:r>
             <a:rPr lang="en-US" sz="1400" kern="1200" baseline="0" dirty="0"/>
@@ -4863,18 +5243,18 @@
         </a:p>
       </dsp:txBody>
       <dsp:txXfrm>
-        <a:off x="697202" y="2441025"/>
+        <a:off x="1004745" y="2441025"/>
         <a:ext cx="969063" cy="601690"/>
       </dsp:txXfrm>
     </dsp:sp>
-    <dsp:sp modelId="{DBCC1B88-3490-4A64-952E-E20BB6003DEF}">
+    <dsp:sp modelId="{293A0CDE-33F3-46EC-8856-E5BA013A63E4}">
       <dsp:nvSpPr>
         <dsp:cNvPr id="0" name=""/>
         <dsp:cNvSpPr/>
       </dsp:nvSpPr>
       <dsp:spPr>
         <a:xfrm>
-          <a:off x="1796818" y="2316064"/>
+          <a:off x="2104361" y="2316064"/>
           <a:ext cx="1006501" cy="639128"/>
         </a:xfrm>
         <a:prstGeom prst="roundRect">
@@ -4919,14 +5299,14 @@
         </a:fontRef>
       </dsp:style>
     </dsp:sp>
-    <dsp:sp modelId="{7627023D-68E6-41F5-A314-0DE0565DC153}">
+    <dsp:sp modelId="{32523095-824A-4E5E-BB13-108F6A7832E0}">
       <dsp:nvSpPr>
         <dsp:cNvPr id="0" name=""/>
         <dsp:cNvSpPr/>
       </dsp:nvSpPr>
       <dsp:spPr>
         <a:xfrm>
-          <a:off x="1908652" y="2422306"/>
+          <a:off x="2216194" y="2422306"/>
           <a:ext cx="1006501" cy="639128"/>
         </a:xfrm>
         <a:prstGeom prst="roundRect">
@@ -4970,12 +5350,12 @@
         <a:fontRef idx="minor"/>
       </dsp:style>
       <dsp:txBody>
-        <a:bodyPr spcFirstLastPara="0" vert="horz" wrap="square" lIns="53340" tIns="53340" rIns="53340" bIns="53340" numCol="1" spcCol="1270" anchor="ctr" anchorCtr="0">
+        <a:bodyPr spcFirstLastPara="0" vert="horz" wrap="square" lIns="49530" tIns="49530" rIns="49530" bIns="49530" numCol="1" spcCol="1270" anchor="ctr" anchorCtr="0">
           <a:noAutofit/>
         </a:bodyPr>
         <a:lstStyle/>
         <a:p>
-          <a:pPr marL="0" lvl="0" indent="0" algn="ctr" defTabSz="622300">
+          <a:pPr lvl="0" algn="ctr" defTabSz="577850">
             <a:lnSpc>
               <a:spcPct val="90000"/>
             </a:lnSpc>
@@ -4985,27 +5365,27 @@
             <a:spcAft>
               <a:spcPct val="35000"/>
             </a:spcAft>
-            <a:buNone/>
           </a:pPr>
           <a:r>
-            <a:rPr lang="en-US" sz="1400" kern="1200" baseline="0" dirty="0"/>
-            <a:t>revisions</a:t>
+            <a:rPr lang="en-US" sz="1300" kern="1200"/>
+            <a:t>derivatives</a:t>
           </a:r>
+          <a:endParaRPr lang="en-US" sz="1300" kern="1200" baseline="0" dirty="0"/>
         </a:p>
       </dsp:txBody>
       <dsp:txXfrm>
-        <a:off x="1927371" y="2441025"/>
+        <a:off x="2234913" y="2441025"/>
         <a:ext cx="969063" cy="601690"/>
       </dsp:txXfrm>
     </dsp:sp>
-    <dsp:sp modelId="{CE0F9948-6955-4301-8F2D-E0BD63D5DDCE}">
+    <dsp:sp modelId="{C37F13D2-50DF-46CE-B8DA-DB2E58BF9FDF}">
       <dsp:nvSpPr>
         <dsp:cNvPr id="0" name=""/>
         <dsp:cNvSpPr/>
       </dsp:nvSpPr>
       <dsp:spPr>
         <a:xfrm>
-          <a:off x="1181734" y="3247917"/>
+          <a:off x="1489276" y="3247917"/>
           <a:ext cx="1006501" cy="639128"/>
         </a:xfrm>
         <a:prstGeom prst="roundRect">
@@ -5050,14 +5430,14 @@
         </a:fontRef>
       </dsp:style>
     </dsp:sp>
-    <dsp:sp modelId="{9EDCDDC1-BD6E-485B-A244-E75823256875}">
+    <dsp:sp modelId="{177B5FD7-7D73-4372-BC75-34654571A3BB}">
       <dsp:nvSpPr>
         <dsp:cNvPr id="0" name=""/>
         <dsp:cNvSpPr/>
       </dsp:nvSpPr>
       <dsp:spPr>
         <a:xfrm>
-          <a:off x="1293568" y="3354159"/>
+          <a:off x="1601110" y="3354159"/>
           <a:ext cx="1006501" cy="639128"/>
         </a:xfrm>
         <a:prstGeom prst="roundRect">
@@ -5106,7 +5486,7 @@
         </a:bodyPr>
         <a:lstStyle/>
         <a:p>
-          <a:pPr marL="0" lvl="0" indent="0" algn="ctr" defTabSz="577850">
+          <a:pPr lvl="0" algn="ctr" defTabSz="577850">
             <a:lnSpc>
               <a:spcPct val="90000"/>
             </a:lnSpc>
@@ -5116,27 +5496,34 @@
             <a:spcAft>
               <a:spcPct val="35000"/>
             </a:spcAft>
-            <a:buNone/>
           </a:pPr>
           <a:r>
             <a:rPr lang="en-US" sz="1300" kern="1200" baseline="0" dirty="0"/>
-            <a:t>1.xml</a:t>
+            <a:t>Folder # on disk (&lt;</a:t>
+          </a:r>
+          <a:r>
+            <a:rPr lang="en-US" sz="1300" kern="1200" baseline="0" dirty="0" err="1"/>
+            <a:t>pos</a:t>
+          </a:r>
+          <a:r>
+            <a:rPr lang="en-US" sz="1300" kern="1200" baseline="0" dirty="0"/>
+            <a:t>&gt;)</a:t>
           </a:r>
         </a:p>
       </dsp:txBody>
       <dsp:txXfrm>
-        <a:off x="1312287" y="3372878"/>
+        <a:off x="1619829" y="3372878"/>
         <a:ext cx="969063" cy="601690"/>
       </dsp:txXfrm>
     </dsp:sp>
-    <dsp:sp modelId="{EC212F02-5A53-441E-BA40-74A46D8B49AA}">
+    <dsp:sp modelId="{37473B37-D036-441C-AF30-D277B72B0661}">
       <dsp:nvSpPr>
         <dsp:cNvPr id="0" name=""/>
         <dsp:cNvSpPr/>
       </dsp:nvSpPr>
       <dsp:spPr>
         <a:xfrm>
-          <a:off x="2411903" y="3247917"/>
+          <a:off x="1489276" y="4179769"/>
           <a:ext cx="1006501" cy="639128"/>
         </a:xfrm>
         <a:prstGeom prst="roundRect">
@@ -5181,14 +5568,14 @@
         </a:fontRef>
       </dsp:style>
     </dsp:sp>
-    <dsp:sp modelId="{F5D33BEE-6B78-4387-ABEC-A540DAF8CDC3}">
+    <dsp:sp modelId="{20F962D1-CEF5-4AC2-8C8B-9B1FB6606F81}">
       <dsp:nvSpPr>
         <dsp:cNvPr id="0" name=""/>
         <dsp:cNvSpPr/>
       </dsp:nvSpPr>
       <dsp:spPr>
         <a:xfrm>
-          <a:off x="2523736" y="3354159"/>
+          <a:off x="1601110" y="4286011"/>
           <a:ext cx="1006501" cy="639128"/>
         </a:xfrm>
         <a:prstGeom prst="roundRect">
@@ -5237,7 +5624,7 @@
         </a:bodyPr>
         <a:lstStyle/>
         <a:p>
-          <a:pPr marL="0" lvl="0" indent="0" algn="ctr" defTabSz="577850">
+          <a:pPr lvl="0" algn="ctr" defTabSz="577850">
             <a:lnSpc>
               <a:spcPct val="90000"/>
             </a:lnSpc>
@@ -5247,27 +5634,26 @@
             <a:spcAft>
               <a:spcPct val="35000"/>
             </a:spcAft>
-            <a:buNone/>
           </a:pPr>
           <a:r>
             <a:rPr lang="en-US" sz="1300" kern="1200" baseline="0" dirty="0"/>
-            <a:t>2.xml</a:t>
+            <a:t>filename</a:t>
           </a:r>
         </a:p>
       </dsp:txBody>
       <dsp:txXfrm>
-        <a:off x="2542455" y="3372878"/>
+        <a:off x="1619829" y="4304730"/>
         <a:ext cx="969063" cy="601690"/>
       </dsp:txXfrm>
     </dsp:sp>
-    <dsp:sp modelId="{293A0CDE-33F3-46EC-8856-E5BA013A63E4}">
+    <dsp:sp modelId="{7EA5CF7E-3592-4848-AEBD-D3159C97287C}">
       <dsp:nvSpPr>
         <dsp:cNvPr id="0" name=""/>
         <dsp:cNvSpPr/>
       </dsp:nvSpPr>
       <dsp:spPr>
         <a:xfrm>
-          <a:off x="4257155" y="2316064"/>
+          <a:off x="2719445" y="3247917"/>
           <a:ext cx="1006501" cy="639128"/>
         </a:xfrm>
         <a:prstGeom prst="roundRect">
@@ -5312,14 +5698,14 @@
         </a:fontRef>
       </dsp:style>
     </dsp:sp>
-    <dsp:sp modelId="{32523095-824A-4E5E-BB13-108F6A7832E0}">
+    <dsp:sp modelId="{A29A621D-FDB0-41DF-A1D4-75FD9D5980A5}">
       <dsp:nvSpPr>
         <dsp:cNvPr id="0" name=""/>
         <dsp:cNvSpPr/>
       </dsp:nvSpPr>
       <dsp:spPr>
         <a:xfrm>
-          <a:off x="4368989" y="2422306"/>
+          <a:off x="2831278" y="3354159"/>
           <a:ext cx="1006501" cy="639128"/>
         </a:xfrm>
         <a:prstGeom prst="roundRect">
@@ -5368,7 +5754,7 @@
         </a:bodyPr>
         <a:lstStyle/>
         <a:p>
-          <a:pPr marL="0" lvl="0" indent="0" algn="ctr" defTabSz="577850">
+          <a:pPr lvl="0" algn="ctr" defTabSz="577850">
             <a:lnSpc>
               <a:spcPct val="90000"/>
             </a:lnSpc>
@@ -5378,28 +5764,34 @@
             <a:spcAft>
               <a:spcPct val="35000"/>
             </a:spcAft>
-            <a:buNone/>
           </a:pPr>
           <a:r>
-            <a:rPr lang="en-US" sz="1300" kern="1200"/>
-            <a:t>derivatives</a:t>
+            <a:rPr lang="en-US" sz="1300" kern="1200" baseline="0" dirty="0"/>
+            <a:t>Folder # on disk (&lt;</a:t>
           </a:r>
-          <a:endParaRPr lang="en-US" sz="1300" kern="1200" baseline="0" dirty="0"/>
+          <a:r>
+            <a:rPr lang="en-US" sz="1300" kern="1200" baseline="0" dirty="0" err="1"/>
+            <a:t>pos</a:t>
+          </a:r>
+          <a:r>
+            <a:rPr lang="en-US" sz="1300" kern="1200" baseline="0" dirty="0"/>
+            <a:t>&gt;)</a:t>
+          </a:r>
         </a:p>
       </dsp:txBody>
       <dsp:txXfrm>
-        <a:off x="4387708" y="2441025"/>
+        <a:off x="2849997" y="3372878"/>
         <a:ext cx="969063" cy="601690"/>
       </dsp:txXfrm>
     </dsp:sp>
-    <dsp:sp modelId="{C37F13D2-50DF-46CE-B8DA-DB2E58BF9FDF}">
+    <dsp:sp modelId="{85C74A9C-AAF1-40A4-BEAC-47F880039518}">
       <dsp:nvSpPr>
         <dsp:cNvPr id="0" name=""/>
         <dsp:cNvSpPr/>
       </dsp:nvSpPr>
       <dsp:spPr>
         <a:xfrm>
-          <a:off x="3642071" y="3247917"/>
+          <a:off x="2719445" y="4179769"/>
           <a:ext cx="1006501" cy="639128"/>
         </a:xfrm>
         <a:prstGeom prst="roundRect">
@@ -5444,14 +5836,14 @@
         </a:fontRef>
       </dsp:style>
     </dsp:sp>
-    <dsp:sp modelId="{177B5FD7-7D73-4372-BC75-34654571A3BB}">
+    <dsp:sp modelId="{20B05BA1-6646-492F-999C-1460239F9202}">
       <dsp:nvSpPr>
         <dsp:cNvPr id="0" name=""/>
         <dsp:cNvSpPr/>
       </dsp:nvSpPr>
       <dsp:spPr>
         <a:xfrm>
-          <a:off x="3753905" y="3354159"/>
+          <a:off x="2831278" y="4286011"/>
           <a:ext cx="1006501" cy="639128"/>
         </a:xfrm>
         <a:prstGeom prst="roundRect">
@@ -5500,7 +5892,7 @@
         </a:bodyPr>
         <a:lstStyle/>
         <a:p>
-          <a:pPr marL="0" lvl="0" indent="0" algn="ctr" defTabSz="577850">
+          <a:pPr lvl="0" algn="ctr" defTabSz="577850">
             <a:lnSpc>
               <a:spcPct val="90000"/>
             </a:lnSpc>
@@ -5510,35 +5902,26 @@
             <a:spcAft>
               <a:spcPct val="35000"/>
             </a:spcAft>
-            <a:buNone/>
           </a:pPr>
           <a:r>
             <a:rPr lang="en-US" sz="1300" kern="1200" baseline="0" dirty="0"/>
-            <a:t>Folder # on disk (&lt;</a:t>
-          </a:r>
-          <a:r>
-            <a:rPr lang="en-US" sz="1300" kern="1200" baseline="0" dirty="0" err="1"/>
-            <a:t>pos</a:t>
-          </a:r>
-          <a:r>
-            <a:rPr lang="en-US" sz="1300" kern="1200" baseline="0" dirty="0"/>
-            <a:t>&gt;)</a:t>
+            <a:t>filename</a:t>
           </a:r>
         </a:p>
       </dsp:txBody>
       <dsp:txXfrm>
-        <a:off x="3772624" y="3372878"/>
+        <a:off x="2849997" y="4304730"/>
         <a:ext cx="969063" cy="601690"/>
       </dsp:txXfrm>
     </dsp:sp>
-    <dsp:sp modelId="{37473B37-D036-441C-AF30-D277B72B0661}">
+    <dsp:sp modelId="{C308A9D1-D240-4771-B544-89D7A9E33D63}">
       <dsp:nvSpPr>
         <dsp:cNvPr id="0" name=""/>
         <dsp:cNvSpPr/>
       </dsp:nvSpPr>
       <dsp:spPr>
         <a:xfrm>
-          <a:off x="3642071" y="4179769"/>
+          <a:off x="5353328" y="1384212"/>
           <a:ext cx="1006501" cy="639128"/>
         </a:xfrm>
         <a:prstGeom prst="roundRect">
@@ -5583,14 +5966,14 @@
         </a:fontRef>
       </dsp:style>
     </dsp:sp>
-    <dsp:sp modelId="{20F962D1-CEF5-4AC2-8C8B-9B1FB6606F81}">
+    <dsp:sp modelId="{A87540D3-F830-41BD-9A10-CD1CDC824B11}">
       <dsp:nvSpPr>
         <dsp:cNvPr id="0" name=""/>
         <dsp:cNvSpPr/>
       </dsp:nvSpPr>
       <dsp:spPr>
         <a:xfrm>
-          <a:off x="3753905" y="4286011"/>
+          <a:off x="5465161" y="1490453"/>
           <a:ext cx="1006501" cy="639128"/>
         </a:xfrm>
         <a:prstGeom prst="roundRect">
@@ -5634,12 +6017,12 @@
         <a:fontRef idx="minor"/>
       </dsp:style>
       <dsp:txBody>
-        <a:bodyPr spcFirstLastPara="0" vert="horz" wrap="square" lIns="49530" tIns="49530" rIns="49530" bIns="49530" numCol="1" spcCol="1270" anchor="ctr" anchorCtr="0">
+        <a:bodyPr spcFirstLastPara="0" vert="horz" wrap="square" lIns="53340" tIns="53340" rIns="53340" bIns="53340" numCol="1" spcCol="1270" anchor="ctr" anchorCtr="0">
           <a:noAutofit/>
         </a:bodyPr>
         <a:lstStyle/>
         <a:p>
-          <a:pPr marL="0" lvl="0" indent="0" algn="ctr" defTabSz="577850">
+          <a:pPr lvl="0" algn="ctr" defTabSz="622300">
             <a:lnSpc>
               <a:spcPct val="90000"/>
             </a:lnSpc>
@@ -5649,27 +6032,26 @@
             <a:spcAft>
               <a:spcPct val="35000"/>
             </a:spcAft>
-            <a:buNone/>
           </a:pPr>
           <a:r>
-            <a:rPr lang="en-US" sz="1300" kern="1200" baseline="0" dirty="0"/>
-            <a:t>filename</a:t>
+            <a:rPr lang="en-US" sz="1400" kern="1200" baseline="0" dirty="0"/>
+            <a:t>metadata</a:t>
           </a:r>
         </a:p>
       </dsp:txBody>
       <dsp:txXfrm>
-        <a:off x="3772624" y="4304730"/>
+        <a:off x="5483880" y="1509172"/>
         <a:ext cx="969063" cy="601690"/>
       </dsp:txXfrm>
     </dsp:sp>
-    <dsp:sp modelId="{7EA5CF7E-3592-4848-AEBD-D3159C97287C}">
+    <dsp:sp modelId="{E05D9250-02A1-466E-9394-D878C6B21066}">
       <dsp:nvSpPr>
         <dsp:cNvPr id="0" name=""/>
         <dsp:cNvSpPr/>
       </dsp:nvSpPr>
       <dsp:spPr>
         <a:xfrm>
-          <a:off x="4872240" y="3247917"/>
+          <a:off x="3334529" y="2316064"/>
           <a:ext cx="1006501" cy="639128"/>
         </a:xfrm>
         <a:prstGeom prst="roundRect">
@@ -5714,14 +6096,14 @@
         </a:fontRef>
       </dsp:style>
     </dsp:sp>
-    <dsp:sp modelId="{A29A621D-FDB0-41DF-A1D4-75FD9D5980A5}">
+    <dsp:sp modelId="{9450FCFE-5D5E-48BB-B65E-15E8D1D3F1C8}">
       <dsp:nvSpPr>
         <dsp:cNvPr id="0" name=""/>
         <dsp:cNvSpPr/>
       </dsp:nvSpPr>
       <dsp:spPr>
         <a:xfrm>
-          <a:off x="4984073" y="3354159"/>
+          <a:off x="3446363" y="2422306"/>
           <a:ext cx="1006501" cy="639128"/>
         </a:xfrm>
         <a:prstGeom prst="roundRect">
@@ -5765,12 +6147,12 @@
         <a:fontRef idx="minor"/>
       </dsp:style>
       <dsp:txBody>
-        <a:bodyPr spcFirstLastPara="0" vert="horz" wrap="square" lIns="49530" tIns="49530" rIns="49530" bIns="49530" numCol="1" spcCol="1270" anchor="ctr" anchorCtr="0">
+        <a:bodyPr spcFirstLastPara="0" vert="horz" wrap="square" lIns="53340" tIns="53340" rIns="53340" bIns="53340" numCol="1" spcCol="1270" anchor="ctr" anchorCtr="0">
           <a:noAutofit/>
         </a:bodyPr>
         <a:lstStyle/>
         <a:p>
-          <a:pPr marL="0" lvl="0" indent="0" algn="ctr" defTabSz="577850">
+          <a:pPr lvl="0" algn="ctr" defTabSz="622300">
             <a:lnSpc>
               <a:spcPct val="90000"/>
             </a:lnSpc>
@@ -5780,35 +6162,26 @@
             <a:spcAft>
               <a:spcPct val="35000"/>
             </a:spcAft>
-            <a:buNone/>
           </a:pPr>
           <a:r>
-            <a:rPr lang="en-US" sz="1300" kern="1200" baseline="0" dirty="0"/>
-            <a:t>Folder # on disk (&lt;</a:t>
-          </a:r>
-          <a:r>
-            <a:rPr lang="en-US" sz="1300" kern="1200" baseline="0" dirty="0" err="1"/>
-            <a:t>pos</a:t>
-          </a:r>
-          <a:r>
-            <a:rPr lang="en-US" sz="1300" kern="1200" baseline="0" dirty="0"/>
-            <a:t>&gt;)</a:t>
+            <a:rPr lang="en-US" sz="1400" kern="1200" baseline="0" dirty="0"/>
+            <a:t>checksum.md5</a:t>
           </a:r>
         </a:p>
       </dsp:txBody>
       <dsp:txXfrm>
-        <a:off x="5002792" y="3372878"/>
+        <a:off x="3465082" y="2441025"/>
         <a:ext cx="969063" cy="601690"/>
       </dsp:txXfrm>
     </dsp:sp>
-    <dsp:sp modelId="{85C74A9C-AAF1-40A4-BEAC-47F880039518}">
+    <dsp:sp modelId="{D1DB5463-056A-4879-ADA8-42770FCA7B99}">
       <dsp:nvSpPr>
         <dsp:cNvPr id="0" name=""/>
         <dsp:cNvSpPr/>
       </dsp:nvSpPr>
       <dsp:spPr>
         <a:xfrm>
-          <a:off x="4872240" y="4179769"/>
+          <a:off x="4564698" y="2316064"/>
           <a:ext cx="1006501" cy="639128"/>
         </a:xfrm>
         <a:prstGeom prst="roundRect">
@@ -5853,14 +6226,14 @@
         </a:fontRef>
       </dsp:style>
     </dsp:sp>
-    <dsp:sp modelId="{20B05BA1-6646-492F-999C-1460239F9202}">
+    <dsp:sp modelId="{32C02F5D-2AFD-4AEB-B702-B9D5EDFC6578}">
       <dsp:nvSpPr>
         <dsp:cNvPr id="0" name=""/>
         <dsp:cNvSpPr/>
       </dsp:nvSpPr>
       <dsp:spPr>
         <a:xfrm>
-          <a:off x="4984073" y="4286011"/>
+          <a:off x="4676531" y="2422306"/>
           <a:ext cx="1006501" cy="639128"/>
         </a:xfrm>
         <a:prstGeom prst="roundRect">
@@ -5904,12 +6277,12 @@
         <a:fontRef idx="minor"/>
       </dsp:style>
       <dsp:txBody>
-        <a:bodyPr spcFirstLastPara="0" vert="horz" wrap="square" lIns="49530" tIns="49530" rIns="49530" bIns="49530" numCol="1" spcCol="1270" anchor="ctr" anchorCtr="0">
+        <a:bodyPr spcFirstLastPara="0" vert="horz" wrap="square" lIns="53340" tIns="53340" rIns="53340" bIns="53340" numCol="1" spcCol="1270" anchor="ctr" anchorCtr="0">
           <a:noAutofit/>
         </a:bodyPr>
         <a:lstStyle/>
         <a:p>
-          <a:pPr marL="0" lvl="0" indent="0" algn="ctr" defTabSz="577850">
+          <a:pPr lvl="0" algn="ctr" defTabSz="622300">
             <a:lnSpc>
               <a:spcPct val="90000"/>
             </a:lnSpc>
@@ -5919,27 +6292,167 @@
             <a:spcAft>
               <a:spcPct val="35000"/>
             </a:spcAft>
-            <a:buNone/>
           </a:pPr>
           <a:r>
-            <a:rPr lang="en-US" sz="1300" kern="1200" baseline="0" dirty="0"/>
-            <a:t>filename</a:t>
+            <a:rPr lang="en-US" sz="1400" kern="1200" baseline="0" dirty="0"/>
+            <a:t>EP3.xml</a:t>
           </a:r>
         </a:p>
       </dsp:txBody>
       <dsp:txXfrm>
-        <a:off x="5002792" y="4304730"/>
+        <a:off x="4695250" y="2441025"/>
         <a:ext cx="969063" cy="601690"/>
       </dsp:txXfrm>
     </dsp:sp>
-    <dsp:sp modelId="{C308A9D1-D240-4771-B544-89D7A9E33D63}">
+    <dsp:sp modelId="{B898930F-812D-4B70-A930-6FC5D6860FF4}">
       <dsp:nvSpPr>
         <dsp:cNvPr id="0" name=""/>
         <dsp:cNvSpPr/>
       </dsp:nvSpPr>
       <dsp:spPr>
         <a:xfrm>
-          <a:off x="6891039" y="1384212"/>
+          <a:off x="5794866" y="2316064"/>
+          <a:ext cx="1353593" cy="639128"/>
+        </a:xfrm>
+        <a:prstGeom prst="roundRect">
+          <a:avLst>
+            <a:gd name="adj" fmla="val 10000"/>
+          </a:avLst>
+        </a:prstGeom>
+        <a:solidFill>
+          <a:schemeClr val="accent1">
+            <a:hueOff val="0"/>
+            <a:satOff val="0"/>
+            <a:lumOff val="0"/>
+            <a:alphaOff val="0"/>
+          </a:schemeClr>
+        </a:solidFill>
+        <a:ln w="12700" cap="flat" cmpd="sng" algn="ctr">
+          <a:solidFill>
+            <a:schemeClr val="lt1">
+              <a:hueOff val="0"/>
+              <a:satOff val="0"/>
+              <a:lumOff val="0"/>
+              <a:alphaOff val="0"/>
+            </a:schemeClr>
+          </a:solidFill>
+          <a:prstDash val="solid"/>
+          <a:miter lim="800000"/>
+        </a:ln>
+        <a:effectLst/>
+      </dsp:spPr>
+      <dsp:style>
+        <a:lnRef idx="2">
+          <a:scrgbClr r="0" g="0" b="0"/>
+        </a:lnRef>
+        <a:fillRef idx="1">
+          <a:scrgbClr r="0" g="0" b="0"/>
+        </a:fillRef>
+        <a:effectRef idx="0">
+          <a:scrgbClr r="0" g="0" b="0"/>
+        </a:effectRef>
+        <a:fontRef idx="minor">
+          <a:schemeClr val="lt1"/>
+        </a:fontRef>
+      </dsp:style>
+    </dsp:sp>
+    <dsp:sp modelId="{B6D96C63-9EA5-4EBC-BCFA-CF10C3B1CC41}">
+      <dsp:nvSpPr>
+        <dsp:cNvPr id="0" name=""/>
+        <dsp:cNvSpPr/>
+      </dsp:nvSpPr>
+      <dsp:spPr>
+        <a:xfrm>
+          <a:off x="5906700" y="2422306"/>
+          <a:ext cx="1353593" cy="639128"/>
+        </a:xfrm>
+        <a:prstGeom prst="roundRect">
+          <a:avLst>
+            <a:gd name="adj" fmla="val 10000"/>
+          </a:avLst>
+        </a:prstGeom>
+        <a:solidFill>
+          <a:schemeClr val="lt1">
+            <a:alpha val="90000"/>
+            <a:hueOff val="0"/>
+            <a:satOff val="0"/>
+            <a:lumOff val="0"/>
+            <a:alphaOff val="0"/>
+          </a:schemeClr>
+        </a:solidFill>
+        <a:ln w="12700" cap="flat" cmpd="sng" algn="ctr">
+          <a:solidFill>
+            <a:schemeClr val="accent1">
+              <a:hueOff val="0"/>
+              <a:satOff val="0"/>
+              <a:lumOff val="0"/>
+              <a:alphaOff val="0"/>
+            </a:schemeClr>
+          </a:solidFill>
+          <a:prstDash val="solid"/>
+          <a:miter lim="800000"/>
+        </a:ln>
+        <a:effectLst/>
+      </dsp:spPr>
+      <dsp:style>
+        <a:lnRef idx="2">
+          <a:scrgbClr r="0" g="0" b="0"/>
+        </a:lnRef>
+        <a:fillRef idx="1">
+          <a:scrgbClr r="0" g="0" b="0"/>
+        </a:fillRef>
+        <a:effectRef idx="0">
+          <a:scrgbClr r="0" g="0" b="0"/>
+        </a:effectRef>
+        <a:fontRef idx="minor"/>
+      </dsp:style>
+      <dsp:txBody>
+        <a:bodyPr spcFirstLastPara="0" vert="horz" wrap="square" lIns="53340" tIns="53340" rIns="53340" bIns="53340" numCol="1" spcCol="1270" anchor="ctr" anchorCtr="0">
+          <a:noAutofit/>
+        </a:bodyPr>
+        <a:lstStyle/>
+        <a:p>
+          <a:pPr lvl="0" algn="ctr" defTabSz="622300">
+            <a:lnSpc>
+              <a:spcPct val="90000"/>
+            </a:lnSpc>
+            <a:spcBef>
+              <a:spcPct val="0"/>
+            </a:spcBef>
+            <a:spcAft>
+              <a:spcPct val="35000"/>
+            </a:spcAft>
+          </a:pPr>
+          <a:r>
+            <a:rPr lang="en-US" sz="1400" kern="1200" baseline="0" dirty="0" err="1"/>
+            <a:t>metadata.json</a:t>
+          </a:r>
+          <a:r>
+            <a:rPr lang="en-US" sz="1400" kern="1200" baseline="0" dirty="0"/>
+            <a:t/>
+          </a:r>
+          <a:br>
+            <a:rPr lang="en-US" sz="1400" kern="1200" baseline="0" dirty="0"/>
+          </a:br>
+          <a:r>
+            <a:rPr lang="en-US" sz="1400" kern="1200" baseline="0" dirty="0"/>
+            <a:t>(Dublin Core)</a:t>
+          </a:r>
+        </a:p>
+      </dsp:txBody>
+      <dsp:txXfrm>
+        <a:off x="5925419" y="2441025"/>
+        <a:ext cx="1316155" cy="601690"/>
+      </dsp:txXfrm>
+    </dsp:sp>
+    <dsp:sp modelId="{295D90B2-D32A-4489-A429-CF0E105F5327}">
+      <dsp:nvSpPr>
+        <dsp:cNvPr id="0" name=""/>
+        <dsp:cNvSpPr/>
+      </dsp:nvSpPr>
+      <dsp:spPr>
+        <a:xfrm>
+          <a:off x="7372127" y="2316064"/>
           <a:ext cx="1006501" cy="639128"/>
         </a:xfrm>
         <a:prstGeom prst="roundRect">
@@ -5984,14 +6497,14 @@
         </a:fontRef>
       </dsp:style>
     </dsp:sp>
-    <dsp:sp modelId="{A87540D3-F830-41BD-9A10-CD1CDC824B11}">
+    <dsp:sp modelId="{103AD321-37C2-4DAA-B852-908F5B3EB6A8}">
       <dsp:nvSpPr>
         <dsp:cNvPr id="0" name=""/>
         <dsp:cNvSpPr/>
       </dsp:nvSpPr>
       <dsp:spPr>
         <a:xfrm>
-          <a:off x="7002872" y="1490453"/>
+          <a:off x="7483960" y="2422306"/>
           <a:ext cx="1006501" cy="639128"/>
         </a:xfrm>
         <a:prstGeom prst="roundRect">
@@ -6040,7 +6553,7 @@
         </a:bodyPr>
         <a:lstStyle/>
         <a:p>
-          <a:pPr marL="0" lvl="0" indent="0" algn="ctr" defTabSz="622300">
+          <a:pPr lvl="0" algn="ctr" defTabSz="622300">
             <a:lnSpc>
               <a:spcPct val="90000"/>
             </a:lnSpc>
@@ -6050,27 +6563,27 @@
             <a:spcAft>
               <a:spcPct val="35000"/>
             </a:spcAft>
-            <a:buNone/>
           </a:pPr>
           <a:r>
-            <a:rPr lang="en-US" sz="1400" kern="1200" baseline="0" dirty="0"/>
-            <a:t>metadata</a:t>
+            <a:rPr lang="en-US" sz="1400" kern="1200" baseline="0" smtClean="0"/>
+            <a:t>revisions</a:t>
           </a:r>
+          <a:endParaRPr lang="en-US" sz="1400" kern="1200" baseline="0" dirty="0"/>
         </a:p>
       </dsp:txBody>
       <dsp:txXfrm>
-        <a:off x="7021591" y="1509172"/>
+        <a:off x="7502679" y="2441025"/>
         <a:ext cx="969063" cy="601690"/>
       </dsp:txXfrm>
     </dsp:sp>
-    <dsp:sp modelId="{E05D9250-02A1-466E-9394-D878C6B21066}">
+    <dsp:sp modelId="{939DAF17-CDD6-4135-AE9C-F83D4C44C91B}">
       <dsp:nvSpPr>
         <dsp:cNvPr id="0" name=""/>
         <dsp:cNvSpPr/>
       </dsp:nvSpPr>
       <dsp:spPr>
         <a:xfrm>
-          <a:off x="5487324" y="2316064"/>
+          <a:off x="6757042" y="3247917"/>
           <a:ext cx="1006501" cy="639128"/>
         </a:xfrm>
         <a:prstGeom prst="roundRect">
@@ -6115,14 +6628,14 @@
         </a:fontRef>
       </dsp:style>
     </dsp:sp>
-    <dsp:sp modelId="{9450FCFE-5D5E-48BB-B65E-15E8D1D3F1C8}">
+    <dsp:sp modelId="{0EF8C61B-402E-46C8-A5B4-80DF33CB4364}">
       <dsp:nvSpPr>
         <dsp:cNvPr id="0" name=""/>
         <dsp:cNvSpPr/>
       </dsp:nvSpPr>
       <dsp:spPr>
         <a:xfrm>
-          <a:off x="5599157" y="2422306"/>
+          <a:off x="6868876" y="3354159"/>
           <a:ext cx="1006501" cy="639128"/>
         </a:xfrm>
         <a:prstGeom prst="roundRect">
@@ -6166,12 +6679,12 @@
         <a:fontRef idx="minor"/>
       </dsp:style>
       <dsp:txBody>
-        <a:bodyPr spcFirstLastPara="0" vert="horz" wrap="square" lIns="53340" tIns="53340" rIns="53340" bIns="53340" numCol="1" spcCol="1270" anchor="ctr" anchorCtr="0">
+        <a:bodyPr spcFirstLastPara="0" vert="horz" wrap="square" lIns="49530" tIns="49530" rIns="49530" bIns="49530" numCol="1" spcCol="1270" anchor="ctr" anchorCtr="0">
           <a:noAutofit/>
         </a:bodyPr>
         <a:lstStyle/>
         <a:p>
-          <a:pPr marL="0" lvl="0" indent="0" algn="ctr" defTabSz="622300">
+          <a:pPr lvl="0" algn="ctr" defTabSz="577850">
             <a:lnSpc>
               <a:spcPct val="90000"/>
             </a:lnSpc>
@@ -6181,27 +6694,26 @@
             <a:spcAft>
               <a:spcPct val="35000"/>
             </a:spcAft>
-            <a:buNone/>
           </a:pPr>
           <a:r>
-            <a:rPr lang="en-US" sz="1400" kern="1200" baseline="0" dirty="0"/>
-            <a:t>checksum.md5</a:t>
+            <a:rPr lang="en-US" sz="1300" kern="1200" baseline="0" dirty="0"/>
+            <a:t>1.xml</a:t>
           </a:r>
         </a:p>
       </dsp:txBody>
       <dsp:txXfrm>
-        <a:off x="5617876" y="2441025"/>
+        <a:off x="6887595" y="3372878"/>
         <a:ext cx="969063" cy="601690"/>
       </dsp:txXfrm>
     </dsp:sp>
-    <dsp:sp modelId="{D1DB5463-056A-4879-ADA8-42770FCA7B99}">
+    <dsp:sp modelId="{84B620C5-363F-4C1E-9940-E9AB072DE63B}">
       <dsp:nvSpPr>
         <dsp:cNvPr id="0" name=""/>
         <dsp:cNvSpPr/>
       </dsp:nvSpPr>
       <dsp:spPr>
         <a:xfrm>
-          <a:off x="6717492" y="2316064"/>
+          <a:off x="7987211" y="3247917"/>
           <a:ext cx="1006501" cy="639128"/>
         </a:xfrm>
         <a:prstGeom prst="roundRect">
@@ -6246,14 +6758,14 @@
         </a:fontRef>
       </dsp:style>
     </dsp:sp>
-    <dsp:sp modelId="{32C02F5D-2AFD-4AEB-B702-B9D5EDFC6578}">
+    <dsp:sp modelId="{A25BC8F9-7585-41FB-BA74-6F019EEC87A7}">
       <dsp:nvSpPr>
         <dsp:cNvPr id="0" name=""/>
         <dsp:cNvSpPr/>
       </dsp:nvSpPr>
       <dsp:spPr>
         <a:xfrm>
-          <a:off x="6829326" y="2422306"/>
+          <a:off x="8099044" y="3354159"/>
           <a:ext cx="1006501" cy="639128"/>
         </a:xfrm>
         <a:prstGeom prst="roundRect">
@@ -6297,12 +6809,12 @@
         <a:fontRef idx="minor"/>
       </dsp:style>
       <dsp:txBody>
-        <a:bodyPr spcFirstLastPara="0" vert="horz" wrap="square" lIns="53340" tIns="53340" rIns="53340" bIns="53340" numCol="1" spcCol="1270" anchor="ctr" anchorCtr="0">
+        <a:bodyPr spcFirstLastPara="0" vert="horz" wrap="square" lIns="49530" tIns="49530" rIns="49530" bIns="49530" numCol="1" spcCol="1270" anchor="ctr" anchorCtr="0">
           <a:noAutofit/>
         </a:bodyPr>
         <a:lstStyle/>
         <a:p>
-          <a:pPr marL="0" lvl="0" indent="0" algn="ctr" defTabSz="622300">
+          <a:pPr lvl="0" algn="ctr" defTabSz="577850">
             <a:lnSpc>
               <a:spcPct val="90000"/>
             </a:lnSpc>
@@ -6312,155 +6824,16 @@
             <a:spcAft>
               <a:spcPct val="35000"/>
             </a:spcAft>
-            <a:buNone/>
           </a:pPr>
           <a:r>
-            <a:rPr lang="en-US" sz="1400" kern="1200" baseline="0" dirty="0"/>
-            <a:t>EP3.xml</a:t>
+            <a:rPr lang="en-US" sz="1300" kern="1200" baseline="0" dirty="0"/>
+            <a:t>2.xml</a:t>
           </a:r>
         </a:p>
       </dsp:txBody>
       <dsp:txXfrm>
-        <a:off x="6848045" y="2441025"/>
+        <a:off x="8117763" y="3372878"/>
         <a:ext cx="969063" cy="601690"/>
-      </dsp:txXfrm>
-    </dsp:sp>
-    <dsp:sp modelId="{B898930F-812D-4B70-A930-6FC5D6860FF4}">
-      <dsp:nvSpPr>
-        <dsp:cNvPr id="0" name=""/>
-        <dsp:cNvSpPr/>
-      </dsp:nvSpPr>
-      <dsp:spPr>
-        <a:xfrm>
-          <a:off x="7947661" y="2316064"/>
-          <a:ext cx="1353593" cy="639128"/>
-        </a:xfrm>
-        <a:prstGeom prst="roundRect">
-          <a:avLst>
-            <a:gd name="adj" fmla="val 10000"/>
-          </a:avLst>
-        </a:prstGeom>
-        <a:solidFill>
-          <a:schemeClr val="accent1">
-            <a:hueOff val="0"/>
-            <a:satOff val="0"/>
-            <a:lumOff val="0"/>
-            <a:alphaOff val="0"/>
-          </a:schemeClr>
-        </a:solidFill>
-        <a:ln w="12700" cap="flat" cmpd="sng" algn="ctr">
-          <a:solidFill>
-            <a:schemeClr val="lt1">
-              <a:hueOff val="0"/>
-              <a:satOff val="0"/>
-              <a:lumOff val="0"/>
-              <a:alphaOff val="0"/>
-            </a:schemeClr>
-          </a:solidFill>
-          <a:prstDash val="solid"/>
-          <a:miter lim="800000"/>
-        </a:ln>
-        <a:effectLst/>
-      </dsp:spPr>
-      <dsp:style>
-        <a:lnRef idx="2">
-          <a:scrgbClr r="0" g="0" b="0"/>
-        </a:lnRef>
-        <a:fillRef idx="1">
-          <a:scrgbClr r="0" g="0" b="0"/>
-        </a:fillRef>
-        <a:effectRef idx="0">
-          <a:scrgbClr r="0" g="0" b="0"/>
-        </a:effectRef>
-        <a:fontRef idx="minor">
-          <a:schemeClr val="lt1"/>
-        </a:fontRef>
-      </dsp:style>
-    </dsp:sp>
-    <dsp:sp modelId="{B6D96C63-9EA5-4EBC-BCFA-CF10C3B1CC41}">
-      <dsp:nvSpPr>
-        <dsp:cNvPr id="0" name=""/>
-        <dsp:cNvSpPr/>
-      </dsp:nvSpPr>
-      <dsp:spPr>
-        <a:xfrm>
-          <a:off x="8059495" y="2422306"/>
-          <a:ext cx="1353593" cy="639128"/>
-        </a:xfrm>
-        <a:prstGeom prst="roundRect">
-          <a:avLst>
-            <a:gd name="adj" fmla="val 10000"/>
-          </a:avLst>
-        </a:prstGeom>
-        <a:solidFill>
-          <a:schemeClr val="lt1">
-            <a:alpha val="90000"/>
-            <a:hueOff val="0"/>
-            <a:satOff val="0"/>
-            <a:lumOff val="0"/>
-            <a:alphaOff val="0"/>
-          </a:schemeClr>
-        </a:solidFill>
-        <a:ln w="12700" cap="flat" cmpd="sng" algn="ctr">
-          <a:solidFill>
-            <a:schemeClr val="accent1">
-              <a:hueOff val="0"/>
-              <a:satOff val="0"/>
-              <a:lumOff val="0"/>
-              <a:alphaOff val="0"/>
-            </a:schemeClr>
-          </a:solidFill>
-          <a:prstDash val="solid"/>
-          <a:miter lim="800000"/>
-        </a:ln>
-        <a:effectLst/>
-      </dsp:spPr>
-      <dsp:style>
-        <a:lnRef idx="2">
-          <a:scrgbClr r="0" g="0" b="0"/>
-        </a:lnRef>
-        <a:fillRef idx="1">
-          <a:scrgbClr r="0" g="0" b="0"/>
-        </a:fillRef>
-        <a:effectRef idx="0">
-          <a:scrgbClr r="0" g="0" b="0"/>
-        </a:effectRef>
-        <a:fontRef idx="minor"/>
-      </dsp:style>
-      <dsp:txBody>
-        <a:bodyPr spcFirstLastPara="0" vert="horz" wrap="square" lIns="53340" tIns="53340" rIns="53340" bIns="53340" numCol="1" spcCol="1270" anchor="ctr" anchorCtr="0">
-          <a:noAutofit/>
-        </a:bodyPr>
-        <a:lstStyle/>
-        <a:p>
-          <a:pPr marL="0" lvl="0" indent="0" algn="ctr" defTabSz="622300">
-            <a:lnSpc>
-              <a:spcPct val="90000"/>
-            </a:lnSpc>
-            <a:spcBef>
-              <a:spcPct val="0"/>
-            </a:spcBef>
-            <a:spcAft>
-              <a:spcPct val="35000"/>
-            </a:spcAft>
-            <a:buNone/>
-          </a:pPr>
-          <a:r>
-            <a:rPr lang="en-US" sz="1400" kern="1200" baseline="0" dirty="0" err="1"/>
-            <a:t>metadata.json</a:t>
-          </a:r>
-          <a:br>
-            <a:rPr lang="en-US" sz="1400" kern="1200" baseline="0" dirty="0"/>
-          </a:br>
-          <a:r>
-            <a:rPr lang="en-US" sz="1400" kern="1200" baseline="0" dirty="0"/>
-            <a:t>(Dublin Core)</a:t>
-          </a:r>
-        </a:p>
-      </dsp:txBody>
-      <dsp:txXfrm>
-        <a:off x="8078214" y="2441025"/>
-        <a:ext cx="1316155" cy="601690"/>
       </dsp:txXfrm>
     </dsp:sp>
   </dsp:spTree>
@@ -6522,7 +6895,7 @@
         </a:bodyPr>
         <a:lstStyle/>
         <a:p>
-          <a:pPr marL="0" lvl="0" indent="0" algn="ctr" defTabSz="977900">
+          <a:pPr lvl="0" algn="ctr" defTabSz="977900">
             <a:lnSpc>
               <a:spcPct val="90000"/>
             </a:lnSpc>
@@ -6532,7 +6905,6 @@
             <a:spcAft>
               <a:spcPct val="35000"/>
             </a:spcAft>
-            <a:buNone/>
           </a:pPr>
           <a:r>
             <a:rPr lang="en-US" sz="2200" kern="1200" dirty="0"/>
@@ -6600,7 +6972,7 @@
         </a:bodyPr>
         <a:lstStyle/>
         <a:p>
-          <a:pPr marL="0" lvl="0" indent="0" algn="ctr" defTabSz="977900">
+          <a:pPr lvl="0" algn="ctr" defTabSz="977900">
             <a:lnSpc>
               <a:spcPct val="90000"/>
             </a:lnSpc>
@@ -6610,7 +6982,6 @@
             <a:spcAft>
               <a:spcPct val="35000"/>
             </a:spcAft>
-            <a:buNone/>
           </a:pPr>
           <a:r>
             <a:rPr lang="en-US" sz="2200" kern="1200" dirty="0" err="1"/>
@@ -6671,7 +7042,7 @@
         </a:bodyPr>
         <a:lstStyle/>
         <a:p>
-          <a:pPr marL="0" lvl="0" indent="0" algn="ctr" defTabSz="977900">
+          <a:pPr lvl="0" algn="ctr" defTabSz="977900">
             <a:lnSpc>
               <a:spcPct val="90000"/>
             </a:lnSpc>
@@ -6681,7 +7052,6 @@
             <a:spcAft>
               <a:spcPct val="35000"/>
             </a:spcAft>
-            <a:buNone/>
           </a:pPr>
           <a:r>
             <a:rPr lang="en-US" sz="2200" kern="1200" dirty="0"/>
@@ -6741,7 +7111,7 @@
         </a:bodyPr>
         <a:lstStyle/>
         <a:p>
-          <a:pPr marL="0" lvl="0" indent="0" algn="ctr" defTabSz="977900">
+          <a:pPr lvl="0" algn="ctr" defTabSz="977900">
             <a:lnSpc>
               <a:spcPct val="90000"/>
             </a:lnSpc>
@@ -6751,7 +7121,6 @@
             <a:spcAft>
               <a:spcPct val="35000"/>
             </a:spcAft>
-            <a:buNone/>
           </a:pPr>
           <a:r>
             <a:rPr lang="en-US" sz="2200" kern="1200" dirty="0" err="1"/>
@@ -6812,7 +7181,7 @@
         </a:bodyPr>
         <a:lstStyle/>
         <a:p>
-          <a:pPr marL="0" lvl="0" indent="0" algn="ctr" defTabSz="977900">
+          <a:pPr lvl="0" algn="ctr" defTabSz="977900">
             <a:lnSpc>
               <a:spcPct val="90000"/>
             </a:lnSpc>
@@ -6822,7 +7191,6 @@
             <a:spcAft>
               <a:spcPct val="35000"/>
             </a:spcAft>
-            <a:buNone/>
           </a:pPr>
           <a:r>
             <a:rPr lang="en-US" sz="2200" kern="1200" dirty="0"/>
@@ -6892,7 +7260,7 @@
         </a:bodyPr>
         <a:lstStyle/>
         <a:p>
-          <a:pPr marL="0" lvl="0" indent="0" algn="ctr" defTabSz="977900">
+          <a:pPr lvl="0" algn="ctr" defTabSz="977900">
             <a:lnSpc>
               <a:spcPct val="90000"/>
             </a:lnSpc>
@@ -6902,7 +7270,6 @@
             <a:spcAft>
               <a:spcPct val="35000"/>
             </a:spcAft>
-            <a:buNone/>
           </a:pPr>
           <a:r>
             <a:rPr lang="en-CA" sz="2200" kern="1200" dirty="0" err="1"/>
@@ -6981,7 +7348,7 @@
         </a:bodyPr>
         <a:lstStyle/>
         <a:p>
-          <a:pPr marL="0" lvl="0" indent="0" algn="ctr" defTabSz="222250">
+          <a:pPr lvl="0" algn="ctr" defTabSz="222250">
             <a:lnSpc>
               <a:spcPct val="90000"/>
             </a:lnSpc>
@@ -6991,7 +7358,6 @@
             <a:spcAft>
               <a:spcPct val="35000"/>
             </a:spcAft>
-            <a:buNone/>
           </a:pPr>
           <a:endParaRPr lang="en-US" sz="500" kern="1200"/>
         </a:p>
@@ -7058,7 +7424,7 @@
         </a:bodyPr>
         <a:lstStyle/>
         <a:p>
-          <a:pPr marL="0" lvl="0" indent="0" algn="ctr" defTabSz="977900">
+          <a:pPr lvl="0" algn="ctr" defTabSz="977900">
             <a:lnSpc>
               <a:spcPct val="90000"/>
             </a:lnSpc>
@@ -7068,7 +7434,6 @@
             <a:spcAft>
               <a:spcPct val="35000"/>
             </a:spcAft>
-            <a:buNone/>
           </a:pPr>
           <a:r>
             <a:rPr lang="en-CA" sz="2200" kern="1200" dirty="0"/>
@@ -7143,7 +7508,7 @@
         </a:bodyPr>
         <a:lstStyle/>
         <a:p>
-          <a:pPr marL="0" lvl="0" indent="0" algn="ctr" defTabSz="222250">
+          <a:pPr lvl="0" algn="ctr" defTabSz="222250">
             <a:lnSpc>
               <a:spcPct val="90000"/>
             </a:lnSpc>
@@ -7153,7 +7518,6 @@
             <a:spcAft>
               <a:spcPct val="35000"/>
             </a:spcAft>
-            <a:buNone/>
           </a:pPr>
           <a:endParaRPr lang="en-US" sz="500" kern="1200"/>
         </a:p>
@@ -7220,7 +7584,7 @@
         </a:bodyPr>
         <a:lstStyle/>
         <a:p>
-          <a:pPr marL="0" lvl="0" indent="0" algn="ctr" defTabSz="977900">
+          <a:pPr lvl="0" algn="ctr" defTabSz="977900">
             <a:lnSpc>
               <a:spcPct val="90000"/>
             </a:lnSpc>
@@ -7230,7 +7594,6 @@
             <a:spcAft>
               <a:spcPct val="35000"/>
             </a:spcAft>
-            <a:buNone/>
           </a:pPr>
           <a:r>
             <a:rPr lang="en-CA" sz="2200" kern="1200" dirty="0" err="1"/>
@@ -7309,7 +7672,7 @@
         </a:bodyPr>
         <a:lstStyle/>
         <a:p>
-          <a:pPr marL="0" lvl="0" indent="0" algn="ctr" defTabSz="222250">
+          <a:pPr lvl="0" algn="ctr" defTabSz="222250">
             <a:lnSpc>
               <a:spcPct val="90000"/>
             </a:lnSpc>
@@ -7319,7 +7682,6 @@
             <a:spcAft>
               <a:spcPct val="35000"/>
             </a:spcAft>
-            <a:buNone/>
           </a:pPr>
           <a:endParaRPr lang="en-US" sz="500" kern="1200"/>
         </a:p>
@@ -7386,7 +7748,7 @@
         </a:bodyPr>
         <a:lstStyle/>
         <a:p>
-          <a:pPr marL="0" lvl="0" indent="0" algn="ctr" defTabSz="977900">
+          <a:pPr lvl="0" algn="ctr" defTabSz="977900">
             <a:lnSpc>
               <a:spcPct val="90000"/>
             </a:lnSpc>
@@ -7396,7 +7758,6 @@
             <a:spcAft>
               <a:spcPct val="35000"/>
             </a:spcAft>
-            <a:buNone/>
           </a:pPr>
           <a:r>
             <a:rPr lang="en-US" sz="2200" kern="1200" dirty="0" err="1"/>
@@ -7474,7 +7835,7 @@
         </a:bodyPr>
         <a:lstStyle/>
         <a:p>
-          <a:pPr marL="0" lvl="0" indent="0" algn="ctr" defTabSz="222250">
+          <a:pPr lvl="0" algn="ctr" defTabSz="222250">
             <a:lnSpc>
               <a:spcPct val="90000"/>
             </a:lnSpc>
@@ -7484,7 +7845,6 @@
             <a:spcAft>
               <a:spcPct val="35000"/>
             </a:spcAft>
-            <a:buNone/>
           </a:pPr>
           <a:endParaRPr lang="en-US" sz="500" kern="1200"/>
         </a:p>
@@ -7551,7 +7911,7 @@
         </a:bodyPr>
         <a:lstStyle/>
         <a:p>
-          <a:pPr marL="0" lvl="0" indent="0" algn="ctr" defTabSz="977900">
+          <a:pPr lvl="0" algn="ctr" defTabSz="977900">
             <a:lnSpc>
               <a:spcPct val="90000"/>
             </a:lnSpc>
@@ -7561,7 +7921,6 @@
             <a:spcAft>
               <a:spcPct val="35000"/>
             </a:spcAft>
-            <a:buNone/>
           </a:pPr>
           <a:r>
             <a:rPr lang="en-CA" sz="2200" kern="1200" dirty="0"/>
@@ -7644,7 +8003,7 @@
         </a:bodyPr>
         <a:lstStyle/>
         <a:p>
-          <a:pPr marL="0" lvl="0" indent="0" algn="ctr" defTabSz="222250">
+          <a:pPr lvl="0" algn="ctr" defTabSz="222250">
             <a:lnSpc>
               <a:spcPct val="90000"/>
             </a:lnSpc>
@@ -7654,7 +8013,6 @@
             <a:spcAft>
               <a:spcPct val="35000"/>
             </a:spcAft>
-            <a:buNone/>
           </a:pPr>
           <a:endParaRPr lang="en-US" sz="500" kern="1200"/>
         </a:p>
@@ -7721,7 +8079,7 @@
         </a:bodyPr>
         <a:lstStyle/>
         <a:p>
-          <a:pPr marL="0" lvl="0" indent="0" algn="ctr" defTabSz="977900">
+          <a:pPr lvl="0" algn="ctr" defTabSz="977900">
             <a:lnSpc>
               <a:spcPct val="90000"/>
             </a:lnSpc>
@@ -7731,7 +8089,6 @@
             <a:spcAft>
               <a:spcPct val="35000"/>
             </a:spcAft>
-            <a:buNone/>
           </a:pPr>
           <a:r>
             <a:rPr lang="en-CA" sz="2200" kern="1200" dirty="0"/>
@@ -11036,7 +11393,7 @@
           <a:p>
             <a:fld id="{631DEFAC-41BF-4E6E-9128-9BCF41586C00}" type="datetimeFigureOut">
               <a:rPr lang="en-US" smtClean="0"/>
-              <a:t>11/12/18</a:t>
+              <a:t>11/19/2018</a:t>
             </a:fld>
             <a:endParaRPr lang="en-US"/>
           </a:p>
@@ -14350,7 +14707,7 @@
           <p:nvPr>
             <p:extLst>
               <p:ext uri="{D42A27DB-BD31-4B8C-83A1-F6EECF244321}">
-                <p14:modId xmlns:p14="http://schemas.microsoft.com/office/powerpoint/2010/main" val="905344828"/>
+                <p14:modId xmlns:p14="http://schemas.microsoft.com/office/powerpoint/2010/main" val="1634205835"/>
               </p:ext>
             </p:extLst>
           </p:nvPr>

</xml_diff>

<commit_message>
- adding ---EPrintsArchivematicaDatasetID to the export folder name, so that AM can make the callback later with this ID and we can track, inside EPrints, the corresponding UUID of the AIP in the AM Storage Service.
</commit_message>
<xml_diff>
--- a/EPrintsArchivematicaExportStructure-v2.pptx
+++ b/EPrintsArchivematicaExportStructure-v2.pptx
@@ -1632,12 +1632,44 @@
         <a:lstStyle/>
         <a:p>
           <a:r>
-            <a:rPr lang="en-CA" sz="1200" b="1" dirty="0" err="1"/>
-            <a:t>repositoryid-eprintid-lastmoddate</a:t>
+            <a:rPr lang="en-CA" sz="1200" b="1" dirty="0" err="1" smtClean="0"/>
+            <a:t>repositoryid</a:t>
+          </a:r>
+          <a:r>
+            <a:rPr lang="en-CA" sz="1200" b="1" dirty="0" smtClean="0"/>
+            <a:t>-</a:t>
+          </a:r>
+          <a:r>
+            <a:rPr lang="en-CA" sz="1200" b="1" dirty="0" err="1" smtClean="0"/>
+            <a:t>eprintid</a:t>
+          </a:r>
+          <a:r>
+            <a:rPr lang="en-CA" sz="1200" b="1" dirty="0" smtClean="0"/>
+            <a:t>-</a:t>
+          </a:r>
+          <a:r>
+            <a:rPr lang="en-CA" sz="1200" b="1" dirty="0" err="1" smtClean="0"/>
+            <a:t>lastmoddate</a:t>
+          </a:r>
+          <a:r>
+            <a:rPr lang="en-CA" sz="1200" b="0" i="0" dirty="0" smtClean="0"/>
+            <a:t>---</a:t>
+          </a:r>
+          <a:r>
+            <a:rPr lang="en-CA" sz="1200" b="1" i="0" dirty="0" err="1" smtClean="0"/>
+            <a:t>EPrintsArchivematicaDatasetID</a:t>
+          </a:r>
+          <a:r>
+            <a:rPr lang="en-CA" sz="1200" b="1" dirty="0" smtClean="0"/>
+            <a:t> </a:t>
+          </a:r>
+          <a:r>
+            <a:rPr lang="en-CA" sz="1200" b="0" dirty="0"/>
+            <a:t>folder</a:t>
           </a:r>
           <a:r>
             <a:rPr lang="en-CA" sz="1200" b="1" dirty="0"/>
-            <a:t> folder </a:t>
+            <a:t> </a:t>
           </a:r>
           <a:r>
             <a:rPr lang="en-CA" sz="1200" dirty="0"/>
@@ -2242,7 +2274,7 @@
       <dgm:spPr/>
     </dgm:pt>
     <dgm:pt modelId="{E427CD53-C7F2-47C3-8E2D-9550FFDB0AF1}" type="pres">
-      <dgm:prSet presAssocID="{4B45486A-C81F-4BA8-AEEE-9DE931EFB1FA}" presName="text" presStyleLbl="fgAcc0" presStyleIdx="0" presStyleCnt="1" custScaleX="161126" custScaleY="170605">
+      <dgm:prSet presAssocID="{4B45486A-C81F-4BA8-AEEE-9DE931EFB1FA}" presName="text" presStyleLbl="fgAcc0" presStyleIdx="0" presStyleCnt="1" custScaleX="440983" custScaleY="170605">
         <dgm:presLayoutVars>
           <dgm:chPref val="3"/>
         </dgm:presLayoutVars>
@@ -2725,6 +2757,13 @@
     <dgm:pt modelId="{A5C7B76E-693C-419E-80D9-A29E24C8EA4A}" type="pres">
       <dgm:prSet presAssocID="{407FEB63-8158-4A0B-85C2-5B7A8B48439B}" presName="Name17" presStyleLbl="parChTrans1D3" presStyleIdx="5" presStyleCnt="6"/>
       <dgm:spPr/>
+      <dgm:t>
+        <a:bodyPr/>
+        <a:lstStyle/>
+        <a:p>
+          <a:endParaRPr lang="en-US"/>
+        </a:p>
+      </dgm:t>
     </dgm:pt>
     <dgm:pt modelId="{FC80C44F-44C5-45E4-B448-44CA66B1FE92}" type="pres">
       <dgm:prSet presAssocID="{4AB3E4C6-43C2-48D1-A38B-01ECD40F1524}" presName="hierRoot3" presStyleCnt="0"/>
@@ -2760,6 +2799,13 @@
     <dgm:pt modelId="{08D92B9D-B990-423A-876F-1E3FED113F39}" type="pres">
       <dgm:prSet presAssocID="{43F3177A-6443-45D1-BB60-F0C6515A522C}" presName="Name23" presStyleLbl="parChTrans1D4" presStyleIdx="4" presStyleCnt="6"/>
       <dgm:spPr/>
+      <dgm:t>
+        <a:bodyPr/>
+        <a:lstStyle/>
+        <a:p>
+          <a:endParaRPr lang="en-US"/>
+        </a:p>
+      </dgm:t>
     </dgm:pt>
     <dgm:pt modelId="{88925BA9-63E3-4E9F-82A1-1FFB5B7B5BD3}" type="pres">
       <dgm:prSet presAssocID="{4515D76F-57B5-49C6-A6F1-D374F67D1C57}" presName="hierRoot4" presStyleCnt="0"/>
@@ -2795,6 +2841,13 @@
     <dgm:pt modelId="{30CE19D5-C21C-471E-A851-7A903D8FE7CD}" type="pres">
       <dgm:prSet presAssocID="{56856F2B-3CEE-4255-992F-EF7B88167994}" presName="Name23" presStyleLbl="parChTrans1D4" presStyleIdx="5" presStyleCnt="6"/>
       <dgm:spPr/>
+      <dgm:t>
+        <a:bodyPr/>
+        <a:lstStyle/>
+        <a:p>
+          <a:endParaRPr lang="en-US"/>
+        </a:p>
+      </dgm:t>
     </dgm:pt>
     <dgm:pt modelId="{FECF9DA1-2C76-499B-A2C5-0308E310D50F}" type="pres">
       <dgm:prSet presAssocID="{B9051C09-EEE7-4B39-97BB-062B0ADD8898}" presName="hierRoot4" presStyleCnt="0"/>
@@ -2836,14 +2889,14 @@
     <dgm:cxn modelId="{FED7E166-BD0F-4F6A-AD63-C4156D9C3877}" srcId="{1245DEF0-43F9-4230-A81A-980D178A756B}" destId="{B425ABC7-A3E0-4EA9-B0B0-C88BCA4327A4}" srcOrd="0" destOrd="0" parTransId="{86E7B6D8-3187-4F63-AB19-DA0A507E63CF}" sibTransId="{31DC6FC8-7155-44AB-A0C2-7E3659723262}"/>
     <dgm:cxn modelId="{407AD1C1-6AAC-46E4-9968-F8EBC6AEA97C}" srcId="{A1F77813-DA0D-40D1-849D-ADC41B82CA0A}" destId="{4E3C1994-F7FD-4AA9-A246-70726C143854}" srcOrd="0" destOrd="0" parTransId="{EA9BA22A-E1F0-45A9-A49C-BFCDA2B55294}" sibTransId="{F60BD05B-7EEE-4AC9-A656-2EF63AFC4F50}"/>
     <dgm:cxn modelId="{C14C6686-931F-419F-8C59-1B1DA642E4F1}" type="presOf" srcId="{895A8415-186E-42CB-BDCC-8AB59FE0924A}" destId="{A787A79F-FE1A-477E-83CD-31B61485D15B}" srcOrd="0" destOrd="0" presId="urn:microsoft.com/office/officeart/2005/8/layout/hierarchy1"/>
+    <dgm:cxn modelId="{60221A22-0180-4043-B993-B680A713A303}" srcId="{4AB3E4C6-43C2-48D1-A38B-01ECD40F1524}" destId="{4515D76F-57B5-49C6-A6F1-D374F67D1C57}" srcOrd="0" destOrd="0" parTransId="{43F3177A-6443-45D1-BB60-F0C6515A522C}" sibTransId="{FA477417-EB19-4B2B-BFA5-E1652C6CF4FC}"/>
     <dgm:cxn modelId="{F9ED598F-B741-46B2-9855-6BC1EF4960A2}" srcId="{8A45DCF4-0B7F-46CA-9AEF-991A8D1BAF57}" destId="{7162E3DE-4C59-4744-BCED-861246BAEF57}" srcOrd="0" destOrd="0" parTransId="{76F1315D-B542-43FB-9D86-6BE542DF0E15}" sibTransId="{60140E2A-23DB-433A-BA37-E9C855D374C5}"/>
-    <dgm:cxn modelId="{60221A22-0180-4043-B993-B680A713A303}" srcId="{4AB3E4C6-43C2-48D1-A38B-01ECD40F1524}" destId="{4515D76F-57B5-49C6-A6F1-D374F67D1C57}" srcOrd="0" destOrd="0" parTransId="{43F3177A-6443-45D1-BB60-F0C6515A522C}" sibTransId="{FA477417-EB19-4B2B-BFA5-E1652C6CF4FC}"/>
     <dgm:cxn modelId="{643D424E-311C-473F-9492-AC0D835DEDB9}" srcId="{661C1B7C-9DE2-4F22-9F48-D9E13FD0A79C}" destId="{C46F31FD-7EF3-4F4B-8006-EB508A8405C9}" srcOrd="0" destOrd="0" parTransId="{1584C53A-2447-4E17-BF0C-3B02003F65C9}" sibTransId="{8E13F906-C0D5-4414-91F5-3F34A73ECAE7}"/>
     <dgm:cxn modelId="{DF1CFB2D-4438-4528-B0EE-DB35A2DB0ECE}" srcId="{A1F77813-DA0D-40D1-849D-ADC41B82CA0A}" destId="{4AB3E4C6-43C2-48D1-A38B-01ECD40F1524}" srcOrd="3" destOrd="0" parTransId="{407FEB63-8158-4A0B-85C2-5B7A8B48439B}" sibTransId="{81EF869D-083B-48AD-A0E4-BA08709DE1B3}"/>
     <dgm:cxn modelId="{EEBAF1C6-AE25-44CB-B124-98985B2A0DA0}" type="presOf" srcId="{739CE320-AEBA-41DF-A329-8EC1ABB51056}" destId="{F97D9EDF-E13F-4D0F-8781-B5A71300B23F}" srcOrd="0" destOrd="0" presId="urn:microsoft.com/office/officeart/2005/8/layout/hierarchy1"/>
     <dgm:cxn modelId="{6FEE0535-6156-4D1B-AC42-DE47746F3864}" srcId="{661C1B7C-9DE2-4F22-9F48-D9E13FD0A79C}" destId="{8A45DCF4-0B7F-46CA-9AEF-991A8D1BAF57}" srcOrd="1" destOrd="0" parTransId="{739CE320-AEBA-41DF-A329-8EC1ABB51056}" sibTransId="{CE30BABE-A9C7-47E1-BF15-E3CDB0BD6DDF}"/>
+    <dgm:cxn modelId="{CF3D752F-A15A-4D96-A157-62E1081780C8}" type="presOf" srcId="{4515D76F-57B5-49C6-A6F1-D374F67D1C57}" destId="{0EF8C61B-402E-46C8-A5B4-80DF33CB4364}" srcOrd="0" destOrd="0" presId="urn:microsoft.com/office/officeart/2005/8/layout/hierarchy1"/>
     <dgm:cxn modelId="{D14F051A-2F5F-40FE-9E52-B650DB516405}" srcId="{A1F77813-DA0D-40D1-849D-ADC41B82CA0A}" destId="{05CF61FD-F37E-4903-AD79-70AA9CB12F3F}" srcOrd="1" destOrd="0" parTransId="{AB724194-8C5F-4EC8-85D3-603E2D37F61D}" sibTransId="{068CFE31-F983-4A97-99AB-0E7DB4DBE228}"/>
-    <dgm:cxn modelId="{CF3D752F-A15A-4D96-A157-62E1081780C8}" type="presOf" srcId="{4515D76F-57B5-49C6-A6F1-D374F67D1C57}" destId="{0EF8C61B-402E-46C8-A5B4-80DF33CB4364}" srcOrd="0" destOrd="0" presId="urn:microsoft.com/office/officeart/2005/8/layout/hierarchy1"/>
     <dgm:cxn modelId="{99B26500-0EFF-4874-AC8F-B2819FF57375}" type="presOf" srcId="{D9BCAE30-25CA-412D-BFB1-7A093D7B456C}" destId="{1DA52C46-0957-45D5-84AB-55922474A93E}" srcOrd="0" destOrd="0" presId="urn:microsoft.com/office/officeart/2005/8/layout/hierarchy1"/>
     <dgm:cxn modelId="{37AAFB12-7D55-4975-B579-53FF4FA0DC8F}" srcId="{4B45486A-C81F-4BA8-AEEE-9DE931EFB1FA}" destId="{A1F77813-DA0D-40D1-849D-ADC41B82CA0A}" srcOrd="1" destOrd="0" parTransId="{895A8415-186E-42CB-BDCC-8AB59FE0924A}" sibTransId="{5A466318-7B41-4E02-9BA3-5CC1F40C55A0}"/>
     <dgm:cxn modelId="{F75C077A-E342-4D2D-811B-775F96758E7B}" type="presOf" srcId="{1245DEF0-43F9-4230-A81A-980D178A756B}" destId="{FB5950E2-7620-4BF1-A0C5-66658ABCFA8F}" srcOrd="0" destOrd="0" presId="urn:microsoft.com/office/officeart/2005/8/layout/hierarchy1"/>
@@ -2860,9 +2913,9 @@
     <dgm:cxn modelId="{B3414DB1-D1CB-4EDB-B189-BE2BB97D1F9B}" srcId="{4AB3E4C6-43C2-48D1-A38B-01ECD40F1524}" destId="{B9051C09-EEE7-4B39-97BB-062B0ADD8898}" srcOrd="1" destOrd="0" parTransId="{56856F2B-3CEE-4255-992F-EF7B88167994}" sibTransId="{F119A380-1BEB-42D8-87C2-364C7E802DCE}"/>
     <dgm:cxn modelId="{0C81EE67-A3E4-4EAD-80AA-6E643B11BB2D}" srcId="{C46F31FD-7EF3-4F4B-8006-EB508A8405C9}" destId="{1B3B97B0-B938-409A-9DAC-AC4DD6ADD01A}" srcOrd="0" destOrd="0" parTransId="{BC132D8D-8A59-44F1-B428-7713B5EC9CE0}" sibTransId="{A30620E4-2007-4890-A419-3D76282B53F5}"/>
     <dgm:cxn modelId="{144E2FA1-2A12-4DFA-9F92-4CA965AB49DF}" srcId="{A1F77813-DA0D-40D1-849D-ADC41B82CA0A}" destId="{97CC8D6F-7204-402E-87DC-7604A04F6E35}" srcOrd="2" destOrd="0" parTransId="{D9BCAE30-25CA-412D-BFB1-7A093D7B456C}" sibTransId="{9D019E7E-FD7F-43FC-9D6F-7B4B0E8D5D5E}"/>
-    <dgm:cxn modelId="{24167296-3544-47F0-B5A5-A6C96250833A}" type="presOf" srcId="{661C1B7C-9DE2-4F22-9F48-D9E13FD0A79C}" destId="{32523095-824A-4E5E-BB13-108F6A7832E0}" srcOrd="0" destOrd="0" presId="urn:microsoft.com/office/officeart/2005/8/layout/hierarchy1"/>
     <dgm:cxn modelId="{8EDBECAB-7899-4AE4-993D-027751B192A1}" type="presOf" srcId="{B9051C09-EEE7-4B39-97BB-062B0ADD8898}" destId="{A25BC8F9-7585-41FB-BA74-6F019EEC87A7}" srcOrd="0" destOrd="0" presId="urn:microsoft.com/office/officeart/2005/8/layout/hierarchy1"/>
     <dgm:cxn modelId="{5E9ABDD8-A4C8-4311-8E22-095A10782938}" type="presOf" srcId="{C46F31FD-7EF3-4F4B-8006-EB508A8405C9}" destId="{177B5FD7-7D73-4372-BC75-34654571A3BB}" srcOrd="0" destOrd="0" presId="urn:microsoft.com/office/officeart/2005/8/layout/hierarchy1"/>
+    <dgm:cxn modelId="{24167296-3544-47F0-B5A5-A6C96250833A}" type="presOf" srcId="{661C1B7C-9DE2-4F22-9F48-D9E13FD0A79C}" destId="{32523095-824A-4E5E-BB13-108F6A7832E0}" srcOrd="0" destOrd="0" presId="urn:microsoft.com/office/officeart/2005/8/layout/hierarchy1"/>
     <dgm:cxn modelId="{CA281C70-4AE4-43D2-8F20-CC466E1A20BE}" type="presOf" srcId="{7162E3DE-4C59-4744-BCED-861246BAEF57}" destId="{20B05BA1-6646-492F-999C-1460239F9202}" srcOrd="0" destOrd="0" presId="urn:microsoft.com/office/officeart/2005/8/layout/hierarchy1"/>
     <dgm:cxn modelId="{30FDE1A7-28A8-424B-B65B-F68F8ACD8DBE}" type="presOf" srcId="{407FEB63-8158-4A0B-85C2-5B7A8B48439B}" destId="{A5C7B76E-693C-419E-80D9-A29E24C8EA4A}" srcOrd="0" destOrd="0" presId="urn:microsoft.com/office/officeart/2005/8/layout/hierarchy1"/>
     <dgm:cxn modelId="{969DDE65-34D2-464E-ADA3-3C6E86198F74}" type="presOf" srcId="{D569D02A-F937-4D6C-94F5-E1A26484808F}" destId="{473607A1-27FB-4066-9BF8-178C56FE0884}" srcOrd="0" destOrd="0" presId="urn:microsoft.com/office/officeart/2005/8/layout/hierarchy1"/>
@@ -4847,8 +4900,8 @@
       </dsp:nvSpPr>
       <dsp:spPr>
         <a:xfrm>
-          <a:off x="3113685" y="1102"/>
-          <a:ext cx="1621735" cy="1090385"/>
+          <a:off x="1705303" y="1102"/>
+          <a:ext cx="4438500" cy="1090385"/>
         </a:xfrm>
         <a:prstGeom prst="roundRect">
           <a:avLst>
@@ -4899,8 +4952,8 @@
       </dsp:nvSpPr>
       <dsp:spPr>
         <a:xfrm>
-          <a:off x="3225519" y="107344"/>
-          <a:ext cx="1621735" cy="1090385"/>
+          <a:off x="1817136" y="107344"/>
+          <a:ext cx="4438500" cy="1090385"/>
         </a:xfrm>
         <a:prstGeom prst="roundRect">
           <a:avLst>
@@ -4960,12 +5013,44 @@
             </a:spcAft>
           </a:pPr>
           <a:r>
-            <a:rPr lang="en-CA" sz="1200" b="1" kern="1200" dirty="0" err="1"/>
-            <a:t>repositoryid-eprintid-lastmoddate</a:t>
+            <a:rPr lang="en-CA" sz="1200" b="1" kern="1200" dirty="0" err="1" smtClean="0"/>
+            <a:t>repositoryid</a:t>
+          </a:r>
+          <a:r>
+            <a:rPr lang="en-CA" sz="1200" b="1" kern="1200" dirty="0" smtClean="0"/>
+            <a:t>-</a:t>
+          </a:r>
+          <a:r>
+            <a:rPr lang="en-CA" sz="1200" b="1" kern="1200" dirty="0" err="1" smtClean="0"/>
+            <a:t>eprintid</a:t>
+          </a:r>
+          <a:r>
+            <a:rPr lang="en-CA" sz="1200" b="1" kern="1200" dirty="0" smtClean="0"/>
+            <a:t>-</a:t>
+          </a:r>
+          <a:r>
+            <a:rPr lang="en-CA" sz="1200" b="1" kern="1200" dirty="0" err="1" smtClean="0"/>
+            <a:t>lastmoddate</a:t>
+          </a:r>
+          <a:r>
+            <a:rPr lang="en-CA" sz="1200" b="0" i="0" kern="1200" dirty="0" smtClean="0"/>
+            <a:t>---</a:t>
+          </a:r>
+          <a:r>
+            <a:rPr lang="en-CA" sz="1200" b="1" i="0" kern="1200" dirty="0" err="1" smtClean="0"/>
+            <a:t>EPrintsArchivematicaDatasetID</a:t>
+          </a:r>
+          <a:r>
+            <a:rPr lang="en-CA" sz="1200" b="1" kern="1200" dirty="0" smtClean="0"/>
+            <a:t> </a:t>
+          </a:r>
+          <a:r>
+            <a:rPr lang="en-CA" sz="1200" b="0" kern="1200" dirty="0"/>
+            <a:t>folder</a:t>
           </a:r>
           <a:r>
             <a:rPr lang="en-CA" sz="1200" b="1" kern="1200" dirty="0"/>
-            <a:t> folder </a:t>
+            <a:t> </a:t>
           </a:r>
           <a:r>
             <a:rPr lang="en-CA" sz="1200" kern="1200" dirty="0"/>
@@ -4983,8 +5068,8 @@
         </a:p>
       </dsp:txBody>
       <dsp:txXfrm>
-        <a:off x="3257455" y="139280"/>
-        <a:ext cx="1557863" cy="1026513"/>
+        <a:off x="1849072" y="139280"/>
+        <a:ext cx="4374628" cy="1026513"/>
       </dsp:txXfrm>
     </dsp:sp>
     <dsp:sp modelId="{57A2311B-FAB3-41B5-A824-E3EFF5EED4BA}">
@@ -11393,7 +11478,7 @@
           <a:p>
             <a:fld id="{631DEFAC-41BF-4E6E-9128-9BCF41586C00}" type="datetimeFigureOut">
               <a:rPr lang="en-US" smtClean="0"/>
-              <a:t>11/19/2018</a:t>
+              <a:t>11/7/2019</a:t>
             </a:fld>
             <a:endParaRPr lang="en-US"/>
           </a:p>
@@ -14707,7 +14792,7 @@
           <p:nvPr>
             <p:extLst>
               <p:ext uri="{D42A27DB-BD31-4B8C-83A1-F6EECF244321}">
-                <p14:modId xmlns:p14="http://schemas.microsoft.com/office/powerpoint/2010/main" val="1634205835"/>
+                <p14:modId xmlns:p14="http://schemas.microsoft.com/office/powerpoint/2010/main" val="1791440569"/>
               </p:ext>
             </p:extLst>
           </p:nvPr>

</xml_diff>

<commit_message>
- adding ---EPrintsArchivematicaDatasetID to the export folder name so that AM can make the callback later with this ID and we can track, inside EPrints, the corresponding UUID of the AIP in the AM Storage Service.
</commit_message>
<xml_diff>
--- a/EPrintsArchivematicaExportStructure-v2.pptx
+++ b/EPrintsArchivematicaExportStructure-v2.pptx
@@ -1676,11 +1676,11 @@
             <a:t>(for example </a:t>
           </a:r>
           <a:r>
-            <a:rPr lang="en-CA" sz="1200" baseline="0" dirty="0"/>
-            <a:t>library-981471-2016-11-05_05-20-53</a:t>
+            <a:rPr lang="en-CA" sz="1200" baseline="0" dirty="0" smtClean="0"/>
+            <a:t>library-981471-2016-11-05_05-20-53---999</a:t>
           </a:r>
           <a:r>
-            <a:rPr lang="en-CA" sz="1200" dirty="0"/>
+            <a:rPr lang="en-CA" sz="1200" dirty="0" smtClean="0"/>
             <a:t>)</a:t>
           </a:r>
           <a:endParaRPr lang="en-US" sz="1200" dirty="0"/>
@@ -5057,11 +5057,11 @@
             <a:t>(for example </a:t>
           </a:r>
           <a:r>
-            <a:rPr lang="en-CA" sz="1200" kern="1200" baseline="0" dirty="0"/>
-            <a:t>library-981471-2016-11-05_05-20-53</a:t>
+            <a:rPr lang="en-CA" sz="1200" kern="1200" baseline="0" dirty="0" smtClean="0"/>
+            <a:t>library-981471-2016-11-05_05-20-53---999</a:t>
           </a:r>
           <a:r>
-            <a:rPr lang="en-CA" sz="1200" kern="1200" dirty="0"/>
+            <a:rPr lang="en-CA" sz="1200" kern="1200" dirty="0" smtClean="0"/>
             <a:t>)</a:t>
           </a:r>
           <a:endParaRPr lang="en-US" sz="1200" kern="1200" dirty="0"/>
@@ -14792,7 +14792,7 @@
           <p:nvPr>
             <p:extLst>
               <p:ext uri="{D42A27DB-BD31-4B8C-83A1-F6EECF244321}">
-                <p14:modId xmlns:p14="http://schemas.microsoft.com/office/powerpoint/2010/main" val="1791440569"/>
+                <p14:modId xmlns:p14="http://schemas.microsoft.com/office/powerpoint/2010/main" val="1733813101"/>
               </p:ext>
             </p:extLst>
           </p:nvPr>
@@ -14840,6 +14840,13 @@
   <p:clrMapOvr>
     <a:masterClrMapping/>
   </p:clrMapOvr>
+  <p:timing>
+    <p:tnLst>
+      <p:par>
+        <p:cTn id="1" dur="indefinite" restart="never" nodeType="tmRoot"/>
+      </p:par>
+    </p:tnLst>
+  </p:timing>
 </p:sld>
 </file>
 
@@ -14937,6 +14944,13 @@
   <p:clrMapOvr>
     <a:masterClrMapping/>
   </p:clrMapOvr>
+  <p:timing>
+    <p:tnLst>
+      <p:par>
+        <p:cTn id="1" dur="indefinite" restart="never" nodeType="tmRoot"/>
+      </p:par>
+    </p:tnLst>
+  </p:timing>
 </p:sld>
 </file>
 

</xml_diff>

<commit_message>
Update to spec - use EPrintsArchivematicaDatasetID for the top folder name of the exported AIP
</commit_message>
<xml_diff>
--- a/EPrintsArchivematicaExportStructure-v2.pptx
+++ b/EPrintsArchivematicaExportStructure-v2.pptx
@@ -1632,30 +1632,6 @@
         <a:lstStyle/>
         <a:p>
           <a:r>
-            <a:rPr lang="en-CA" sz="1200" b="1" dirty="0" err="1" smtClean="0"/>
-            <a:t>repositoryid</a:t>
-          </a:r>
-          <a:r>
-            <a:rPr lang="en-CA" sz="1200" b="1" dirty="0" smtClean="0"/>
-            <a:t>-</a:t>
-          </a:r>
-          <a:r>
-            <a:rPr lang="en-CA" sz="1200" b="1" dirty="0" err="1" smtClean="0"/>
-            <a:t>eprintid</a:t>
-          </a:r>
-          <a:r>
-            <a:rPr lang="en-CA" sz="1200" b="1" dirty="0" smtClean="0"/>
-            <a:t>-</a:t>
-          </a:r>
-          <a:r>
-            <a:rPr lang="en-CA" sz="1200" b="1" dirty="0" err="1" smtClean="0"/>
-            <a:t>lastmoddate</a:t>
-          </a:r>
-          <a:r>
-            <a:rPr lang="en-CA" sz="1200" b="0" i="0" dirty="0" smtClean="0"/>
-            <a:t>---</a:t>
-          </a:r>
-          <a:r>
             <a:rPr lang="en-CA" sz="1200" b="1" i="0" dirty="0" err="1" smtClean="0"/>
             <a:t>EPrintsArchivematicaDatasetID</a:t>
           </a:r>
@@ -1673,11 +1649,15 @@
           </a:r>
           <a:r>
             <a:rPr lang="en-CA" sz="1200" dirty="0"/>
-            <a:t>(for example </a:t>
+            <a:t>(for </a:t>
           </a:r>
           <a:r>
-            <a:rPr lang="en-CA" sz="1200" baseline="0" dirty="0" smtClean="0"/>
-            <a:t>library-981471-2016-11-05_05-20-53---999</a:t>
+            <a:rPr lang="en-CA" sz="1200"/>
+            <a:t>example </a:t>
+          </a:r>
+          <a:r>
+            <a:rPr lang="en-CA" sz="1200" baseline="0" smtClean="0"/>
+            <a:t>999</a:t>
           </a:r>
           <a:r>
             <a:rPr lang="en-CA" sz="1200" dirty="0" smtClean="0"/>
@@ -5013,30 +4993,6 @@
             </a:spcAft>
           </a:pPr>
           <a:r>
-            <a:rPr lang="en-CA" sz="1200" b="1" kern="1200" dirty="0" err="1" smtClean="0"/>
-            <a:t>repositoryid</a:t>
-          </a:r>
-          <a:r>
-            <a:rPr lang="en-CA" sz="1200" b="1" kern="1200" dirty="0" smtClean="0"/>
-            <a:t>-</a:t>
-          </a:r>
-          <a:r>
-            <a:rPr lang="en-CA" sz="1200" b="1" kern="1200" dirty="0" err="1" smtClean="0"/>
-            <a:t>eprintid</a:t>
-          </a:r>
-          <a:r>
-            <a:rPr lang="en-CA" sz="1200" b="1" kern="1200" dirty="0" smtClean="0"/>
-            <a:t>-</a:t>
-          </a:r>
-          <a:r>
-            <a:rPr lang="en-CA" sz="1200" b="1" kern="1200" dirty="0" err="1" smtClean="0"/>
-            <a:t>lastmoddate</a:t>
-          </a:r>
-          <a:r>
-            <a:rPr lang="en-CA" sz="1200" b="0" i="0" kern="1200" dirty="0" smtClean="0"/>
-            <a:t>---</a:t>
-          </a:r>
-          <a:r>
             <a:rPr lang="en-CA" sz="1200" b="1" i="0" kern="1200" dirty="0" err="1" smtClean="0"/>
             <a:t>EPrintsArchivematicaDatasetID</a:t>
           </a:r>
@@ -5054,11 +5010,15 @@
           </a:r>
           <a:r>
             <a:rPr lang="en-CA" sz="1200" kern="1200" dirty="0"/>
-            <a:t>(for example </a:t>
+            <a:t>(for </a:t>
           </a:r>
           <a:r>
-            <a:rPr lang="en-CA" sz="1200" kern="1200" baseline="0" dirty="0" smtClean="0"/>
-            <a:t>library-981471-2016-11-05_05-20-53---999</a:t>
+            <a:rPr lang="en-CA" sz="1200" kern="1200"/>
+            <a:t>example </a:t>
+          </a:r>
+          <a:r>
+            <a:rPr lang="en-CA" sz="1200" kern="1200" baseline="0" smtClean="0"/>
+            <a:t>999</a:t>
           </a:r>
           <a:r>
             <a:rPr lang="en-CA" sz="1200" kern="1200" dirty="0" smtClean="0"/>
@@ -11478,7 +11438,7 @@
           <a:p>
             <a:fld id="{631DEFAC-41BF-4E6E-9128-9BCF41586C00}" type="datetimeFigureOut">
               <a:rPr lang="en-US" smtClean="0"/>
-              <a:t>11/7/2019</a:t>
+              <a:t>11/14/2019</a:t>
             </a:fld>
             <a:endParaRPr lang="en-US"/>
           </a:p>
@@ -14792,7 +14752,7 @@
           <p:nvPr>
             <p:extLst>
               <p:ext uri="{D42A27DB-BD31-4B8C-83A1-F6EECF244321}">
-                <p14:modId xmlns:p14="http://schemas.microsoft.com/office/powerpoint/2010/main" val="1733813101"/>
+                <p14:modId xmlns:p14="http://schemas.microsoft.com/office/powerpoint/2010/main" val="2378851695"/>
               </p:ext>
             </p:extLst>
           </p:nvPr>

</xml_diff>